<commit_message>
Update UI for 1 3
</commit_message>
<xml_diff>
--- a/Doccuments/UI/IOCome_UI.pptx
+++ b/Doccuments/UI/IOCome_UI.pptx
@@ -6,10 +6,11 @@
   </p:sldMasterIdLst>
   <p:sldIdLst>
     <p:sldId id="256" r:id="rId2"/>
-    <p:sldId id="257" r:id="rId3"/>
-    <p:sldId id="258" r:id="rId4"/>
-    <p:sldId id="259" r:id="rId5"/>
-    <p:sldId id="260" r:id="rId6"/>
+    <p:sldId id="261" r:id="rId3"/>
+    <p:sldId id="257" r:id="rId4"/>
+    <p:sldId id="258" r:id="rId5"/>
+    <p:sldId id="259" r:id="rId6"/>
+    <p:sldId id="260" r:id="rId7"/>
   </p:sldIdLst>
   <p:sldSz cx="12192000" cy="6858000"/>
   <p:notesSz cx="6858000" cy="9144000"/>
@@ -110,7 +111,7 @@
   </p:defaultTextStyle>
   <p:extLst>
     <p:ext uri="{EFAFB233-063F-42B5-8137-9DF3F51BA10A}">
-      <p15:sldGuideLst xmlns:p15="http://schemas.microsoft.com/office/powerpoint/2012/main"/>
+      <p15:sldGuideLst xmlns:p15="http://schemas.microsoft.com/office/powerpoint/2012/main" xmlns=""/>
     </p:ext>
   </p:extLst>
 </p:presentation>
@@ -247,7 +248,7 @@
           <a:p>
             <a:fld id="{C825973C-53B5-47E1-A734-4594CD7192E7}" type="datetimeFigureOut">
               <a:rPr lang="en-US" smtClean="0"/>
-              <a:t>10/30/2021</a:t>
+              <a:t>10/31/2021</a:t>
             </a:fld>
             <a:endParaRPr lang="en-US"/>
           </a:p>
@@ -417,7 +418,7 @@
           <a:p>
             <a:fld id="{C825973C-53B5-47E1-A734-4594CD7192E7}" type="datetimeFigureOut">
               <a:rPr lang="en-US" smtClean="0"/>
-              <a:t>10/30/2021</a:t>
+              <a:t>10/31/2021</a:t>
             </a:fld>
             <a:endParaRPr lang="en-US"/>
           </a:p>
@@ -597,7 +598,7 @@
           <a:p>
             <a:fld id="{C825973C-53B5-47E1-A734-4594CD7192E7}" type="datetimeFigureOut">
               <a:rPr lang="en-US" smtClean="0"/>
-              <a:t>10/30/2021</a:t>
+              <a:t>10/31/2021</a:t>
             </a:fld>
             <a:endParaRPr lang="en-US"/>
           </a:p>
@@ -767,7 +768,7 @@
           <a:p>
             <a:fld id="{C825973C-53B5-47E1-A734-4594CD7192E7}" type="datetimeFigureOut">
               <a:rPr lang="en-US" smtClean="0"/>
-              <a:t>10/30/2021</a:t>
+              <a:t>10/31/2021</a:t>
             </a:fld>
             <a:endParaRPr lang="en-US"/>
           </a:p>
@@ -1013,7 +1014,7 @@
           <a:p>
             <a:fld id="{C825973C-53B5-47E1-A734-4594CD7192E7}" type="datetimeFigureOut">
               <a:rPr lang="en-US" smtClean="0"/>
-              <a:t>10/30/2021</a:t>
+              <a:t>10/31/2021</a:t>
             </a:fld>
             <a:endParaRPr lang="en-US"/>
           </a:p>
@@ -1245,7 +1246,7 @@
           <a:p>
             <a:fld id="{C825973C-53B5-47E1-A734-4594CD7192E7}" type="datetimeFigureOut">
               <a:rPr lang="en-US" smtClean="0"/>
-              <a:t>10/30/2021</a:t>
+              <a:t>10/31/2021</a:t>
             </a:fld>
             <a:endParaRPr lang="en-US"/>
           </a:p>
@@ -1612,7 +1613,7 @@
           <a:p>
             <a:fld id="{C825973C-53B5-47E1-A734-4594CD7192E7}" type="datetimeFigureOut">
               <a:rPr lang="en-US" smtClean="0"/>
-              <a:t>10/30/2021</a:t>
+              <a:t>10/31/2021</a:t>
             </a:fld>
             <a:endParaRPr lang="en-US"/>
           </a:p>
@@ -1730,7 +1731,7 @@
           <a:p>
             <a:fld id="{C825973C-53B5-47E1-A734-4594CD7192E7}" type="datetimeFigureOut">
               <a:rPr lang="en-US" smtClean="0"/>
-              <a:t>10/30/2021</a:t>
+              <a:t>10/31/2021</a:t>
             </a:fld>
             <a:endParaRPr lang="en-US"/>
           </a:p>
@@ -1825,7 +1826,7 @@
           <a:p>
             <a:fld id="{C825973C-53B5-47E1-A734-4594CD7192E7}" type="datetimeFigureOut">
               <a:rPr lang="en-US" smtClean="0"/>
-              <a:t>10/30/2021</a:t>
+              <a:t>10/31/2021</a:t>
             </a:fld>
             <a:endParaRPr lang="en-US"/>
           </a:p>
@@ -2102,7 +2103,7 @@
           <a:p>
             <a:fld id="{C825973C-53B5-47E1-A734-4594CD7192E7}" type="datetimeFigureOut">
               <a:rPr lang="en-US" smtClean="0"/>
-              <a:t>10/30/2021</a:t>
+              <a:t>10/31/2021</a:t>
             </a:fld>
             <a:endParaRPr lang="en-US"/>
           </a:p>
@@ -2355,7 +2356,7 @@
           <a:p>
             <a:fld id="{C825973C-53B5-47E1-A734-4594CD7192E7}" type="datetimeFigureOut">
               <a:rPr lang="en-US" smtClean="0"/>
-              <a:t>10/30/2021</a:t>
+              <a:t>10/31/2021</a:t>
             </a:fld>
             <a:endParaRPr lang="en-US"/>
           </a:p>
@@ -2568,7 +2569,7 @@
           <a:p>
             <a:fld id="{C825973C-53B5-47E1-A734-4594CD7192E7}" type="datetimeFigureOut">
               <a:rPr lang="en-US" smtClean="0"/>
-              <a:t>10/30/2021</a:t>
+              <a:t>10/31/2021</a:t>
             </a:fld>
             <a:endParaRPr lang="en-US"/>
           </a:p>
@@ -4972,6 +4973,385 @@
           </a:fontRef>
         </p:style>
       </p:cxnSp>
+      <p:sp>
+        <p:nvSpPr>
+          <p:cNvPr id="2" name="Oval 1"/>
+          <p:cNvSpPr/>
+          <p:nvPr/>
+        </p:nvSpPr>
+        <p:spPr>
+          <a:xfrm>
+            <a:off x="5257800" y="1135380"/>
+            <a:ext cx="796910" cy="796910"/>
+          </a:xfrm>
+          <a:prstGeom prst="ellipse">
+            <a:avLst/>
+          </a:prstGeom>
+        </p:spPr>
+        <p:style>
+          <a:lnRef idx="2">
+            <a:schemeClr val="accent4">
+              <a:shade val="50000"/>
+            </a:schemeClr>
+          </a:lnRef>
+          <a:fillRef idx="1">
+            <a:schemeClr val="accent4"/>
+          </a:fillRef>
+          <a:effectRef idx="0">
+            <a:schemeClr val="accent4"/>
+          </a:effectRef>
+          <a:fontRef idx="minor">
+            <a:schemeClr val="lt1"/>
+          </a:fontRef>
+        </p:style>
+        <p:txBody>
+          <a:bodyPr rtlCol="0" anchor="ctr"/>
+          <a:lstStyle/>
+          <a:p>
+            <a:pPr algn="ctr"/>
+            <a:endParaRPr lang="en-US"/>
+          </a:p>
+        </p:txBody>
+      </p:sp>
+      <p:sp>
+        <p:nvSpPr>
+          <p:cNvPr id="3" name="Rectangle 2"/>
+          <p:cNvSpPr/>
+          <p:nvPr/>
+        </p:nvSpPr>
+        <p:spPr>
+          <a:xfrm>
+            <a:off x="6252593" y="1135380"/>
+            <a:ext cx="1430517" cy="796910"/>
+          </a:xfrm>
+          <a:prstGeom prst="rect">
+            <a:avLst/>
+          </a:prstGeom>
+        </p:spPr>
+        <p:style>
+          <a:lnRef idx="2">
+            <a:schemeClr val="accent1">
+              <a:shade val="50000"/>
+            </a:schemeClr>
+          </a:lnRef>
+          <a:fillRef idx="1">
+            <a:schemeClr val="accent1"/>
+          </a:fillRef>
+          <a:effectRef idx="0">
+            <a:schemeClr val="accent1"/>
+          </a:effectRef>
+          <a:fontRef idx="minor">
+            <a:schemeClr val="lt1"/>
+          </a:fontRef>
+        </p:style>
+        <p:txBody>
+          <a:bodyPr rtlCol="0" anchor="ctr"/>
+          <a:lstStyle/>
+          <a:p>
+            <a:pPr algn="ctr"/>
+            <a:endParaRPr lang="en-US"/>
+          </a:p>
+        </p:txBody>
+      </p:sp>
+      <p:sp>
+        <p:nvSpPr>
+          <p:cNvPr id="5" name="Rectangle 4"/>
+          <p:cNvSpPr/>
+          <p:nvPr/>
+        </p:nvSpPr>
+        <p:spPr>
+          <a:xfrm>
+            <a:off x="5257800" y="2118360"/>
+            <a:ext cx="2425309" cy="739140"/>
+          </a:xfrm>
+          <a:prstGeom prst="rect">
+            <a:avLst/>
+          </a:prstGeom>
+        </p:spPr>
+        <p:style>
+          <a:lnRef idx="2">
+            <a:schemeClr val="accent1">
+              <a:shade val="50000"/>
+            </a:schemeClr>
+          </a:lnRef>
+          <a:fillRef idx="1">
+            <a:schemeClr val="accent1"/>
+          </a:fillRef>
+          <a:effectRef idx="0">
+            <a:schemeClr val="accent1"/>
+          </a:effectRef>
+          <a:fontRef idx="minor">
+            <a:schemeClr val="lt1"/>
+          </a:fontRef>
+        </p:style>
+        <p:txBody>
+          <a:bodyPr rtlCol="0" anchor="ctr"/>
+          <a:lstStyle/>
+          <a:p>
+            <a:pPr algn="ctr"/>
+            <a:endParaRPr lang="en-US"/>
+          </a:p>
+        </p:txBody>
+      </p:sp>
+      <p:sp>
+        <p:nvSpPr>
+          <p:cNvPr id="6" name="Rectangle 5"/>
+          <p:cNvSpPr/>
+          <p:nvPr/>
+        </p:nvSpPr>
+        <p:spPr>
+          <a:xfrm>
+            <a:off x="5339080" y="2166620"/>
+            <a:ext cx="1938020" cy="101600"/>
+          </a:xfrm>
+          <a:prstGeom prst="rect">
+            <a:avLst/>
+          </a:prstGeom>
+        </p:spPr>
+        <p:style>
+          <a:lnRef idx="2">
+            <a:schemeClr val="accent1">
+              <a:shade val="50000"/>
+            </a:schemeClr>
+          </a:lnRef>
+          <a:fillRef idx="1">
+            <a:schemeClr val="accent1"/>
+          </a:fillRef>
+          <a:effectRef idx="0">
+            <a:schemeClr val="accent1"/>
+          </a:effectRef>
+          <a:fontRef idx="minor">
+            <a:schemeClr val="lt1"/>
+          </a:fontRef>
+        </p:style>
+        <p:txBody>
+          <a:bodyPr rtlCol="0" anchor="ctr"/>
+          <a:lstStyle/>
+          <a:p>
+            <a:r>
+              <a:rPr lang="en-US" sz="1000" dirty="0" smtClean="0"/>
+              <a:t>Date</a:t>
+            </a:r>
+            <a:endParaRPr lang="en-US" sz="1000" dirty="0"/>
+          </a:p>
+        </p:txBody>
+      </p:sp>
+      <p:sp>
+        <p:nvSpPr>
+          <p:cNvPr id="8" name="Rectangle 7"/>
+          <p:cNvSpPr/>
+          <p:nvPr/>
+        </p:nvSpPr>
+        <p:spPr>
+          <a:xfrm>
+            <a:off x="5339080" y="2364740"/>
+            <a:ext cx="1270000" cy="317500"/>
+          </a:xfrm>
+          <a:prstGeom prst="rect">
+            <a:avLst/>
+          </a:prstGeom>
+        </p:spPr>
+        <p:style>
+          <a:lnRef idx="2">
+            <a:schemeClr val="accent1">
+              <a:shade val="50000"/>
+            </a:schemeClr>
+          </a:lnRef>
+          <a:fillRef idx="1">
+            <a:schemeClr val="accent1"/>
+          </a:fillRef>
+          <a:effectRef idx="0">
+            <a:schemeClr val="accent1"/>
+          </a:effectRef>
+          <a:fontRef idx="minor">
+            <a:schemeClr val="lt1"/>
+          </a:fontRef>
+        </p:style>
+        <p:txBody>
+          <a:bodyPr rtlCol="0" anchor="ctr"/>
+          <a:lstStyle/>
+          <a:p>
+            <a:pPr algn="ctr"/>
+            <a:r>
+              <a:rPr lang="en-US" dirty="0" smtClean="0"/>
+              <a:t>Total</a:t>
+            </a:r>
+            <a:endParaRPr lang="en-US" dirty="0"/>
+          </a:p>
+        </p:txBody>
+      </p:sp>
+      <p:sp>
+        <p:nvSpPr>
+          <p:cNvPr id="9" name="Rectangle 8"/>
+          <p:cNvSpPr/>
+          <p:nvPr/>
+        </p:nvSpPr>
+        <p:spPr>
+          <a:xfrm>
+            <a:off x="6685532" y="2364740"/>
+            <a:ext cx="911608" cy="102870"/>
+          </a:xfrm>
+          <a:prstGeom prst="rect">
+            <a:avLst/>
+          </a:prstGeom>
+        </p:spPr>
+        <p:style>
+          <a:lnRef idx="2">
+            <a:schemeClr val="accent1">
+              <a:shade val="50000"/>
+            </a:schemeClr>
+          </a:lnRef>
+          <a:fillRef idx="1">
+            <a:schemeClr val="accent1"/>
+          </a:fillRef>
+          <a:effectRef idx="0">
+            <a:schemeClr val="accent1"/>
+          </a:effectRef>
+          <a:fontRef idx="minor">
+            <a:schemeClr val="lt1"/>
+          </a:fontRef>
+        </p:style>
+        <p:txBody>
+          <a:bodyPr rtlCol="0" anchor="ctr"/>
+          <a:lstStyle/>
+          <a:p>
+            <a:r>
+              <a:rPr lang="en-US" sz="1000" dirty="0" smtClean="0"/>
+              <a:t>In</a:t>
+            </a:r>
+            <a:endParaRPr lang="en-US" sz="1000" dirty="0"/>
+          </a:p>
+        </p:txBody>
+      </p:sp>
+      <p:sp>
+        <p:nvSpPr>
+          <p:cNvPr id="24" name="Rectangle 23"/>
+          <p:cNvSpPr/>
+          <p:nvPr/>
+        </p:nvSpPr>
+        <p:spPr>
+          <a:xfrm>
+            <a:off x="6685532" y="2579370"/>
+            <a:ext cx="911608" cy="102870"/>
+          </a:xfrm>
+          <a:prstGeom prst="rect">
+            <a:avLst/>
+          </a:prstGeom>
+        </p:spPr>
+        <p:style>
+          <a:lnRef idx="2">
+            <a:schemeClr val="accent1">
+              <a:shade val="50000"/>
+            </a:schemeClr>
+          </a:lnRef>
+          <a:fillRef idx="1">
+            <a:schemeClr val="accent1"/>
+          </a:fillRef>
+          <a:effectRef idx="0">
+            <a:schemeClr val="accent1"/>
+          </a:effectRef>
+          <a:fontRef idx="minor">
+            <a:schemeClr val="lt1"/>
+          </a:fontRef>
+        </p:style>
+        <p:txBody>
+          <a:bodyPr rtlCol="0" anchor="ctr"/>
+          <a:lstStyle/>
+          <a:p>
+            <a:r>
+              <a:rPr lang="en-US" sz="1000" dirty="0" smtClean="0"/>
+              <a:t>Out</a:t>
+            </a:r>
+            <a:endParaRPr lang="en-US" sz="1000" dirty="0"/>
+          </a:p>
+        </p:txBody>
+      </p:sp>
+      <p:sp>
+        <p:nvSpPr>
+          <p:cNvPr id="11" name="Rectangle 10"/>
+          <p:cNvSpPr/>
+          <p:nvPr/>
+        </p:nvSpPr>
+        <p:spPr>
+          <a:xfrm>
+            <a:off x="5167866" y="2956560"/>
+            <a:ext cx="2585484" cy="304800"/>
+          </a:xfrm>
+          <a:prstGeom prst="rect">
+            <a:avLst/>
+          </a:prstGeom>
+        </p:spPr>
+        <p:style>
+          <a:lnRef idx="2">
+            <a:schemeClr val="accent1">
+              <a:shade val="50000"/>
+            </a:schemeClr>
+          </a:lnRef>
+          <a:fillRef idx="1">
+            <a:schemeClr val="accent1"/>
+          </a:fillRef>
+          <a:effectRef idx="0">
+            <a:schemeClr val="accent1"/>
+          </a:effectRef>
+          <a:fontRef idx="minor">
+            <a:schemeClr val="lt1"/>
+          </a:fontRef>
+        </p:style>
+        <p:txBody>
+          <a:bodyPr rtlCol="0" anchor="ctr"/>
+          <a:lstStyle/>
+          <a:p>
+            <a:r>
+              <a:rPr lang="en-US" dirty="0" smtClean="0"/>
+              <a:t>Item 1</a:t>
+            </a:r>
+            <a:endParaRPr lang="en-US" dirty="0"/>
+          </a:p>
+        </p:txBody>
+      </p:sp>
+      <p:sp>
+        <p:nvSpPr>
+          <p:cNvPr id="27" name="Rectangle 26"/>
+          <p:cNvSpPr/>
+          <p:nvPr/>
+        </p:nvSpPr>
+        <p:spPr>
+          <a:xfrm>
+            <a:off x="5167868" y="3353633"/>
+            <a:ext cx="2585484" cy="304800"/>
+          </a:xfrm>
+          <a:prstGeom prst="rect">
+            <a:avLst/>
+          </a:prstGeom>
+        </p:spPr>
+        <p:style>
+          <a:lnRef idx="2">
+            <a:schemeClr val="accent1">
+              <a:shade val="50000"/>
+            </a:schemeClr>
+          </a:lnRef>
+          <a:fillRef idx="1">
+            <a:schemeClr val="accent1"/>
+          </a:fillRef>
+          <a:effectRef idx="0">
+            <a:schemeClr val="accent1"/>
+          </a:effectRef>
+          <a:fontRef idx="minor">
+            <a:schemeClr val="lt1"/>
+          </a:fontRef>
+        </p:style>
+        <p:txBody>
+          <a:bodyPr rtlCol="0" anchor="ctr"/>
+          <a:lstStyle/>
+          <a:p>
+            <a:r>
+              <a:rPr lang="en-US" dirty="0" smtClean="0"/>
+              <a:t>Item 2</a:t>
+            </a:r>
+            <a:endParaRPr lang="en-US" dirty="0"/>
+          </a:p>
+        </p:txBody>
+      </p:sp>
     </p:spTree>
     <p:extLst>
       <p:ext uri="{BB962C8B-B14F-4D97-AF65-F5344CB8AC3E}">
@@ -5839,7 +6219,9 @@
           <a:prstGeom prst="actionButtonHome">
             <a:avLst/>
           </a:prstGeom>
-          <a:noFill/>
+          <a:solidFill>
+            <a:schemeClr val="accent4"/>
+          </a:solidFill>
         </p:spPr>
         <p:style>
           <a:lnRef idx="2">
@@ -5880,9 +6262,7 @@
           <a:prstGeom prst="flowChartOr">
             <a:avLst/>
           </a:prstGeom>
-          <a:solidFill>
-            <a:schemeClr val="accent4"/>
-          </a:solidFill>
+          <a:noFill/>
           <a:ln>
             <a:solidFill>
               <a:srgbClr val="0070C0"/>
@@ -6797,7 +7177,15 @@
           <a:lstStyle/>
           <a:p>
             <a:pPr algn="ctr"/>
-            <a:endParaRPr lang="en-US"/>
+            <a:r>
+              <a:rPr lang="en-US" dirty="0" smtClean="0"/>
+              <a:t>Rec</a:t>
+            </a:r>
+            <a:r>
+              <a:rPr lang="en-US" dirty="0" smtClean="0"/>
+              <a:t>ycle list</a:t>
+            </a:r>
+            <a:endParaRPr lang="en-US" dirty="0"/>
           </a:p>
         </p:txBody>
       </p:sp>
@@ -7001,10 +7389,393 @@
           </a:fontRef>
         </p:style>
       </p:cxnSp>
+      <p:sp>
+        <p:nvSpPr>
+          <p:cNvPr id="3" name="Rectangle 2"/>
+          <p:cNvSpPr/>
+          <p:nvPr/>
+        </p:nvSpPr>
+        <p:spPr>
+          <a:xfrm>
+            <a:off x="5257801" y="1135380"/>
+            <a:ext cx="2425310" cy="240030"/>
+          </a:xfrm>
+          <a:prstGeom prst="rect">
+            <a:avLst/>
+          </a:prstGeom>
+        </p:spPr>
+        <p:style>
+          <a:lnRef idx="2">
+            <a:schemeClr val="accent1">
+              <a:shade val="50000"/>
+            </a:schemeClr>
+          </a:lnRef>
+          <a:fillRef idx="1">
+            <a:schemeClr val="accent1"/>
+          </a:fillRef>
+          <a:effectRef idx="0">
+            <a:schemeClr val="accent1"/>
+          </a:effectRef>
+          <a:fontRef idx="minor">
+            <a:schemeClr val="lt1"/>
+          </a:fontRef>
+        </p:style>
+        <p:txBody>
+          <a:bodyPr rtlCol="0" anchor="ctr"/>
+          <a:lstStyle/>
+          <a:p>
+            <a:r>
+              <a:rPr lang="en-US" dirty="0" smtClean="0"/>
+              <a:t>Name</a:t>
+            </a:r>
+            <a:endParaRPr lang="en-US" dirty="0"/>
+          </a:p>
+        </p:txBody>
+      </p:sp>
+      <p:sp>
+        <p:nvSpPr>
+          <p:cNvPr id="5" name="Rectangle 4"/>
+          <p:cNvSpPr/>
+          <p:nvPr/>
+        </p:nvSpPr>
+        <p:spPr>
+          <a:xfrm>
+            <a:off x="5257800" y="1478280"/>
+            <a:ext cx="2425309" cy="739140"/>
+          </a:xfrm>
+          <a:prstGeom prst="rect">
+            <a:avLst/>
+          </a:prstGeom>
+        </p:spPr>
+        <p:style>
+          <a:lnRef idx="2">
+            <a:schemeClr val="accent1">
+              <a:shade val="50000"/>
+            </a:schemeClr>
+          </a:lnRef>
+          <a:fillRef idx="1">
+            <a:schemeClr val="accent1"/>
+          </a:fillRef>
+          <a:effectRef idx="0">
+            <a:schemeClr val="accent1"/>
+          </a:effectRef>
+          <a:fontRef idx="minor">
+            <a:schemeClr val="lt1"/>
+          </a:fontRef>
+        </p:style>
+        <p:txBody>
+          <a:bodyPr rtlCol="0" anchor="ctr"/>
+          <a:lstStyle/>
+          <a:p>
+            <a:pPr algn="ctr"/>
+            <a:endParaRPr lang="en-US"/>
+          </a:p>
+        </p:txBody>
+      </p:sp>
+      <p:sp>
+        <p:nvSpPr>
+          <p:cNvPr id="6" name="Rectangle 5"/>
+          <p:cNvSpPr/>
+          <p:nvPr/>
+        </p:nvSpPr>
+        <p:spPr>
+          <a:xfrm>
+            <a:off x="5339080" y="1526540"/>
+            <a:ext cx="1938020" cy="101600"/>
+          </a:xfrm>
+          <a:prstGeom prst="rect">
+            <a:avLst/>
+          </a:prstGeom>
+        </p:spPr>
+        <p:style>
+          <a:lnRef idx="2">
+            <a:schemeClr val="accent1">
+              <a:shade val="50000"/>
+            </a:schemeClr>
+          </a:lnRef>
+          <a:fillRef idx="1">
+            <a:schemeClr val="accent1"/>
+          </a:fillRef>
+          <a:effectRef idx="0">
+            <a:schemeClr val="accent1"/>
+          </a:effectRef>
+          <a:fontRef idx="minor">
+            <a:schemeClr val="lt1"/>
+          </a:fontRef>
+        </p:style>
+        <p:txBody>
+          <a:bodyPr rtlCol="0" anchor="ctr"/>
+          <a:lstStyle/>
+          <a:p>
+            <a:r>
+              <a:rPr lang="en-US" sz="1000" dirty="0" smtClean="0"/>
+              <a:t>Date</a:t>
+            </a:r>
+            <a:endParaRPr lang="en-US" sz="1000" dirty="0"/>
+          </a:p>
+        </p:txBody>
+      </p:sp>
+      <p:sp>
+        <p:nvSpPr>
+          <p:cNvPr id="8" name="Rectangle 7"/>
+          <p:cNvSpPr/>
+          <p:nvPr/>
+        </p:nvSpPr>
+        <p:spPr>
+          <a:xfrm>
+            <a:off x="5339080" y="1724660"/>
+            <a:ext cx="1270000" cy="317500"/>
+          </a:xfrm>
+          <a:prstGeom prst="rect">
+            <a:avLst/>
+          </a:prstGeom>
+        </p:spPr>
+        <p:style>
+          <a:lnRef idx="2">
+            <a:schemeClr val="accent1">
+              <a:shade val="50000"/>
+            </a:schemeClr>
+          </a:lnRef>
+          <a:fillRef idx="1">
+            <a:schemeClr val="accent1"/>
+          </a:fillRef>
+          <a:effectRef idx="0">
+            <a:schemeClr val="accent1"/>
+          </a:effectRef>
+          <a:fontRef idx="minor">
+            <a:schemeClr val="lt1"/>
+          </a:fontRef>
+        </p:style>
+        <p:txBody>
+          <a:bodyPr rtlCol="0" anchor="ctr"/>
+          <a:lstStyle/>
+          <a:p>
+            <a:pPr algn="ctr"/>
+            <a:r>
+              <a:rPr lang="en-US" dirty="0" smtClean="0"/>
+              <a:t>Total</a:t>
+            </a:r>
+            <a:endParaRPr lang="en-US" dirty="0"/>
+          </a:p>
+        </p:txBody>
+      </p:sp>
+      <p:sp>
+        <p:nvSpPr>
+          <p:cNvPr id="9" name="Rectangle 8"/>
+          <p:cNvSpPr/>
+          <p:nvPr/>
+        </p:nvSpPr>
+        <p:spPr>
+          <a:xfrm>
+            <a:off x="6685532" y="1724660"/>
+            <a:ext cx="911608" cy="102870"/>
+          </a:xfrm>
+          <a:prstGeom prst="rect">
+            <a:avLst/>
+          </a:prstGeom>
+        </p:spPr>
+        <p:style>
+          <a:lnRef idx="2">
+            <a:schemeClr val="accent1">
+              <a:shade val="50000"/>
+            </a:schemeClr>
+          </a:lnRef>
+          <a:fillRef idx="1">
+            <a:schemeClr val="accent1"/>
+          </a:fillRef>
+          <a:effectRef idx="0">
+            <a:schemeClr val="accent1"/>
+          </a:effectRef>
+          <a:fontRef idx="minor">
+            <a:schemeClr val="lt1"/>
+          </a:fontRef>
+        </p:style>
+        <p:txBody>
+          <a:bodyPr rtlCol="0" anchor="ctr"/>
+          <a:lstStyle/>
+          <a:p>
+            <a:r>
+              <a:rPr lang="en-US" sz="1000" dirty="0" smtClean="0"/>
+              <a:t>In</a:t>
+            </a:r>
+            <a:endParaRPr lang="en-US" sz="1000" dirty="0"/>
+          </a:p>
+        </p:txBody>
+      </p:sp>
+      <p:sp>
+        <p:nvSpPr>
+          <p:cNvPr id="24" name="Rectangle 23"/>
+          <p:cNvSpPr/>
+          <p:nvPr/>
+        </p:nvSpPr>
+        <p:spPr>
+          <a:xfrm>
+            <a:off x="6685532" y="1939290"/>
+            <a:ext cx="911608" cy="102870"/>
+          </a:xfrm>
+          <a:prstGeom prst="rect">
+            <a:avLst/>
+          </a:prstGeom>
+        </p:spPr>
+        <p:style>
+          <a:lnRef idx="2">
+            <a:schemeClr val="accent1">
+              <a:shade val="50000"/>
+            </a:schemeClr>
+          </a:lnRef>
+          <a:fillRef idx="1">
+            <a:schemeClr val="accent1"/>
+          </a:fillRef>
+          <a:effectRef idx="0">
+            <a:schemeClr val="accent1"/>
+          </a:effectRef>
+          <a:fontRef idx="minor">
+            <a:schemeClr val="lt1"/>
+          </a:fontRef>
+        </p:style>
+        <p:txBody>
+          <a:bodyPr rtlCol="0" anchor="ctr"/>
+          <a:lstStyle/>
+          <a:p>
+            <a:r>
+              <a:rPr lang="en-US" sz="1000" dirty="0" smtClean="0"/>
+              <a:t>Out</a:t>
+            </a:r>
+            <a:endParaRPr lang="en-US" sz="1000" dirty="0"/>
+          </a:p>
+        </p:txBody>
+      </p:sp>
+      <p:sp>
+        <p:nvSpPr>
+          <p:cNvPr id="11" name="Rectangle 10"/>
+          <p:cNvSpPr/>
+          <p:nvPr/>
+        </p:nvSpPr>
+        <p:spPr>
+          <a:xfrm>
+            <a:off x="5155840" y="2293620"/>
+            <a:ext cx="2585484" cy="304800"/>
+          </a:xfrm>
+          <a:prstGeom prst="rect">
+            <a:avLst/>
+          </a:prstGeom>
+        </p:spPr>
+        <p:style>
+          <a:lnRef idx="2">
+            <a:schemeClr val="accent1">
+              <a:shade val="50000"/>
+            </a:schemeClr>
+          </a:lnRef>
+          <a:fillRef idx="1">
+            <a:schemeClr val="accent1"/>
+          </a:fillRef>
+          <a:effectRef idx="0">
+            <a:schemeClr val="accent1"/>
+          </a:effectRef>
+          <a:fontRef idx="minor">
+            <a:schemeClr val="lt1"/>
+          </a:fontRef>
+        </p:style>
+        <p:txBody>
+          <a:bodyPr rtlCol="0" anchor="ctr"/>
+          <a:lstStyle/>
+          <a:p>
+            <a:r>
+              <a:rPr lang="en-US" dirty="0" smtClean="0"/>
+              <a:t>Item 1</a:t>
+            </a:r>
+            <a:endParaRPr lang="en-US" dirty="0"/>
+          </a:p>
+        </p:txBody>
+      </p:sp>
+      <p:sp>
+        <p:nvSpPr>
+          <p:cNvPr id="27" name="Rectangle 26"/>
+          <p:cNvSpPr/>
+          <p:nvPr/>
+        </p:nvSpPr>
+        <p:spPr>
+          <a:xfrm>
+            <a:off x="5155842" y="2690693"/>
+            <a:ext cx="2585484" cy="304800"/>
+          </a:xfrm>
+          <a:prstGeom prst="rect">
+            <a:avLst/>
+          </a:prstGeom>
+        </p:spPr>
+        <p:style>
+          <a:lnRef idx="2">
+            <a:schemeClr val="accent1">
+              <a:shade val="50000"/>
+            </a:schemeClr>
+          </a:lnRef>
+          <a:fillRef idx="1">
+            <a:schemeClr val="accent1"/>
+          </a:fillRef>
+          <a:effectRef idx="0">
+            <a:schemeClr val="accent1"/>
+          </a:effectRef>
+          <a:fontRef idx="minor">
+            <a:schemeClr val="lt1"/>
+          </a:fontRef>
+        </p:style>
+        <p:txBody>
+          <a:bodyPr rtlCol="0" anchor="ctr"/>
+          <a:lstStyle/>
+          <a:p>
+            <a:r>
+              <a:rPr lang="en-US" dirty="0" smtClean="0"/>
+              <a:t>Item 2</a:t>
+            </a:r>
+            <a:endParaRPr lang="en-US" dirty="0"/>
+          </a:p>
+        </p:txBody>
+      </p:sp>
+      <p:sp>
+        <p:nvSpPr>
+          <p:cNvPr id="12" name="Rectangle 11"/>
+          <p:cNvSpPr/>
+          <p:nvPr/>
+        </p:nvSpPr>
+        <p:spPr>
+          <a:xfrm>
+            <a:off x="5128260" y="2244090"/>
+            <a:ext cx="2644140" cy="3360420"/>
+          </a:xfrm>
+          <a:prstGeom prst="rect">
+            <a:avLst/>
+          </a:prstGeom>
+          <a:noFill/>
+        </p:spPr>
+        <p:style>
+          <a:lnRef idx="2">
+            <a:schemeClr val="accent1">
+              <a:shade val="50000"/>
+            </a:schemeClr>
+          </a:lnRef>
+          <a:fillRef idx="1">
+            <a:schemeClr val="accent1"/>
+          </a:fillRef>
+          <a:effectRef idx="0">
+            <a:schemeClr val="accent1"/>
+          </a:effectRef>
+          <a:fontRef idx="minor">
+            <a:schemeClr val="lt1"/>
+          </a:fontRef>
+        </p:style>
+        <p:txBody>
+          <a:bodyPr rtlCol="0" anchor="ctr"/>
+          <a:lstStyle/>
+          <a:p>
+            <a:pPr algn="ctr"/>
+            <a:endParaRPr lang="en-US"/>
+          </a:p>
+        </p:txBody>
+      </p:sp>
     </p:spTree>
     <p:extLst>
       <p:ext uri="{BB962C8B-B14F-4D97-AF65-F5344CB8AC3E}">
-        <p14:creationId xmlns:p14="http://schemas.microsoft.com/office/powerpoint/2010/main" val="3531403397"/>
+        <p14:creationId xmlns:p14="http://schemas.microsoft.com/office/powerpoint/2010/main" val="3917702710"/>
       </p:ext>
     </p:extLst>
   </p:cSld>
@@ -7909,7 +8680,9 @@
           <a:prstGeom prst="flowChartOr">
             <a:avLst/>
           </a:prstGeom>
-          <a:noFill/>
+          <a:solidFill>
+            <a:schemeClr val="accent4"/>
+          </a:solidFill>
           <a:ln>
             <a:solidFill>
               <a:srgbClr val="0070C0"/>
@@ -8655,9 +9428,7 @@
           <a:prstGeom prst="flowChartCollate">
             <a:avLst/>
           </a:prstGeom>
-          <a:solidFill>
-            <a:schemeClr val="accent4"/>
-          </a:solidFill>
+          <a:noFill/>
         </p:spPr>
         <p:style>
           <a:lnRef idx="2">
@@ -9033,7 +9804,7 @@
     </p:spTree>
     <p:extLst>
       <p:ext uri="{BB962C8B-B14F-4D97-AF65-F5344CB8AC3E}">
-        <p14:creationId xmlns:p14="http://schemas.microsoft.com/office/powerpoint/2010/main" val="3100980107"/>
+        <p14:creationId xmlns:p14="http://schemas.microsoft.com/office/powerpoint/2010/main" val="3531403397"/>
       </p:ext>
     </p:extLst>
   </p:cSld>
@@ -10684,7 +11455,9 @@
           <a:prstGeom prst="flowChartCollate">
             <a:avLst/>
           </a:prstGeom>
-          <a:noFill/>
+          <a:solidFill>
+            <a:schemeClr val="accent4"/>
+          </a:solidFill>
         </p:spPr>
         <p:style>
           <a:lnRef idx="2">
@@ -10731,9 +11504,7 @@
           <a:prstGeom prst="actionButtonInformation">
             <a:avLst/>
           </a:prstGeom>
-          <a:solidFill>
-            <a:schemeClr val="accent4"/>
-          </a:solidFill>
+          <a:noFill/>
         </p:spPr>
         <p:style>
           <a:lnRef idx="2">
@@ -11059,10 +11830,782 @@
           </a:fontRef>
         </p:style>
       </p:cxnSp>
+      <p:sp>
+        <p:nvSpPr>
+          <p:cNvPr id="2" name="Rectangle 1"/>
+          <p:cNvSpPr/>
+          <p:nvPr/>
+        </p:nvSpPr>
+        <p:spPr>
+          <a:xfrm>
+            <a:off x="5091715" y="890826"/>
+            <a:ext cx="1355651" cy="172164"/>
+          </a:xfrm>
+          <a:prstGeom prst="rect">
+            <a:avLst/>
+          </a:prstGeom>
+        </p:spPr>
+        <p:style>
+          <a:lnRef idx="2">
+            <a:schemeClr val="accent4">
+              <a:shade val="50000"/>
+            </a:schemeClr>
+          </a:lnRef>
+          <a:fillRef idx="1">
+            <a:schemeClr val="accent4"/>
+          </a:fillRef>
+          <a:effectRef idx="0">
+            <a:schemeClr val="accent4"/>
+          </a:effectRef>
+          <a:fontRef idx="minor">
+            <a:schemeClr val="lt1"/>
+          </a:fontRef>
+        </p:style>
+        <p:txBody>
+          <a:bodyPr rtlCol="0" anchor="ctr"/>
+          <a:lstStyle/>
+          <a:p>
+            <a:pPr algn="ctr"/>
+            <a:r>
+              <a:rPr lang="en-US" dirty="0" smtClean="0"/>
+              <a:t>Chi</a:t>
+            </a:r>
+            <a:endParaRPr lang="en-US" dirty="0"/>
+          </a:p>
+        </p:txBody>
+      </p:sp>
+      <p:sp>
+        <p:nvSpPr>
+          <p:cNvPr id="3" name="Rectangle 2"/>
+          <p:cNvSpPr/>
+          <p:nvPr/>
+        </p:nvSpPr>
+        <p:spPr>
+          <a:xfrm>
+            <a:off x="6447366" y="890826"/>
+            <a:ext cx="1355652" cy="172164"/>
+          </a:xfrm>
+          <a:prstGeom prst="rect">
+            <a:avLst/>
+          </a:prstGeom>
+        </p:spPr>
+        <p:style>
+          <a:lnRef idx="2">
+            <a:schemeClr val="accent1">
+              <a:shade val="50000"/>
+            </a:schemeClr>
+          </a:lnRef>
+          <a:fillRef idx="1">
+            <a:schemeClr val="accent1"/>
+          </a:fillRef>
+          <a:effectRef idx="0">
+            <a:schemeClr val="accent1"/>
+          </a:effectRef>
+          <a:fontRef idx="minor">
+            <a:schemeClr val="lt1"/>
+          </a:fontRef>
+        </p:style>
+        <p:txBody>
+          <a:bodyPr rtlCol="0" anchor="ctr"/>
+          <a:lstStyle/>
+          <a:p>
+            <a:pPr algn="ctr"/>
+            <a:r>
+              <a:rPr lang="en-US" dirty="0" smtClean="0"/>
+              <a:t>Thu</a:t>
+            </a:r>
+            <a:endParaRPr lang="en-US" dirty="0"/>
+          </a:p>
+        </p:txBody>
+      </p:sp>
+      <p:cxnSp>
+        <p:nvCxnSpPr>
+          <p:cNvPr id="6" name="Straight Arrow Connector 5"/>
+          <p:cNvCxnSpPr/>
+          <p:nvPr/>
+        </p:nvCxnSpPr>
+        <p:spPr>
+          <a:xfrm>
+            <a:off x="7653524" y="976908"/>
+            <a:ext cx="560836" cy="0"/>
+          </a:xfrm>
+          <a:prstGeom prst="straightConnector1">
+            <a:avLst/>
+          </a:prstGeom>
+          <a:ln>
+            <a:tailEnd type="arrow"/>
+          </a:ln>
+        </p:spPr>
+        <p:style>
+          <a:lnRef idx="1">
+            <a:schemeClr val="accent1"/>
+          </a:lnRef>
+          <a:fillRef idx="0">
+            <a:schemeClr val="accent1"/>
+          </a:fillRef>
+          <a:effectRef idx="0">
+            <a:schemeClr val="accent1"/>
+          </a:effectRef>
+          <a:fontRef idx="minor">
+            <a:schemeClr val="tx1"/>
+          </a:fontRef>
+        </p:style>
+      </p:cxnSp>
+      <p:sp>
+        <p:nvSpPr>
+          <p:cNvPr id="8" name="TextBox 7"/>
+          <p:cNvSpPr txBox="1"/>
+          <p:nvPr/>
+        </p:nvSpPr>
+        <p:spPr>
+          <a:xfrm>
+            <a:off x="8214360" y="853797"/>
+            <a:ext cx="405840" cy="246221"/>
+          </a:xfrm>
+          <a:prstGeom prst="rect">
+            <a:avLst/>
+          </a:prstGeom>
+          <a:noFill/>
+        </p:spPr>
+        <p:txBody>
+          <a:bodyPr wrap="square" rtlCol="0">
+            <a:spAutoFit/>
+          </a:bodyPr>
+          <a:lstStyle/>
+          <a:p>
+            <a:r>
+              <a:rPr lang="en-US" sz="1000" dirty="0" smtClean="0"/>
+              <a:t>Tab</a:t>
+            </a:r>
+            <a:endParaRPr lang="en-US" sz="1000" dirty="0"/>
+          </a:p>
+        </p:txBody>
+      </p:sp>
+      <p:sp>
+        <p:nvSpPr>
+          <p:cNvPr id="9" name="Rectangle 8"/>
+          <p:cNvSpPr/>
+          <p:nvPr/>
+        </p:nvSpPr>
+        <p:spPr>
+          <a:xfrm>
+            <a:off x="5091715" y="1062990"/>
+            <a:ext cx="2711303" cy="236220"/>
+          </a:xfrm>
+          <a:prstGeom prst="rect">
+            <a:avLst/>
+          </a:prstGeom>
+        </p:spPr>
+        <p:style>
+          <a:lnRef idx="2">
+            <a:schemeClr val="accent3">
+              <a:shade val="50000"/>
+            </a:schemeClr>
+          </a:lnRef>
+          <a:fillRef idx="1">
+            <a:schemeClr val="accent3"/>
+          </a:fillRef>
+          <a:effectRef idx="0">
+            <a:schemeClr val="accent3"/>
+          </a:effectRef>
+          <a:fontRef idx="minor">
+            <a:schemeClr val="lt1"/>
+          </a:fontRef>
+        </p:style>
+        <p:txBody>
+          <a:bodyPr rtlCol="0" anchor="ctr"/>
+          <a:lstStyle/>
+          <a:p>
+            <a:pPr algn="ctr"/>
+            <a:r>
+              <a:rPr lang="en-US" dirty="0" smtClean="0"/>
+              <a:t>Date(MM/YYYY)</a:t>
+            </a:r>
+            <a:endParaRPr lang="en-US" dirty="0"/>
+          </a:p>
+        </p:txBody>
+      </p:sp>
+      <p:sp>
+        <p:nvSpPr>
+          <p:cNvPr id="11" name="Rectangle 10"/>
+          <p:cNvSpPr/>
+          <p:nvPr/>
+        </p:nvSpPr>
+        <p:spPr>
+          <a:xfrm>
+            <a:off x="5167868" y="1600200"/>
+            <a:ext cx="2577864" cy="194310"/>
+          </a:xfrm>
+          <a:prstGeom prst="rect">
+            <a:avLst/>
+          </a:prstGeom>
+        </p:spPr>
+        <p:style>
+          <a:lnRef idx="2">
+            <a:schemeClr val="accent1">
+              <a:shade val="50000"/>
+            </a:schemeClr>
+          </a:lnRef>
+          <a:fillRef idx="1">
+            <a:schemeClr val="accent1"/>
+          </a:fillRef>
+          <a:effectRef idx="0">
+            <a:schemeClr val="accent1"/>
+          </a:effectRef>
+          <a:fontRef idx="minor">
+            <a:schemeClr val="lt1"/>
+          </a:fontRef>
+        </p:style>
+        <p:txBody>
+          <a:bodyPr rtlCol="0" anchor="ctr"/>
+          <a:lstStyle/>
+          <a:p>
+            <a:pPr algn="ctr"/>
+            <a:r>
+              <a:rPr lang="en-US" dirty="0" smtClean="0"/>
+              <a:t>Item 1</a:t>
+            </a:r>
+            <a:endParaRPr lang="en-US" dirty="0"/>
+          </a:p>
+        </p:txBody>
+      </p:sp>
+      <p:cxnSp>
+        <p:nvCxnSpPr>
+          <p:cNvPr id="14" name="Straight Connector 13"/>
+          <p:cNvCxnSpPr/>
+          <p:nvPr/>
+        </p:nvCxnSpPr>
+        <p:spPr>
+          <a:xfrm>
+            <a:off x="5167868" y="1497330"/>
+            <a:ext cx="2577864" cy="0"/>
+          </a:xfrm>
+          <a:prstGeom prst="line">
+            <a:avLst/>
+          </a:prstGeom>
+        </p:spPr>
+        <p:style>
+          <a:lnRef idx="1">
+            <a:schemeClr val="accent1"/>
+          </a:lnRef>
+          <a:fillRef idx="0">
+            <a:schemeClr val="accent1"/>
+          </a:fillRef>
+          <a:effectRef idx="0">
+            <a:schemeClr val="accent1"/>
+          </a:effectRef>
+          <a:fontRef idx="minor">
+            <a:schemeClr val="tx1"/>
+          </a:fontRef>
+        </p:style>
+      </p:cxnSp>
+      <p:sp>
+        <p:nvSpPr>
+          <p:cNvPr id="15" name="TextBox 14"/>
+          <p:cNvSpPr txBox="1"/>
+          <p:nvPr/>
+        </p:nvSpPr>
+        <p:spPr>
+          <a:xfrm>
+            <a:off x="5174864" y="1312515"/>
+            <a:ext cx="418216" cy="200055"/>
+          </a:xfrm>
+          <a:prstGeom prst="rect">
+            <a:avLst/>
+          </a:prstGeom>
+          <a:noFill/>
+        </p:spPr>
+        <p:txBody>
+          <a:bodyPr wrap="square" rtlCol="0">
+            <a:spAutoFit/>
+          </a:bodyPr>
+          <a:lstStyle/>
+          <a:p>
+            <a:r>
+              <a:rPr lang="en-US" sz="700" dirty="0" smtClean="0"/>
+              <a:t>Day 1</a:t>
+            </a:r>
+            <a:endParaRPr lang="en-US" sz="700" dirty="0"/>
+          </a:p>
+        </p:txBody>
+      </p:sp>
+      <p:sp>
+        <p:nvSpPr>
+          <p:cNvPr id="29" name="Rectangle 28"/>
+          <p:cNvSpPr/>
+          <p:nvPr/>
+        </p:nvSpPr>
+        <p:spPr>
+          <a:xfrm>
+            <a:off x="5167868" y="1849755"/>
+            <a:ext cx="2577864" cy="194310"/>
+          </a:xfrm>
+          <a:prstGeom prst="rect">
+            <a:avLst/>
+          </a:prstGeom>
+        </p:spPr>
+        <p:style>
+          <a:lnRef idx="2">
+            <a:schemeClr val="accent1">
+              <a:shade val="50000"/>
+            </a:schemeClr>
+          </a:lnRef>
+          <a:fillRef idx="1">
+            <a:schemeClr val="accent1"/>
+          </a:fillRef>
+          <a:effectRef idx="0">
+            <a:schemeClr val="accent1"/>
+          </a:effectRef>
+          <a:fontRef idx="minor">
+            <a:schemeClr val="lt1"/>
+          </a:fontRef>
+        </p:style>
+        <p:txBody>
+          <a:bodyPr rtlCol="0" anchor="ctr"/>
+          <a:lstStyle/>
+          <a:p>
+            <a:pPr algn="ctr"/>
+            <a:r>
+              <a:rPr lang="en-US" dirty="0" smtClean="0"/>
+              <a:t>Item 2</a:t>
+            </a:r>
+            <a:endParaRPr lang="en-US" dirty="0"/>
+          </a:p>
+        </p:txBody>
+      </p:sp>
+      <p:sp>
+        <p:nvSpPr>
+          <p:cNvPr id="32" name="Rectangle 31"/>
+          <p:cNvSpPr/>
+          <p:nvPr/>
+        </p:nvSpPr>
+        <p:spPr>
+          <a:xfrm>
+            <a:off x="5167868" y="2095500"/>
+            <a:ext cx="2577864" cy="194310"/>
+          </a:xfrm>
+          <a:prstGeom prst="rect">
+            <a:avLst/>
+          </a:prstGeom>
+        </p:spPr>
+        <p:style>
+          <a:lnRef idx="2">
+            <a:schemeClr val="accent1">
+              <a:shade val="50000"/>
+            </a:schemeClr>
+          </a:lnRef>
+          <a:fillRef idx="1">
+            <a:schemeClr val="accent1"/>
+          </a:fillRef>
+          <a:effectRef idx="0">
+            <a:schemeClr val="accent1"/>
+          </a:effectRef>
+          <a:fontRef idx="minor">
+            <a:schemeClr val="lt1"/>
+          </a:fontRef>
+        </p:style>
+        <p:txBody>
+          <a:bodyPr rtlCol="0" anchor="ctr"/>
+          <a:lstStyle/>
+          <a:p>
+            <a:pPr algn="ctr"/>
+            <a:r>
+              <a:rPr lang="en-US" dirty="0" smtClean="0"/>
+              <a:t>Item 3</a:t>
+            </a:r>
+            <a:endParaRPr lang="en-US" dirty="0"/>
+          </a:p>
+        </p:txBody>
+      </p:sp>
+      <p:cxnSp>
+        <p:nvCxnSpPr>
+          <p:cNvPr id="33" name="Straight Connector 32"/>
+          <p:cNvCxnSpPr/>
+          <p:nvPr/>
+        </p:nvCxnSpPr>
+        <p:spPr>
+          <a:xfrm>
+            <a:off x="5167868" y="2560320"/>
+            <a:ext cx="2577864" cy="0"/>
+          </a:xfrm>
+          <a:prstGeom prst="line">
+            <a:avLst/>
+          </a:prstGeom>
+        </p:spPr>
+        <p:style>
+          <a:lnRef idx="1">
+            <a:schemeClr val="accent1"/>
+          </a:lnRef>
+          <a:fillRef idx="0">
+            <a:schemeClr val="accent1"/>
+          </a:fillRef>
+          <a:effectRef idx="0">
+            <a:schemeClr val="accent1"/>
+          </a:effectRef>
+          <a:fontRef idx="minor">
+            <a:schemeClr val="tx1"/>
+          </a:fontRef>
+        </p:style>
+      </p:cxnSp>
+      <p:sp>
+        <p:nvSpPr>
+          <p:cNvPr id="35" name="TextBox 34"/>
+          <p:cNvSpPr txBox="1"/>
+          <p:nvPr/>
+        </p:nvSpPr>
+        <p:spPr>
+          <a:xfrm>
+            <a:off x="5174864" y="2375505"/>
+            <a:ext cx="418216" cy="200055"/>
+          </a:xfrm>
+          <a:prstGeom prst="rect">
+            <a:avLst/>
+          </a:prstGeom>
+          <a:noFill/>
+        </p:spPr>
+        <p:txBody>
+          <a:bodyPr wrap="square" rtlCol="0">
+            <a:spAutoFit/>
+          </a:bodyPr>
+          <a:lstStyle/>
+          <a:p>
+            <a:r>
+              <a:rPr lang="en-US" sz="700" dirty="0" smtClean="0"/>
+              <a:t>Day 2</a:t>
+            </a:r>
+            <a:endParaRPr lang="en-US" sz="700" dirty="0"/>
+          </a:p>
+        </p:txBody>
+      </p:sp>
+      <p:sp>
+        <p:nvSpPr>
+          <p:cNvPr id="40" name="Rectangle 39"/>
+          <p:cNvSpPr/>
+          <p:nvPr/>
+        </p:nvSpPr>
+        <p:spPr>
+          <a:xfrm>
+            <a:off x="5167868" y="2671643"/>
+            <a:ext cx="2577864" cy="194310"/>
+          </a:xfrm>
+          <a:prstGeom prst="rect">
+            <a:avLst/>
+          </a:prstGeom>
+        </p:spPr>
+        <p:style>
+          <a:lnRef idx="2">
+            <a:schemeClr val="accent1">
+              <a:shade val="50000"/>
+            </a:schemeClr>
+          </a:lnRef>
+          <a:fillRef idx="1">
+            <a:schemeClr val="accent1"/>
+          </a:fillRef>
+          <a:effectRef idx="0">
+            <a:schemeClr val="accent1"/>
+          </a:effectRef>
+          <a:fontRef idx="minor">
+            <a:schemeClr val="lt1"/>
+          </a:fontRef>
+        </p:style>
+        <p:txBody>
+          <a:bodyPr rtlCol="0" anchor="ctr"/>
+          <a:lstStyle/>
+          <a:p>
+            <a:pPr algn="ctr"/>
+            <a:r>
+              <a:rPr lang="en-US" dirty="0" smtClean="0"/>
+              <a:t>Item 1</a:t>
+            </a:r>
+            <a:endParaRPr lang="en-US" dirty="0"/>
+          </a:p>
+        </p:txBody>
+      </p:sp>
+      <p:sp>
+        <p:nvSpPr>
+          <p:cNvPr id="41" name="Rectangle 40"/>
+          <p:cNvSpPr/>
+          <p:nvPr/>
+        </p:nvSpPr>
+        <p:spPr>
+          <a:xfrm>
+            <a:off x="5167868" y="2921198"/>
+            <a:ext cx="2577864" cy="194310"/>
+          </a:xfrm>
+          <a:prstGeom prst="rect">
+            <a:avLst/>
+          </a:prstGeom>
+        </p:spPr>
+        <p:style>
+          <a:lnRef idx="2">
+            <a:schemeClr val="accent1">
+              <a:shade val="50000"/>
+            </a:schemeClr>
+          </a:lnRef>
+          <a:fillRef idx="1">
+            <a:schemeClr val="accent1"/>
+          </a:fillRef>
+          <a:effectRef idx="0">
+            <a:schemeClr val="accent1"/>
+          </a:effectRef>
+          <a:fontRef idx="minor">
+            <a:schemeClr val="lt1"/>
+          </a:fontRef>
+        </p:style>
+        <p:txBody>
+          <a:bodyPr rtlCol="0" anchor="ctr"/>
+          <a:lstStyle/>
+          <a:p>
+            <a:pPr algn="ctr"/>
+            <a:r>
+              <a:rPr lang="en-US" dirty="0" smtClean="0"/>
+              <a:t>Item 2</a:t>
+            </a:r>
+            <a:endParaRPr lang="en-US" dirty="0"/>
+          </a:p>
+        </p:txBody>
+      </p:sp>
+      <p:sp>
+        <p:nvSpPr>
+          <p:cNvPr id="43" name="Rectangle 42"/>
+          <p:cNvSpPr/>
+          <p:nvPr/>
+        </p:nvSpPr>
+        <p:spPr>
+          <a:xfrm>
+            <a:off x="5167868" y="3166943"/>
+            <a:ext cx="2577864" cy="194310"/>
+          </a:xfrm>
+          <a:prstGeom prst="rect">
+            <a:avLst/>
+          </a:prstGeom>
+        </p:spPr>
+        <p:style>
+          <a:lnRef idx="2">
+            <a:schemeClr val="accent1">
+              <a:shade val="50000"/>
+            </a:schemeClr>
+          </a:lnRef>
+          <a:fillRef idx="1">
+            <a:schemeClr val="accent1"/>
+          </a:fillRef>
+          <a:effectRef idx="0">
+            <a:schemeClr val="accent1"/>
+          </a:effectRef>
+          <a:fontRef idx="minor">
+            <a:schemeClr val="lt1"/>
+          </a:fontRef>
+        </p:style>
+        <p:txBody>
+          <a:bodyPr rtlCol="0" anchor="ctr"/>
+          <a:lstStyle/>
+          <a:p>
+            <a:pPr algn="ctr"/>
+            <a:r>
+              <a:rPr lang="en-US" dirty="0" smtClean="0"/>
+              <a:t>Item 3</a:t>
+            </a:r>
+            <a:endParaRPr lang="en-US" dirty="0"/>
+          </a:p>
+        </p:txBody>
+      </p:sp>
+      <p:sp>
+        <p:nvSpPr>
+          <p:cNvPr id="44" name="Rectangle 43"/>
+          <p:cNvSpPr/>
+          <p:nvPr/>
+        </p:nvSpPr>
+        <p:spPr>
+          <a:xfrm>
+            <a:off x="1429755" y="1600200"/>
+            <a:ext cx="2577864" cy="194310"/>
+          </a:xfrm>
+          <a:prstGeom prst="rect">
+            <a:avLst/>
+          </a:prstGeom>
+        </p:spPr>
+        <p:style>
+          <a:lnRef idx="2">
+            <a:schemeClr val="accent1">
+              <a:shade val="50000"/>
+            </a:schemeClr>
+          </a:lnRef>
+          <a:fillRef idx="1">
+            <a:schemeClr val="accent1"/>
+          </a:fillRef>
+          <a:effectRef idx="0">
+            <a:schemeClr val="accent1"/>
+          </a:effectRef>
+          <a:fontRef idx="minor">
+            <a:schemeClr val="lt1"/>
+          </a:fontRef>
+        </p:style>
+        <p:txBody>
+          <a:bodyPr rtlCol="0" anchor="ctr"/>
+          <a:lstStyle/>
+          <a:p>
+            <a:pPr algn="ctr"/>
+            <a:r>
+              <a:rPr lang="en-US" dirty="0" smtClean="0"/>
+              <a:t>Title</a:t>
+            </a:r>
+            <a:endParaRPr lang="en-US" dirty="0"/>
+          </a:p>
+        </p:txBody>
+      </p:sp>
+      <p:sp>
+        <p:nvSpPr>
+          <p:cNvPr id="19" name="Oval 18"/>
+          <p:cNvSpPr/>
+          <p:nvPr/>
+        </p:nvSpPr>
+        <p:spPr>
+          <a:xfrm>
+            <a:off x="1520190" y="1611630"/>
+            <a:ext cx="182880" cy="182880"/>
+          </a:xfrm>
+          <a:prstGeom prst="ellipse">
+            <a:avLst/>
+          </a:prstGeom>
+        </p:spPr>
+        <p:style>
+          <a:lnRef idx="2">
+            <a:schemeClr val="accent4">
+              <a:shade val="50000"/>
+            </a:schemeClr>
+          </a:lnRef>
+          <a:fillRef idx="1">
+            <a:schemeClr val="accent4"/>
+          </a:fillRef>
+          <a:effectRef idx="0">
+            <a:schemeClr val="accent4"/>
+          </a:effectRef>
+          <a:fontRef idx="minor">
+            <a:schemeClr val="lt1"/>
+          </a:fontRef>
+        </p:style>
+        <p:txBody>
+          <a:bodyPr rtlCol="0" anchor="ctr"/>
+          <a:lstStyle/>
+          <a:p>
+            <a:pPr algn="ctr"/>
+            <a:endParaRPr lang="en-US"/>
+          </a:p>
+        </p:txBody>
+      </p:sp>
+      <p:cxnSp>
+        <p:nvCxnSpPr>
+          <p:cNvPr id="21" name="Straight Arrow Connector 20"/>
+          <p:cNvCxnSpPr>
+            <a:stCxn id="19" idx="4"/>
+          </p:cNvCxnSpPr>
+          <p:nvPr/>
+        </p:nvCxnSpPr>
+        <p:spPr>
+          <a:xfrm>
+            <a:off x="1611630" y="1794510"/>
+            <a:ext cx="0" cy="249555"/>
+          </a:xfrm>
+          <a:prstGeom prst="straightConnector1">
+            <a:avLst/>
+          </a:prstGeom>
+          <a:ln>
+            <a:tailEnd type="arrow"/>
+          </a:ln>
+        </p:spPr>
+        <p:style>
+          <a:lnRef idx="1">
+            <a:schemeClr val="accent1"/>
+          </a:lnRef>
+          <a:fillRef idx="0">
+            <a:schemeClr val="accent1"/>
+          </a:fillRef>
+          <a:effectRef idx="0">
+            <a:schemeClr val="accent1"/>
+          </a:effectRef>
+          <a:fontRef idx="minor">
+            <a:schemeClr val="tx1"/>
+          </a:fontRef>
+        </p:style>
+      </p:cxnSp>
+      <p:sp>
+        <p:nvSpPr>
+          <p:cNvPr id="22" name="TextBox 21"/>
+          <p:cNvSpPr txBox="1"/>
+          <p:nvPr/>
+        </p:nvSpPr>
+        <p:spPr>
+          <a:xfrm>
+            <a:off x="1276350" y="2044065"/>
+            <a:ext cx="609600" cy="369332"/>
+          </a:xfrm>
+          <a:prstGeom prst="rect">
+            <a:avLst/>
+          </a:prstGeom>
+          <a:noFill/>
+        </p:spPr>
+        <p:txBody>
+          <a:bodyPr wrap="square" rtlCol="0">
+            <a:spAutoFit/>
+          </a:bodyPr>
+          <a:lstStyle/>
+          <a:p>
+            <a:r>
+              <a:rPr lang="en-US" dirty="0" smtClean="0"/>
+              <a:t>Icon</a:t>
+            </a:r>
+            <a:endParaRPr lang="en-US" dirty="0"/>
+          </a:p>
+        </p:txBody>
+      </p:sp>
+      <p:sp>
+        <p:nvSpPr>
+          <p:cNvPr id="23" name="Rectangle 22"/>
+          <p:cNvSpPr/>
+          <p:nvPr/>
+        </p:nvSpPr>
+        <p:spPr>
+          <a:xfrm>
+            <a:off x="3276600" y="1642110"/>
+            <a:ext cx="689610" cy="110490"/>
+          </a:xfrm>
+          <a:prstGeom prst="rect">
+            <a:avLst/>
+          </a:prstGeom>
+        </p:spPr>
+        <p:style>
+          <a:lnRef idx="2">
+            <a:schemeClr val="accent6">
+              <a:shade val="50000"/>
+            </a:schemeClr>
+          </a:lnRef>
+          <a:fillRef idx="1">
+            <a:schemeClr val="accent6"/>
+          </a:fillRef>
+          <a:effectRef idx="0">
+            <a:schemeClr val="accent6"/>
+          </a:effectRef>
+          <a:fontRef idx="minor">
+            <a:schemeClr val="lt1"/>
+          </a:fontRef>
+        </p:style>
+        <p:txBody>
+          <a:bodyPr rtlCol="0" anchor="ctr"/>
+          <a:lstStyle/>
+          <a:p>
+            <a:pPr algn="ctr"/>
+            <a:r>
+              <a:rPr lang="en-US" sz="900" dirty="0" smtClean="0"/>
+              <a:t>Money</a:t>
+            </a:r>
+            <a:endParaRPr lang="en-US" sz="900" dirty="0"/>
+          </a:p>
+        </p:txBody>
+      </p:sp>
     </p:spTree>
     <p:extLst>
       <p:ext uri="{BB962C8B-B14F-4D97-AF65-F5344CB8AC3E}">
-        <p14:creationId xmlns:p14="http://schemas.microsoft.com/office/powerpoint/2010/main" val="3804437772"/>
+        <p14:creationId xmlns:p14="http://schemas.microsoft.com/office/powerpoint/2010/main" val="3100980107"/>
       </p:ext>
     </p:extLst>
   </p:cSld>
@@ -11926,9 +13469,7 @@
           <a:prstGeom prst="actionButtonHome">
             <a:avLst/>
           </a:prstGeom>
-          <a:solidFill>
-            <a:schemeClr val="accent4"/>
-          </a:solidFill>
+          <a:noFill/>
         </p:spPr>
         <p:style>
           <a:lnRef idx="2">
@@ -11969,9 +13510,7 @@
           <a:prstGeom prst="flowChartOr">
             <a:avLst/>
           </a:prstGeom>
-          <a:solidFill>
-            <a:schemeClr val="bg1"/>
-          </a:solidFill>
+          <a:noFill/>
           <a:ln>
             <a:solidFill>
               <a:srgbClr val="0070C0"/>
@@ -12717,6 +14256,2039 @@
           <a:prstGeom prst="flowChartCollate">
             <a:avLst/>
           </a:prstGeom>
+          <a:noFill/>
+        </p:spPr>
+        <p:style>
+          <a:lnRef idx="2">
+            <a:schemeClr val="accent1">
+              <a:shade val="50000"/>
+            </a:schemeClr>
+          </a:lnRef>
+          <a:fillRef idx="1">
+            <a:schemeClr val="accent1"/>
+          </a:fillRef>
+          <a:effectRef idx="0">
+            <a:schemeClr val="accent1"/>
+          </a:effectRef>
+          <a:fontRef idx="minor">
+            <a:schemeClr val="lt1"/>
+          </a:fontRef>
+        </p:style>
+        <p:txBody>
+          <a:bodyPr rtlCol="0" anchor="ctr"/>
+          <a:lstStyle/>
+          <a:p>
+            <a:pPr algn="ctr"/>
+            <a:endParaRPr lang="en-US">
+              <a:solidFill>
+                <a:schemeClr val="tx1"/>
+              </a:solidFill>
+            </a:endParaRPr>
+          </a:p>
+        </p:txBody>
+      </p:sp>
+      <p:sp>
+        <p:nvSpPr>
+          <p:cNvPr id="37" name="Action Button: Information 36">
+            <a:hlinkClick r:id="" action="ppaction://noaction" highlightClick="1"/>
+          </p:cNvPr>
+          <p:cNvSpPr/>
+          <p:nvPr/>
+        </p:nvSpPr>
+        <p:spPr>
+          <a:xfrm>
+            <a:off x="7323915" y="5975900"/>
+            <a:ext cx="329609" cy="283741"/>
+          </a:xfrm>
+          <a:prstGeom prst="actionButtonInformation">
+            <a:avLst/>
+          </a:prstGeom>
+          <a:solidFill>
+            <a:schemeClr val="accent4"/>
+          </a:solidFill>
+        </p:spPr>
+        <p:style>
+          <a:lnRef idx="2">
+            <a:schemeClr val="accent1">
+              <a:shade val="50000"/>
+            </a:schemeClr>
+          </a:lnRef>
+          <a:fillRef idx="1">
+            <a:schemeClr val="accent1"/>
+          </a:fillRef>
+          <a:effectRef idx="0">
+            <a:schemeClr val="accent1"/>
+          </a:effectRef>
+          <a:fontRef idx="minor">
+            <a:schemeClr val="lt1"/>
+          </a:fontRef>
+        </p:style>
+        <p:txBody>
+          <a:bodyPr rtlCol="0" anchor="ctr"/>
+          <a:lstStyle/>
+          <a:p>
+            <a:pPr algn="ctr"/>
+            <a:endParaRPr lang="en-US"/>
+          </a:p>
+        </p:txBody>
+      </p:sp>
+      <p:sp>
+        <p:nvSpPr>
+          <p:cNvPr id="38" name="Chevron 37"/>
+          <p:cNvSpPr/>
+          <p:nvPr/>
+        </p:nvSpPr>
+        <p:spPr>
+          <a:xfrm rot="5400000">
+            <a:off x="5241544" y="576027"/>
+            <a:ext cx="147739" cy="295094"/>
+          </a:xfrm>
+          <a:prstGeom prst="chevron">
+            <a:avLst>
+              <a:gd name="adj" fmla="val 72295"/>
+            </a:avLst>
+          </a:prstGeom>
+          <a:solidFill>
+            <a:schemeClr val="accent4"/>
+          </a:solidFill>
+          <a:ln>
+            <a:noFill/>
+          </a:ln>
+        </p:spPr>
+        <p:style>
+          <a:lnRef idx="2">
+            <a:schemeClr val="accent1">
+              <a:shade val="50000"/>
+            </a:schemeClr>
+          </a:lnRef>
+          <a:fillRef idx="1">
+            <a:schemeClr val="accent1"/>
+          </a:fillRef>
+          <a:effectRef idx="0">
+            <a:schemeClr val="accent1"/>
+          </a:effectRef>
+          <a:fontRef idx="minor">
+            <a:schemeClr val="lt1"/>
+          </a:fontRef>
+        </p:style>
+        <p:txBody>
+          <a:bodyPr rtlCol="0" anchor="ctr"/>
+          <a:lstStyle/>
+          <a:p>
+            <a:pPr algn="ctr"/>
+            <a:endParaRPr lang="en-US">
+              <a:solidFill>
+                <a:schemeClr val="tx1"/>
+              </a:solidFill>
+            </a:endParaRPr>
+          </a:p>
+        </p:txBody>
+      </p:sp>
+      <p:sp>
+        <p:nvSpPr>
+          <p:cNvPr id="39" name="Rectangle 38"/>
+          <p:cNvSpPr/>
+          <p:nvPr/>
+        </p:nvSpPr>
+        <p:spPr>
+          <a:xfrm>
+            <a:off x="5091715" y="890826"/>
+            <a:ext cx="2711303" cy="4940855"/>
+          </a:xfrm>
+          <a:prstGeom prst="rect">
+            <a:avLst/>
+          </a:prstGeom>
+          <a:solidFill>
+            <a:schemeClr val="accent1">
+              <a:lumMod val="40000"/>
+              <a:lumOff val="60000"/>
+              <a:alpha val="59000"/>
+            </a:schemeClr>
+          </a:solidFill>
+        </p:spPr>
+        <p:style>
+          <a:lnRef idx="2">
+            <a:schemeClr val="accent1">
+              <a:shade val="50000"/>
+            </a:schemeClr>
+          </a:lnRef>
+          <a:fillRef idx="1">
+            <a:schemeClr val="accent1"/>
+          </a:fillRef>
+          <a:effectRef idx="0">
+            <a:schemeClr val="accent1"/>
+          </a:effectRef>
+          <a:fontRef idx="minor">
+            <a:schemeClr val="lt1"/>
+          </a:fontRef>
+        </p:style>
+        <p:txBody>
+          <a:bodyPr rtlCol="0" anchor="ctr"/>
+          <a:lstStyle/>
+          <a:p>
+            <a:pPr algn="ctr"/>
+            <a:endParaRPr lang="en-US"/>
+          </a:p>
+        </p:txBody>
+      </p:sp>
+      <p:sp>
+        <p:nvSpPr>
+          <p:cNvPr id="42" name="TextBox 41"/>
+          <p:cNvSpPr txBox="1"/>
+          <p:nvPr/>
+        </p:nvSpPr>
+        <p:spPr>
+          <a:xfrm>
+            <a:off x="5546904" y="521494"/>
+            <a:ext cx="1626782" cy="369332"/>
+          </a:xfrm>
+          <a:prstGeom prst="rect">
+            <a:avLst/>
+          </a:prstGeom>
+          <a:noFill/>
+        </p:spPr>
+        <p:txBody>
+          <a:bodyPr wrap="square" rtlCol="0">
+            <a:spAutoFit/>
+          </a:bodyPr>
+          <a:lstStyle/>
+          <a:p>
+            <a:r>
+              <a:rPr lang="en-US" smtClean="0">
+                <a:solidFill>
+                  <a:schemeClr val="accent4"/>
+                </a:solidFill>
+              </a:rPr>
+              <a:t>Information</a:t>
+            </a:r>
+            <a:endParaRPr lang="en-US">
+              <a:solidFill>
+                <a:schemeClr val="accent4"/>
+              </a:solidFill>
+            </a:endParaRPr>
+          </a:p>
+        </p:txBody>
+      </p:sp>
+      <p:sp>
+        <p:nvSpPr>
+          <p:cNvPr id="17" name="Oval 16"/>
+          <p:cNvSpPr/>
+          <p:nvPr/>
+        </p:nvSpPr>
+        <p:spPr>
+          <a:xfrm>
+            <a:off x="6223007" y="5659293"/>
+            <a:ext cx="462525" cy="441971"/>
+          </a:xfrm>
+          <a:prstGeom prst="ellipse">
+            <a:avLst/>
+          </a:prstGeom>
+          <a:solidFill>
+            <a:schemeClr val="accent1"/>
+          </a:solidFill>
+          <a:ln>
+            <a:noFill/>
+          </a:ln>
+        </p:spPr>
+        <p:style>
+          <a:lnRef idx="2">
+            <a:schemeClr val="accent1">
+              <a:shade val="50000"/>
+            </a:schemeClr>
+          </a:lnRef>
+          <a:fillRef idx="1">
+            <a:schemeClr val="accent1"/>
+          </a:fillRef>
+          <a:effectRef idx="0">
+            <a:schemeClr val="accent1"/>
+          </a:effectRef>
+          <a:fontRef idx="minor">
+            <a:schemeClr val="lt1"/>
+          </a:fontRef>
+        </p:style>
+        <p:txBody>
+          <a:bodyPr rtlCol="0" anchor="ctr"/>
+          <a:lstStyle/>
+          <a:p>
+            <a:pPr algn="ctr"/>
+            <a:endParaRPr lang="en-US"/>
+          </a:p>
+        </p:txBody>
+      </p:sp>
+      <p:sp>
+        <p:nvSpPr>
+          <p:cNvPr id="18" name="Oval 17"/>
+          <p:cNvSpPr/>
+          <p:nvPr/>
+        </p:nvSpPr>
+        <p:spPr>
+          <a:xfrm>
+            <a:off x="6252593" y="5683521"/>
+            <a:ext cx="407194" cy="389099"/>
+          </a:xfrm>
+          <a:prstGeom prst="ellipse">
+            <a:avLst/>
+          </a:prstGeom>
+          <a:solidFill>
+            <a:schemeClr val="accent4"/>
+          </a:solidFill>
+          <a:ln>
+            <a:noFill/>
+          </a:ln>
+        </p:spPr>
+        <p:style>
+          <a:lnRef idx="2">
+            <a:schemeClr val="accent1">
+              <a:shade val="50000"/>
+            </a:schemeClr>
+          </a:lnRef>
+          <a:fillRef idx="1">
+            <a:schemeClr val="accent1"/>
+          </a:fillRef>
+          <a:effectRef idx="0">
+            <a:schemeClr val="accent1"/>
+          </a:effectRef>
+          <a:fontRef idx="minor">
+            <a:schemeClr val="lt1"/>
+          </a:fontRef>
+        </p:style>
+        <p:txBody>
+          <a:bodyPr rtlCol="0" anchor="ctr"/>
+          <a:lstStyle/>
+          <a:p>
+            <a:pPr algn="ctr"/>
+            <a:endParaRPr lang="en-US"/>
+          </a:p>
+        </p:txBody>
+      </p:sp>
+      <p:cxnSp>
+        <p:nvCxnSpPr>
+          <p:cNvPr id="26" name="Straight Connector 25"/>
+          <p:cNvCxnSpPr/>
+          <p:nvPr/>
+        </p:nvCxnSpPr>
+        <p:spPr>
+          <a:xfrm>
+            <a:off x="6448469" y="5836015"/>
+            <a:ext cx="0" cy="95250"/>
+          </a:xfrm>
+          <a:prstGeom prst="line">
+            <a:avLst/>
+          </a:prstGeom>
+          <a:ln w="12700">
+            <a:solidFill>
+              <a:schemeClr val="accent1"/>
+            </a:solidFill>
+          </a:ln>
+        </p:spPr>
+        <p:style>
+          <a:lnRef idx="1">
+            <a:schemeClr val="accent1"/>
+          </a:lnRef>
+          <a:fillRef idx="0">
+            <a:schemeClr val="accent1"/>
+          </a:fillRef>
+          <a:effectRef idx="0">
+            <a:schemeClr val="accent1"/>
+          </a:effectRef>
+          <a:fontRef idx="minor">
+            <a:schemeClr val="tx1"/>
+          </a:fontRef>
+        </p:style>
+      </p:cxnSp>
+      <p:cxnSp>
+        <p:nvCxnSpPr>
+          <p:cNvPr id="28" name="Straight Connector 27"/>
+          <p:cNvCxnSpPr/>
+          <p:nvPr/>
+        </p:nvCxnSpPr>
+        <p:spPr>
+          <a:xfrm>
+            <a:off x="6394593" y="5881505"/>
+            <a:ext cx="107979" cy="0"/>
+          </a:xfrm>
+          <a:prstGeom prst="line">
+            <a:avLst/>
+          </a:prstGeom>
+          <a:ln w="12700">
+            <a:solidFill>
+              <a:schemeClr val="accent1"/>
+            </a:solidFill>
+          </a:ln>
+        </p:spPr>
+        <p:style>
+          <a:lnRef idx="1">
+            <a:schemeClr val="accent1"/>
+          </a:lnRef>
+          <a:fillRef idx="0">
+            <a:schemeClr val="accent1"/>
+          </a:fillRef>
+          <a:effectRef idx="0">
+            <a:schemeClr val="accent1"/>
+          </a:effectRef>
+          <a:fontRef idx="minor">
+            <a:schemeClr val="tx1"/>
+          </a:fontRef>
+        </p:style>
+      </p:cxnSp>
+    </p:spTree>
+    <p:extLst>
+      <p:ext uri="{BB962C8B-B14F-4D97-AF65-F5344CB8AC3E}">
+        <p14:creationId xmlns:p14="http://schemas.microsoft.com/office/powerpoint/2010/main" val="3804437772"/>
+      </p:ext>
+    </p:extLst>
+  </p:cSld>
+  <p:clrMapOvr>
+    <a:masterClrMapping/>
+  </p:clrMapOvr>
+</p:sld>
+</file>
+
+<file path=ppt/slides/slide6.xml><?xml version="1.0" encoding="utf-8"?>
+<p:sld xmlns:a="http://schemas.openxmlformats.org/drawingml/2006/main" xmlns:r="http://schemas.openxmlformats.org/officeDocument/2006/relationships" xmlns:p="http://schemas.openxmlformats.org/presentationml/2006/main">
+  <p:cSld>
+    <p:spTree>
+      <p:nvGrpSpPr>
+        <p:cNvPr id="1" name=""/>
+        <p:cNvGrpSpPr/>
+        <p:nvPr/>
+      </p:nvGrpSpPr>
+      <p:grpSpPr>
+        <a:xfrm>
+          <a:off x="0" y="0"/>
+          <a:ext cx="0" cy="0"/>
+          <a:chOff x="0" y="0"/>
+          <a:chExt cx="0" cy="0"/>
+        </a:xfrm>
+      </p:grpSpPr>
+      <p:sp>
+        <p:nvSpPr>
+          <p:cNvPr id="4" name="Rectangle 3"/>
+          <p:cNvSpPr/>
+          <p:nvPr/>
+        </p:nvSpPr>
+        <p:spPr>
+          <a:xfrm>
+            <a:off x="5007430" y="435430"/>
+            <a:ext cx="2888342" cy="5921828"/>
+          </a:xfrm>
+          <a:prstGeom prst="rect">
+            <a:avLst/>
+          </a:prstGeom>
+          <a:solidFill>
+            <a:srgbClr val="66FF66"/>
+          </a:solidFill>
+        </p:spPr>
+        <p:style>
+          <a:lnRef idx="1">
+            <a:schemeClr val="accent6"/>
+          </a:lnRef>
+          <a:fillRef idx="2">
+            <a:schemeClr val="accent6"/>
+          </a:fillRef>
+          <a:effectRef idx="1">
+            <a:schemeClr val="accent6"/>
+          </a:effectRef>
+          <a:fontRef idx="minor">
+            <a:schemeClr val="dk1"/>
+          </a:fontRef>
+        </p:style>
+        <p:txBody>
+          <a:bodyPr rtlCol="0" anchor="ctr"/>
+          <a:lstStyle/>
+          <a:p>
+            <a:pPr algn="ctr"/>
+            <a:endParaRPr lang="en-US"/>
+          </a:p>
+        </p:txBody>
+      </p:sp>
+      <p:cxnSp>
+        <p:nvCxnSpPr>
+          <p:cNvPr id="7" name="Straight Arrow Connector 6"/>
+          <p:cNvCxnSpPr/>
+          <p:nvPr/>
+        </p:nvCxnSpPr>
+        <p:spPr>
+          <a:xfrm>
+            <a:off x="8621486" y="435430"/>
+            <a:ext cx="29029" cy="5921828"/>
+          </a:xfrm>
+          <a:prstGeom prst="straightConnector1">
+            <a:avLst/>
+          </a:prstGeom>
+          <a:ln>
+            <a:headEnd type="triangle"/>
+            <a:tailEnd type="triangle"/>
+          </a:ln>
+        </p:spPr>
+        <p:style>
+          <a:lnRef idx="1">
+            <a:schemeClr val="accent1"/>
+          </a:lnRef>
+          <a:fillRef idx="0">
+            <a:schemeClr val="accent1"/>
+          </a:fillRef>
+          <a:effectRef idx="0">
+            <a:schemeClr val="accent1"/>
+          </a:effectRef>
+          <a:fontRef idx="minor">
+            <a:schemeClr val="tx1"/>
+          </a:fontRef>
+        </p:style>
+      </p:cxnSp>
+      <p:sp>
+        <p:nvSpPr>
+          <p:cNvPr id="10" name="Rectangle 9"/>
+          <p:cNvSpPr/>
+          <p:nvPr/>
+        </p:nvSpPr>
+        <p:spPr>
+          <a:xfrm>
+            <a:off x="5007430" y="5878286"/>
+            <a:ext cx="2888342" cy="478972"/>
+          </a:xfrm>
+          <a:prstGeom prst="rect">
+            <a:avLst/>
+          </a:prstGeom>
+          <a:solidFill>
+            <a:srgbClr val="66FF66"/>
+          </a:solidFill>
+          <a:ln>
+            <a:noFill/>
+          </a:ln>
+        </p:spPr>
+        <p:style>
+          <a:lnRef idx="2">
+            <a:schemeClr val="accent1">
+              <a:shade val="50000"/>
+            </a:schemeClr>
+          </a:lnRef>
+          <a:fillRef idx="1">
+            <a:schemeClr val="accent1"/>
+          </a:fillRef>
+          <a:effectRef idx="0">
+            <a:schemeClr val="accent1"/>
+          </a:effectRef>
+          <a:fontRef idx="minor">
+            <a:schemeClr val="lt1"/>
+          </a:fontRef>
+        </p:style>
+        <p:txBody>
+          <a:bodyPr rtlCol="0" anchor="ctr"/>
+          <a:lstStyle/>
+          <a:p>
+            <a:pPr algn="ctr"/>
+            <a:endParaRPr lang="en-US"/>
+          </a:p>
+        </p:txBody>
+      </p:sp>
+      <p:sp>
+        <p:nvSpPr>
+          <p:cNvPr id="13" name="Rounded Rectangle 12"/>
+          <p:cNvSpPr/>
+          <p:nvPr/>
+        </p:nvSpPr>
+        <p:spPr>
+          <a:xfrm>
+            <a:off x="5009818" y="5882518"/>
+            <a:ext cx="1442201" cy="482267"/>
+          </a:xfrm>
+          <a:custGeom>
+            <a:avLst/>
+            <a:gdLst>
+              <a:gd name="connsiteX0" fmla="*/ 0 w 1132114"/>
+              <a:gd name="connsiteY0" fmla="*/ 113697 h 682171"/>
+              <a:gd name="connsiteX1" fmla="*/ 113697 w 1132114"/>
+              <a:gd name="connsiteY1" fmla="*/ 0 h 682171"/>
+              <a:gd name="connsiteX2" fmla="*/ 1018417 w 1132114"/>
+              <a:gd name="connsiteY2" fmla="*/ 0 h 682171"/>
+              <a:gd name="connsiteX3" fmla="*/ 1132114 w 1132114"/>
+              <a:gd name="connsiteY3" fmla="*/ 113697 h 682171"/>
+              <a:gd name="connsiteX4" fmla="*/ 1132114 w 1132114"/>
+              <a:gd name="connsiteY4" fmla="*/ 568474 h 682171"/>
+              <a:gd name="connsiteX5" fmla="*/ 1018417 w 1132114"/>
+              <a:gd name="connsiteY5" fmla="*/ 682171 h 682171"/>
+              <a:gd name="connsiteX6" fmla="*/ 113697 w 1132114"/>
+              <a:gd name="connsiteY6" fmla="*/ 682171 h 682171"/>
+              <a:gd name="connsiteX7" fmla="*/ 0 w 1132114"/>
+              <a:gd name="connsiteY7" fmla="*/ 568474 h 682171"/>
+              <a:gd name="connsiteX8" fmla="*/ 0 w 1132114"/>
+              <a:gd name="connsiteY8" fmla="*/ 113697 h 682171"/>
+              <a:gd name="connsiteX0" fmla="*/ 0 w 1132114"/>
+              <a:gd name="connsiteY0" fmla="*/ 113697 h 682171"/>
+              <a:gd name="connsiteX1" fmla="*/ 113697 w 1132114"/>
+              <a:gd name="connsiteY1" fmla="*/ 0 h 682171"/>
+              <a:gd name="connsiteX2" fmla="*/ 923167 w 1132114"/>
+              <a:gd name="connsiteY2" fmla="*/ 4762 h 682171"/>
+              <a:gd name="connsiteX3" fmla="*/ 1132114 w 1132114"/>
+              <a:gd name="connsiteY3" fmla="*/ 113697 h 682171"/>
+              <a:gd name="connsiteX4" fmla="*/ 1132114 w 1132114"/>
+              <a:gd name="connsiteY4" fmla="*/ 568474 h 682171"/>
+              <a:gd name="connsiteX5" fmla="*/ 1018417 w 1132114"/>
+              <a:gd name="connsiteY5" fmla="*/ 682171 h 682171"/>
+              <a:gd name="connsiteX6" fmla="*/ 113697 w 1132114"/>
+              <a:gd name="connsiteY6" fmla="*/ 682171 h 682171"/>
+              <a:gd name="connsiteX7" fmla="*/ 0 w 1132114"/>
+              <a:gd name="connsiteY7" fmla="*/ 568474 h 682171"/>
+              <a:gd name="connsiteX8" fmla="*/ 0 w 1132114"/>
+              <a:gd name="connsiteY8" fmla="*/ 113697 h 682171"/>
+              <a:gd name="connsiteX0" fmla="*/ 0 w 1132114"/>
+              <a:gd name="connsiteY0" fmla="*/ 113697 h 682171"/>
+              <a:gd name="connsiteX1" fmla="*/ 113697 w 1132114"/>
+              <a:gd name="connsiteY1" fmla="*/ 0 h 682171"/>
+              <a:gd name="connsiteX2" fmla="*/ 923167 w 1132114"/>
+              <a:gd name="connsiteY2" fmla="*/ 4762 h 682171"/>
+              <a:gd name="connsiteX3" fmla="*/ 1132114 w 1132114"/>
+              <a:gd name="connsiteY3" fmla="*/ 227997 h 682171"/>
+              <a:gd name="connsiteX4" fmla="*/ 1132114 w 1132114"/>
+              <a:gd name="connsiteY4" fmla="*/ 568474 h 682171"/>
+              <a:gd name="connsiteX5" fmla="*/ 1018417 w 1132114"/>
+              <a:gd name="connsiteY5" fmla="*/ 682171 h 682171"/>
+              <a:gd name="connsiteX6" fmla="*/ 113697 w 1132114"/>
+              <a:gd name="connsiteY6" fmla="*/ 682171 h 682171"/>
+              <a:gd name="connsiteX7" fmla="*/ 0 w 1132114"/>
+              <a:gd name="connsiteY7" fmla="*/ 568474 h 682171"/>
+              <a:gd name="connsiteX8" fmla="*/ 0 w 1132114"/>
+              <a:gd name="connsiteY8" fmla="*/ 113697 h 682171"/>
+              <a:gd name="connsiteX0" fmla="*/ 0 w 1132114"/>
+              <a:gd name="connsiteY0" fmla="*/ 113697 h 682171"/>
+              <a:gd name="connsiteX1" fmla="*/ 113697 w 1132114"/>
+              <a:gd name="connsiteY1" fmla="*/ 0 h 682171"/>
+              <a:gd name="connsiteX2" fmla="*/ 923167 w 1132114"/>
+              <a:gd name="connsiteY2" fmla="*/ 4762 h 682171"/>
+              <a:gd name="connsiteX3" fmla="*/ 1132114 w 1132114"/>
+              <a:gd name="connsiteY3" fmla="*/ 227997 h 682171"/>
+              <a:gd name="connsiteX4" fmla="*/ 1132114 w 1132114"/>
+              <a:gd name="connsiteY4" fmla="*/ 568474 h 682171"/>
+              <a:gd name="connsiteX5" fmla="*/ 1018417 w 1132114"/>
+              <a:gd name="connsiteY5" fmla="*/ 682171 h 682171"/>
+              <a:gd name="connsiteX6" fmla="*/ 113697 w 1132114"/>
+              <a:gd name="connsiteY6" fmla="*/ 682171 h 682171"/>
+              <a:gd name="connsiteX7" fmla="*/ 0 w 1132114"/>
+              <a:gd name="connsiteY7" fmla="*/ 568474 h 682171"/>
+              <a:gd name="connsiteX8" fmla="*/ 0 w 1132114"/>
+              <a:gd name="connsiteY8" fmla="*/ 113697 h 682171"/>
+              <a:gd name="connsiteX0" fmla="*/ 0 w 1132114"/>
+              <a:gd name="connsiteY0" fmla="*/ 113697 h 682171"/>
+              <a:gd name="connsiteX1" fmla="*/ 113697 w 1132114"/>
+              <a:gd name="connsiteY1" fmla="*/ 0 h 682171"/>
+              <a:gd name="connsiteX2" fmla="*/ 923167 w 1132114"/>
+              <a:gd name="connsiteY2" fmla="*/ 4762 h 682171"/>
+              <a:gd name="connsiteX3" fmla="*/ 1132114 w 1132114"/>
+              <a:gd name="connsiteY3" fmla="*/ 227997 h 682171"/>
+              <a:gd name="connsiteX4" fmla="*/ 1132114 w 1132114"/>
+              <a:gd name="connsiteY4" fmla="*/ 568474 h 682171"/>
+              <a:gd name="connsiteX5" fmla="*/ 1018417 w 1132114"/>
+              <a:gd name="connsiteY5" fmla="*/ 682171 h 682171"/>
+              <a:gd name="connsiteX6" fmla="*/ 113697 w 1132114"/>
+              <a:gd name="connsiteY6" fmla="*/ 682171 h 682171"/>
+              <a:gd name="connsiteX7" fmla="*/ 0 w 1132114"/>
+              <a:gd name="connsiteY7" fmla="*/ 568474 h 682171"/>
+              <a:gd name="connsiteX8" fmla="*/ 0 w 1132114"/>
+              <a:gd name="connsiteY8" fmla="*/ 113697 h 682171"/>
+              <a:gd name="connsiteX0" fmla="*/ 0 w 1132114"/>
+              <a:gd name="connsiteY0" fmla="*/ 113697 h 682171"/>
+              <a:gd name="connsiteX1" fmla="*/ 113697 w 1132114"/>
+              <a:gd name="connsiteY1" fmla="*/ 0 h 682171"/>
+              <a:gd name="connsiteX2" fmla="*/ 923167 w 1132114"/>
+              <a:gd name="connsiteY2" fmla="*/ 4762 h 682171"/>
+              <a:gd name="connsiteX3" fmla="*/ 1132114 w 1132114"/>
+              <a:gd name="connsiteY3" fmla="*/ 227997 h 682171"/>
+              <a:gd name="connsiteX4" fmla="*/ 1132114 w 1132114"/>
+              <a:gd name="connsiteY4" fmla="*/ 568474 h 682171"/>
+              <a:gd name="connsiteX5" fmla="*/ 1018417 w 1132114"/>
+              <a:gd name="connsiteY5" fmla="*/ 682171 h 682171"/>
+              <a:gd name="connsiteX6" fmla="*/ 113697 w 1132114"/>
+              <a:gd name="connsiteY6" fmla="*/ 682171 h 682171"/>
+              <a:gd name="connsiteX7" fmla="*/ 0 w 1132114"/>
+              <a:gd name="connsiteY7" fmla="*/ 568474 h 682171"/>
+              <a:gd name="connsiteX8" fmla="*/ 0 w 1132114"/>
+              <a:gd name="connsiteY8" fmla="*/ 113697 h 682171"/>
+              <a:gd name="connsiteX0" fmla="*/ 0 w 1132114"/>
+              <a:gd name="connsiteY0" fmla="*/ 113697 h 682171"/>
+              <a:gd name="connsiteX1" fmla="*/ 113697 w 1132114"/>
+              <a:gd name="connsiteY1" fmla="*/ 0 h 682171"/>
+              <a:gd name="connsiteX2" fmla="*/ 923167 w 1132114"/>
+              <a:gd name="connsiteY2" fmla="*/ 4762 h 682171"/>
+              <a:gd name="connsiteX3" fmla="*/ 1132114 w 1132114"/>
+              <a:gd name="connsiteY3" fmla="*/ 227997 h 682171"/>
+              <a:gd name="connsiteX4" fmla="*/ 1132114 w 1132114"/>
+              <a:gd name="connsiteY4" fmla="*/ 568474 h 682171"/>
+              <a:gd name="connsiteX5" fmla="*/ 1018417 w 1132114"/>
+              <a:gd name="connsiteY5" fmla="*/ 682171 h 682171"/>
+              <a:gd name="connsiteX6" fmla="*/ 113697 w 1132114"/>
+              <a:gd name="connsiteY6" fmla="*/ 682171 h 682171"/>
+              <a:gd name="connsiteX7" fmla="*/ 0 w 1132114"/>
+              <a:gd name="connsiteY7" fmla="*/ 568474 h 682171"/>
+              <a:gd name="connsiteX8" fmla="*/ 0 w 1132114"/>
+              <a:gd name="connsiteY8" fmla="*/ 113697 h 682171"/>
+              <a:gd name="connsiteX0" fmla="*/ 0 w 1132114"/>
+              <a:gd name="connsiteY0" fmla="*/ 113697 h 682171"/>
+              <a:gd name="connsiteX1" fmla="*/ 113697 w 1132114"/>
+              <a:gd name="connsiteY1" fmla="*/ 0 h 682171"/>
+              <a:gd name="connsiteX2" fmla="*/ 923167 w 1132114"/>
+              <a:gd name="connsiteY2" fmla="*/ 4762 h 682171"/>
+              <a:gd name="connsiteX3" fmla="*/ 1132114 w 1132114"/>
+              <a:gd name="connsiteY3" fmla="*/ 227997 h 682171"/>
+              <a:gd name="connsiteX4" fmla="*/ 1132114 w 1132114"/>
+              <a:gd name="connsiteY4" fmla="*/ 568474 h 682171"/>
+              <a:gd name="connsiteX5" fmla="*/ 1018417 w 1132114"/>
+              <a:gd name="connsiteY5" fmla="*/ 682171 h 682171"/>
+              <a:gd name="connsiteX6" fmla="*/ 113697 w 1132114"/>
+              <a:gd name="connsiteY6" fmla="*/ 682171 h 682171"/>
+              <a:gd name="connsiteX7" fmla="*/ 0 w 1132114"/>
+              <a:gd name="connsiteY7" fmla="*/ 568474 h 682171"/>
+              <a:gd name="connsiteX8" fmla="*/ 0 w 1132114"/>
+              <a:gd name="connsiteY8" fmla="*/ 113697 h 682171"/>
+              <a:gd name="connsiteX0" fmla="*/ 0 w 1132114"/>
+              <a:gd name="connsiteY0" fmla="*/ 113697 h 682171"/>
+              <a:gd name="connsiteX1" fmla="*/ 113697 w 1132114"/>
+              <a:gd name="connsiteY1" fmla="*/ 0 h 682171"/>
+              <a:gd name="connsiteX2" fmla="*/ 923167 w 1132114"/>
+              <a:gd name="connsiteY2" fmla="*/ 4762 h 682171"/>
+              <a:gd name="connsiteX3" fmla="*/ 1132114 w 1132114"/>
+              <a:gd name="connsiteY3" fmla="*/ 227997 h 682171"/>
+              <a:gd name="connsiteX4" fmla="*/ 1132114 w 1132114"/>
+              <a:gd name="connsiteY4" fmla="*/ 568474 h 682171"/>
+              <a:gd name="connsiteX5" fmla="*/ 1018417 w 1132114"/>
+              <a:gd name="connsiteY5" fmla="*/ 682171 h 682171"/>
+              <a:gd name="connsiteX6" fmla="*/ 113697 w 1132114"/>
+              <a:gd name="connsiteY6" fmla="*/ 682171 h 682171"/>
+              <a:gd name="connsiteX7" fmla="*/ 0 w 1132114"/>
+              <a:gd name="connsiteY7" fmla="*/ 568474 h 682171"/>
+              <a:gd name="connsiteX8" fmla="*/ 0 w 1132114"/>
+              <a:gd name="connsiteY8" fmla="*/ 113697 h 682171"/>
+              <a:gd name="connsiteX0" fmla="*/ 0 w 1132114"/>
+              <a:gd name="connsiteY0" fmla="*/ 113697 h 682171"/>
+              <a:gd name="connsiteX1" fmla="*/ 113697 w 1132114"/>
+              <a:gd name="connsiteY1" fmla="*/ 0 h 682171"/>
+              <a:gd name="connsiteX2" fmla="*/ 923167 w 1132114"/>
+              <a:gd name="connsiteY2" fmla="*/ 4762 h 682171"/>
+              <a:gd name="connsiteX3" fmla="*/ 1132114 w 1132114"/>
+              <a:gd name="connsiteY3" fmla="*/ 227997 h 682171"/>
+              <a:gd name="connsiteX4" fmla="*/ 1132114 w 1132114"/>
+              <a:gd name="connsiteY4" fmla="*/ 568474 h 682171"/>
+              <a:gd name="connsiteX5" fmla="*/ 1018417 w 1132114"/>
+              <a:gd name="connsiteY5" fmla="*/ 682171 h 682171"/>
+              <a:gd name="connsiteX6" fmla="*/ 113697 w 1132114"/>
+              <a:gd name="connsiteY6" fmla="*/ 682171 h 682171"/>
+              <a:gd name="connsiteX7" fmla="*/ 0 w 1132114"/>
+              <a:gd name="connsiteY7" fmla="*/ 568474 h 682171"/>
+              <a:gd name="connsiteX8" fmla="*/ 0 w 1132114"/>
+              <a:gd name="connsiteY8" fmla="*/ 113697 h 682171"/>
+              <a:gd name="connsiteX0" fmla="*/ 0 w 1132114"/>
+              <a:gd name="connsiteY0" fmla="*/ 113698 h 682172"/>
+              <a:gd name="connsiteX1" fmla="*/ 113697 w 1132114"/>
+              <a:gd name="connsiteY1" fmla="*/ 1 h 682172"/>
+              <a:gd name="connsiteX2" fmla="*/ 804104 w 1132114"/>
+              <a:gd name="connsiteY2" fmla="*/ 0 h 682172"/>
+              <a:gd name="connsiteX3" fmla="*/ 1132114 w 1132114"/>
+              <a:gd name="connsiteY3" fmla="*/ 227998 h 682172"/>
+              <a:gd name="connsiteX4" fmla="*/ 1132114 w 1132114"/>
+              <a:gd name="connsiteY4" fmla="*/ 568475 h 682172"/>
+              <a:gd name="connsiteX5" fmla="*/ 1018417 w 1132114"/>
+              <a:gd name="connsiteY5" fmla="*/ 682172 h 682172"/>
+              <a:gd name="connsiteX6" fmla="*/ 113697 w 1132114"/>
+              <a:gd name="connsiteY6" fmla="*/ 682172 h 682172"/>
+              <a:gd name="connsiteX7" fmla="*/ 0 w 1132114"/>
+              <a:gd name="connsiteY7" fmla="*/ 568475 h 682172"/>
+              <a:gd name="connsiteX8" fmla="*/ 0 w 1132114"/>
+              <a:gd name="connsiteY8" fmla="*/ 113698 h 682172"/>
+              <a:gd name="connsiteX0" fmla="*/ 0 w 1136876"/>
+              <a:gd name="connsiteY0" fmla="*/ 113698 h 682172"/>
+              <a:gd name="connsiteX1" fmla="*/ 113697 w 1136876"/>
+              <a:gd name="connsiteY1" fmla="*/ 1 h 682172"/>
+              <a:gd name="connsiteX2" fmla="*/ 804104 w 1136876"/>
+              <a:gd name="connsiteY2" fmla="*/ 0 h 682172"/>
+              <a:gd name="connsiteX3" fmla="*/ 1136876 w 1136876"/>
+              <a:gd name="connsiteY3" fmla="*/ 332773 h 682172"/>
+              <a:gd name="connsiteX4" fmla="*/ 1132114 w 1136876"/>
+              <a:gd name="connsiteY4" fmla="*/ 568475 h 682172"/>
+              <a:gd name="connsiteX5" fmla="*/ 1018417 w 1136876"/>
+              <a:gd name="connsiteY5" fmla="*/ 682172 h 682172"/>
+              <a:gd name="connsiteX6" fmla="*/ 113697 w 1136876"/>
+              <a:gd name="connsiteY6" fmla="*/ 682172 h 682172"/>
+              <a:gd name="connsiteX7" fmla="*/ 0 w 1136876"/>
+              <a:gd name="connsiteY7" fmla="*/ 568475 h 682172"/>
+              <a:gd name="connsiteX8" fmla="*/ 0 w 1136876"/>
+              <a:gd name="connsiteY8" fmla="*/ 113698 h 682172"/>
+              <a:gd name="connsiteX0" fmla="*/ 0 w 1136876"/>
+              <a:gd name="connsiteY0" fmla="*/ 113698 h 682172"/>
+              <a:gd name="connsiteX1" fmla="*/ 113697 w 1136876"/>
+              <a:gd name="connsiteY1" fmla="*/ 1 h 682172"/>
+              <a:gd name="connsiteX2" fmla="*/ 804104 w 1136876"/>
+              <a:gd name="connsiteY2" fmla="*/ 0 h 682172"/>
+              <a:gd name="connsiteX3" fmla="*/ 1136876 w 1136876"/>
+              <a:gd name="connsiteY3" fmla="*/ 332773 h 682172"/>
+              <a:gd name="connsiteX4" fmla="*/ 1132114 w 1136876"/>
+              <a:gd name="connsiteY4" fmla="*/ 568475 h 682172"/>
+              <a:gd name="connsiteX5" fmla="*/ 1018417 w 1136876"/>
+              <a:gd name="connsiteY5" fmla="*/ 682172 h 682172"/>
+              <a:gd name="connsiteX6" fmla="*/ 113697 w 1136876"/>
+              <a:gd name="connsiteY6" fmla="*/ 682172 h 682172"/>
+              <a:gd name="connsiteX7" fmla="*/ 0 w 1136876"/>
+              <a:gd name="connsiteY7" fmla="*/ 568475 h 682172"/>
+              <a:gd name="connsiteX8" fmla="*/ 0 w 1136876"/>
+              <a:gd name="connsiteY8" fmla="*/ 113698 h 682172"/>
+              <a:gd name="connsiteX0" fmla="*/ 0 w 1136876"/>
+              <a:gd name="connsiteY0" fmla="*/ 118461 h 686935"/>
+              <a:gd name="connsiteX1" fmla="*/ 113697 w 1136876"/>
+              <a:gd name="connsiteY1" fmla="*/ 4764 h 686935"/>
+              <a:gd name="connsiteX2" fmla="*/ 646941 w 1136876"/>
+              <a:gd name="connsiteY2" fmla="*/ 0 h 686935"/>
+              <a:gd name="connsiteX3" fmla="*/ 1136876 w 1136876"/>
+              <a:gd name="connsiteY3" fmla="*/ 337536 h 686935"/>
+              <a:gd name="connsiteX4" fmla="*/ 1132114 w 1136876"/>
+              <a:gd name="connsiteY4" fmla="*/ 573238 h 686935"/>
+              <a:gd name="connsiteX5" fmla="*/ 1018417 w 1136876"/>
+              <a:gd name="connsiteY5" fmla="*/ 686935 h 686935"/>
+              <a:gd name="connsiteX6" fmla="*/ 113697 w 1136876"/>
+              <a:gd name="connsiteY6" fmla="*/ 686935 h 686935"/>
+              <a:gd name="connsiteX7" fmla="*/ 0 w 1136876"/>
+              <a:gd name="connsiteY7" fmla="*/ 573238 h 686935"/>
+              <a:gd name="connsiteX8" fmla="*/ 0 w 1136876"/>
+              <a:gd name="connsiteY8" fmla="*/ 118461 h 686935"/>
+              <a:gd name="connsiteX0" fmla="*/ 0 w 1136876"/>
+              <a:gd name="connsiteY0" fmla="*/ 118461 h 686935"/>
+              <a:gd name="connsiteX1" fmla="*/ 113697 w 1136876"/>
+              <a:gd name="connsiteY1" fmla="*/ 4764 h 686935"/>
+              <a:gd name="connsiteX2" fmla="*/ 646941 w 1136876"/>
+              <a:gd name="connsiteY2" fmla="*/ 0 h 686935"/>
+              <a:gd name="connsiteX3" fmla="*/ 1136876 w 1136876"/>
+              <a:gd name="connsiteY3" fmla="*/ 337536 h 686935"/>
+              <a:gd name="connsiteX4" fmla="*/ 1132114 w 1136876"/>
+              <a:gd name="connsiteY4" fmla="*/ 573238 h 686935"/>
+              <a:gd name="connsiteX5" fmla="*/ 1018417 w 1136876"/>
+              <a:gd name="connsiteY5" fmla="*/ 686935 h 686935"/>
+              <a:gd name="connsiteX6" fmla="*/ 113697 w 1136876"/>
+              <a:gd name="connsiteY6" fmla="*/ 686935 h 686935"/>
+              <a:gd name="connsiteX7" fmla="*/ 0 w 1136876"/>
+              <a:gd name="connsiteY7" fmla="*/ 573238 h 686935"/>
+              <a:gd name="connsiteX8" fmla="*/ 0 w 1136876"/>
+              <a:gd name="connsiteY8" fmla="*/ 118461 h 686935"/>
+              <a:gd name="connsiteX0" fmla="*/ 0 w 1136876"/>
+              <a:gd name="connsiteY0" fmla="*/ 118461 h 686935"/>
+              <a:gd name="connsiteX1" fmla="*/ 113697 w 1136876"/>
+              <a:gd name="connsiteY1" fmla="*/ 4764 h 686935"/>
+              <a:gd name="connsiteX2" fmla="*/ 646941 w 1136876"/>
+              <a:gd name="connsiteY2" fmla="*/ 0 h 686935"/>
+              <a:gd name="connsiteX3" fmla="*/ 1136876 w 1136876"/>
+              <a:gd name="connsiteY3" fmla="*/ 337536 h 686935"/>
+              <a:gd name="connsiteX4" fmla="*/ 1132114 w 1136876"/>
+              <a:gd name="connsiteY4" fmla="*/ 573238 h 686935"/>
+              <a:gd name="connsiteX5" fmla="*/ 1018417 w 1136876"/>
+              <a:gd name="connsiteY5" fmla="*/ 686935 h 686935"/>
+              <a:gd name="connsiteX6" fmla="*/ 113697 w 1136876"/>
+              <a:gd name="connsiteY6" fmla="*/ 686935 h 686935"/>
+              <a:gd name="connsiteX7" fmla="*/ 0 w 1136876"/>
+              <a:gd name="connsiteY7" fmla="*/ 573238 h 686935"/>
+              <a:gd name="connsiteX8" fmla="*/ 0 w 1136876"/>
+              <a:gd name="connsiteY8" fmla="*/ 118461 h 686935"/>
+              <a:gd name="connsiteX0" fmla="*/ 0 w 1136876"/>
+              <a:gd name="connsiteY0" fmla="*/ 118461 h 686935"/>
+              <a:gd name="connsiteX1" fmla="*/ 113697 w 1136876"/>
+              <a:gd name="connsiteY1" fmla="*/ 4764 h 686935"/>
+              <a:gd name="connsiteX2" fmla="*/ 646941 w 1136876"/>
+              <a:gd name="connsiteY2" fmla="*/ 0 h 686935"/>
+              <a:gd name="connsiteX3" fmla="*/ 1136876 w 1136876"/>
+              <a:gd name="connsiteY3" fmla="*/ 337536 h 686935"/>
+              <a:gd name="connsiteX4" fmla="*/ 1132114 w 1136876"/>
+              <a:gd name="connsiteY4" fmla="*/ 573238 h 686935"/>
+              <a:gd name="connsiteX5" fmla="*/ 1018417 w 1136876"/>
+              <a:gd name="connsiteY5" fmla="*/ 686935 h 686935"/>
+              <a:gd name="connsiteX6" fmla="*/ 113697 w 1136876"/>
+              <a:gd name="connsiteY6" fmla="*/ 686935 h 686935"/>
+              <a:gd name="connsiteX7" fmla="*/ 0 w 1136876"/>
+              <a:gd name="connsiteY7" fmla="*/ 573238 h 686935"/>
+              <a:gd name="connsiteX8" fmla="*/ 0 w 1136876"/>
+              <a:gd name="connsiteY8" fmla="*/ 118461 h 686935"/>
+              <a:gd name="connsiteX0" fmla="*/ 0 w 1136876"/>
+              <a:gd name="connsiteY0" fmla="*/ 118465 h 686939"/>
+              <a:gd name="connsiteX1" fmla="*/ 113697 w 1136876"/>
+              <a:gd name="connsiteY1" fmla="*/ 4768 h 686939"/>
+              <a:gd name="connsiteX2" fmla="*/ 646941 w 1136876"/>
+              <a:gd name="connsiteY2" fmla="*/ 4 h 686939"/>
+              <a:gd name="connsiteX3" fmla="*/ 1136876 w 1136876"/>
+              <a:gd name="connsiteY3" fmla="*/ 337540 h 686939"/>
+              <a:gd name="connsiteX4" fmla="*/ 1132114 w 1136876"/>
+              <a:gd name="connsiteY4" fmla="*/ 573242 h 686939"/>
+              <a:gd name="connsiteX5" fmla="*/ 1018417 w 1136876"/>
+              <a:gd name="connsiteY5" fmla="*/ 686939 h 686939"/>
+              <a:gd name="connsiteX6" fmla="*/ 113697 w 1136876"/>
+              <a:gd name="connsiteY6" fmla="*/ 686939 h 686939"/>
+              <a:gd name="connsiteX7" fmla="*/ 0 w 1136876"/>
+              <a:gd name="connsiteY7" fmla="*/ 573242 h 686939"/>
+              <a:gd name="connsiteX8" fmla="*/ 0 w 1136876"/>
+              <a:gd name="connsiteY8" fmla="*/ 118465 h 686939"/>
+              <a:gd name="connsiteX0" fmla="*/ 0 w 1136876"/>
+              <a:gd name="connsiteY0" fmla="*/ 118466 h 686940"/>
+              <a:gd name="connsiteX1" fmla="*/ 113697 w 1136876"/>
+              <a:gd name="connsiteY1" fmla="*/ 4769 h 686940"/>
+              <a:gd name="connsiteX2" fmla="*/ 646941 w 1136876"/>
+              <a:gd name="connsiteY2" fmla="*/ 5 h 686940"/>
+              <a:gd name="connsiteX3" fmla="*/ 1136876 w 1136876"/>
+              <a:gd name="connsiteY3" fmla="*/ 337541 h 686940"/>
+              <a:gd name="connsiteX4" fmla="*/ 1132114 w 1136876"/>
+              <a:gd name="connsiteY4" fmla="*/ 573243 h 686940"/>
+              <a:gd name="connsiteX5" fmla="*/ 1018417 w 1136876"/>
+              <a:gd name="connsiteY5" fmla="*/ 686940 h 686940"/>
+              <a:gd name="connsiteX6" fmla="*/ 113697 w 1136876"/>
+              <a:gd name="connsiteY6" fmla="*/ 686940 h 686940"/>
+              <a:gd name="connsiteX7" fmla="*/ 0 w 1136876"/>
+              <a:gd name="connsiteY7" fmla="*/ 573243 h 686940"/>
+              <a:gd name="connsiteX8" fmla="*/ 0 w 1136876"/>
+              <a:gd name="connsiteY8" fmla="*/ 118466 h 686940"/>
+              <a:gd name="connsiteX0" fmla="*/ 0 w 1136876"/>
+              <a:gd name="connsiteY0" fmla="*/ 118466 h 686940"/>
+              <a:gd name="connsiteX1" fmla="*/ 113697 w 1136876"/>
+              <a:gd name="connsiteY1" fmla="*/ 4769 h 686940"/>
+              <a:gd name="connsiteX2" fmla="*/ 646941 w 1136876"/>
+              <a:gd name="connsiteY2" fmla="*/ 5 h 686940"/>
+              <a:gd name="connsiteX3" fmla="*/ 1136876 w 1136876"/>
+              <a:gd name="connsiteY3" fmla="*/ 337541 h 686940"/>
+              <a:gd name="connsiteX4" fmla="*/ 1132114 w 1136876"/>
+              <a:gd name="connsiteY4" fmla="*/ 573243 h 686940"/>
+              <a:gd name="connsiteX5" fmla="*/ 1018417 w 1136876"/>
+              <a:gd name="connsiteY5" fmla="*/ 686940 h 686940"/>
+              <a:gd name="connsiteX6" fmla="*/ 113697 w 1136876"/>
+              <a:gd name="connsiteY6" fmla="*/ 686940 h 686940"/>
+              <a:gd name="connsiteX7" fmla="*/ 0 w 1136876"/>
+              <a:gd name="connsiteY7" fmla="*/ 573244 h 686940"/>
+              <a:gd name="connsiteX8" fmla="*/ 0 w 1136876"/>
+              <a:gd name="connsiteY8" fmla="*/ 118466 h 686940"/>
+              <a:gd name="connsiteX0" fmla="*/ 1797 w 1138673"/>
+              <a:gd name="connsiteY0" fmla="*/ 118466 h 691666"/>
+              <a:gd name="connsiteX1" fmla="*/ 115494 w 1138673"/>
+              <a:gd name="connsiteY1" fmla="*/ 4769 h 691666"/>
+              <a:gd name="connsiteX2" fmla="*/ 648738 w 1138673"/>
+              <a:gd name="connsiteY2" fmla="*/ 5 h 691666"/>
+              <a:gd name="connsiteX3" fmla="*/ 1138673 w 1138673"/>
+              <a:gd name="connsiteY3" fmla="*/ 337541 h 691666"/>
+              <a:gd name="connsiteX4" fmla="*/ 1133911 w 1138673"/>
+              <a:gd name="connsiteY4" fmla="*/ 573243 h 691666"/>
+              <a:gd name="connsiteX5" fmla="*/ 1020214 w 1138673"/>
+              <a:gd name="connsiteY5" fmla="*/ 686940 h 691666"/>
+              <a:gd name="connsiteX6" fmla="*/ 115494 w 1138673"/>
+              <a:gd name="connsiteY6" fmla="*/ 686940 h 691666"/>
+              <a:gd name="connsiteX7" fmla="*/ 1797 w 1138673"/>
+              <a:gd name="connsiteY7" fmla="*/ 573244 h 691666"/>
+              <a:gd name="connsiteX8" fmla="*/ 1797 w 1138673"/>
+              <a:gd name="connsiteY8" fmla="*/ 118466 h 691666"/>
+              <a:gd name="connsiteX0" fmla="*/ 1797 w 1138673"/>
+              <a:gd name="connsiteY0" fmla="*/ 118462 h 691662"/>
+              <a:gd name="connsiteX1" fmla="*/ 115494 w 1138673"/>
+              <a:gd name="connsiteY1" fmla="*/ 4765 h 691662"/>
+              <a:gd name="connsiteX2" fmla="*/ 648738 w 1138673"/>
+              <a:gd name="connsiteY2" fmla="*/ 1 h 691662"/>
+              <a:gd name="connsiteX3" fmla="*/ 1138673 w 1138673"/>
+              <a:gd name="connsiteY3" fmla="*/ 337537 h 691662"/>
+              <a:gd name="connsiteX4" fmla="*/ 1133911 w 1138673"/>
+              <a:gd name="connsiteY4" fmla="*/ 573239 h 691662"/>
+              <a:gd name="connsiteX5" fmla="*/ 1020214 w 1138673"/>
+              <a:gd name="connsiteY5" fmla="*/ 686936 h 691662"/>
+              <a:gd name="connsiteX6" fmla="*/ 115494 w 1138673"/>
+              <a:gd name="connsiteY6" fmla="*/ 686936 h 691662"/>
+              <a:gd name="connsiteX7" fmla="*/ 1797 w 1138673"/>
+              <a:gd name="connsiteY7" fmla="*/ 573240 h 691662"/>
+              <a:gd name="connsiteX8" fmla="*/ 1797 w 1138673"/>
+              <a:gd name="connsiteY8" fmla="*/ 118462 h 691662"/>
+              <a:gd name="connsiteX0" fmla="*/ 1797 w 1138673"/>
+              <a:gd name="connsiteY0" fmla="*/ 118461 h 691661"/>
+              <a:gd name="connsiteX1" fmla="*/ 115494 w 1138673"/>
+              <a:gd name="connsiteY1" fmla="*/ 4764 h 691661"/>
+              <a:gd name="connsiteX2" fmla="*/ 648738 w 1138673"/>
+              <a:gd name="connsiteY2" fmla="*/ 0 h 691661"/>
+              <a:gd name="connsiteX3" fmla="*/ 1138673 w 1138673"/>
+              <a:gd name="connsiteY3" fmla="*/ 337536 h 691661"/>
+              <a:gd name="connsiteX4" fmla="*/ 1133911 w 1138673"/>
+              <a:gd name="connsiteY4" fmla="*/ 573238 h 691661"/>
+              <a:gd name="connsiteX5" fmla="*/ 1020214 w 1138673"/>
+              <a:gd name="connsiteY5" fmla="*/ 686935 h 691661"/>
+              <a:gd name="connsiteX6" fmla="*/ 115494 w 1138673"/>
+              <a:gd name="connsiteY6" fmla="*/ 686935 h 691661"/>
+              <a:gd name="connsiteX7" fmla="*/ 1797 w 1138673"/>
+              <a:gd name="connsiteY7" fmla="*/ 573239 h 691661"/>
+              <a:gd name="connsiteX8" fmla="*/ 1797 w 1138673"/>
+              <a:gd name="connsiteY8" fmla="*/ 118461 h 691661"/>
+              <a:gd name="connsiteX0" fmla="*/ 1797 w 1138673"/>
+              <a:gd name="connsiteY0" fmla="*/ 118461 h 691661"/>
+              <a:gd name="connsiteX1" fmla="*/ 115494 w 1138673"/>
+              <a:gd name="connsiteY1" fmla="*/ 4764 h 691661"/>
+              <a:gd name="connsiteX2" fmla="*/ 648738 w 1138673"/>
+              <a:gd name="connsiteY2" fmla="*/ 0 h 691661"/>
+              <a:gd name="connsiteX3" fmla="*/ 1138673 w 1138673"/>
+              <a:gd name="connsiteY3" fmla="*/ 337536 h 691661"/>
+              <a:gd name="connsiteX4" fmla="*/ 1133911 w 1138673"/>
+              <a:gd name="connsiteY4" fmla="*/ 573238 h 691661"/>
+              <a:gd name="connsiteX5" fmla="*/ 1020214 w 1138673"/>
+              <a:gd name="connsiteY5" fmla="*/ 686935 h 691661"/>
+              <a:gd name="connsiteX6" fmla="*/ 115494 w 1138673"/>
+              <a:gd name="connsiteY6" fmla="*/ 686935 h 691661"/>
+              <a:gd name="connsiteX7" fmla="*/ 1797 w 1138673"/>
+              <a:gd name="connsiteY7" fmla="*/ 573239 h 691661"/>
+              <a:gd name="connsiteX8" fmla="*/ 1797 w 1138673"/>
+              <a:gd name="connsiteY8" fmla="*/ 118461 h 691661"/>
+              <a:gd name="connsiteX0" fmla="*/ 1797 w 1138673"/>
+              <a:gd name="connsiteY0" fmla="*/ 118461 h 691661"/>
+              <a:gd name="connsiteX1" fmla="*/ 115494 w 1138673"/>
+              <a:gd name="connsiteY1" fmla="*/ 4764 h 691661"/>
+              <a:gd name="connsiteX2" fmla="*/ 648738 w 1138673"/>
+              <a:gd name="connsiteY2" fmla="*/ 0 h 691661"/>
+              <a:gd name="connsiteX3" fmla="*/ 1138673 w 1138673"/>
+              <a:gd name="connsiteY3" fmla="*/ 337536 h 691661"/>
+              <a:gd name="connsiteX4" fmla="*/ 1133911 w 1138673"/>
+              <a:gd name="connsiteY4" fmla="*/ 573238 h 691661"/>
+              <a:gd name="connsiteX5" fmla="*/ 1020214 w 1138673"/>
+              <a:gd name="connsiteY5" fmla="*/ 686935 h 691661"/>
+              <a:gd name="connsiteX6" fmla="*/ 115494 w 1138673"/>
+              <a:gd name="connsiteY6" fmla="*/ 686935 h 691661"/>
+              <a:gd name="connsiteX7" fmla="*/ 1797 w 1138673"/>
+              <a:gd name="connsiteY7" fmla="*/ 573239 h 691661"/>
+              <a:gd name="connsiteX8" fmla="*/ 1797 w 1138673"/>
+              <a:gd name="connsiteY8" fmla="*/ 118461 h 691661"/>
+              <a:gd name="connsiteX0" fmla="*/ 1797 w 1138673"/>
+              <a:gd name="connsiteY0" fmla="*/ 118461 h 691661"/>
+              <a:gd name="connsiteX1" fmla="*/ 115494 w 1138673"/>
+              <a:gd name="connsiteY1" fmla="*/ 4764 h 691661"/>
+              <a:gd name="connsiteX2" fmla="*/ 648738 w 1138673"/>
+              <a:gd name="connsiteY2" fmla="*/ 0 h 691661"/>
+              <a:gd name="connsiteX3" fmla="*/ 1138673 w 1138673"/>
+              <a:gd name="connsiteY3" fmla="*/ 337536 h 691661"/>
+              <a:gd name="connsiteX4" fmla="*/ 1133911 w 1138673"/>
+              <a:gd name="connsiteY4" fmla="*/ 573238 h 691661"/>
+              <a:gd name="connsiteX5" fmla="*/ 1020214 w 1138673"/>
+              <a:gd name="connsiteY5" fmla="*/ 686935 h 691661"/>
+              <a:gd name="connsiteX6" fmla="*/ 115494 w 1138673"/>
+              <a:gd name="connsiteY6" fmla="*/ 686935 h 691661"/>
+              <a:gd name="connsiteX7" fmla="*/ 1797 w 1138673"/>
+              <a:gd name="connsiteY7" fmla="*/ 573239 h 691661"/>
+              <a:gd name="connsiteX8" fmla="*/ 1797 w 1138673"/>
+              <a:gd name="connsiteY8" fmla="*/ 118461 h 691661"/>
+              <a:gd name="connsiteX0" fmla="*/ 1797 w 1138673"/>
+              <a:gd name="connsiteY0" fmla="*/ 118461 h 691661"/>
+              <a:gd name="connsiteX1" fmla="*/ 115494 w 1138673"/>
+              <a:gd name="connsiteY1" fmla="*/ 4764 h 691661"/>
+              <a:gd name="connsiteX2" fmla="*/ 648738 w 1138673"/>
+              <a:gd name="connsiteY2" fmla="*/ 0 h 691661"/>
+              <a:gd name="connsiteX3" fmla="*/ 1138673 w 1138673"/>
+              <a:gd name="connsiteY3" fmla="*/ 337536 h 691661"/>
+              <a:gd name="connsiteX4" fmla="*/ 1133911 w 1138673"/>
+              <a:gd name="connsiteY4" fmla="*/ 573238 h 691661"/>
+              <a:gd name="connsiteX5" fmla="*/ 1020214 w 1138673"/>
+              <a:gd name="connsiteY5" fmla="*/ 686935 h 691661"/>
+              <a:gd name="connsiteX6" fmla="*/ 115494 w 1138673"/>
+              <a:gd name="connsiteY6" fmla="*/ 686935 h 691661"/>
+              <a:gd name="connsiteX7" fmla="*/ 1797 w 1138673"/>
+              <a:gd name="connsiteY7" fmla="*/ 573239 h 691661"/>
+              <a:gd name="connsiteX8" fmla="*/ 1797 w 1138673"/>
+              <a:gd name="connsiteY8" fmla="*/ 118461 h 691661"/>
+              <a:gd name="connsiteX0" fmla="*/ 1797 w 1138673"/>
+              <a:gd name="connsiteY0" fmla="*/ 118461 h 691661"/>
+              <a:gd name="connsiteX1" fmla="*/ 115494 w 1138673"/>
+              <a:gd name="connsiteY1" fmla="*/ 4764 h 691661"/>
+              <a:gd name="connsiteX2" fmla="*/ 648738 w 1138673"/>
+              <a:gd name="connsiteY2" fmla="*/ 0 h 691661"/>
+              <a:gd name="connsiteX3" fmla="*/ 1138673 w 1138673"/>
+              <a:gd name="connsiteY3" fmla="*/ 337536 h 691661"/>
+              <a:gd name="connsiteX4" fmla="*/ 1133911 w 1138673"/>
+              <a:gd name="connsiteY4" fmla="*/ 573238 h 691661"/>
+              <a:gd name="connsiteX5" fmla="*/ 1020214 w 1138673"/>
+              <a:gd name="connsiteY5" fmla="*/ 686935 h 691661"/>
+              <a:gd name="connsiteX6" fmla="*/ 115494 w 1138673"/>
+              <a:gd name="connsiteY6" fmla="*/ 686935 h 691661"/>
+              <a:gd name="connsiteX7" fmla="*/ 1797 w 1138673"/>
+              <a:gd name="connsiteY7" fmla="*/ 573239 h 691661"/>
+              <a:gd name="connsiteX8" fmla="*/ 1797 w 1138673"/>
+              <a:gd name="connsiteY8" fmla="*/ 118461 h 691661"/>
+              <a:gd name="connsiteX0" fmla="*/ 1797 w 1138673"/>
+              <a:gd name="connsiteY0" fmla="*/ 118461 h 691661"/>
+              <a:gd name="connsiteX1" fmla="*/ 115494 w 1138673"/>
+              <a:gd name="connsiteY1" fmla="*/ 4764 h 691661"/>
+              <a:gd name="connsiteX2" fmla="*/ 826875 w 1138673"/>
+              <a:gd name="connsiteY2" fmla="*/ 0 h 691661"/>
+              <a:gd name="connsiteX3" fmla="*/ 1138673 w 1138673"/>
+              <a:gd name="connsiteY3" fmla="*/ 337536 h 691661"/>
+              <a:gd name="connsiteX4" fmla="*/ 1133911 w 1138673"/>
+              <a:gd name="connsiteY4" fmla="*/ 573238 h 691661"/>
+              <a:gd name="connsiteX5" fmla="*/ 1020214 w 1138673"/>
+              <a:gd name="connsiteY5" fmla="*/ 686935 h 691661"/>
+              <a:gd name="connsiteX6" fmla="*/ 115494 w 1138673"/>
+              <a:gd name="connsiteY6" fmla="*/ 686935 h 691661"/>
+              <a:gd name="connsiteX7" fmla="*/ 1797 w 1138673"/>
+              <a:gd name="connsiteY7" fmla="*/ 573239 h 691661"/>
+              <a:gd name="connsiteX8" fmla="*/ 1797 w 1138673"/>
+              <a:gd name="connsiteY8" fmla="*/ 118461 h 691661"/>
+              <a:gd name="connsiteX0" fmla="*/ 1797 w 1138673"/>
+              <a:gd name="connsiteY0" fmla="*/ 118461 h 691661"/>
+              <a:gd name="connsiteX1" fmla="*/ 115494 w 1138673"/>
+              <a:gd name="connsiteY1" fmla="*/ 4764 h 691661"/>
+              <a:gd name="connsiteX2" fmla="*/ 826875 w 1138673"/>
+              <a:gd name="connsiteY2" fmla="*/ 0 h 691661"/>
+              <a:gd name="connsiteX3" fmla="*/ 1138673 w 1138673"/>
+              <a:gd name="connsiteY3" fmla="*/ 337536 h 691661"/>
+              <a:gd name="connsiteX4" fmla="*/ 1133911 w 1138673"/>
+              <a:gd name="connsiteY4" fmla="*/ 573238 h 691661"/>
+              <a:gd name="connsiteX5" fmla="*/ 1020214 w 1138673"/>
+              <a:gd name="connsiteY5" fmla="*/ 686935 h 691661"/>
+              <a:gd name="connsiteX6" fmla="*/ 115494 w 1138673"/>
+              <a:gd name="connsiteY6" fmla="*/ 686935 h 691661"/>
+              <a:gd name="connsiteX7" fmla="*/ 1797 w 1138673"/>
+              <a:gd name="connsiteY7" fmla="*/ 573239 h 691661"/>
+              <a:gd name="connsiteX8" fmla="*/ 1797 w 1138673"/>
+              <a:gd name="connsiteY8" fmla="*/ 118461 h 691661"/>
+              <a:gd name="connsiteX0" fmla="*/ 1797 w 1138673"/>
+              <a:gd name="connsiteY0" fmla="*/ 118461 h 691661"/>
+              <a:gd name="connsiteX1" fmla="*/ 115494 w 1138673"/>
+              <a:gd name="connsiteY1" fmla="*/ 4764 h 691661"/>
+              <a:gd name="connsiteX2" fmla="*/ 826875 w 1138673"/>
+              <a:gd name="connsiteY2" fmla="*/ 0 h 691661"/>
+              <a:gd name="connsiteX3" fmla="*/ 1138673 w 1138673"/>
+              <a:gd name="connsiteY3" fmla="*/ 337536 h 691661"/>
+              <a:gd name="connsiteX4" fmla="*/ 1133911 w 1138673"/>
+              <a:gd name="connsiteY4" fmla="*/ 573238 h 691661"/>
+              <a:gd name="connsiteX5" fmla="*/ 1020214 w 1138673"/>
+              <a:gd name="connsiteY5" fmla="*/ 686935 h 691661"/>
+              <a:gd name="connsiteX6" fmla="*/ 115494 w 1138673"/>
+              <a:gd name="connsiteY6" fmla="*/ 686935 h 691661"/>
+              <a:gd name="connsiteX7" fmla="*/ 1797 w 1138673"/>
+              <a:gd name="connsiteY7" fmla="*/ 573239 h 691661"/>
+              <a:gd name="connsiteX8" fmla="*/ 1797 w 1138673"/>
+              <a:gd name="connsiteY8" fmla="*/ 118461 h 691661"/>
+              <a:gd name="connsiteX0" fmla="*/ 1797 w 1138673"/>
+              <a:gd name="connsiteY0" fmla="*/ 118461 h 691661"/>
+              <a:gd name="connsiteX1" fmla="*/ 115494 w 1138673"/>
+              <a:gd name="connsiteY1" fmla="*/ 4764 h 691661"/>
+              <a:gd name="connsiteX2" fmla="*/ 826875 w 1138673"/>
+              <a:gd name="connsiteY2" fmla="*/ 0 h 691661"/>
+              <a:gd name="connsiteX3" fmla="*/ 1138673 w 1138673"/>
+              <a:gd name="connsiteY3" fmla="*/ 337536 h 691661"/>
+              <a:gd name="connsiteX4" fmla="*/ 1133911 w 1138673"/>
+              <a:gd name="connsiteY4" fmla="*/ 573238 h 691661"/>
+              <a:gd name="connsiteX5" fmla="*/ 1020214 w 1138673"/>
+              <a:gd name="connsiteY5" fmla="*/ 686935 h 691661"/>
+              <a:gd name="connsiteX6" fmla="*/ 115494 w 1138673"/>
+              <a:gd name="connsiteY6" fmla="*/ 686935 h 691661"/>
+              <a:gd name="connsiteX7" fmla="*/ 1797 w 1138673"/>
+              <a:gd name="connsiteY7" fmla="*/ 573239 h 691661"/>
+              <a:gd name="connsiteX8" fmla="*/ 1797 w 1138673"/>
+              <a:gd name="connsiteY8" fmla="*/ 118461 h 691661"/>
+            </a:gdLst>
+            <a:ahLst/>
+            <a:cxnLst>
+              <a:cxn ang="0">
+                <a:pos x="connsiteX0" y="connsiteY0"/>
+              </a:cxn>
+              <a:cxn ang="0">
+                <a:pos x="connsiteX1" y="connsiteY1"/>
+              </a:cxn>
+              <a:cxn ang="0">
+                <a:pos x="connsiteX2" y="connsiteY2"/>
+              </a:cxn>
+              <a:cxn ang="0">
+                <a:pos x="connsiteX3" y="connsiteY3"/>
+              </a:cxn>
+              <a:cxn ang="0">
+                <a:pos x="connsiteX4" y="connsiteY4"/>
+              </a:cxn>
+              <a:cxn ang="0">
+                <a:pos x="connsiteX5" y="connsiteY5"/>
+              </a:cxn>
+              <a:cxn ang="0">
+                <a:pos x="connsiteX6" y="connsiteY6"/>
+              </a:cxn>
+              <a:cxn ang="0">
+                <a:pos x="connsiteX7" y="connsiteY7"/>
+              </a:cxn>
+              <a:cxn ang="0">
+                <a:pos x="connsiteX8" y="connsiteY8"/>
+              </a:cxn>
+            </a:cxnLst>
+            <a:rect l="l" t="t" r="r" b="b"/>
+            <a:pathLst>
+              <a:path w="1138673" h="691661">
+                <a:moveTo>
+                  <a:pt x="1797" y="118461"/>
+                </a:moveTo>
+                <a:cubicBezTo>
+                  <a:pt x="1797" y="55668"/>
+                  <a:pt x="52701" y="4764"/>
+                  <a:pt x="115494" y="4764"/>
+                </a:cubicBezTo>
+                <a:lnTo>
+                  <a:pt x="826875" y="0"/>
+                </a:lnTo>
+                <a:cubicBezTo>
+                  <a:pt x="1006399" y="10834"/>
+                  <a:pt x="892773" y="279869"/>
+                  <a:pt x="1138673" y="337536"/>
+                </a:cubicBezTo>
+                <a:cubicBezTo>
+                  <a:pt x="1137086" y="416103"/>
+                  <a:pt x="1135498" y="494671"/>
+                  <a:pt x="1133911" y="573238"/>
+                </a:cubicBezTo>
+                <a:cubicBezTo>
+                  <a:pt x="1133911" y="684602"/>
+                  <a:pt x="1123340" y="686935"/>
+                  <a:pt x="1020214" y="686935"/>
+                </a:cubicBezTo>
+                <a:lnTo>
+                  <a:pt x="115494" y="686935"/>
+                </a:lnTo>
+                <a:cubicBezTo>
+                  <a:pt x="52701" y="686935"/>
+                  <a:pt x="-11647" y="727102"/>
+                  <a:pt x="1797" y="573239"/>
+                </a:cubicBezTo>
+                <a:lnTo>
+                  <a:pt x="1797" y="118461"/>
+                </a:lnTo>
+                <a:close/>
+              </a:path>
+            </a:pathLst>
+          </a:custGeom>
+          <a:solidFill>
+            <a:schemeClr val="accent6">
+              <a:lumMod val="75000"/>
+              <a:alpha val="32000"/>
+            </a:schemeClr>
+          </a:solidFill>
+          <a:ln>
+            <a:noFill/>
+          </a:ln>
+        </p:spPr>
+        <p:style>
+          <a:lnRef idx="2">
+            <a:schemeClr val="accent1">
+              <a:shade val="50000"/>
+            </a:schemeClr>
+          </a:lnRef>
+          <a:fillRef idx="1">
+            <a:schemeClr val="accent1"/>
+          </a:fillRef>
+          <a:effectRef idx="0">
+            <a:schemeClr val="accent1"/>
+          </a:effectRef>
+          <a:fontRef idx="minor">
+            <a:schemeClr val="lt1"/>
+          </a:fontRef>
+        </p:style>
+        <p:txBody>
+          <a:bodyPr rtlCol="0" anchor="ctr"/>
+          <a:lstStyle/>
+          <a:p>
+            <a:pPr algn="ctr"/>
+            <a:endParaRPr lang="en-US"/>
+          </a:p>
+        </p:txBody>
+      </p:sp>
+      <p:sp>
+        <p:nvSpPr>
+          <p:cNvPr id="30" name="Action Button: Home 29">
+            <a:hlinkClick r:id="" action="ppaction://hlinkshowjump?jump=firstslide" highlightClick="1"/>
+          </p:cNvPr>
+          <p:cNvSpPr/>
+          <p:nvPr/>
+        </p:nvSpPr>
+        <p:spPr>
+          <a:xfrm>
+            <a:off x="5167868" y="5978138"/>
+            <a:ext cx="295094" cy="281504"/>
+          </a:xfrm>
+          <a:prstGeom prst="actionButtonHome">
+            <a:avLst/>
+          </a:prstGeom>
+          <a:solidFill>
+            <a:schemeClr val="accent4"/>
+          </a:solidFill>
+        </p:spPr>
+        <p:style>
+          <a:lnRef idx="2">
+            <a:schemeClr val="accent1">
+              <a:shade val="50000"/>
+            </a:schemeClr>
+          </a:lnRef>
+          <a:fillRef idx="1">
+            <a:schemeClr val="accent1"/>
+          </a:fillRef>
+          <a:effectRef idx="0">
+            <a:schemeClr val="accent1"/>
+          </a:effectRef>
+          <a:fontRef idx="minor">
+            <a:schemeClr val="lt1"/>
+          </a:fontRef>
+        </p:style>
+        <p:txBody>
+          <a:bodyPr rtlCol="0" anchor="ctr"/>
+          <a:lstStyle/>
+          <a:p>
+            <a:pPr algn="ctr"/>
+            <a:endParaRPr lang="en-US"/>
+          </a:p>
+        </p:txBody>
+      </p:sp>
+      <p:sp>
+        <p:nvSpPr>
+          <p:cNvPr id="31" name="Flowchart: Or 30"/>
+          <p:cNvSpPr/>
+          <p:nvPr/>
+        </p:nvSpPr>
+        <p:spPr>
+          <a:xfrm>
+            <a:off x="5754686" y="5975901"/>
+            <a:ext cx="300024" cy="283741"/>
+          </a:xfrm>
+          <a:prstGeom prst="flowChartOr">
+            <a:avLst/>
+          </a:prstGeom>
+          <a:solidFill>
+            <a:schemeClr val="bg1"/>
+          </a:solidFill>
+          <a:ln>
+            <a:solidFill>
+              <a:srgbClr val="0070C0"/>
+            </a:solidFill>
+          </a:ln>
+        </p:spPr>
+        <p:style>
+          <a:lnRef idx="2">
+            <a:schemeClr val="accent1">
+              <a:shade val="50000"/>
+            </a:schemeClr>
+          </a:lnRef>
+          <a:fillRef idx="1">
+            <a:schemeClr val="accent1"/>
+          </a:fillRef>
+          <a:effectRef idx="0">
+            <a:schemeClr val="accent1"/>
+          </a:effectRef>
+          <a:fontRef idx="minor">
+            <a:schemeClr val="lt1"/>
+          </a:fontRef>
+        </p:style>
+        <p:txBody>
+          <a:bodyPr rtlCol="0" anchor="ctr"/>
+          <a:lstStyle/>
+          <a:p>
+            <a:pPr algn="ctr"/>
+            <a:endParaRPr lang="en-US"/>
+          </a:p>
+        </p:txBody>
+      </p:sp>
+      <p:sp>
+        <p:nvSpPr>
+          <p:cNvPr id="34" name="Rounded Rectangle 12"/>
+          <p:cNvSpPr/>
+          <p:nvPr/>
+        </p:nvSpPr>
+        <p:spPr>
+          <a:xfrm flipH="1">
+            <a:off x="6447367" y="5882518"/>
+            <a:ext cx="1452638" cy="482267"/>
+          </a:xfrm>
+          <a:custGeom>
+            <a:avLst/>
+            <a:gdLst>
+              <a:gd name="connsiteX0" fmla="*/ 0 w 1132114"/>
+              <a:gd name="connsiteY0" fmla="*/ 113697 h 682171"/>
+              <a:gd name="connsiteX1" fmla="*/ 113697 w 1132114"/>
+              <a:gd name="connsiteY1" fmla="*/ 0 h 682171"/>
+              <a:gd name="connsiteX2" fmla="*/ 1018417 w 1132114"/>
+              <a:gd name="connsiteY2" fmla="*/ 0 h 682171"/>
+              <a:gd name="connsiteX3" fmla="*/ 1132114 w 1132114"/>
+              <a:gd name="connsiteY3" fmla="*/ 113697 h 682171"/>
+              <a:gd name="connsiteX4" fmla="*/ 1132114 w 1132114"/>
+              <a:gd name="connsiteY4" fmla="*/ 568474 h 682171"/>
+              <a:gd name="connsiteX5" fmla="*/ 1018417 w 1132114"/>
+              <a:gd name="connsiteY5" fmla="*/ 682171 h 682171"/>
+              <a:gd name="connsiteX6" fmla="*/ 113697 w 1132114"/>
+              <a:gd name="connsiteY6" fmla="*/ 682171 h 682171"/>
+              <a:gd name="connsiteX7" fmla="*/ 0 w 1132114"/>
+              <a:gd name="connsiteY7" fmla="*/ 568474 h 682171"/>
+              <a:gd name="connsiteX8" fmla="*/ 0 w 1132114"/>
+              <a:gd name="connsiteY8" fmla="*/ 113697 h 682171"/>
+              <a:gd name="connsiteX0" fmla="*/ 0 w 1132114"/>
+              <a:gd name="connsiteY0" fmla="*/ 113697 h 682171"/>
+              <a:gd name="connsiteX1" fmla="*/ 113697 w 1132114"/>
+              <a:gd name="connsiteY1" fmla="*/ 0 h 682171"/>
+              <a:gd name="connsiteX2" fmla="*/ 923167 w 1132114"/>
+              <a:gd name="connsiteY2" fmla="*/ 4762 h 682171"/>
+              <a:gd name="connsiteX3" fmla="*/ 1132114 w 1132114"/>
+              <a:gd name="connsiteY3" fmla="*/ 113697 h 682171"/>
+              <a:gd name="connsiteX4" fmla="*/ 1132114 w 1132114"/>
+              <a:gd name="connsiteY4" fmla="*/ 568474 h 682171"/>
+              <a:gd name="connsiteX5" fmla="*/ 1018417 w 1132114"/>
+              <a:gd name="connsiteY5" fmla="*/ 682171 h 682171"/>
+              <a:gd name="connsiteX6" fmla="*/ 113697 w 1132114"/>
+              <a:gd name="connsiteY6" fmla="*/ 682171 h 682171"/>
+              <a:gd name="connsiteX7" fmla="*/ 0 w 1132114"/>
+              <a:gd name="connsiteY7" fmla="*/ 568474 h 682171"/>
+              <a:gd name="connsiteX8" fmla="*/ 0 w 1132114"/>
+              <a:gd name="connsiteY8" fmla="*/ 113697 h 682171"/>
+              <a:gd name="connsiteX0" fmla="*/ 0 w 1132114"/>
+              <a:gd name="connsiteY0" fmla="*/ 113697 h 682171"/>
+              <a:gd name="connsiteX1" fmla="*/ 113697 w 1132114"/>
+              <a:gd name="connsiteY1" fmla="*/ 0 h 682171"/>
+              <a:gd name="connsiteX2" fmla="*/ 923167 w 1132114"/>
+              <a:gd name="connsiteY2" fmla="*/ 4762 h 682171"/>
+              <a:gd name="connsiteX3" fmla="*/ 1132114 w 1132114"/>
+              <a:gd name="connsiteY3" fmla="*/ 227997 h 682171"/>
+              <a:gd name="connsiteX4" fmla="*/ 1132114 w 1132114"/>
+              <a:gd name="connsiteY4" fmla="*/ 568474 h 682171"/>
+              <a:gd name="connsiteX5" fmla="*/ 1018417 w 1132114"/>
+              <a:gd name="connsiteY5" fmla="*/ 682171 h 682171"/>
+              <a:gd name="connsiteX6" fmla="*/ 113697 w 1132114"/>
+              <a:gd name="connsiteY6" fmla="*/ 682171 h 682171"/>
+              <a:gd name="connsiteX7" fmla="*/ 0 w 1132114"/>
+              <a:gd name="connsiteY7" fmla="*/ 568474 h 682171"/>
+              <a:gd name="connsiteX8" fmla="*/ 0 w 1132114"/>
+              <a:gd name="connsiteY8" fmla="*/ 113697 h 682171"/>
+              <a:gd name="connsiteX0" fmla="*/ 0 w 1132114"/>
+              <a:gd name="connsiteY0" fmla="*/ 113697 h 682171"/>
+              <a:gd name="connsiteX1" fmla="*/ 113697 w 1132114"/>
+              <a:gd name="connsiteY1" fmla="*/ 0 h 682171"/>
+              <a:gd name="connsiteX2" fmla="*/ 923167 w 1132114"/>
+              <a:gd name="connsiteY2" fmla="*/ 4762 h 682171"/>
+              <a:gd name="connsiteX3" fmla="*/ 1132114 w 1132114"/>
+              <a:gd name="connsiteY3" fmla="*/ 227997 h 682171"/>
+              <a:gd name="connsiteX4" fmla="*/ 1132114 w 1132114"/>
+              <a:gd name="connsiteY4" fmla="*/ 568474 h 682171"/>
+              <a:gd name="connsiteX5" fmla="*/ 1018417 w 1132114"/>
+              <a:gd name="connsiteY5" fmla="*/ 682171 h 682171"/>
+              <a:gd name="connsiteX6" fmla="*/ 113697 w 1132114"/>
+              <a:gd name="connsiteY6" fmla="*/ 682171 h 682171"/>
+              <a:gd name="connsiteX7" fmla="*/ 0 w 1132114"/>
+              <a:gd name="connsiteY7" fmla="*/ 568474 h 682171"/>
+              <a:gd name="connsiteX8" fmla="*/ 0 w 1132114"/>
+              <a:gd name="connsiteY8" fmla="*/ 113697 h 682171"/>
+              <a:gd name="connsiteX0" fmla="*/ 0 w 1132114"/>
+              <a:gd name="connsiteY0" fmla="*/ 113697 h 682171"/>
+              <a:gd name="connsiteX1" fmla="*/ 113697 w 1132114"/>
+              <a:gd name="connsiteY1" fmla="*/ 0 h 682171"/>
+              <a:gd name="connsiteX2" fmla="*/ 923167 w 1132114"/>
+              <a:gd name="connsiteY2" fmla="*/ 4762 h 682171"/>
+              <a:gd name="connsiteX3" fmla="*/ 1132114 w 1132114"/>
+              <a:gd name="connsiteY3" fmla="*/ 227997 h 682171"/>
+              <a:gd name="connsiteX4" fmla="*/ 1132114 w 1132114"/>
+              <a:gd name="connsiteY4" fmla="*/ 568474 h 682171"/>
+              <a:gd name="connsiteX5" fmla="*/ 1018417 w 1132114"/>
+              <a:gd name="connsiteY5" fmla="*/ 682171 h 682171"/>
+              <a:gd name="connsiteX6" fmla="*/ 113697 w 1132114"/>
+              <a:gd name="connsiteY6" fmla="*/ 682171 h 682171"/>
+              <a:gd name="connsiteX7" fmla="*/ 0 w 1132114"/>
+              <a:gd name="connsiteY7" fmla="*/ 568474 h 682171"/>
+              <a:gd name="connsiteX8" fmla="*/ 0 w 1132114"/>
+              <a:gd name="connsiteY8" fmla="*/ 113697 h 682171"/>
+              <a:gd name="connsiteX0" fmla="*/ 0 w 1132114"/>
+              <a:gd name="connsiteY0" fmla="*/ 113697 h 682171"/>
+              <a:gd name="connsiteX1" fmla="*/ 113697 w 1132114"/>
+              <a:gd name="connsiteY1" fmla="*/ 0 h 682171"/>
+              <a:gd name="connsiteX2" fmla="*/ 923167 w 1132114"/>
+              <a:gd name="connsiteY2" fmla="*/ 4762 h 682171"/>
+              <a:gd name="connsiteX3" fmla="*/ 1132114 w 1132114"/>
+              <a:gd name="connsiteY3" fmla="*/ 227997 h 682171"/>
+              <a:gd name="connsiteX4" fmla="*/ 1132114 w 1132114"/>
+              <a:gd name="connsiteY4" fmla="*/ 568474 h 682171"/>
+              <a:gd name="connsiteX5" fmla="*/ 1018417 w 1132114"/>
+              <a:gd name="connsiteY5" fmla="*/ 682171 h 682171"/>
+              <a:gd name="connsiteX6" fmla="*/ 113697 w 1132114"/>
+              <a:gd name="connsiteY6" fmla="*/ 682171 h 682171"/>
+              <a:gd name="connsiteX7" fmla="*/ 0 w 1132114"/>
+              <a:gd name="connsiteY7" fmla="*/ 568474 h 682171"/>
+              <a:gd name="connsiteX8" fmla="*/ 0 w 1132114"/>
+              <a:gd name="connsiteY8" fmla="*/ 113697 h 682171"/>
+              <a:gd name="connsiteX0" fmla="*/ 0 w 1132114"/>
+              <a:gd name="connsiteY0" fmla="*/ 113697 h 682171"/>
+              <a:gd name="connsiteX1" fmla="*/ 113697 w 1132114"/>
+              <a:gd name="connsiteY1" fmla="*/ 0 h 682171"/>
+              <a:gd name="connsiteX2" fmla="*/ 923167 w 1132114"/>
+              <a:gd name="connsiteY2" fmla="*/ 4762 h 682171"/>
+              <a:gd name="connsiteX3" fmla="*/ 1132114 w 1132114"/>
+              <a:gd name="connsiteY3" fmla="*/ 227997 h 682171"/>
+              <a:gd name="connsiteX4" fmla="*/ 1132114 w 1132114"/>
+              <a:gd name="connsiteY4" fmla="*/ 568474 h 682171"/>
+              <a:gd name="connsiteX5" fmla="*/ 1018417 w 1132114"/>
+              <a:gd name="connsiteY5" fmla="*/ 682171 h 682171"/>
+              <a:gd name="connsiteX6" fmla="*/ 113697 w 1132114"/>
+              <a:gd name="connsiteY6" fmla="*/ 682171 h 682171"/>
+              <a:gd name="connsiteX7" fmla="*/ 0 w 1132114"/>
+              <a:gd name="connsiteY7" fmla="*/ 568474 h 682171"/>
+              <a:gd name="connsiteX8" fmla="*/ 0 w 1132114"/>
+              <a:gd name="connsiteY8" fmla="*/ 113697 h 682171"/>
+              <a:gd name="connsiteX0" fmla="*/ 0 w 1132114"/>
+              <a:gd name="connsiteY0" fmla="*/ 113697 h 682171"/>
+              <a:gd name="connsiteX1" fmla="*/ 113697 w 1132114"/>
+              <a:gd name="connsiteY1" fmla="*/ 0 h 682171"/>
+              <a:gd name="connsiteX2" fmla="*/ 923167 w 1132114"/>
+              <a:gd name="connsiteY2" fmla="*/ 4762 h 682171"/>
+              <a:gd name="connsiteX3" fmla="*/ 1132114 w 1132114"/>
+              <a:gd name="connsiteY3" fmla="*/ 227997 h 682171"/>
+              <a:gd name="connsiteX4" fmla="*/ 1132114 w 1132114"/>
+              <a:gd name="connsiteY4" fmla="*/ 568474 h 682171"/>
+              <a:gd name="connsiteX5" fmla="*/ 1018417 w 1132114"/>
+              <a:gd name="connsiteY5" fmla="*/ 682171 h 682171"/>
+              <a:gd name="connsiteX6" fmla="*/ 113697 w 1132114"/>
+              <a:gd name="connsiteY6" fmla="*/ 682171 h 682171"/>
+              <a:gd name="connsiteX7" fmla="*/ 0 w 1132114"/>
+              <a:gd name="connsiteY7" fmla="*/ 568474 h 682171"/>
+              <a:gd name="connsiteX8" fmla="*/ 0 w 1132114"/>
+              <a:gd name="connsiteY8" fmla="*/ 113697 h 682171"/>
+              <a:gd name="connsiteX0" fmla="*/ 0 w 1132114"/>
+              <a:gd name="connsiteY0" fmla="*/ 113697 h 682171"/>
+              <a:gd name="connsiteX1" fmla="*/ 113697 w 1132114"/>
+              <a:gd name="connsiteY1" fmla="*/ 0 h 682171"/>
+              <a:gd name="connsiteX2" fmla="*/ 923167 w 1132114"/>
+              <a:gd name="connsiteY2" fmla="*/ 4762 h 682171"/>
+              <a:gd name="connsiteX3" fmla="*/ 1132114 w 1132114"/>
+              <a:gd name="connsiteY3" fmla="*/ 227997 h 682171"/>
+              <a:gd name="connsiteX4" fmla="*/ 1132114 w 1132114"/>
+              <a:gd name="connsiteY4" fmla="*/ 568474 h 682171"/>
+              <a:gd name="connsiteX5" fmla="*/ 1018417 w 1132114"/>
+              <a:gd name="connsiteY5" fmla="*/ 682171 h 682171"/>
+              <a:gd name="connsiteX6" fmla="*/ 113697 w 1132114"/>
+              <a:gd name="connsiteY6" fmla="*/ 682171 h 682171"/>
+              <a:gd name="connsiteX7" fmla="*/ 0 w 1132114"/>
+              <a:gd name="connsiteY7" fmla="*/ 568474 h 682171"/>
+              <a:gd name="connsiteX8" fmla="*/ 0 w 1132114"/>
+              <a:gd name="connsiteY8" fmla="*/ 113697 h 682171"/>
+              <a:gd name="connsiteX0" fmla="*/ 0 w 1132114"/>
+              <a:gd name="connsiteY0" fmla="*/ 113697 h 682171"/>
+              <a:gd name="connsiteX1" fmla="*/ 113697 w 1132114"/>
+              <a:gd name="connsiteY1" fmla="*/ 0 h 682171"/>
+              <a:gd name="connsiteX2" fmla="*/ 923167 w 1132114"/>
+              <a:gd name="connsiteY2" fmla="*/ 4762 h 682171"/>
+              <a:gd name="connsiteX3" fmla="*/ 1132114 w 1132114"/>
+              <a:gd name="connsiteY3" fmla="*/ 227997 h 682171"/>
+              <a:gd name="connsiteX4" fmla="*/ 1132114 w 1132114"/>
+              <a:gd name="connsiteY4" fmla="*/ 568474 h 682171"/>
+              <a:gd name="connsiteX5" fmla="*/ 1018417 w 1132114"/>
+              <a:gd name="connsiteY5" fmla="*/ 682171 h 682171"/>
+              <a:gd name="connsiteX6" fmla="*/ 113697 w 1132114"/>
+              <a:gd name="connsiteY6" fmla="*/ 682171 h 682171"/>
+              <a:gd name="connsiteX7" fmla="*/ 0 w 1132114"/>
+              <a:gd name="connsiteY7" fmla="*/ 568474 h 682171"/>
+              <a:gd name="connsiteX8" fmla="*/ 0 w 1132114"/>
+              <a:gd name="connsiteY8" fmla="*/ 113697 h 682171"/>
+              <a:gd name="connsiteX0" fmla="*/ 0 w 1132114"/>
+              <a:gd name="connsiteY0" fmla="*/ 113698 h 682172"/>
+              <a:gd name="connsiteX1" fmla="*/ 113697 w 1132114"/>
+              <a:gd name="connsiteY1" fmla="*/ 1 h 682172"/>
+              <a:gd name="connsiteX2" fmla="*/ 804104 w 1132114"/>
+              <a:gd name="connsiteY2" fmla="*/ 0 h 682172"/>
+              <a:gd name="connsiteX3" fmla="*/ 1132114 w 1132114"/>
+              <a:gd name="connsiteY3" fmla="*/ 227998 h 682172"/>
+              <a:gd name="connsiteX4" fmla="*/ 1132114 w 1132114"/>
+              <a:gd name="connsiteY4" fmla="*/ 568475 h 682172"/>
+              <a:gd name="connsiteX5" fmla="*/ 1018417 w 1132114"/>
+              <a:gd name="connsiteY5" fmla="*/ 682172 h 682172"/>
+              <a:gd name="connsiteX6" fmla="*/ 113697 w 1132114"/>
+              <a:gd name="connsiteY6" fmla="*/ 682172 h 682172"/>
+              <a:gd name="connsiteX7" fmla="*/ 0 w 1132114"/>
+              <a:gd name="connsiteY7" fmla="*/ 568475 h 682172"/>
+              <a:gd name="connsiteX8" fmla="*/ 0 w 1132114"/>
+              <a:gd name="connsiteY8" fmla="*/ 113698 h 682172"/>
+              <a:gd name="connsiteX0" fmla="*/ 0 w 1136876"/>
+              <a:gd name="connsiteY0" fmla="*/ 113698 h 682172"/>
+              <a:gd name="connsiteX1" fmla="*/ 113697 w 1136876"/>
+              <a:gd name="connsiteY1" fmla="*/ 1 h 682172"/>
+              <a:gd name="connsiteX2" fmla="*/ 804104 w 1136876"/>
+              <a:gd name="connsiteY2" fmla="*/ 0 h 682172"/>
+              <a:gd name="connsiteX3" fmla="*/ 1136876 w 1136876"/>
+              <a:gd name="connsiteY3" fmla="*/ 332773 h 682172"/>
+              <a:gd name="connsiteX4" fmla="*/ 1132114 w 1136876"/>
+              <a:gd name="connsiteY4" fmla="*/ 568475 h 682172"/>
+              <a:gd name="connsiteX5" fmla="*/ 1018417 w 1136876"/>
+              <a:gd name="connsiteY5" fmla="*/ 682172 h 682172"/>
+              <a:gd name="connsiteX6" fmla="*/ 113697 w 1136876"/>
+              <a:gd name="connsiteY6" fmla="*/ 682172 h 682172"/>
+              <a:gd name="connsiteX7" fmla="*/ 0 w 1136876"/>
+              <a:gd name="connsiteY7" fmla="*/ 568475 h 682172"/>
+              <a:gd name="connsiteX8" fmla="*/ 0 w 1136876"/>
+              <a:gd name="connsiteY8" fmla="*/ 113698 h 682172"/>
+              <a:gd name="connsiteX0" fmla="*/ 0 w 1136876"/>
+              <a:gd name="connsiteY0" fmla="*/ 113698 h 682172"/>
+              <a:gd name="connsiteX1" fmla="*/ 113697 w 1136876"/>
+              <a:gd name="connsiteY1" fmla="*/ 1 h 682172"/>
+              <a:gd name="connsiteX2" fmla="*/ 804104 w 1136876"/>
+              <a:gd name="connsiteY2" fmla="*/ 0 h 682172"/>
+              <a:gd name="connsiteX3" fmla="*/ 1136876 w 1136876"/>
+              <a:gd name="connsiteY3" fmla="*/ 332773 h 682172"/>
+              <a:gd name="connsiteX4" fmla="*/ 1132114 w 1136876"/>
+              <a:gd name="connsiteY4" fmla="*/ 568475 h 682172"/>
+              <a:gd name="connsiteX5" fmla="*/ 1018417 w 1136876"/>
+              <a:gd name="connsiteY5" fmla="*/ 682172 h 682172"/>
+              <a:gd name="connsiteX6" fmla="*/ 113697 w 1136876"/>
+              <a:gd name="connsiteY6" fmla="*/ 682172 h 682172"/>
+              <a:gd name="connsiteX7" fmla="*/ 0 w 1136876"/>
+              <a:gd name="connsiteY7" fmla="*/ 568475 h 682172"/>
+              <a:gd name="connsiteX8" fmla="*/ 0 w 1136876"/>
+              <a:gd name="connsiteY8" fmla="*/ 113698 h 682172"/>
+              <a:gd name="connsiteX0" fmla="*/ 0 w 1136876"/>
+              <a:gd name="connsiteY0" fmla="*/ 118461 h 686935"/>
+              <a:gd name="connsiteX1" fmla="*/ 113697 w 1136876"/>
+              <a:gd name="connsiteY1" fmla="*/ 4764 h 686935"/>
+              <a:gd name="connsiteX2" fmla="*/ 646941 w 1136876"/>
+              <a:gd name="connsiteY2" fmla="*/ 0 h 686935"/>
+              <a:gd name="connsiteX3" fmla="*/ 1136876 w 1136876"/>
+              <a:gd name="connsiteY3" fmla="*/ 337536 h 686935"/>
+              <a:gd name="connsiteX4" fmla="*/ 1132114 w 1136876"/>
+              <a:gd name="connsiteY4" fmla="*/ 573238 h 686935"/>
+              <a:gd name="connsiteX5" fmla="*/ 1018417 w 1136876"/>
+              <a:gd name="connsiteY5" fmla="*/ 686935 h 686935"/>
+              <a:gd name="connsiteX6" fmla="*/ 113697 w 1136876"/>
+              <a:gd name="connsiteY6" fmla="*/ 686935 h 686935"/>
+              <a:gd name="connsiteX7" fmla="*/ 0 w 1136876"/>
+              <a:gd name="connsiteY7" fmla="*/ 573238 h 686935"/>
+              <a:gd name="connsiteX8" fmla="*/ 0 w 1136876"/>
+              <a:gd name="connsiteY8" fmla="*/ 118461 h 686935"/>
+              <a:gd name="connsiteX0" fmla="*/ 0 w 1136876"/>
+              <a:gd name="connsiteY0" fmla="*/ 118461 h 686935"/>
+              <a:gd name="connsiteX1" fmla="*/ 113697 w 1136876"/>
+              <a:gd name="connsiteY1" fmla="*/ 4764 h 686935"/>
+              <a:gd name="connsiteX2" fmla="*/ 646941 w 1136876"/>
+              <a:gd name="connsiteY2" fmla="*/ 0 h 686935"/>
+              <a:gd name="connsiteX3" fmla="*/ 1136876 w 1136876"/>
+              <a:gd name="connsiteY3" fmla="*/ 337536 h 686935"/>
+              <a:gd name="connsiteX4" fmla="*/ 1132114 w 1136876"/>
+              <a:gd name="connsiteY4" fmla="*/ 573238 h 686935"/>
+              <a:gd name="connsiteX5" fmla="*/ 1018417 w 1136876"/>
+              <a:gd name="connsiteY5" fmla="*/ 686935 h 686935"/>
+              <a:gd name="connsiteX6" fmla="*/ 113697 w 1136876"/>
+              <a:gd name="connsiteY6" fmla="*/ 686935 h 686935"/>
+              <a:gd name="connsiteX7" fmla="*/ 0 w 1136876"/>
+              <a:gd name="connsiteY7" fmla="*/ 573238 h 686935"/>
+              <a:gd name="connsiteX8" fmla="*/ 0 w 1136876"/>
+              <a:gd name="connsiteY8" fmla="*/ 118461 h 686935"/>
+              <a:gd name="connsiteX0" fmla="*/ 0 w 1136876"/>
+              <a:gd name="connsiteY0" fmla="*/ 118461 h 686935"/>
+              <a:gd name="connsiteX1" fmla="*/ 113697 w 1136876"/>
+              <a:gd name="connsiteY1" fmla="*/ 4764 h 686935"/>
+              <a:gd name="connsiteX2" fmla="*/ 646941 w 1136876"/>
+              <a:gd name="connsiteY2" fmla="*/ 0 h 686935"/>
+              <a:gd name="connsiteX3" fmla="*/ 1136876 w 1136876"/>
+              <a:gd name="connsiteY3" fmla="*/ 337536 h 686935"/>
+              <a:gd name="connsiteX4" fmla="*/ 1132114 w 1136876"/>
+              <a:gd name="connsiteY4" fmla="*/ 573238 h 686935"/>
+              <a:gd name="connsiteX5" fmla="*/ 1018417 w 1136876"/>
+              <a:gd name="connsiteY5" fmla="*/ 686935 h 686935"/>
+              <a:gd name="connsiteX6" fmla="*/ 113697 w 1136876"/>
+              <a:gd name="connsiteY6" fmla="*/ 686935 h 686935"/>
+              <a:gd name="connsiteX7" fmla="*/ 0 w 1136876"/>
+              <a:gd name="connsiteY7" fmla="*/ 573238 h 686935"/>
+              <a:gd name="connsiteX8" fmla="*/ 0 w 1136876"/>
+              <a:gd name="connsiteY8" fmla="*/ 118461 h 686935"/>
+              <a:gd name="connsiteX0" fmla="*/ 0 w 1136876"/>
+              <a:gd name="connsiteY0" fmla="*/ 118461 h 686935"/>
+              <a:gd name="connsiteX1" fmla="*/ 113697 w 1136876"/>
+              <a:gd name="connsiteY1" fmla="*/ 4764 h 686935"/>
+              <a:gd name="connsiteX2" fmla="*/ 646941 w 1136876"/>
+              <a:gd name="connsiteY2" fmla="*/ 0 h 686935"/>
+              <a:gd name="connsiteX3" fmla="*/ 1136876 w 1136876"/>
+              <a:gd name="connsiteY3" fmla="*/ 337536 h 686935"/>
+              <a:gd name="connsiteX4" fmla="*/ 1132114 w 1136876"/>
+              <a:gd name="connsiteY4" fmla="*/ 573238 h 686935"/>
+              <a:gd name="connsiteX5" fmla="*/ 1018417 w 1136876"/>
+              <a:gd name="connsiteY5" fmla="*/ 686935 h 686935"/>
+              <a:gd name="connsiteX6" fmla="*/ 113697 w 1136876"/>
+              <a:gd name="connsiteY6" fmla="*/ 686935 h 686935"/>
+              <a:gd name="connsiteX7" fmla="*/ 0 w 1136876"/>
+              <a:gd name="connsiteY7" fmla="*/ 573238 h 686935"/>
+              <a:gd name="connsiteX8" fmla="*/ 0 w 1136876"/>
+              <a:gd name="connsiteY8" fmla="*/ 118461 h 686935"/>
+              <a:gd name="connsiteX0" fmla="*/ 0 w 1136876"/>
+              <a:gd name="connsiteY0" fmla="*/ 118465 h 686939"/>
+              <a:gd name="connsiteX1" fmla="*/ 113697 w 1136876"/>
+              <a:gd name="connsiteY1" fmla="*/ 4768 h 686939"/>
+              <a:gd name="connsiteX2" fmla="*/ 646941 w 1136876"/>
+              <a:gd name="connsiteY2" fmla="*/ 4 h 686939"/>
+              <a:gd name="connsiteX3" fmla="*/ 1136876 w 1136876"/>
+              <a:gd name="connsiteY3" fmla="*/ 337540 h 686939"/>
+              <a:gd name="connsiteX4" fmla="*/ 1132114 w 1136876"/>
+              <a:gd name="connsiteY4" fmla="*/ 573242 h 686939"/>
+              <a:gd name="connsiteX5" fmla="*/ 1018417 w 1136876"/>
+              <a:gd name="connsiteY5" fmla="*/ 686939 h 686939"/>
+              <a:gd name="connsiteX6" fmla="*/ 113697 w 1136876"/>
+              <a:gd name="connsiteY6" fmla="*/ 686939 h 686939"/>
+              <a:gd name="connsiteX7" fmla="*/ 0 w 1136876"/>
+              <a:gd name="connsiteY7" fmla="*/ 573242 h 686939"/>
+              <a:gd name="connsiteX8" fmla="*/ 0 w 1136876"/>
+              <a:gd name="connsiteY8" fmla="*/ 118465 h 686939"/>
+              <a:gd name="connsiteX0" fmla="*/ 0 w 1136876"/>
+              <a:gd name="connsiteY0" fmla="*/ 118466 h 686940"/>
+              <a:gd name="connsiteX1" fmla="*/ 113697 w 1136876"/>
+              <a:gd name="connsiteY1" fmla="*/ 4769 h 686940"/>
+              <a:gd name="connsiteX2" fmla="*/ 646941 w 1136876"/>
+              <a:gd name="connsiteY2" fmla="*/ 5 h 686940"/>
+              <a:gd name="connsiteX3" fmla="*/ 1136876 w 1136876"/>
+              <a:gd name="connsiteY3" fmla="*/ 337541 h 686940"/>
+              <a:gd name="connsiteX4" fmla="*/ 1132114 w 1136876"/>
+              <a:gd name="connsiteY4" fmla="*/ 573243 h 686940"/>
+              <a:gd name="connsiteX5" fmla="*/ 1018417 w 1136876"/>
+              <a:gd name="connsiteY5" fmla="*/ 686940 h 686940"/>
+              <a:gd name="connsiteX6" fmla="*/ 113697 w 1136876"/>
+              <a:gd name="connsiteY6" fmla="*/ 686940 h 686940"/>
+              <a:gd name="connsiteX7" fmla="*/ 0 w 1136876"/>
+              <a:gd name="connsiteY7" fmla="*/ 573243 h 686940"/>
+              <a:gd name="connsiteX8" fmla="*/ 0 w 1136876"/>
+              <a:gd name="connsiteY8" fmla="*/ 118466 h 686940"/>
+              <a:gd name="connsiteX0" fmla="*/ 0 w 1136876"/>
+              <a:gd name="connsiteY0" fmla="*/ 118466 h 686940"/>
+              <a:gd name="connsiteX1" fmla="*/ 113697 w 1136876"/>
+              <a:gd name="connsiteY1" fmla="*/ 4769 h 686940"/>
+              <a:gd name="connsiteX2" fmla="*/ 646941 w 1136876"/>
+              <a:gd name="connsiteY2" fmla="*/ 5 h 686940"/>
+              <a:gd name="connsiteX3" fmla="*/ 1136876 w 1136876"/>
+              <a:gd name="connsiteY3" fmla="*/ 337541 h 686940"/>
+              <a:gd name="connsiteX4" fmla="*/ 1132114 w 1136876"/>
+              <a:gd name="connsiteY4" fmla="*/ 573243 h 686940"/>
+              <a:gd name="connsiteX5" fmla="*/ 1018417 w 1136876"/>
+              <a:gd name="connsiteY5" fmla="*/ 686940 h 686940"/>
+              <a:gd name="connsiteX6" fmla="*/ 113697 w 1136876"/>
+              <a:gd name="connsiteY6" fmla="*/ 686940 h 686940"/>
+              <a:gd name="connsiteX7" fmla="*/ 0 w 1136876"/>
+              <a:gd name="connsiteY7" fmla="*/ 573244 h 686940"/>
+              <a:gd name="connsiteX8" fmla="*/ 0 w 1136876"/>
+              <a:gd name="connsiteY8" fmla="*/ 118466 h 686940"/>
+              <a:gd name="connsiteX0" fmla="*/ 1797 w 1138673"/>
+              <a:gd name="connsiteY0" fmla="*/ 118466 h 691666"/>
+              <a:gd name="connsiteX1" fmla="*/ 115494 w 1138673"/>
+              <a:gd name="connsiteY1" fmla="*/ 4769 h 691666"/>
+              <a:gd name="connsiteX2" fmla="*/ 648738 w 1138673"/>
+              <a:gd name="connsiteY2" fmla="*/ 5 h 691666"/>
+              <a:gd name="connsiteX3" fmla="*/ 1138673 w 1138673"/>
+              <a:gd name="connsiteY3" fmla="*/ 337541 h 691666"/>
+              <a:gd name="connsiteX4" fmla="*/ 1133911 w 1138673"/>
+              <a:gd name="connsiteY4" fmla="*/ 573243 h 691666"/>
+              <a:gd name="connsiteX5" fmla="*/ 1020214 w 1138673"/>
+              <a:gd name="connsiteY5" fmla="*/ 686940 h 691666"/>
+              <a:gd name="connsiteX6" fmla="*/ 115494 w 1138673"/>
+              <a:gd name="connsiteY6" fmla="*/ 686940 h 691666"/>
+              <a:gd name="connsiteX7" fmla="*/ 1797 w 1138673"/>
+              <a:gd name="connsiteY7" fmla="*/ 573244 h 691666"/>
+              <a:gd name="connsiteX8" fmla="*/ 1797 w 1138673"/>
+              <a:gd name="connsiteY8" fmla="*/ 118466 h 691666"/>
+              <a:gd name="connsiteX0" fmla="*/ 1797 w 1138673"/>
+              <a:gd name="connsiteY0" fmla="*/ 118462 h 691662"/>
+              <a:gd name="connsiteX1" fmla="*/ 115494 w 1138673"/>
+              <a:gd name="connsiteY1" fmla="*/ 4765 h 691662"/>
+              <a:gd name="connsiteX2" fmla="*/ 648738 w 1138673"/>
+              <a:gd name="connsiteY2" fmla="*/ 1 h 691662"/>
+              <a:gd name="connsiteX3" fmla="*/ 1138673 w 1138673"/>
+              <a:gd name="connsiteY3" fmla="*/ 337537 h 691662"/>
+              <a:gd name="connsiteX4" fmla="*/ 1133911 w 1138673"/>
+              <a:gd name="connsiteY4" fmla="*/ 573239 h 691662"/>
+              <a:gd name="connsiteX5" fmla="*/ 1020214 w 1138673"/>
+              <a:gd name="connsiteY5" fmla="*/ 686936 h 691662"/>
+              <a:gd name="connsiteX6" fmla="*/ 115494 w 1138673"/>
+              <a:gd name="connsiteY6" fmla="*/ 686936 h 691662"/>
+              <a:gd name="connsiteX7" fmla="*/ 1797 w 1138673"/>
+              <a:gd name="connsiteY7" fmla="*/ 573240 h 691662"/>
+              <a:gd name="connsiteX8" fmla="*/ 1797 w 1138673"/>
+              <a:gd name="connsiteY8" fmla="*/ 118462 h 691662"/>
+              <a:gd name="connsiteX0" fmla="*/ 1797 w 1138673"/>
+              <a:gd name="connsiteY0" fmla="*/ 118461 h 691661"/>
+              <a:gd name="connsiteX1" fmla="*/ 115494 w 1138673"/>
+              <a:gd name="connsiteY1" fmla="*/ 4764 h 691661"/>
+              <a:gd name="connsiteX2" fmla="*/ 648738 w 1138673"/>
+              <a:gd name="connsiteY2" fmla="*/ 0 h 691661"/>
+              <a:gd name="connsiteX3" fmla="*/ 1138673 w 1138673"/>
+              <a:gd name="connsiteY3" fmla="*/ 337536 h 691661"/>
+              <a:gd name="connsiteX4" fmla="*/ 1133911 w 1138673"/>
+              <a:gd name="connsiteY4" fmla="*/ 573238 h 691661"/>
+              <a:gd name="connsiteX5" fmla="*/ 1020214 w 1138673"/>
+              <a:gd name="connsiteY5" fmla="*/ 686935 h 691661"/>
+              <a:gd name="connsiteX6" fmla="*/ 115494 w 1138673"/>
+              <a:gd name="connsiteY6" fmla="*/ 686935 h 691661"/>
+              <a:gd name="connsiteX7" fmla="*/ 1797 w 1138673"/>
+              <a:gd name="connsiteY7" fmla="*/ 573239 h 691661"/>
+              <a:gd name="connsiteX8" fmla="*/ 1797 w 1138673"/>
+              <a:gd name="connsiteY8" fmla="*/ 118461 h 691661"/>
+              <a:gd name="connsiteX0" fmla="*/ 1797 w 1138673"/>
+              <a:gd name="connsiteY0" fmla="*/ 118461 h 691661"/>
+              <a:gd name="connsiteX1" fmla="*/ 115494 w 1138673"/>
+              <a:gd name="connsiteY1" fmla="*/ 4764 h 691661"/>
+              <a:gd name="connsiteX2" fmla="*/ 648738 w 1138673"/>
+              <a:gd name="connsiteY2" fmla="*/ 0 h 691661"/>
+              <a:gd name="connsiteX3" fmla="*/ 1138673 w 1138673"/>
+              <a:gd name="connsiteY3" fmla="*/ 337536 h 691661"/>
+              <a:gd name="connsiteX4" fmla="*/ 1133911 w 1138673"/>
+              <a:gd name="connsiteY4" fmla="*/ 573238 h 691661"/>
+              <a:gd name="connsiteX5" fmla="*/ 1020214 w 1138673"/>
+              <a:gd name="connsiteY5" fmla="*/ 686935 h 691661"/>
+              <a:gd name="connsiteX6" fmla="*/ 115494 w 1138673"/>
+              <a:gd name="connsiteY6" fmla="*/ 686935 h 691661"/>
+              <a:gd name="connsiteX7" fmla="*/ 1797 w 1138673"/>
+              <a:gd name="connsiteY7" fmla="*/ 573239 h 691661"/>
+              <a:gd name="connsiteX8" fmla="*/ 1797 w 1138673"/>
+              <a:gd name="connsiteY8" fmla="*/ 118461 h 691661"/>
+              <a:gd name="connsiteX0" fmla="*/ 1797 w 1138673"/>
+              <a:gd name="connsiteY0" fmla="*/ 118461 h 691661"/>
+              <a:gd name="connsiteX1" fmla="*/ 115494 w 1138673"/>
+              <a:gd name="connsiteY1" fmla="*/ 4764 h 691661"/>
+              <a:gd name="connsiteX2" fmla="*/ 648738 w 1138673"/>
+              <a:gd name="connsiteY2" fmla="*/ 0 h 691661"/>
+              <a:gd name="connsiteX3" fmla="*/ 1138673 w 1138673"/>
+              <a:gd name="connsiteY3" fmla="*/ 337536 h 691661"/>
+              <a:gd name="connsiteX4" fmla="*/ 1133911 w 1138673"/>
+              <a:gd name="connsiteY4" fmla="*/ 573238 h 691661"/>
+              <a:gd name="connsiteX5" fmla="*/ 1020214 w 1138673"/>
+              <a:gd name="connsiteY5" fmla="*/ 686935 h 691661"/>
+              <a:gd name="connsiteX6" fmla="*/ 115494 w 1138673"/>
+              <a:gd name="connsiteY6" fmla="*/ 686935 h 691661"/>
+              <a:gd name="connsiteX7" fmla="*/ 1797 w 1138673"/>
+              <a:gd name="connsiteY7" fmla="*/ 573239 h 691661"/>
+              <a:gd name="connsiteX8" fmla="*/ 1797 w 1138673"/>
+              <a:gd name="connsiteY8" fmla="*/ 118461 h 691661"/>
+              <a:gd name="connsiteX0" fmla="*/ 1797 w 1138673"/>
+              <a:gd name="connsiteY0" fmla="*/ 118461 h 691661"/>
+              <a:gd name="connsiteX1" fmla="*/ 115494 w 1138673"/>
+              <a:gd name="connsiteY1" fmla="*/ 4764 h 691661"/>
+              <a:gd name="connsiteX2" fmla="*/ 648738 w 1138673"/>
+              <a:gd name="connsiteY2" fmla="*/ 0 h 691661"/>
+              <a:gd name="connsiteX3" fmla="*/ 1138673 w 1138673"/>
+              <a:gd name="connsiteY3" fmla="*/ 337536 h 691661"/>
+              <a:gd name="connsiteX4" fmla="*/ 1133911 w 1138673"/>
+              <a:gd name="connsiteY4" fmla="*/ 573238 h 691661"/>
+              <a:gd name="connsiteX5" fmla="*/ 1020214 w 1138673"/>
+              <a:gd name="connsiteY5" fmla="*/ 686935 h 691661"/>
+              <a:gd name="connsiteX6" fmla="*/ 115494 w 1138673"/>
+              <a:gd name="connsiteY6" fmla="*/ 686935 h 691661"/>
+              <a:gd name="connsiteX7" fmla="*/ 1797 w 1138673"/>
+              <a:gd name="connsiteY7" fmla="*/ 573239 h 691661"/>
+              <a:gd name="connsiteX8" fmla="*/ 1797 w 1138673"/>
+              <a:gd name="connsiteY8" fmla="*/ 118461 h 691661"/>
+              <a:gd name="connsiteX0" fmla="*/ 1797 w 1138673"/>
+              <a:gd name="connsiteY0" fmla="*/ 118461 h 691661"/>
+              <a:gd name="connsiteX1" fmla="*/ 115494 w 1138673"/>
+              <a:gd name="connsiteY1" fmla="*/ 4764 h 691661"/>
+              <a:gd name="connsiteX2" fmla="*/ 648738 w 1138673"/>
+              <a:gd name="connsiteY2" fmla="*/ 0 h 691661"/>
+              <a:gd name="connsiteX3" fmla="*/ 1138673 w 1138673"/>
+              <a:gd name="connsiteY3" fmla="*/ 337536 h 691661"/>
+              <a:gd name="connsiteX4" fmla="*/ 1133911 w 1138673"/>
+              <a:gd name="connsiteY4" fmla="*/ 573238 h 691661"/>
+              <a:gd name="connsiteX5" fmla="*/ 1020214 w 1138673"/>
+              <a:gd name="connsiteY5" fmla="*/ 686935 h 691661"/>
+              <a:gd name="connsiteX6" fmla="*/ 115494 w 1138673"/>
+              <a:gd name="connsiteY6" fmla="*/ 686935 h 691661"/>
+              <a:gd name="connsiteX7" fmla="*/ 1797 w 1138673"/>
+              <a:gd name="connsiteY7" fmla="*/ 573239 h 691661"/>
+              <a:gd name="connsiteX8" fmla="*/ 1797 w 1138673"/>
+              <a:gd name="connsiteY8" fmla="*/ 118461 h 691661"/>
+              <a:gd name="connsiteX0" fmla="*/ 1797 w 1138673"/>
+              <a:gd name="connsiteY0" fmla="*/ 118461 h 691661"/>
+              <a:gd name="connsiteX1" fmla="*/ 115494 w 1138673"/>
+              <a:gd name="connsiteY1" fmla="*/ 4764 h 691661"/>
+              <a:gd name="connsiteX2" fmla="*/ 648738 w 1138673"/>
+              <a:gd name="connsiteY2" fmla="*/ 0 h 691661"/>
+              <a:gd name="connsiteX3" fmla="*/ 1138673 w 1138673"/>
+              <a:gd name="connsiteY3" fmla="*/ 337536 h 691661"/>
+              <a:gd name="connsiteX4" fmla="*/ 1133911 w 1138673"/>
+              <a:gd name="connsiteY4" fmla="*/ 573238 h 691661"/>
+              <a:gd name="connsiteX5" fmla="*/ 1020214 w 1138673"/>
+              <a:gd name="connsiteY5" fmla="*/ 686935 h 691661"/>
+              <a:gd name="connsiteX6" fmla="*/ 115494 w 1138673"/>
+              <a:gd name="connsiteY6" fmla="*/ 686935 h 691661"/>
+              <a:gd name="connsiteX7" fmla="*/ 1797 w 1138673"/>
+              <a:gd name="connsiteY7" fmla="*/ 573239 h 691661"/>
+              <a:gd name="connsiteX8" fmla="*/ 1797 w 1138673"/>
+              <a:gd name="connsiteY8" fmla="*/ 118461 h 691661"/>
+              <a:gd name="connsiteX0" fmla="*/ 1797 w 1138673"/>
+              <a:gd name="connsiteY0" fmla="*/ 118461 h 691661"/>
+              <a:gd name="connsiteX1" fmla="*/ 115494 w 1138673"/>
+              <a:gd name="connsiteY1" fmla="*/ 4764 h 691661"/>
+              <a:gd name="connsiteX2" fmla="*/ 826875 w 1138673"/>
+              <a:gd name="connsiteY2" fmla="*/ 0 h 691661"/>
+              <a:gd name="connsiteX3" fmla="*/ 1138673 w 1138673"/>
+              <a:gd name="connsiteY3" fmla="*/ 337536 h 691661"/>
+              <a:gd name="connsiteX4" fmla="*/ 1133911 w 1138673"/>
+              <a:gd name="connsiteY4" fmla="*/ 573238 h 691661"/>
+              <a:gd name="connsiteX5" fmla="*/ 1020214 w 1138673"/>
+              <a:gd name="connsiteY5" fmla="*/ 686935 h 691661"/>
+              <a:gd name="connsiteX6" fmla="*/ 115494 w 1138673"/>
+              <a:gd name="connsiteY6" fmla="*/ 686935 h 691661"/>
+              <a:gd name="connsiteX7" fmla="*/ 1797 w 1138673"/>
+              <a:gd name="connsiteY7" fmla="*/ 573239 h 691661"/>
+              <a:gd name="connsiteX8" fmla="*/ 1797 w 1138673"/>
+              <a:gd name="connsiteY8" fmla="*/ 118461 h 691661"/>
+              <a:gd name="connsiteX0" fmla="*/ 1797 w 1138673"/>
+              <a:gd name="connsiteY0" fmla="*/ 118461 h 691661"/>
+              <a:gd name="connsiteX1" fmla="*/ 115494 w 1138673"/>
+              <a:gd name="connsiteY1" fmla="*/ 4764 h 691661"/>
+              <a:gd name="connsiteX2" fmla="*/ 826875 w 1138673"/>
+              <a:gd name="connsiteY2" fmla="*/ 0 h 691661"/>
+              <a:gd name="connsiteX3" fmla="*/ 1138673 w 1138673"/>
+              <a:gd name="connsiteY3" fmla="*/ 337536 h 691661"/>
+              <a:gd name="connsiteX4" fmla="*/ 1133911 w 1138673"/>
+              <a:gd name="connsiteY4" fmla="*/ 573238 h 691661"/>
+              <a:gd name="connsiteX5" fmla="*/ 1020214 w 1138673"/>
+              <a:gd name="connsiteY5" fmla="*/ 686935 h 691661"/>
+              <a:gd name="connsiteX6" fmla="*/ 115494 w 1138673"/>
+              <a:gd name="connsiteY6" fmla="*/ 686935 h 691661"/>
+              <a:gd name="connsiteX7" fmla="*/ 1797 w 1138673"/>
+              <a:gd name="connsiteY7" fmla="*/ 573239 h 691661"/>
+              <a:gd name="connsiteX8" fmla="*/ 1797 w 1138673"/>
+              <a:gd name="connsiteY8" fmla="*/ 118461 h 691661"/>
+              <a:gd name="connsiteX0" fmla="*/ 1797 w 1138673"/>
+              <a:gd name="connsiteY0" fmla="*/ 118461 h 691661"/>
+              <a:gd name="connsiteX1" fmla="*/ 115494 w 1138673"/>
+              <a:gd name="connsiteY1" fmla="*/ 4764 h 691661"/>
+              <a:gd name="connsiteX2" fmla="*/ 826875 w 1138673"/>
+              <a:gd name="connsiteY2" fmla="*/ 0 h 691661"/>
+              <a:gd name="connsiteX3" fmla="*/ 1138673 w 1138673"/>
+              <a:gd name="connsiteY3" fmla="*/ 337536 h 691661"/>
+              <a:gd name="connsiteX4" fmla="*/ 1133911 w 1138673"/>
+              <a:gd name="connsiteY4" fmla="*/ 573238 h 691661"/>
+              <a:gd name="connsiteX5" fmla="*/ 1020214 w 1138673"/>
+              <a:gd name="connsiteY5" fmla="*/ 686935 h 691661"/>
+              <a:gd name="connsiteX6" fmla="*/ 115494 w 1138673"/>
+              <a:gd name="connsiteY6" fmla="*/ 686935 h 691661"/>
+              <a:gd name="connsiteX7" fmla="*/ 1797 w 1138673"/>
+              <a:gd name="connsiteY7" fmla="*/ 573239 h 691661"/>
+              <a:gd name="connsiteX8" fmla="*/ 1797 w 1138673"/>
+              <a:gd name="connsiteY8" fmla="*/ 118461 h 691661"/>
+              <a:gd name="connsiteX0" fmla="*/ 1797 w 1138673"/>
+              <a:gd name="connsiteY0" fmla="*/ 118461 h 691661"/>
+              <a:gd name="connsiteX1" fmla="*/ 115494 w 1138673"/>
+              <a:gd name="connsiteY1" fmla="*/ 4764 h 691661"/>
+              <a:gd name="connsiteX2" fmla="*/ 826875 w 1138673"/>
+              <a:gd name="connsiteY2" fmla="*/ 0 h 691661"/>
+              <a:gd name="connsiteX3" fmla="*/ 1138673 w 1138673"/>
+              <a:gd name="connsiteY3" fmla="*/ 337536 h 691661"/>
+              <a:gd name="connsiteX4" fmla="*/ 1133911 w 1138673"/>
+              <a:gd name="connsiteY4" fmla="*/ 573238 h 691661"/>
+              <a:gd name="connsiteX5" fmla="*/ 1020214 w 1138673"/>
+              <a:gd name="connsiteY5" fmla="*/ 686935 h 691661"/>
+              <a:gd name="connsiteX6" fmla="*/ 115494 w 1138673"/>
+              <a:gd name="connsiteY6" fmla="*/ 686935 h 691661"/>
+              <a:gd name="connsiteX7" fmla="*/ 1797 w 1138673"/>
+              <a:gd name="connsiteY7" fmla="*/ 573239 h 691661"/>
+              <a:gd name="connsiteX8" fmla="*/ 1797 w 1138673"/>
+              <a:gd name="connsiteY8" fmla="*/ 118461 h 691661"/>
+            </a:gdLst>
+            <a:ahLst/>
+            <a:cxnLst>
+              <a:cxn ang="0">
+                <a:pos x="connsiteX0" y="connsiteY0"/>
+              </a:cxn>
+              <a:cxn ang="0">
+                <a:pos x="connsiteX1" y="connsiteY1"/>
+              </a:cxn>
+              <a:cxn ang="0">
+                <a:pos x="connsiteX2" y="connsiteY2"/>
+              </a:cxn>
+              <a:cxn ang="0">
+                <a:pos x="connsiteX3" y="connsiteY3"/>
+              </a:cxn>
+              <a:cxn ang="0">
+                <a:pos x="connsiteX4" y="connsiteY4"/>
+              </a:cxn>
+              <a:cxn ang="0">
+                <a:pos x="connsiteX5" y="connsiteY5"/>
+              </a:cxn>
+              <a:cxn ang="0">
+                <a:pos x="connsiteX6" y="connsiteY6"/>
+              </a:cxn>
+              <a:cxn ang="0">
+                <a:pos x="connsiteX7" y="connsiteY7"/>
+              </a:cxn>
+              <a:cxn ang="0">
+                <a:pos x="connsiteX8" y="connsiteY8"/>
+              </a:cxn>
+            </a:cxnLst>
+            <a:rect l="l" t="t" r="r" b="b"/>
+            <a:pathLst>
+              <a:path w="1138673" h="691661">
+                <a:moveTo>
+                  <a:pt x="1797" y="118461"/>
+                </a:moveTo>
+                <a:cubicBezTo>
+                  <a:pt x="1797" y="55668"/>
+                  <a:pt x="52701" y="4764"/>
+                  <a:pt x="115494" y="4764"/>
+                </a:cubicBezTo>
+                <a:lnTo>
+                  <a:pt x="826875" y="0"/>
+                </a:lnTo>
+                <a:cubicBezTo>
+                  <a:pt x="1006399" y="10834"/>
+                  <a:pt x="892773" y="279869"/>
+                  <a:pt x="1138673" y="337536"/>
+                </a:cubicBezTo>
+                <a:cubicBezTo>
+                  <a:pt x="1137086" y="416103"/>
+                  <a:pt x="1135498" y="494671"/>
+                  <a:pt x="1133911" y="573238"/>
+                </a:cubicBezTo>
+                <a:cubicBezTo>
+                  <a:pt x="1133911" y="684602"/>
+                  <a:pt x="1123340" y="686935"/>
+                  <a:pt x="1020214" y="686935"/>
+                </a:cubicBezTo>
+                <a:lnTo>
+                  <a:pt x="115494" y="686935"/>
+                </a:lnTo>
+                <a:cubicBezTo>
+                  <a:pt x="52701" y="686935"/>
+                  <a:pt x="-11647" y="727102"/>
+                  <a:pt x="1797" y="573239"/>
+                </a:cubicBezTo>
+                <a:lnTo>
+                  <a:pt x="1797" y="118461"/>
+                </a:lnTo>
+                <a:close/>
+              </a:path>
+            </a:pathLst>
+          </a:custGeom>
+          <a:solidFill>
+            <a:schemeClr val="accent6">
+              <a:lumMod val="75000"/>
+              <a:alpha val="32000"/>
+            </a:schemeClr>
+          </a:solidFill>
+          <a:ln>
+            <a:noFill/>
+          </a:ln>
+        </p:spPr>
+        <p:style>
+          <a:lnRef idx="2">
+            <a:schemeClr val="accent1">
+              <a:shade val="50000"/>
+            </a:schemeClr>
+          </a:lnRef>
+          <a:fillRef idx="1">
+            <a:schemeClr val="accent1"/>
+          </a:fillRef>
+          <a:effectRef idx="0">
+            <a:schemeClr val="accent1"/>
+          </a:effectRef>
+          <a:fontRef idx="minor">
+            <a:schemeClr val="lt1"/>
+          </a:fontRef>
+        </p:style>
+        <p:txBody>
+          <a:bodyPr rtlCol="0" anchor="ctr"/>
+          <a:lstStyle/>
+          <a:p>
+            <a:pPr algn="ctr"/>
+            <a:endParaRPr lang="en-US"/>
+          </a:p>
+        </p:txBody>
+      </p:sp>
+      <p:sp>
+        <p:nvSpPr>
+          <p:cNvPr id="36" name="Flowchart: Collate 35"/>
+          <p:cNvSpPr/>
+          <p:nvPr/>
+        </p:nvSpPr>
+        <p:spPr>
+          <a:xfrm>
+            <a:off x="6791695" y="5975901"/>
+            <a:ext cx="314317" cy="283741"/>
+          </a:xfrm>
+          <a:prstGeom prst="flowChartCollate">
+            <a:avLst/>
+          </a:prstGeom>
           <a:solidFill>
             <a:schemeClr val="bg1"/>
           </a:solidFill>
@@ -13150,7 +16722,7 @@
     </a:clrScheme>
     <a:fontScheme name="Office">
       <a:majorFont>
-        <a:latin typeface="Calibri Light" panose="020F0302020204030204"/>
+        <a:latin typeface="Calibri Light"/>
         <a:ea typeface=""/>
         <a:cs typeface=""/>
         <a:font script="Jpan" typeface="ＭＳ Ｐゴシック"/>
@@ -13185,7 +16757,7 @@
         <a:font script="Geor" typeface="Sylfaen"/>
       </a:majorFont>
       <a:minorFont>
-        <a:latin typeface="Calibri" panose="020F0502020204030204"/>
+        <a:latin typeface="Calibri"/>
         <a:ea typeface=""/>
         <a:cs typeface=""/>
         <a:font script="Jpan" typeface="ＭＳ Ｐゴシック"/>
@@ -13362,7 +16934,7 @@
   <a:extraClrSchemeLst/>
   <a:extLst>
     <a:ext uri="{05A4C25C-085E-4340-85A3-A5531E510DB2}">
-      <thm15:themeFamily xmlns:thm15="http://schemas.microsoft.com/office/thememl/2012/main" name="Office Theme" id="{62F939B6-93AF-4DB8-9C6B-D6C7DFDC589F}" vid="{4A3C46E8-61CC-4603-A589-7422A47A8E4A}"/>
+      <thm15:themeFamily xmlns:thm15="http://schemas.microsoft.com/office/thememl/2012/main" xmlns="" name="Office Theme" id="{62F939B6-93AF-4DB8-9C6B-D6C7DFDC589F}" vid="{4A3C46E8-61CC-4603-A589-7422A47A8E4A}"/>
     </a:ext>
   </a:extLst>
 </a:theme>

</xml_diff>

<commit_message>
Add_DOC_UI Fragment 4: Settings
</commit_message>
<xml_diff>
--- a/Doccuments/UI/IOCome_UI.pptx
+++ b/Doccuments/UI/IOCome_UI.pptx
@@ -11,7 +11,6 @@
     <p:sldId id="262" r:id="rId5"/>
     <p:sldId id="258" r:id="rId6"/>
     <p:sldId id="259" r:id="rId7"/>
-    <p:sldId id="260" r:id="rId8"/>
   </p:sldIdLst>
   <p:sldSz cx="12192000" cy="6858000"/>
   <p:notesSz cx="6858000" cy="9144000"/>
@@ -16911,7 +16910,7 @@
         </p:nvSpPr>
         <p:spPr>
           <a:xfrm>
-            <a:off x="5007430" y="435430"/>
+            <a:off x="579809" y="515640"/>
             <a:ext cx="2888342" cy="5921828"/>
           </a:xfrm>
           <a:prstGeom prst="rect">
@@ -16952,7 +16951,7 @@
         </p:nvCxnSpPr>
         <p:spPr>
           <a:xfrm>
-            <a:off x="8621486" y="435430"/>
+            <a:off x="4193865" y="515640"/>
             <a:ext cx="29029" cy="5921828"/>
           </a:xfrm>
           <a:prstGeom prst="straightConnector1">
@@ -16986,7 +16985,7 @@
         </p:nvSpPr>
         <p:spPr>
           <a:xfrm>
-            <a:off x="5007430" y="5878286"/>
+            <a:off x="579809" y="5958496"/>
             <a:ext cx="2888342" cy="478972"/>
           </a:xfrm>
           <a:prstGeom prst="rect">
@@ -17032,7 +17031,7 @@
         </p:nvSpPr>
         <p:spPr>
           <a:xfrm>
-            <a:off x="5009818" y="5882518"/>
+            <a:off x="582197" y="5962728"/>
             <a:ext cx="1442201" cy="482267"/>
           </a:xfrm>
           <a:custGeom>
@@ -17734,7 +17733,7 @@
         </p:nvSpPr>
         <p:spPr>
           <a:xfrm>
-            <a:off x="5167868" y="5978138"/>
+            <a:off x="740247" y="6058348"/>
             <a:ext cx="295094" cy="281504"/>
           </a:xfrm>
           <a:prstGeom prst="actionButtonHome">
@@ -17775,7 +17774,7 @@
         </p:nvSpPr>
         <p:spPr>
           <a:xfrm>
-            <a:off x="5754686" y="5975901"/>
+            <a:off x="1327065" y="6056111"/>
             <a:ext cx="300024" cy="283741"/>
           </a:xfrm>
           <a:prstGeom prst="flowChartOr">
@@ -17821,7 +17820,7 @@
         </p:nvSpPr>
         <p:spPr>
           <a:xfrm flipH="1">
-            <a:off x="6447367" y="5882518"/>
+            <a:off x="2019746" y="5962728"/>
             <a:ext cx="1452638" cy="482267"/>
           </a:xfrm>
           <a:custGeom>
@@ -18521,7 +18520,7 @@
         </p:nvSpPr>
         <p:spPr>
           <a:xfrm>
-            <a:off x="6791695" y="5975901"/>
+            <a:off x="2364074" y="6056111"/>
             <a:ext cx="314317" cy="283741"/>
           </a:xfrm>
           <a:prstGeom prst="flowChartCollate">
@@ -18568,7 +18567,7 @@
         </p:nvSpPr>
         <p:spPr>
           <a:xfrm>
-            <a:off x="7323915" y="5975900"/>
+            <a:off x="2896294" y="6056110"/>
             <a:ext cx="329609" cy="283741"/>
           </a:xfrm>
           <a:prstGeom prst="actionButtonInformation">
@@ -18611,7 +18610,7 @@
         </p:nvSpPr>
         <p:spPr>
           <a:xfrm rot="5400000">
-            <a:off x="5241544" y="576027"/>
+            <a:off x="813923" y="656237"/>
             <a:ext cx="147739" cy="295094"/>
           </a:xfrm>
           <a:prstGeom prst="chevron">
@@ -18663,7 +18662,7 @@
         </p:nvSpPr>
         <p:spPr>
           <a:xfrm>
-            <a:off x="5091715" y="890826"/>
+            <a:off x="664094" y="971036"/>
             <a:ext cx="2711303" cy="4940855"/>
           </a:xfrm>
           <a:prstGeom prst="rect">
@@ -18710,7 +18709,7 @@
         </p:nvSpPr>
         <p:spPr>
           <a:xfrm>
-            <a:off x="5546904" y="521494"/>
+            <a:off x="1119283" y="601704"/>
             <a:ext cx="1626782" cy="369332"/>
           </a:xfrm>
           <a:prstGeom prst="rect">
@@ -18748,7 +18747,7 @@
         </p:nvSpPr>
         <p:spPr>
           <a:xfrm>
-            <a:off x="6223007" y="5659293"/>
+            <a:off x="1795386" y="5739503"/>
             <a:ext cx="462525" cy="441971"/>
           </a:xfrm>
           <a:prstGeom prst="ellipse">
@@ -18794,7 +18793,7 @@
         </p:nvSpPr>
         <p:spPr>
           <a:xfrm>
-            <a:off x="6252593" y="5683521"/>
+            <a:off x="1824972" y="5763731"/>
             <a:ext cx="407194" cy="389099"/>
           </a:xfrm>
           <a:prstGeom prst="ellipse">
@@ -18840,7 +18839,7 @@
         </p:nvCxnSpPr>
         <p:spPr>
           <a:xfrm>
-            <a:off x="6448469" y="5836015"/>
+            <a:off x="2020848" y="5916225"/>
             <a:ext cx="0" cy="95250"/>
           </a:xfrm>
           <a:prstGeom prst="line">
@@ -18875,7 +18874,7 @@
         </p:nvCxnSpPr>
         <p:spPr>
           <a:xfrm>
-            <a:off x="6394593" y="5881505"/>
+            <a:off x="1966972" y="5961715"/>
             <a:ext cx="107979" cy="0"/>
           </a:xfrm>
           <a:prstGeom prst="line">
@@ -18902,131 +18901,25 @@
           </a:fontRef>
         </p:style>
       </p:cxnSp>
-    </p:spTree>
-    <p:extLst>
-      <p:ext uri="{BB962C8B-B14F-4D97-AF65-F5344CB8AC3E}">
-        <p14:creationId xmlns:p14="http://schemas.microsoft.com/office/powerpoint/2010/main" val="3804437772"/>
-      </p:ext>
-    </p:extLst>
-  </p:cSld>
-  <p:clrMapOvr>
-    <a:masterClrMapping/>
-  </p:clrMapOvr>
-</p:sld>
-</file>
-
-<file path=ppt/slides/slide7.xml><?xml version="1.0" encoding="utf-8"?>
-<p:sld xmlns:a="http://schemas.openxmlformats.org/drawingml/2006/main" xmlns:r="http://schemas.openxmlformats.org/officeDocument/2006/relationships" xmlns:p="http://schemas.openxmlformats.org/presentationml/2006/main">
-  <p:cSld>
-    <p:spTree>
-      <p:nvGrpSpPr>
-        <p:cNvPr id="1" name=""/>
-        <p:cNvGrpSpPr/>
-        <p:nvPr/>
-      </p:nvGrpSpPr>
-      <p:grpSpPr>
-        <a:xfrm>
-          <a:off x="0" y="0"/>
-          <a:ext cx="0" cy="0"/>
-          <a:chOff x="0" y="0"/>
-          <a:chExt cx="0" cy="0"/>
-        </a:xfrm>
-      </p:grpSpPr>
-      <p:sp>
-        <p:nvSpPr>
-          <p:cNvPr id="4" name="Rectangle 3"/>
+      <p:sp>
+        <p:nvSpPr>
+          <p:cNvPr id="6" name="Rounded Rectangle 5"/>
           <p:cNvSpPr/>
           <p:nvPr/>
         </p:nvSpPr>
         <p:spPr>
           <a:xfrm>
-            <a:off x="5007430" y="435430"/>
-            <a:ext cx="2888342" cy="5921828"/>
-          </a:xfrm>
-          <a:prstGeom prst="rect">
+            <a:off x="659861" y="1209577"/>
+            <a:ext cx="2715536" cy="403854"/>
+          </a:xfrm>
+          <a:prstGeom prst="roundRect">
             <a:avLst/>
           </a:prstGeom>
           <a:solidFill>
-            <a:srgbClr val="66FF66"/>
+            <a:schemeClr val="accent1">
+              <a:alpha val="38000"/>
+            </a:schemeClr>
           </a:solidFill>
-        </p:spPr>
-        <p:style>
-          <a:lnRef idx="1">
-            <a:schemeClr val="accent6"/>
-          </a:lnRef>
-          <a:fillRef idx="2">
-            <a:schemeClr val="accent6"/>
-          </a:fillRef>
-          <a:effectRef idx="1">
-            <a:schemeClr val="accent6"/>
-          </a:effectRef>
-          <a:fontRef idx="minor">
-            <a:schemeClr val="dk1"/>
-          </a:fontRef>
-        </p:style>
-        <p:txBody>
-          <a:bodyPr rtlCol="0" anchor="ctr"/>
-          <a:lstStyle/>
-          <a:p>
-            <a:pPr algn="ctr"/>
-            <a:endParaRPr lang="en-US"/>
-          </a:p>
-        </p:txBody>
-      </p:sp>
-      <p:cxnSp>
-        <p:nvCxnSpPr>
-          <p:cNvPr id="7" name="Straight Arrow Connector 6"/>
-          <p:cNvCxnSpPr/>
-          <p:nvPr/>
-        </p:nvCxnSpPr>
-        <p:spPr>
-          <a:xfrm>
-            <a:off x="8621486" y="435430"/>
-            <a:ext cx="29029" cy="5921828"/>
-          </a:xfrm>
-          <a:prstGeom prst="straightConnector1">
-            <a:avLst/>
-          </a:prstGeom>
-          <a:ln>
-            <a:headEnd type="triangle"/>
-            <a:tailEnd type="triangle"/>
-          </a:ln>
-        </p:spPr>
-        <p:style>
-          <a:lnRef idx="1">
-            <a:schemeClr val="accent1"/>
-          </a:lnRef>
-          <a:fillRef idx="0">
-            <a:schemeClr val="accent1"/>
-          </a:fillRef>
-          <a:effectRef idx="0">
-            <a:schemeClr val="accent1"/>
-          </a:effectRef>
-          <a:fontRef idx="minor">
-            <a:schemeClr val="tx1"/>
-          </a:fontRef>
-        </p:style>
-      </p:cxnSp>
-      <p:sp>
-        <p:nvSpPr>
-          <p:cNvPr id="10" name="Rectangle 9"/>
-          <p:cNvSpPr/>
-          <p:nvPr/>
-        </p:nvSpPr>
-        <p:spPr>
-          <a:xfrm>
-            <a:off x="5007430" y="5878286"/>
-            <a:ext cx="2888342" cy="478972"/>
-          </a:xfrm>
-          <a:prstGeom prst="rect">
-            <a:avLst/>
-          </a:prstGeom>
-          <a:solidFill>
-            <a:srgbClr val="66FF66"/>
-          </a:solidFill>
-          <a:ln>
-            <a:noFill/>
-          </a:ln>
         </p:spPr>
         <p:style>
           <a:lnRef idx="2">
@@ -19048,685 +18941,33 @@
           <a:bodyPr rtlCol="0" anchor="ctr"/>
           <a:lstStyle/>
           <a:p>
-            <a:pPr algn="ctr"/>
+            <a:r>
+              <a:rPr lang="en-US"/>
+              <a:t>Thông tin cá nhân</a:t>
+            </a:r>
             <a:endParaRPr lang="en-US"/>
           </a:p>
         </p:txBody>
       </p:sp>
       <p:sp>
         <p:nvSpPr>
-          <p:cNvPr id="13" name="Rounded Rectangle 12"/>
+          <p:cNvPr id="22" name="Rounded Rectangle 21"/>
           <p:cNvSpPr/>
           <p:nvPr/>
         </p:nvSpPr>
         <p:spPr>
           <a:xfrm>
-            <a:off x="5009818" y="5882518"/>
-            <a:ext cx="1442201" cy="482267"/>
-          </a:xfrm>
-          <a:custGeom>
+            <a:off x="666212" y="1740278"/>
+            <a:ext cx="2709185" cy="403854"/>
+          </a:xfrm>
+          <a:prstGeom prst="roundRect">
             <a:avLst/>
-            <a:gdLst>
-              <a:gd name="connsiteX0" fmla="*/ 0 w 1132114"/>
-              <a:gd name="connsiteY0" fmla="*/ 113697 h 682171"/>
-              <a:gd name="connsiteX1" fmla="*/ 113697 w 1132114"/>
-              <a:gd name="connsiteY1" fmla="*/ 0 h 682171"/>
-              <a:gd name="connsiteX2" fmla="*/ 1018417 w 1132114"/>
-              <a:gd name="connsiteY2" fmla="*/ 0 h 682171"/>
-              <a:gd name="connsiteX3" fmla="*/ 1132114 w 1132114"/>
-              <a:gd name="connsiteY3" fmla="*/ 113697 h 682171"/>
-              <a:gd name="connsiteX4" fmla="*/ 1132114 w 1132114"/>
-              <a:gd name="connsiteY4" fmla="*/ 568474 h 682171"/>
-              <a:gd name="connsiteX5" fmla="*/ 1018417 w 1132114"/>
-              <a:gd name="connsiteY5" fmla="*/ 682171 h 682171"/>
-              <a:gd name="connsiteX6" fmla="*/ 113697 w 1132114"/>
-              <a:gd name="connsiteY6" fmla="*/ 682171 h 682171"/>
-              <a:gd name="connsiteX7" fmla="*/ 0 w 1132114"/>
-              <a:gd name="connsiteY7" fmla="*/ 568474 h 682171"/>
-              <a:gd name="connsiteX8" fmla="*/ 0 w 1132114"/>
-              <a:gd name="connsiteY8" fmla="*/ 113697 h 682171"/>
-              <a:gd name="connsiteX0" fmla="*/ 0 w 1132114"/>
-              <a:gd name="connsiteY0" fmla="*/ 113697 h 682171"/>
-              <a:gd name="connsiteX1" fmla="*/ 113697 w 1132114"/>
-              <a:gd name="connsiteY1" fmla="*/ 0 h 682171"/>
-              <a:gd name="connsiteX2" fmla="*/ 923167 w 1132114"/>
-              <a:gd name="connsiteY2" fmla="*/ 4762 h 682171"/>
-              <a:gd name="connsiteX3" fmla="*/ 1132114 w 1132114"/>
-              <a:gd name="connsiteY3" fmla="*/ 113697 h 682171"/>
-              <a:gd name="connsiteX4" fmla="*/ 1132114 w 1132114"/>
-              <a:gd name="connsiteY4" fmla="*/ 568474 h 682171"/>
-              <a:gd name="connsiteX5" fmla="*/ 1018417 w 1132114"/>
-              <a:gd name="connsiteY5" fmla="*/ 682171 h 682171"/>
-              <a:gd name="connsiteX6" fmla="*/ 113697 w 1132114"/>
-              <a:gd name="connsiteY6" fmla="*/ 682171 h 682171"/>
-              <a:gd name="connsiteX7" fmla="*/ 0 w 1132114"/>
-              <a:gd name="connsiteY7" fmla="*/ 568474 h 682171"/>
-              <a:gd name="connsiteX8" fmla="*/ 0 w 1132114"/>
-              <a:gd name="connsiteY8" fmla="*/ 113697 h 682171"/>
-              <a:gd name="connsiteX0" fmla="*/ 0 w 1132114"/>
-              <a:gd name="connsiteY0" fmla="*/ 113697 h 682171"/>
-              <a:gd name="connsiteX1" fmla="*/ 113697 w 1132114"/>
-              <a:gd name="connsiteY1" fmla="*/ 0 h 682171"/>
-              <a:gd name="connsiteX2" fmla="*/ 923167 w 1132114"/>
-              <a:gd name="connsiteY2" fmla="*/ 4762 h 682171"/>
-              <a:gd name="connsiteX3" fmla="*/ 1132114 w 1132114"/>
-              <a:gd name="connsiteY3" fmla="*/ 227997 h 682171"/>
-              <a:gd name="connsiteX4" fmla="*/ 1132114 w 1132114"/>
-              <a:gd name="connsiteY4" fmla="*/ 568474 h 682171"/>
-              <a:gd name="connsiteX5" fmla="*/ 1018417 w 1132114"/>
-              <a:gd name="connsiteY5" fmla="*/ 682171 h 682171"/>
-              <a:gd name="connsiteX6" fmla="*/ 113697 w 1132114"/>
-              <a:gd name="connsiteY6" fmla="*/ 682171 h 682171"/>
-              <a:gd name="connsiteX7" fmla="*/ 0 w 1132114"/>
-              <a:gd name="connsiteY7" fmla="*/ 568474 h 682171"/>
-              <a:gd name="connsiteX8" fmla="*/ 0 w 1132114"/>
-              <a:gd name="connsiteY8" fmla="*/ 113697 h 682171"/>
-              <a:gd name="connsiteX0" fmla="*/ 0 w 1132114"/>
-              <a:gd name="connsiteY0" fmla="*/ 113697 h 682171"/>
-              <a:gd name="connsiteX1" fmla="*/ 113697 w 1132114"/>
-              <a:gd name="connsiteY1" fmla="*/ 0 h 682171"/>
-              <a:gd name="connsiteX2" fmla="*/ 923167 w 1132114"/>
-              <a:gd name="connsiteY2" fmla="*/ 4762 h 682171"/>
-              <a:gd name="connsiteX3" fmla="*/ 1132114 w 1132114"/>
-              <a:gd name="connsiteY3" fmla="*/ 227997 h 682171"/>
-              <a:gd name="connsiteX4" fmla="*/ 1132114 w 1132114"/>
-              <a:gd name="connsiteY4" fmla="*/ 568474 h 682171"/>
-              <a:gd name="connsiteX5" fmla="*/ 1018417 w 1132114"/>
-              <a:gd name="connsiteY5" fmla="*/ 682171 h 682171"/>
-              <a:gd name="connsiteX6" fmla="*/ 113697 w 1132114"/>
-              <a:gd name="connsiteY6" fmla="*/ 682171 h 682171"/>
-              <a:gd name="connsiteX7" fmla="*/ 0 w 1132114"/>
-              <a:gd name="connsiteY7" fmla="*/ 568474 h 682171"/>
-              <a:gd name="connsiteX8" fmla="*/ 0 w 1132114"/>
-              <a:gd name="connsiteY8" fmla="*/ 113697 h 682171"/>
-              <a:gd name="connsiteX0" fmla="*/ 0 w 1132114"/>
-              <a:gd name="connsiteY0" fmla="*/ 113697 h 682171"/>
-              <a:gd name="connsiteX1" fmla="*/ 113697 w 1132114"/>
-              <a:gd name="connsiteY1" fmla="*/ 0 h 682171"/>
-              <a:gd name="connsiteX2" fmla="*/ 923167 w 1132114"/>
-              <a:gd name="connsiteY2" fmla="*/ 4762 h 682171"/>
-              <a:gd name="connsiteX3" fmla="*/ 1132114 w 1132114"/>
-              <a:gd name="connsiteY3" fmla="*/ 227997 h 682171"/>
-              <a:gd name="connsiteX4" fmla="*/ 1132114 w 1132114"/>
-              <a:gd name="connsiteY4" fmla="*/ 568474 h 682171"/>
-              <a:gd name="connsiteX5" fmla="*/ 1018417 w 1132114"/>
-              <a:gd name="connsiteY5" fmla="*/ 682171 h 682171"/>
-              <a:gd name="connsiteX6" fmla="*/ 113697 w 1132114"/>
-              <a:gd name="connsiteY6" fmla="*/ 682171 h 682171"/>
-              <a:gd name="connsiteX7" fmla="*/ 0 w 1132114"/>
-              <a:gd name="connsiteY7" fmla="*/ 568474 h 682171"/>
-              <a:gd name="connsiteX8" fmla="*/ 0 w 1132114"/>
-              <a:gd name="connsiteY8" fmla="*/ 113697 h 682171"/>
-              <a:gd name="connsiteX0" fmla="*/ 0 w 1132114"/>
-              <a:gd name="connsiteY0" fmla="*/ 113697 h 682171"/>
-              <a:gd name="connsiteX1" fmla="*/ 113697 w 1132114"/>
-              <a:gd name="connsiteY1" fmla="*/ 0 h 682171"/>
-              <a:gd name="connsiteX2" fmla="*/ 923167 w 1132114"/>
-              <a:gd name="connsiteY2" fmla="*/ 4762 h 682171"/>
-              <a:gd name="connsiteX3" fmla="*/ 1132114 w 1132114"/>
-              <a:gd name="connsiteY3" fmla="*/ 227997 h 682171"/>
-              <a:gd name="connsiteX4" fmla="*/ 1132114 w 1132114"/>
-              <a:gd name="connsiteY4" fmla="*/ 568474 h 682171"/>
-              <a:gd name="connsiteX5" fmla="*/ 1018417 w 1132114"/>
-              <a:gd name="connsiteY5" fmla="*/ 682171 h 682171"/>
-              <a:gd name="connsiteX6" fmla="*/ 113697 w 1132114"/>
-              <a:gd name="connsiteY6" fmla="*/ 682171 h 682171"/>
-              <a:gd name="connsiteX7" fmla="*/ 0 w 1132114"/>
-              <a:gd name="connsiteY7" fmla="*/ 568474 h 682171"/>
-              <a:gd name="connsiteX8" fmla="*/ 0 w 1132114"/>
-              <a:gd name="connsiteY8" fmla="*/ 113697 h 682171"/>
-              <a:gd name="connsiteX0" fmla="*/ 0 w 1132114"/>
-              <a:gd name="connsiteY0" fmla="*/ 113697 h 682171"/>
-              <a:gd name="connsiteX1" fmla="*/ 113697 w 1132114"/>
-              <a:gd name="connsiteY1" fmla="*/ 0 h 682171"/>
-              <a:gd name="connsiteX2" fmla="*/ 923167 w 1132114"/>
-              <a:gd name="connsiteY2" fmla="*/ 4762 h 682171"/>
-              <a:gd name="connsiteX3" fmla="*/ 1132114 w 1132114"/>
-              <a:gd name="connsiteY3" fmla="*/ 227997 h 682171"/>
-              <a:gd name="connsiteX4" fmla="*/ 1132114 w 1132114"/>
-              <a:gd name="connsiteY4" fmla="*/ 568474 h 682171"/>
-              <a:gd name="connsiteX5" fmla="*/ 1018417 w 1132114"/>
-              <a:gd name="connsiteY5" fmla="*/ 682171 h 682171"/>
-              <a:gd name="connsiteX6" fmla="*/ 113697 w 1132114"/>
-              <a:gd name="connsiteY6" fmla="*/ 682171 h 682171"/>
-              <a:gd name="connsiteX7" fmla="*/ 0 w 1132114"/>
-              <a:gd name="connsiteY7" fmla="*/ 568474 h 682171"/>
-              <a:gd name="connsiteX8" fmla="*/ 0 w 1132114"/>
-              <a:gd name="connsiteY8" fmla="*/ 113697 h 682171"/>
-              <a:gd name="connsiteX0" fmla="*/ 0 w 1132114"/>
-              <a:gd name="connsiteY0" fmla="*/ 113697 h 682171"/>
-              <a:gd name="connsiteX1" fmla="*/ 113697 w 1132114"/>
-              <a:gd name="connsiteY1" fmla="*/ 0 h 682171"/>
-              <a:gd name="connsiteX2" fmla="*/ 923167 w 1132114"/>
-              <a:gd name="connsiteY2" fmla="*/ 4762 h 682171"/>
-              <a:gd name="connsiteX3" fmla="*/ 1132114 w 1132114"/>
-              <a:gd name="connsiteY3" fmla="*/ 227997 h 682171"/>
-              <a:gd name="connsiteX4" fmla="*/ 1132114 w 1132114"/>
-              <a:gd name="connsiteY4" fmla="*/ 568474 h 682171"/>
-              <a:gd name="connsiteX5" fmla="*/ 1018417 w 1132114"/>
-              <a:gd name="connsiteY5" fmla="*/ 682171 h 682171"/>
-              <a:gd name="connsiteX6" fmla="*/ 113697 w 1132114"/>
-              <a:gd name="connsiteY6" fmla="*/ 682171 h 682171"/>
-              <a:gd name="connsiteX7" fmla="*/ 0 w 1132114"/>
-              <a:gd name="connsiteY7" fmla="*/ 568474 h 682171"/>
-              <a:gd name="connsiteX8" fmla="*/ 0 w 1132114"/>
-              <a:gd name="connsiteY8" fmla="*/ 113697 h 682171"/>
-              <a:gd name="connsiteX0" fmla="*/ 0 w 1132114"/>
-              <a:gd name="connsiteY0" fmla="*/ 113697 h 682171"/>
-              <a:gd name="connsiteX1" fmla="*/ 113697 w 1132114"/>
-              <a:gd name="connsiteY1" fmla="*/ 0 h 682171"/>
-              <a:gd name="connsiteX2" fmla="*/ 923167 w 1132114"/>
-              <a:gd name="connsiteY2" fmla="*/ 4762 h 682171"/>
-              <a:gd name="connsiteX3" fmla="*/ 1132114 w 1132114"/>
-              <a:gd name="connsiteY3" fmla="*/ 227997 h 682171"/>
-              <a:gd name="connsiteX4" fmla="*/ 1132114 w 1132114"/>
-              <a:gd name="connsiteY4" fmla="*/ 568474 h 682171"/>
-              <a:gd name="connsiteX5" fmla="*/ 1018417 w 1132114"/>
-              <a:gd name="connsiteY5" fmla="*/ 682171 h 682171"/>
-              <a:gd name="connsiteX6" fmla="*/ 113697 w 1132114"/>
-              <a:gd name="connsiteY6" fmla="*/ 682171 h 682171"/>
-              <a:gd name="connsiteX7" fmla="*/ 0 w 1132114"/>
-              <a:gd name="connsiteY7" fmla="*/ 568474 h 682171"/>
-              <a:gd name="connsiteX8" fmla="*/ 0 w 1132114"/>
-              <a:gd name="connsiteY8" fmla="*/ 113697 h 682171"/>
-              <a:gd name="connsiteX0" fmla="*/ 0 w 1132114"/>
-              <a:gd name="connsiteY0" fmla="*/ 113697 h 682171"/>
-              <a:gd name="connsiteX1" fmla="*/ 113697 w 1132114"/>
-              <a:gd name="connsiteY1" fmla="*/ 0 h 682171"/>
-              <a:gd name="connsiteX2" fmla="*/ 923167 w 1132114"/>
-              <a:gd name="connsiteY2" fmla="*/ 4762 h 682171"/>
-              <a:gd name="connsiteX3" fmla="*/ 1132114 w 1132114"/>
-              <a:gd name="connsiteY3" fmla="*/ 227997 h 682171"/>
-              <a:gd name="connsiteX4" fmla="*/ 1132114 w 1132114"/>
-              <a:gd name="connsiteY4" fmla="*/ 568474 h 682171"/>
-              <a:gd name="connsiteX5" fmla="*/ 1018417 w 1132114"/>
-              <a:gd name="connsiteY5" fmla="*/ 682171 h 682171"/>
-              <a:gd name="connsiteX6" fmla="*/ 113697 w 1132114"/>
-              <a:gd name="connsiteY6" fmla="*/ 682171 h 682171"/>
-              <a:gd name="connsiteX7" fmla="*/ 0 w 1132114"/>
-              <a:gd name="connsiteY7" fmla="*/ 568474 h 682171"/>
-              <a:gd name="connsiteX8" fmla="*/ 0 w 1132114"/>
-              <a:gd name="connsiteY8" fmla="*/ 113697 h 682171"/>
-              <a:gd name="connsiteX0" fmla="*/ 0 w 1132114"/>
-              <a:gd name="connsiteY0" fmla="*/ 113698 h 682172"/>
-              <a:gd name="connsiteX1" fmla="*/ 113697 w 1132114"/>
-              <a:gd name="connsiteY1" fmla="*/ 1 h 682172"/>
-              <a:gd name="connsiteX2" fmla="*/ 804104 w 1132114"/>
-              <a:gd name="connsiteY2" fmla="*/ 0 h 682172"/>
-              <a:gd name="connsiteX3" fmla="*/ 1132114 w 1132114"/>
-              <a:gd name="connsiteY3" fmla="*/ 227998 h 682172"/>
-              <a:gd name="connsiteX4" fmla="*/ 1132114 w 1132114"/>
-              <a:gd name="connsiteY4" fmla="*/ 568475 h 682172"/>
-              <a:gd name="connsiteX5" fmla="*/ 1018417 w 1132114"/>
-              <a:gd name="connsiteY5" fmla="*/ 682172 h 682172"/>
-              <a:gd name="connsiteX6" fmla="*/ 113697 w 1132114"/>
-              <a:gd name="connsiteY6" fmla="*/ 682172 h 682172"/>
-              <a:gd name="connsiteX7" fmla="*/ 0 w 1132114"/>
-              <a:gd name="connsiteY7" fmla="*/ 568475 h 682172"/>
-              <a:gd name="connsiteX8" fmla="*/ 0 w 1132114"/>
-              <a:gd name="connsiteY8" fmla="*/ 113698 h 682172"/>
-              <a:gd name="connsiteX0" fmla="*/ 0 w 1136876"/>
-              <a:gd name="connsiteY0" fmla="*/ 113698 h 682172"/>
-              <a:gd name="connsiteX1" fmla="*/ 113697 w 1136876"/>
-              <a:gd name="connsiteY1" fmla="*/ 1 h 682172"/>
-              <a:gd name="connsiteX2" fmla="*/ 804104 w 1136876"/>
-              <a:gd name="connsiteY2" fmla="*/ 0 h 682172"/>
-              <a:gd name="connsiteX3" fmla="*/ 1136876 w 1136876"/>
-              <a:gd name="connsiteY3" fmla="*/ 332773 h 682172"/>
-              <a:gd name="connsiteX4" fmla="*/ 1132114 w 1136876"/>
-              <a:gd name="connsiteY4" fmla="*/ 568475 h 682172"/>
-              <a:gd name="connsiteX5" fmla="*/ 1018417 w 1136876"/>
-              <a:gd name="connsiteY5" fmla="*/ 682172 h 682172"/>
-              <a:gd name="connsiteX6" fmla="*/ 113697 w 1136876"/>
-              <a:gd name="connsiteY6" fmla="*/ 682172 h 682172"/>
-              <a:gd name="connsiteX7" fmla="*/ 0 w 1136876"/>
-              <a:gd name="connsiteY7" fmla="*/ 568475 h 682172"/>
-              <a:gd name="connsiteX8" fmla="*/ 0 w 1136876"/>
-              <a:gd name="connsiteY8" fmla="*/ 113698 h 682172"/>
-              <a:gd name="connsiteX0" fmla="*/ 0 w 1136876"/>
-              <a:gd name="connsiteY0" fmla="*/ 113698 h 682172"/>
-              <a:gd name="connsiteX1" fmla="*/ 113697 w 1136876"/>
-              <a:gd name="connsiteY1" fmla="*/ 1 h 682172"/>
-              <a:gd name="connsiteX2" fmla="*/ 804104 w 1136876"/>
-              <a:gd name="connsiteY2" fmla="*/ 0 h 682172"/>
-              <a:gd name="connsiteX3" fmla="*/ 1136876 w 1136876"/>
-              <a:gd name="connsiteY3" fmla="*/ 332773 h 682172"/>
-              <a:gd name="connsiteX4" fmla="*/ 1132114 w 1136876"/>
-              <a:gd name="connsiteY4" fmla="*/ 568475 h 682172"/>
-              <a:gd name="connsiteX5" fmla="*/ 1018417 w 1136876"/>
-              <a:gd name="connsiteY5" fmla="*/ 682172 h 682172"/>
-              <a:gd name="connsiteX6" fmla="*/ 113697 w 1136876"/>
-              <a:gd name="connsiteY6" fmla="*/ 682172 h 682172"/>
-              <a:gd name="connsiteX7" fmla="*/ 0 w 1136876"/>
-              <a:gd name="connsiteY7" fmla="*/ 568475 h 682172"/>
-              <a:gd name="connsiteX8" fmla="*/ 0 w 1136876"/>
-              <a:gd name="connsiteY8" fmla="*/ 113698 h 682172"/>
-              <a:gd name="connsiteX0" fmla="*/ 0 w 1136876"/>
-              <a:gd name="connsiteY0" fmla="*/ 118461 h 686935"/>
-              <a:gd name="connsiteX1" fmla="*/ 113697 w 1136876"/>
-              <a:gd name="connsiteY1" fmla="*/ 4764 h 686935"/>
-              <a:gd name="connsiteX2" fmla="*/ 646941 w 1136876"/>
-              <a:gd name="connsiteY2" fmla="*/ 0 h 686935"/>
-              <a:gd name="connsiteX3" fmla="*/ 1136876 w 1136876"/>
-              <a:gd name="connsiteY3" fmla="*/ 337536 h 686935"/>
-              <a:gd name="connsiteX4" fmla="*/ 1132114 w 1136876"/>
-              <a:gd name="connsiteY4" fmla="*/ 573238 h 686935"/>
-              <a:gd name="connsiteX5" fmla="*/ 1018417 w 1136876"/>
-              <a:gd name="connsiteY5" fmla="*/ 686935 h 686935"/>
-              <a:gd name="connsiteX6" fmla="*/ 113697 w 1136876"/>
-              <a:gd name="connsiteY6" fmla="*/ 686935 h 686935"/>
-              <a:gd name="connsiteX7" fmla="*/ 0 w 1136876"/>
-              <a:gd name="connsiteY7" fmla="*/ 573238 h 686935"/>
-              <a:gd name="connsiteX8" fmla="*/ 0 w 1136876"/>
-              <a:gd name="connsiteY8" fmla="*/ 118461 h 686935"/>
-              <a:gd name="connsiteX0" fmla="*/ 0 w 1136876"/>
-              <a:gd name="connsiteY0" fmla="*/ 118461 h 686935"/>
-              <a:gd name="connsiteX1" fmla="*/ 113697 w 1136876"/>
-              <a:gd name="connsiteY1" fmla="*/ 4764 h 686935"/>
-              <a:gd name="connsiteX2" fmla="*/ 646941 w 1136876"/>
-              <a:gd name="connsiteY2" fmla="*/ 0 h 686935"/>
-              <a:gd name="connsiteX3" fmla="*/ 1136876 w 1136876"/>
-              <a:gd name="connsiteY3" fmla="*/ 337536 h 686935"/>
-              <a:gd name="connsiteX4" fmla="*/ 1132114 w 1136876"/>
-              <a:gd name="connsiteY4" fmla="*/ 573238 h 686935"/>
-              <a:gd name="connsiteX5" fmla="*/ 1018417 w 1136876"/>
-              <a:gd name="connsiteY5" fmla="*/ 686935 h 686935"/>
-              <a:gd name="connsiteX6" fmla="*/ 113697 w 1136876"/>
-              <a:gd name="connsiteY6" fmla="*/ 686935 h 686935"/>
-              <a:gd name="connsiteX7" fmla="*/ 0 w 1136876"/>
-              <a:gd name="connsiteY7" fmla="*/ 573238 h 686935"/>
-              <a:gd name="connsiteX8" fmla="*/ 0 w 1136876"/>
-              <a:gd name="connsiteY8" fmla="*/ 118461 h 686935"/>
-              <a:gd name="connsiteX0" fmla="*/ 0 w 1136876"/>
-              <a:gd name="connsiteY0" fmla="*/ 118461 h 686935"/>
-              <a:gd name="connsiteX1" fmla="*/ 113697 w 1136876"/>
-              <a:gd name="connsiteY1" fmla="*/ 4764 h 686935"/>
-              <a:gd name="connsiteX2" fmla="*/ 646941 w 1136876"/>
-              <a:gd name="connsiteY2" fmla="*/ 0 h 686935"/>
-              <a:gd name="connsiteX3" fmla="*/ 1136876 w 1136876"/>
-              <a:gd name="connsiteY3" fmla="*/ 337536 h 686935"/>
-              <a:gd name="connsiteX4" fmla="*/ 1132114 w 1136876"/>
-              <a:gd name="connsiteY4" fmla="*/ 573238 h 686935"/>
-              <a:gd name="connsiteX5" fmla="*/ 1018417 w 1136876"/>
-              <a:gd name="connsiteY5" fmla="*/ 686935 h 686935"/>
-              <a:gd name="connsiteX6" fmla="*/ 113697 w 1136876"/>
-              <a:gd name="connsiteY6" fmla="*/ 686935 h 686935"/>
-              <a:gd name="connsiteX7" fmla="*/ 0 w 1136876"/>
-              <a:gd name="connsiteY7" fmla="*/ 573238 h 686935"/>
-              <a:gd name="connsiteX8" fmla="*/ 0 w 1136876"/>
-              <a:gd name="connsiteY8" fmla="*/ 118461 h 686935"/>
-              <a:gd name="connsiteX0" fmla="*/ 0 w 1136876"/>
-              <a:gd name="connsiteY0" fmla="*/ 118461 h 686935"/>
-              <a:gd name="connsiteX1" fmla="*/ 113697 w 1136876"/>
-              <a:gd name="connsiteY1" fmla="*/ 4764 h 686935"/>
-              <a:gd name="connsiteX2" fmla="*/ 646941 w 1136876"/>
-              <a:gd name="connsiteY2" fmla="*/ 0 h 686935"/>
-              <a:gd name="connsiteX3" fmla="*/ 1136876 w 1136876"/>
-              <a:gd name="connsiteY3" fmla="*/ 337536 h 686935"/>
-              <a:gd name="connsiteX4" fmla="*/ 1132114 w 1136876"/>
-              <a:gd name="connsiteY4" fmla="*/ 573238 h 686935"/>
-              <a:gd name="connsiteX5" fmla="*/ 1018417 w 1136876"/>
-              <a:gd name="connsiteY5" fmla="*/ 686935 h 686935"/>
-              <a:gd name="connsiteX6" fmla="*/ 113697 w 1136876"/>
-              <a:gd name="connsiteY6" fmla="*/ 686935 h 686935"/>
-              <a:gd name="connsiteX7" fmla="*/ 0 w 1136876"/>
-              <a:gd name="connsiteY7" fmla="*/ 573238 h 686935"/>
-              <a:gd name="connsiteX8" fmla="*/ 0 w 1136876"/>
-              <a:gd name="connsiteY8" fmla="*/ 118461 h 686935"/>
-              <a:gd name="connsiteX0" fmla="*/ 0 w 1136876"/>
-              <a:gd name="connsiteY0" fmla="*/ 118465 h 686939"/>
-              <a:gd name="connsiteX1" fmla="*/ 113697 w 1136876"/>
-              <a:gd name="connsiteY1" fmla="*/ 4768 h 686939"/>
-              <a:gd name="connsiteX2" fmla="*/ 646941 w 1136876"/>
-              <a:gd name="connsiteY2" fmla="*/ 4 h 686939"/>
-              <a:gd name="connsiteX3" fmla="*/ 1136876 w 1136876"/>
-              <a:gd name="connsiteY3" fmla="*/ 337540 h 686939"/>
-              <a:gd name="connsiteX4" fmla="*/ 1132114 w 1136876"/>
-              <a:gd name="connsiteY4" fmla="*/ 573242 h 686939"/>
-              <a:gd name="connsiteX5" fmla="*/ 1018417 w 1136876"/>
-              <a:gd name="connsiteY5" fmla="*/ 686939 h 686939"/>
-              <a:gd name="connsiteX6" fmla="*/ 113697 w 1136876"/>
-              <a:gd name="connsiteY6" fmla="*/ 686939 h 686939"/>
-              <a:gd name="connsiteX7" fmla="*/ 0 w 1136876"/>
-              <a:gd name="connsiteY7" fmla="*/ 573242 h 686939"/>
-              <a:gd name="connsiteX8" fmla="*/ 0 w 1136876"/>
-              <a:gd name="connsiteY8" fmla="*/ 118465 h 686939"/>
-              <a:gd name="connsiteX0" fmla="*/ 0 w 1136876"/>
-              <a:gd name="connsiteY0" fmla="*/ 118466 h 686940"/>
-              <a:gd name="connsiteX1" fmla="*/ 113697 w 1136876"/>
-              <a:gd name="connsiteY1" fmla="*/ 4769 h 686940"/>
-              <a:gd name="connsiteX2" fmla="*/ 646941 w 1136876"/>
-              <a:gd name="connsiteY2" fmla="*/ 5 h 686940"/>
-              <a:gd name="connsiteX3" fmla="*/ 1136876 w 1136876"/>
-              <a:gd name="connsiteY3" fmla="*/ 337541 h 686940"/>
-              <a:gd name="connsiteX4" fmla="*/ 1132114 w 1136876"/>
-              <a:gd name="connsiteY4" fmla="*/ 573243 h 686940"/>
-              <a:gd name="connsiteX5" fmla="*/ 1018417 w 1136876"/>
-              <a:gd name="connsiteY5" fmla="*/ 686940 h 686940"/>
-              <a:gd name="connsiteX6" fmla="*/ 113697 w 1136876"/>
-              <a:gd name="connsiteY6" fmla="*/ 686940 h 686940"/>
-              <a:gd name="connsiteX7" fmla="*/ 0 w 1136876"/>
-              <a:gd name="connsiteY7" fmla="*/ 573243 h 686940"/>
-              <a:gd name="connsiteX8" fmla="*/ 0 w 1136876"/>
-              <a:gd name="connsiteY8" fmla="*/ 118466 h 686940"/>
-              <a:gd name="connsiteX0" fmla="*/ 0 w 1136876"/>
-              <a:gd name="connsiteY0" fmla="*/ 118466 h 686940"/>
-              <a:gd name="connsiteX1" fmla="*/ 113697 w 1136876"/>
-              <a:gd name="connsiteY1" fmla="*/ 4769 h 686940"/>
-              <a:gd name="connsiteX2" fmla="*/ 646941 w 1136876"/>
-              <a:gd name="connsiteY2" fmla="*/ 5 h 686940"/>
-              <a:gd name="connsiteX3" fmla="*/ 1136876 w 1136876"/>
-              <a:gd name="connsiteY3" fmla="*/ 337541 h 686940"/>
-              <a:gd name="connsiteX4" fmla="*/ 1132114 w 1136876"/>
-              <a:gd name="connsiteY4" fmla="*/ 573243 h 686940"/>
-              <a:gd name="connsiteX5" fmla="*/ 1018417 w 1136876"/>
-              <a:gd name="connsiteY5" fmla="*/ 686940 h 686940"/>
-              <a:gd name="connsiteX6" fmla="*/ 113697 w 1136876"/>
-              <a:gd name="connsiteY6" fmla="*/ 686940 h 686940"/>
-              <a:gd name="connsiteX7" fmla="*/ 0 w 1136876"/>
-              <a:gd name="connsiteY7" fmla="*/ 573244 h 686940"/>
-              <a:gd name="connsiteX8" fmla="*/ 0 w 1136876"/>
-              <a:gd name="connsiteY8" fmla="*/ 118466 h 686940"/>
-              <a:gd name="connsiteX0" fmla="*/ 1797 w 1138673"/>
-              <a:gd name="connsiteY0" fmla="*/ 118466 h 691666"/>
-              <a:gd name="connsiteX1" fmla="*/ 115494 w 1138673"/>
-              <a:gd name="connsiteY1" fmla="*/ 4769 h 691666"/>
-              <a:gd name="connsiteX2" fmla="*/ 648738 w 1138673"/>
-              <a:gd name="connsiteY2" fmla="*/ 5 h 691666"/>
-              <a:gd name="connsiteX3" fmla="*/ 1138673 w 1138673"/>
-              <a:gd name="connsiteY3" fmla="*/ 337541 h 691666"/>
-              <a:gd name="connsiteX4" fmla="*/ 1133911 w 1138673"/>
-              <a:gd name="connsiteY4" fmla="*/ 573243 h 691666"/>
-              <a:gd name="connsiteX5" fmla="*/ 1020214 w 1138673"/>
-              <a:gd name="connsiteY5" fmla="*/ 686940 h 691666"/>
-              <a:gd name="connsiteX6" fmla="*/ 115494 w 1138673"/>
-              <a:gd name="connsiteY6" fmla="*/ 686940 h 691666"/>
-              <a:gd name="connsiteX7" fmla="*/ 1797 w 1138673"/>
-              <a:gd name="connsiteY7" fmla="*/ 573244 h 691666"/>
-              <a:gd name="connsiteX8" fmla="*/ 1797 w 1138673"/>
-              <a:gd name="connsiteY8" fmla="*/ 118466 h 691666"/>
-              <a:gd name="connsiteX0" fmla="*/ 1797 w 1138673"/>
-              <a:gd name="connsiteY0" fmla="*/ 118462 h 691662"/>
-              <a:gd name="connsiteX1" fmla="*/ 115494 w 1138673"/>
-              <a:gd name="connsiteY1" fmla="*/ 4765 h 691662"/>
-              <a:gd name="connsiteX2" fmla="*/ 648738 w 1138673"/>
-              <a:gd name="connsiteY2" fmla="*/ 1 h 691662"/>
-              <a:gd name="connsiteX3" fmla="*/ 1138673 w 1138673"/>
-              <a:gd name="connsiteY3" fmla="*/ 337537 h 691662"/>
-              <a:gd name="connsiteX4" fmla="*/ 1133911 w 1138673"/>
-              <a:gd name="connsiteY4" fmla="*/ 573239 h 691662"/>
-              <a:gd name="connsiteX5" fmla="*/ 1020214 w 1138673"/>
-              <a:gd name="connsiteY5" fmla="*/ 686936 h 691662"/>
-              <a:gd name="connsiteX6" fmla="*/ 115494 w 1138673"/>
-              <a:gd name="connsiteY6" fmla="*/ 686936 h 691662"/>
-              <a:gd name="connsiteX7" fmla="*/ 1797 w 1138673"/>
-              <a:gd name="connsiteY7" fmla="*/ 573240 h 691662"/>
-              <a:gd name="connsiteX8" fmla="*/ 1797 w 1138673"/>
-              <a:gd name="connsiteY8" fmla="*/ 118462 h 691662"/>
-              <a:gd name="connsiteX0" fmla="*/ 1797 w 1138673"/>
-              <a:gd name="connsiteY0" fmla="*/ 118461 h 691661"/>
-              <a:gd name="connsiteX1" fmla="*/ 115494 w 1138673"/>
-              <a:gd name="connsiteY1" fmla="*/ 4764 h 691661"/>
-              <a:gd name="connsiteX2" fmla="*/ 648738 w 1138673"/>
-              <a:gd name="connsiteY2" fmla="*/ 0 h 691661"/>
-              <a:gd name="connsiteX3" fmla="*/ 1138673 w 1138673"/>
-              <a:gd name="connsiteY3" fmla="*/ 337536 h 691661"/>
-              <a:gd name="connsiteX4" fmla="*/ 1133911 w 1138673"/>
-              <a:gd name="connsiteY4" fmla="*/ 573238 h 691661"/>
-              <a:gd name="connsiteX5" fmla="*/ 1020214 w 1138673"/>
-              <a:gd name="connsiteY5" fmla="*/ 686935 h 691661"/>
-              <a:gd name="connsiteX6" fmla="*/ 115494 w 1138673"/>
-              <a:gd name="connsiteY6" fmla="*/ 686935 h 691661"/>
-              <a:gd name="connsiteX7" fmla="*/ 1797 w 1138673"/>
-              <a:gd name="connsiteY7" fmla="*/ 573239 h 691661"/>
-              <a:gd name="connsiteX8" fmla="*/ 1797 w 1138673"/>
-              <a:gd name="connsiteY8" fmla="*/ 118461 h 691661"/>
-              <a:gd name="connsiteX0" fmla="*/ 1797 w 1138673"/>
-              <a:gd name="connsiteY0" fmla="*/ 118461 h 691661"/>
-              <a:gd name="connsiteX1" fmla="*/ 115494 w 1138673"/>
-              <a:gd name="connsiteY1" fmla="*/ 4764 h 691661"/>
-              <a:gd name="connsiteX2" fmla="*/ 648738 w 1138673"/>
-              <a:gd name="connsiteY2" fmla="*/ 0 h 691661"/>
-              <a:gd name="connsiteX3" fmla="*/ 1138673 w 1138673"/>
-              <a:gd name="connsiteY3" fmla="*/ 337536 h 691661"/>
-              <a:gd name="connsiteX4" fmla="*/ 1133911 w 1138673"/>
-              <a:gd name="connsiteY4" fmla="*/ 573238 h 691661"/>
-              <a:gd name="connsiteX5" fmla="*/ 1020214 w 1138673"/>
-              <a:gd name="connsiteY5" fmla="*/ 686935 h 691661"/>
-              <a:gd name="connsiteX6" fmla="*/ 115494 w 1138673"/>
-              <a:gd name="connsiteY6" fmla="*/ 686935 h 691661"/>
-              <a:gd name="connsiteX7" fmla="*/ 1797 w 1138673"/>
-              <a:gd name="connsiteY7" fmla="*/ 573239 h 691661"/>
-              <a:gd name="connsiteX8" fmla="*/ 1797 w 1138673"/>
-              <a:gd name="connsiteY8" fmla="*/ 118461 h 691661"/>
-              <a:gd name="connsiteX0" fmla="*/ 1797 w 1138673"/>
-              <a:gd name="connsiteY0" fmla="*/ 118461 h 691661"/>
-              <a:gd name="connsiteX1" fmla="*/ 115494 w 1138673"/>
-              <a:gd name="connsiteY1" fmla="*/ 4764 h 691661"/>
-              <a:gd name="connsiteX2" fmla="*/ 648738 w 1138673"/>
-              <a:gd name="connsiteY2" fmla="*/ 0 h 691661"/>
-              <a:gd name="connsiteX3" fmla="*/ 1138673 w 1138673"/>
-              <a:gd name="connsiteY3" fmla="*/ 337536 h 691661"/>
-              <a:gd name="connsiteX4" fmla="*/ 1133911 w 1138673"/>
-              <a:gd name="connsiteY4" fmla="*/ 573238 h 691661"/>
-              <a:gd name="connsiteX5" fmla="*/ 1020214 w 1138673"/>
-              <a:gd name="connsiteY5" fmla="*/ 686935 h 691661"/>
-              <a:gd name="connsiteX6" fmla="*/ 115494 w 1138673"/>
-              <a:gd name="connsiteY6" fmla="*/ 686935 h 691661"/>
-              <a:gd name="connsiteX7" fmla="*/ 1797 w 1138673"/>
-              <a:gd name="connsiteY7" fmla="*/ 573239 h 691661"/>
-              <a:gd name="connsiteX8" fmla="*/ 1797 w 1138673"/>
-              <a:gd name="connsiteY8" fmla="*/ 118461 h 691661"/>
-              <a:gd name="connsiteX0" fmla="*/ 1797 w 1138673"/>
-              <a:gd name="connsiteY0" fmla="*/ 118461 h 691661"/>
-              <a:gd name="connsiteX1" fmla="*/ 115494 w 1138673"/>
-              <a:gd name="connsiteY1" fmla="*/ 4764 h 691661"/>
-              <a:gd name="connsiteX2" fmla="*/ 648738 w 1138673"/>
-              <a:gd name="connsiteY2" fmla="*/ 0 h 691661"/>
-              <a:gd name="connsiteX3" fmla="*/ 1138673 w 1138673"/>
-              <a:gd name="connsiteY3" fmla="*/ 337536 h 691661"/>
-              <a:gd name="connsiteX4" fmla="*/ 1133911 w 1138673"/>
-              <a:gd name="connsiteY4" fmla="*/ 573238 h 691661"/>
-              <a:gd name="connsiteX5" fmla="*/ 1020214 w 1138673"/>
-              <a:gd name="connsiteY5" fmla="*/ 686935 h 691661"/>
-              <a:gd name="connsiteX6" fmla="*/ 115494 w 1138673"/>
-              <a:gd name="connsiteY6" fmla="*/ 686935 h 691661"/>
-              <a:gd name="connsiteX7" fmla="*/ 1797 w 1138673"/>
-              <a:gd name="connsiteY7" fmla="*/ 573239 h 691661"/>
-              <a:gd name="connsiteX8" fmla="*/ 1797 w 1138673"/>
-              <a:gd name="connsiteY8" fmla="*/ 118461 h 691661"/>
-              <a:gd name="connsiteX0" fmla="*/ 1797 w 1138673"/>
-              <a:gd name="connsiteY0" fmla="*/ 118461 h 691661"/>
-              <a:gd name="connsiteX1" fmla="*/ 115494 w 1138673"/>
-              <a:gd name="connsiteY1" fmla="*/ 4764 h 691661"/>
-              <a:gd name="connsiteX2" fmla="*/ 648738 w 1138673"/>
-              <a:gd name="connsiteY2" fmla="*/ 0 h 691661"/>
-              <a:gd name="connsiteX3" fmla="*/ 1138673 w 1138673"/>
-              <a:gd name="connsiteY3" fmla="*/ 337536 h 691661"/>
-              <a:gd name="connsiteX4" fmla="*/ 1133911 w 1138673"/>
-              <a:gd name="connsiteY4" fmla="*/ 573238 h 691661"/>
-              <a:gd name="connsiteX5" fmla="*/ 1020214 w 1138673"/>
-              <a:gd name="connsiteY5" fmla="*/ 686935 h 691661"/>
-              <a:gd name="connsiteX6" fmla="*/ 115494 w 1138673"/>
-              <a:gd name="connsiteY6" fmla="*/ 686935 h 691661"/>
-              <a:gd name="connsiteX7" fmla="*/ 1797 w 1138673"/>
-              <a:gd name="connsiteY7" fmla="*/ 573239 h 691661"/>
-              <a:gd name="connsiteX8" fmla="*/ 1797 w 1138673"/>
-              <a:gd name="connsiteY8" fmla="*/ 118461 h 691661"/>
-              <a:gd name="connsiteX0" fmla="*/ 1797 w 1138673"/>
-              <a:gd name="connsiteY0" fmla="*/ 118461 h 691661"/>
-              <a:gd name="connsiteX1" fmla="*/ 115494 w 1138673"/>
-              <a:gd name="connsiteY1" fmla="*/ 4764 h 691661"/>
-              <a:gd name="connsiteX2" fmla="*/ 648738 w 1138673"/>
-              <a:gd name="connsiteY2" fmla="*/ 0 h 691661"/>
-              <a:gd name="connsiteX3" fmla="*/ 1138673 w 1138673"/>
-              <a:gd name="connsiteY3" fmla="*/ 337536 h 691661"/>
-              <a:gd name="connsiteX4" fmla="*/ 1133911 w 1138673"/>
-              <a:gd name="connsiteY4" fmla="*/ 573238 h 691661"/>
-              <a:gd name="connsiteX5" fmla="*/ 1020214 w 1138673"/>
-              <a:gd name="connsiteY5" fmla="*/ 686935 h 691661"/>
-              <a:gd name="connsiteX6" fmla="*/ 115494 w 1138673"/>
-              <a:gd name="connsiteY6" fmla="*/ 686935 h 691661"/>
-              <a:gd name="connsiteX7" fmla="*/ 1797 w 1138673"/>
-              <a:gd name="connsiteY7" fmla="*/ 573239 h 691661"/>
-              <a:gd name="connsiteX8" fmla="*/ 1797 w 1138673"/>
-              <a:gd name="connsiteY8" fmla="*/ 118461 h 691661"/>
-              <a:gd name="connsiteX0" fmla="*/ 1797 w 1138673"/>
-              <a:gd name="connsiteY0" fmla="*/ 118461 h 691661"/>
-              <a:gd name="connsiteX1" fmla="*/ 115494 w 1138673"/>
-              <a:gd name="connsiteY1" fmla="*/ 4764 h 691661"/>
-              <a:gd name="connsiteX2" fmla="*/ 826875 w 1138673"/>
-              <a:gd name="connsiteY2" fmla="*/ 0 h 691661"/>
-              <a:gd name="connsiteX3" fmla="*/ 1138673 w 1138673"/>
-              <a:gd name="connsiteY3" fmla="*/ 337536 h 691661"/>
-              <a:gd name="connsiteX4" fmla="*/ 1133911 w 1138673"/>
-              <a:gd name="connsiteY4" fmla="*/ 573238 h 691661"/>
-              <a:gd name="connsiteX5" fmla="*/ 1020214 w 1138673"/>
-              <a:gd name="connsiteY5" fmla="*/ 686935 h 691661"/>
-              <a:gd name="connsiteX6" fmla="*/ 115494 w 1138673"/>
-              <a:gd name="connsiteY6" fmla="*/ 686935 h 691661"/>
-              <a:gd name="connsiteX7" fmla="*/ 1797 w 1138673"/>
-              <a:gd name="connsiteY7" fmla="*/ 573239 h 691661"/>
-              <a:gd name="connsiteX8" fmla="*/ 1797 w 1138673"/>
-              <a:gd name="connsiteY8" fmla="*/ 118461 h 691661"/>
-              <a:gd name="connsiteX0" fmla="*/ 1797 w 1138673"/>
-              <a:gd name="connsiteY0" fmla="*/ 118461 h 691661"/>
-              <a:gd name="connsiteX1" fmla="*/ 115494 w 1138673"/>
-              <a:gd name="connsiteY1" fmla="*/ 4764 h 691661"/>
-              <a:gd name="connsiteX2" fmla="*/ 826875 w 1138673"/>
-              <a:gd name="connsiteY2" fmla="*/ 0 h 691661"/>
-              <a:gd name="connsiteX3" fmla="*/ 1138673 w 1138673"/>
-              <a:gd name="connsiteY3" fmla="*/ 337536 h 691661"/>
-              <a:gd name="connsiteX4" fmla="*/ 1133911 w 1138673"/>
-              <a:gd name="connsiteY4" fmla="*/ 573238 h 691661"/>
-              <a:gd name="connsiteX5" fmla="*/ 1020214 w 1138673"/>
-              <a:gd name="connsiteY5" fmla="*/ 686935 h 691661"/>
-              <a:gd name="connsiteX6" fmla="*/ 115494 w 1138673"/>
-              <a:gd name="connsiteY6" fmla="*/ 686935 h 691661"/>
-              <a:gd name="connsiteX7" fmla="*/ 1797 w 1138673"/>
-              <a:gd name="connsiteY7" fmla="*/ 573239 h 691661"/>
-              <a:gd name="connsiteX8" fmla="*/ 1797 w 1138673"/>
-              <a:gd name="connsiteY8" fmla="*/ 118461 h 691661"/>
-              <a:gd name="connsiteX0" fmla="*/ 1797 w 1138673"/>
-              <a:gd name="connsiteY0" fmla="*/ 118461 h 691661"/>
-              <a:gd name="connsiteX1" fmla="*/ 115494 w 1138673"/>
-              <a:gd name="connsiteY1" fmla="*/ 4764 h 691661"/>
-              <a:gd name="connsiteX2" fmla="*/ 826875 w 1138673"/>
-              <a:gd name="connsiteY2" fmla="*/ 0 h 691661"/>
-              <a:gd name="connsiteX3" fmla="*/ 1138673 w 1138673"/>
-              <a:gd name="connsiteY3" fmla="*/ 337536 h 691661"/>
-              <a:gd name="connsiteX4" fmla="*/ 1133911 w 1138673"/>
-              <a:gd name="connsiteY4" fmla="*/ 573238 h 691661"/>
-              <a:gd name="connsiteX5" fmla="*/ 1020214 w 1138673"/>
-              <a:gd name="connsiteY5" fmla="*/ 686935 h 691661"/>
-              <a:gd name="connsiteX6" fmla="*/ 115494 w 1138673"/>
-              <a:gd name="connsiteY6" fmla="*/ 686935 h 691661"/>
-              <a:gd name="connsiteX7" fmla="*/ 1797 w 1138673"/>
-              <a:gd name="connsiteY7" fmla="*/ 573239 h 691661"/>
-              <a:gd name="connsiteX8" fmla="*/ 1797 w 1138673"/>
-              <a:gd name="connsiteY8" fmla="*/ 118461 h 691661"/>
-              <a:gd name="connsiteX0" fmla="*/ 1797 w 1138673"/>
-              <a:gd name="connsiteY0" fmla="*/ 118461 h 691661"/>
-              <a:gd name="connsiteX1" fmla="*/ 115494 w 1138673"/>
-              <a:gd name="connsiteY1" fmla="*/ 4764 h 691661"/>
-              <a:gd name="connsiteX2" fmla="*/ 826875 w 1138673"/>
-              <a:gd name="connsiteY2" fmla="*/ 0 h 691661"/>
-              <a:gd name="connsiteX3" fmla="*/ 1138673 w 1138673"/>
-              <a:gd name="connsiteY3" fmla="*/ 337536 h 691661"/>
-              <a:gd name="connsiteX4" fmla="*/ 1133911 w 1138673"/>
-              <a:gd name="connsiteY4" fmla="*/ 573238 h 691661"/>
-              <a:gd name="connsiteX5" fmla="*/ 1020214 w 1138673"/>
-              <a:gd name="connsiteY5" fmla="*/ 686935 h 691661"/>
-              <a:gd name="connsiteX6" fmla="*/ 115494 w 1138673"/>
-              <a:gd name="connsiteY6" fmla="*/ 686935 h 691661"/>
-              <a:gd name="connsiteX7" fmla="*/ 1797 w 1138673"/>
-              <a:gd name="connsiteY7" fmla="*/ 573239 h 691661"/>
-              <a:gd name="connsiteX8" fmla="*/ 1797 w 1138673"/>
-              <a:gd name="connsiteY8" fmla="*/ 118461 h 691661"/>
-            </a:gdLst>
-            <a:ahLst/>
-            <a:cxnLst>
-              <a:cxn ang="0">
-                <a:pos x="connsiteX0" y="connsiteY0"/>
-              </a:cxn>
-              <a:cxn ang="0">
-                <a:pos x="connsiteX1" y="connsiteY1"/>
-              </a:cxn>
-              <a:cxn ang="0">
-                <a:pos x="connsiteX2" y="connsiteY2"/>
-              </a:cxn>
-              <a:cxn ang="0">
-                <a:pos x="connsiteX3" y="connsiteY3"/>
-              </a:cxn>
-              <a:cxn ang="0">
-                <a:pos x="connsiteX4" y="connsiteY4"/>
-              </a:cxn>
-              <a:cxn ang="0">
-                <a:pos x="connsiteX5" y="connsiteY5"/>
-              </a:cxn>
-              <a:cxn ang="0">
-                <a:pos x="connsiteX6" y="connsiteY6"/>
-              </a:cxn>
-              <a:cxn ang="0">
-                <a:pos x="connsiteX7" y="connsiteY7"/>
-              </a:cxn>
-              <a:cxn ang="0">
-                <a:pos x="connsiteX8" y="connsiteY8"/>
-              </a:cxn>
-            </a:cxnLst>
-            <a:rect l="l" t="t" r="r" b="b"/>
-            <a:pathLst>
-              <a:path w="1138673" h="691661">
-                <a:moveTo>
-                  <a:pt x="1797" y="118461"/>
-                </a:moveTo>
-                <a:cubicBezTo>
-                  <a:pt x="1797" y="55668"/>
-                  <a:pt x="52701" y="4764"/>
-                  <a:pt x="115494" y="4764"/>
-                </a:cubicBezTo>
-                <a:lnTo>
-                  <a:pt x="826875" y="0"/>
-                </a:lnTo>
-                <a:cubicBezTo>
-                  <a:pt x="1006399" y="10834"/>
-                  <a:pt x="892773" y="279869"/>
-                  <a:pt x="1138673" y="337536"/>
-                </a:cubicBezTo>
-                <a:cubicBezTo>
-                  <a:pt x="1137086" y="416103"/>
-                  <a:pt x="1135498" y="494671"/>
-                  <a:pt x="1133911" y="573238"/>
-                </a:cubicBezTo>
-                <a:cubicBezTo>
-                  <a:pt x="1133911" y="684602"/>
-                  <a:pt x="1123340" y="686935"/>
-                  <a:pt x="1020214" y="686935"/>
-                </a:cubicBezTo>
-                <a:lnTo>
-                  <a:pt x="115494" y="686935"/>
-                </a:lnTo>
-                <a:cubicBezTo>
-                  <a:pt x="52701" y="686935"/>
-                  <a:pt x="-11647" y="727102"/>
-                  <a:pt x="1797" y="573239"/>
-                </a:cubicBezTo>
-                <a:lnTo>
-                  <a:pt x="1797" y="118461"/>
-                </a:lnTo>
-                <a:close/>
-              </a:path>
-            </a:pathLst>
-          </a:custGeom>
+          </a:prstGeom>
           <a:solidFill>
-            <a:schemeClr val="accent6">
-              <a:lumMod val="75000"/>
-              <a:alpha val="32000"/>
+            <a:schemeClr val="accent1">
+              <a:alpha val="38000"/>
             </a:schemeClr>
           </a:solidFill>
-          <a:ln>
-            <a:noFill/>
-          </a:ln>
         </p:spPr>
         <p:style>
           <a:lnRef idx="2">
@@ -19748,29 +18989,32 @@
           <a:bodyPr rtlCol="0" anchor="ctr"/>
           <a:lstStyle/>
           <a:p>
-            <a:pPr algn="ctr"/>
+            <a:r>
+              <a:rPr lang="en-US"/>
+              <a:t>Cài đặt chung</a:t>
+            </a:r>
             <a:endParaRPr lang="en-US"/>
           </a:p>
         </p:txBody>
       </p:sp>
       <p:sp>
         <p:nvSpPr>
-          <p:cNvPr id="30" name="Action Button: Home 29">
-            <a:hlinkClick r:id="" action="ppaction://hlinkshowjump?jump=firstslide" highlightClick="1"/>
-          </p:cNvPr>
+          <p:cNvPr id="23" name="Rounded Rectangle 22"/>
           <p:cNvSpPr/>
           <p:nvPr/>
         </p:nvSpPr>
         <p:spPr>
           <a:xfrm>
-            <a:off x="5167868" y="5978138"/>
-            <a:ext cx="295094" cy="281504"/>
-          </a:xfrm>
-          <a:prstGeom prst="actionButtonHome">
+            <a:off x="666212" y="2307368"/>
+            <a:ext cx="2709185" cy="403854"/>
+          </a:xfrm>
+          <a:prstGeom prst="roundRect">
             <a:avLst/>
           </a:prstGeom>
           <a:solidFill>
-            <a:schemeClr val="accent4"/>
+            <a:schemeClr val="accent1">
+              <a:alpha val="38000"/>
+            </a:schemeClr>
           </a:solidFill>
         </p:spPr>
         <p:style>
@@ -19793,33 +19037,32 @@
           <a:bodyPr rtlCol="0" anchor="ctr"/>
           <a:lstStyle/>
           <a:p>
-            <a:pPr algn="ctr"/>
+            <a:r>
+              <a:rPr lang="en-US"/>
+              <a:t>About </a:t>
+            </a:r>
+            <a:r>
+              <a:rPr lang="en-US" smtClean="0"/>
+              <a:t>App</a:t>
+            </a:r>
             <a:endParaRPr lang="en-US"/>
           </a:p>
         </p:txBody>
       </p:sp>
       <p:sp>
         <p:nvSpPr>
-          <p:cNvPr id="31" name="Flowchart: Or 30"/>
+          <p:cNvPr id="8" name="Rounded Rectangle 7"/>
           <p:cNvSpPr/>
           <p:nvPr/>
         </p:nvSpPr>
         <p:spPr>
           <a:xfrm>
-            <a:off x="5754686" y="5975901"/>
-            <a:ext cx="300024" cy="283741"/>
-          </a:xfrm>
-          <a:prstGeom prst="flowChartOr">
+            <a:off x="6015789" y="424914"/>
+            <a:ext cx="3801979" cy="1548265"/>
+          </a:xfrm>
+          <a:prstGeom prst="roundRect">
             <a:avLst/>
           </a:prstGeom>
-          <a:solidFill>
-            <a:schemeClr val="bg1"/>
-          </a:solidFill>
-          <a:ln>
-            <a:solidFill>
-              <a:srgbClr val="0070C0"/>
-            </a:solidFill>
-          </a:ln>
         </p:spPr>
         <p:style>
           <a:lnRef idx="2">
@@ -19841,685 +19084,46 @@
           <a:bodyPr rtlCol="0" anchor="ctr"/>
           <a:lstStyle/>
           <a:p>
-            <a:pPr algn="ctr"/>
-            <a:endParaRPr lang="en-US"/>
-          </a:p>
-        </p:txBody>
-      </p:sp>
-      <p:sp>
-        <p:nvSpPr>
-          <p:cNvPr id="34" name="Rounded Rectangle 12"/>
+            <a:r>
+              <a:rPr lang="en-US" sz="2400" smtClean="0"/>
+              <a:t>Name</a:t>
+            </a:r>
+          </a:p>
+          <a:p>
+            <a:r>
+              <a:rPr lang="en-US" sz="2400" smtClean="0"/>
+              <a:t>Date of birth</a:t>
+            </a:r>
+          </a:p>
+          <a:p>
+            <a:r>
+              <a:rPr lang="en-US" sz="2400" smtClean="0"/>
+              <a:t>Email</a:t>
+            </a:r>
+          </a:p>
+          <a:p>
+            <a:r>
+              <a:rPr lang="en-US" sz="2400" smtClean="0"/>
+              <a:t>Main Job</a:t>
+            </a:r>
+            <a:endParaRPr lang="en-US" sz="2400"/>
+          </a:p>
+        </p:txBody>
+      </p:sp>
+      <p:sp>
+        <p:nvSpPr>
+          <p:cNvPr id="25" name="Rounded Rectangle 24"/>
           <p:cNvSpPr/>
           <p:nvPr/>
         </p:nvSpPr>
         <p:spPr>
-          <a:xfrm flipH="1">
-            <a:off x="6447367" y="5882518"/>
-            <a:ext cx="1452638" cy="482267"/>
-          </a:xfrm>
-          <a:custGeom>
+          <a:xfrm>
+            <a:off x="6015789" y="2280293"/>
+            <a:ext cx="3801979" cy="1281056"/>
+          </a:xfrm>
+          <a:prstGeom prst="roundRect">
             <a:avLst/>
-            <a:gdLst>
-              <a:gd name="connsiteX0" fmla="*/ 0 w 1132114"/>
-              <a:gd name="connsiteY0" fmla="*/ 113697 h 682171"/>
-              <a:gd name="connsiteX1" fmla="*/ 113697 w 1132114"/>
-              <a:gd name="connsiteY1" fmla="*/ 0 h 682171"/>
-              <a:gd name="connsiteX2" fmla="*/ 1018417 w 1132114"/>
-              <a:gd name="connsiteY2" fmla="*/ 0 h 682171"/>
-              <a:gd name="connsiteX3" fmla="*/ 1132114 w 1132114"/>
-              <a:gd name="connsiteY3" fmla="*/ 113697 h 682171"/>
-              <a:gd name="connsiteX4" fmla="*/ 1132114 w 1132114"/>
-              <a:gd name="connsiteY4" fmla="*/ 568474 h 682171"/>
-              <a:gd name="connsiteX5" fmla="*/ 1018417 w 1132114"/>
-              <a:gd name="connsiteY5" fmla="*/ 682171 h 682171"/>
-              <a:gd name="connsiteX6" fmla="*/ 113697 w 1132114"/>
-              <a:gd name="connsiteY6" fmla="*/ 682171 h 682171"/>
-              <a:gd name="connsiteX7" fmla="*/ 0 w 1132114"/>
-              <a:gd name="connsiteY7" fmla="*/ 568474 h 682171"/>
-              <a:gd name="connsiteX8" fmla="*/ 0 w 1132114"/>
-              <a:gd name="connsiteY8" fmla="*/ 113697 h 682171"/>
-              <a:gd name="connsiteX0" fmla="*/ 0 w 1132114"/>
-              <a:gd name="connsiteY0" fmla="*/ 113697 h 682171"/>
-              <a:gd name="connsiteX1" fmla="*/ 113697 w 1132114"/>
-              <a:gd name="connsiteY1" fmla="*/ 0 h 682171"/>
-              <a:gd name="connsiteX2" fmla="*/ 923167 w 1132114"/>
-              <a:gd name="connsiteY2" fmla="*/ 4762 h 682171"/>
-              <a:gd name="connsiteX3" fmla="*/ 1132114 w 1132114"/>
-              <a:gd name="connsiteY3" fmla="*/ 113697 h 682171"/>
-              <a:gd name="connsiteX4" fmla="*/ 1132114 w 1132114"/>
-              <a:gd name="connsiteY4" fmla="*/ 568474 h 682171"/>
-              <a:gd name="connsiteX5" fmla="*/ 1018417 w 1132114"/>
-              <a:gd name="connsiteY5" fmla="*/ 682171 h 682171"/>
-              <a:gd name="connsiteX6" fmla="*/ 113697 w 1132114"/>
-              <a:gd name="connsiteY6" fmla="*/ 682171 h 682171"/>
-              <a:gd name="connsiteX7" fmla="*/ 0 w 1132114"/>
-              <a:gd name="connsiteY7" fmla="*/ 568474 h 682171"/>
-              <a:gd name="connsiteX8" fmla="*/ 0 w 1132114"/>
-              <a:gd name="connsiteY8" fmla="*/ 113697 h 682171"/>
-              <a:gd name="connsiteX0" fmla="*/ 0 w 1132114"/>
-              <a:gd name="connsiteY0" fmla="*/ 113697 h 682171"/>
-              <a:gd name="connsiteX1" fmla="*/ 113697 w 1132114"/>
-              <a:gd name="connsiteY1" fmla="*/ 0 h 682171"/>
-              <a:gd name="connsiteX2" fmla="*/ 923167 w 1132114"/>
-              <a:gd name="connsiteY2" fmla="*/ 4762 h 682171"/>
-              <a:gd name="connsiteX3" fmla="*/ 1132114 w 1132114"/>
-              <a:gd name="connsiteY3" fmla="*/ 227997 h 682171"/>
-              <a:gd name="connsiteX4" fmla="*/ 1132114 w 1132114"/>
-              <a:gd name="connsiteY4" fmla="*/ 568474 h 682171"/>
-              <a:gd name="connsiteX5" fmla="*/ 1018417 w 1132114"/>
-              <a:gd name="connsiteY5" fmla="*/ 682171 h 682171"/>
-              <a:gd name="connsiteX6" fmla="*/ 113697 w 1132114"/>
-              <a:gd name="connsiteY6" fmla="*/ 682171 h 682171"/>
-              <a:gd name="connsiteX7" fmla="*/ 0 w 1132114"/>
-              <a:gd name="connsiteY7" fmla="*/ 568474 h 682171"/>
-              <a:gd name="connsiteX8" fmla="*/ 0 w 1132114"/>
-              <a:gd name="connsiteY8" fmla="*/ 113697 h 682171"/>
-              <a:gd name="connsiteX0" fmla="*/ 0 w 1132114"/>
-              <a:gd name="connsiteY0" fmla="*/ 113697 h 682171"/>
-              <a:gd name="connsiteX1" fmla="*/ 113697 w 1132114"/>
-              <a:gd name="connsiteY1" fmla="*/ 0 h 682171"/>
-              <a:gd name="connsiteX2" fmla="*/ 923167 w 1132114"/>
-              <a:gd name="connsiteY2" fmla="*/ 4762 h 682171"/>
-              <a:gd name="connsiteX3" fmla="*/ 1132114 w 1132114"/>
-              <a:gd name="connsiteY3" fmla="*/ 227997 h 682171"/>
-              <a:gd name="connsiteX4" fmla="*/ 1132114 w 1132114"/>
-              <a:gd name="connsiteY4" fmla="*/ 568474 h 682171"/>
-              <a:gd name="connsiteX5" fmla="*/ 1018417 w 1132114"/>
-              <a:gd name="connsiteY5" fmla="*/ 682171 h 682171"/>
-              <a:gd name="connsiteX6" fmla="*/ 113697 w 1132114"/>
-              <a:gd name="connsiteY6" fmla="*/ 682171 h 682171"/>
-              <a:gd name="connsiteX7" fmla="*/ 0 w 1132114"/>
-              <a:gd name="connsiteY7" fmla="*/ 568474 h 682171"/>
-              <a:gd name="connsiteX8" fmla="*/ 0 w 1132114"/>
-              <a:gd name="connsiteY8" fmla="*/ 113697 h 682171"/>
-              <a:gd name="connsiteX0" fmla="*/ 0 w 1132114"/>
-              <a:gd name="connsiteY0" fmla="*/ 113697 h 682171"/>
-              <a:gd name="connsiteX1" fmla="*/ 113697 w 1132114"/>
-              <a:gd name="connsiteY1" fmla="*/ 0 h 682171"/>
-              <a:gd name="connsiteX2" fmla="*/ 923167 w 1132114"/>
-              <a:gd name="connsiteY2" fmla="*/ 4762 h 682171"/>
-              <a:gd name="connsiteX3" fmla="*/ 1132114 w 1132114"/>
-              <a:gd name="connsiteY3" fmla="*/ 227997 h 682171"/>
-              <a:gd name="connsiteX4" fmla="*/ 1132114 w 1132114"/>
-              <a:gd name="connsiteY4" fmla="*/ 568474 h 682171"/>
-              <a:gd name="connsiteX5" fmla="*/ 1018417 w 1132114"/>
-              <a:gd name="connsiteY5" fmla="*/ 682171 h 682171"/>
-              <a:gd name="connsiteX6" fmla="*/ 113697 w 1132114"/>
-              <a:gd name="connsiteY6" fmla="*/ 682171 h 682171"/>
-              <a:gd name="connsiteX7" fmla="*/ 0 w 1132114"/>
-              <a:gd name="connsiteY7" fmla="*/ 568474 h 682171"/>
-              <a:gd name="connsiteX8" fmla="*/ 0 w 1132114"/>
-              <a:gd name="connsiteY8" fmla="*/ 113697 h 682171"/>
-              <a:gd name="connsiteX0" fmla="*/ 0 w 1132114"/>
-              <a:gd name="connsiteY0" fmla="*/ 113697 h 682171"/>
-              <a:gd name="connsiteX1" fmla="*/ 113697 w 1132114"/>
-              <a:gd name="connsiteY1" fmla="*/ 0 h 682171"/>
-              <a:gd name="connsiteX2" fmla="*/ 923167 w 1132114"/>
-              <a:gd name="connsiteY2" fmla="*/ 4762 h 682171"/>
-              <a:gd name="connsiteX3" fmla="*/ 1132114 w 1132114"/>
-              <a:gd name="connsiteY3" fmla="*/ 227997 h 682171"/>
-              <a:gd name="connsiteX4" fmla="*/ 1132114 w 1132114"/>
-              <a:gd name="connsiteY4" fmla="*/ 568474 h 682171"/>
-              <a:gd name="connsiteX5" fmla="*/ 1018417 w 1132114"/>
-              <a:gd name="connsiteY5" fmla="*/ 682171 h 682171"/>
-              <a:gd name="connsiteX6" fmla="*/ 113697 w 1132114"/>
-              <a:gd name="connsiteY6" fmla="*/ 682171 h 682171"/>
-              <a:gd name="connsiteX7" fmla="*/ 0 w 1132114"/>
-              <a:gd name="connsiteY7" fmla="*/ 568474 h 682171"/>
-              <a:gd name="connsiteX8" fmla="*/ 0 w 1132114"/>
-              <a:gd name="connsiteY8" fmla="*/ 113697 h 682171"/>
-              <a:gd name="connsiteX0" fmla="*/ 0 w 1132114"/>
-              <a:gd name="connsiteY0" fmla="*/ 113697 h 682171"/>
-              <a:gd name="connsiteX1" fmla="*/ 113697 w 1132114"/>
-              <a:gd name="connsiteY1" fmla="*/ 0 h 682171"/>
-              <a:gd name="connsiteX2" fmla="*/ 923167 w 1132114"/>
-              <a:gd name="connsiteY2" fmla="*/ 4762 h 682171"/>
-              <a:gd name="connsiteX3" fmla="*/ 1132114 w 1132114"/>
-              <a:gd name="connsiteY3" fmla="*/ 227997 h 682171"/>
-              <a:gd name="connsiteX4" fmla="*/ 1132114 w 1132114"/>
-              <a:gd name="connsiteY4" fmla="*/ 568474 h 682171"/>
-              <a:gd name="connsiteX5" fmla="*/ 1018417 w 1132114"/>
-              <a:gd name="connsiteY5" fmla="*/ 682171 h 682171"/>
-              <a:gd name="connsiteX6" fmla="*/ 113697 w 1132114"/>
-              <a:gd name="connsiteY6" fmla="*/ 682171 h 682171"/>
-              <a:gd name="connsiteX7" fmla="*/ 0 w 1132114"/>
-              <a:gd name="connsiteY7" fmla="*/ 568474 h 682171"/>
-              <a:gd name="connsiteX8" fmla="*/ 0 w 1132114"/>
-              <a:gd name="connsiteY8" fmla="*/ 113697 h 682171"/>
-              <a:gd name="connsiteX0" fmla="*/ 0 w 1132114"/>
-              <a:gd name="connsiteY0" fmla="*/ 113697 h 682171"/>
-              <a:gd name="connsiteX1" fmla="*/ 113697 w 1132114"/>
-              <a:gd name="connsiteY1" fmla="*/ 0 h 682171"/>
-              <a:gd name="connsiteX2" fmla="*/ 923167 w 1132114"/>
-              <a:gd name="connsiteY2" fmla="*/ 4762 h 682171"/>
-              <a:gd name="connsiteX3" fmla="*/ 1132114 w 1132114"/>
-              <a:gd name="connsiteY3" fmla="*/ 227997 h 682171"/>
-              <a:gd name="connsiteX4" fmla="*/ 1132114 w 1132114"/>
-              <a:gd name="connsiteY4" fmla="*/ 568474 h 682171"/>
-              <a:gd name="connsiteX5" fmla="*/ 1018417 w 1132114"/>
-              <a:gd name="connsiteY5" fmla="*/ 682171 h 682171"/>
-              <a:gd name="connsiteX6" fmla="*/ 113697 w 1132114"/>
-              <a:gd name="connsiteY6" fmla="*/ 682171 h 682171"/>
-              <a:gd name="connsiteX7" fmla="*/ 0 w 1132114"/>
-              <a:gd name="connsiteY7" fmla="*/ 568474 h 682171"/>
-              <a:gd name="connsiteX8" fmla="*/ 0 w 1132114"/>
-              <a:gd name="connsiteY8" fmla="*/ 113697 h 682171"/>
-              <a:gd name="connsiteX0" fmla="*/ 0 w 1132114"/>
-              <a:gd name="connsiteY0" fmla="*/ 113697 h 682171"/>
-              <a:gd name="connsiteX1" fmla="*/ 113697 w 1132114"/>
-              <a:gd name="connsiteY1" fmla="*/ 0 h 682171"/>
-              <a:gd name="connsiteX2" fmla="*/ 923167 w 1132114"/>
-              <a:gd name="connsiteY2" fmla="*/ 4762 h 682171"/>
-              <a:gd name="connsiteX3" fmla="*/ 1132114 w 1132114"/>
-              <a:gd name="connsiteY3" fmla="*/ 227997 h 682171"/>
-              <a:gd name="connsiteX4" fmla="*/ 1132114 w 1132114"/>
-              <a:gd name="connsiteY4" fmla="*/ 568474 h 682171"/>
-              <a:gd name="connsiteX5" fmla="*/ 1018417 w 1132114"/>
-              <a:gd name="connsiteY5" fmla="*/ 682171 h 682171"/>
-              <a:gd name="connsiteX6" fmla="*/ 113697 w 1132114"/>
-              <a:gd name="connsiteY6" fmla="*/ 682171 h 682171"/>
-              <a:gd name="connsiteX7" fmla="*/ 0 w 1132114"/>
-              <a:gd name="connsiteY7" fmla="*/ 568474 h 682171"/>
-              <a:gd name="connsiteX8" fmla="*/ 0 w 1132114"/>
-              <a:gd name="connsiteY8" fmla="*/ 113697 h 682171"/>
-              <a:gd name="connsiteX0" fmla="*/ 0 w 1132114"/>
-              <a:gd name="connsiteY0" fmla="*/ 113697 h 682171"/>
-              <a:gd name="connsiteX1" fmla="*/ 113697 w 1132114"/>
-              <a:gd name="connsiteY1" fmla="*/ 0 h 682171"/>
-              <a:gd name="connsiteX2" fmla="*/ 923167 w 1132114"/>
-              <a:gd name="connsiteY2" fmla="*/ 4762 h 682171"/>
-              <a:gd name="connsiteX3" fmla="*/ 1132114 w 1132114"/>
-              <a:gd name="connsiteY3" fmla="*/ 227997 h 682171"/>
-              <a:gd name="connsiteX4" fmla="*/ 1132114 w 1132114"/>
-              <a:gd name="connsiteY4" fmla="*/ 568474 h 682171"/>
-              <a:gd name="connsiteX5" fmla="*/ 1018417 w 1132114"/>
-              <a:gd name="connsiteY5" fmla="*/ 682171 h 682171"/>
-              <a:gd name="connsiteX6" fmla="*/ 113697 w 1132114"/>
-              <a:gd name="connsiteY6" fmla="*/ 682171 h 682171"/>
-              <a:gd name="connsiteX7" fmla="*/ 0 w 1132114"/>
-              <a:gd name="connsiteY7" fmla="*/ 568474 h 682171"/>
-              <a:gd name="connsiteX8" fmla="*/ 0 w 1132114"/>
-              <a:gd name="connsiteY8" fmla="*/ 113697 h 682171"/>
-              <a:gd name="connsiteX0" fmla="*/ 0 w 1132114"/>
-              <a:gd name="connsiteY0" fmla="*/ 113698 h 682172"/>
-              <a:gd name="connsiteX1" fmla="*/ 113697 w 1132114"/>
-              <a:gd name="connsiteY1" fmla="*/ 1 h 682172"/>
-              <a:gd name="connsiteX2" fmla="*/ 804104 w 1132114"/>
-              <a:gd name="connsiteY2" fmla="*/ 0 h 682172"/>
-              <a:gd name="connsiteX3" fmla="*/ 1132114 w 1132114"/>
-              <a:gd name="connsiteY3" fmla="*/ 227998 h 682172"/>
-              <a:gd name="connsiteX4" fmla="*/ 1132114 w 1132114"/>
-              <a:gd name="connsiteY4" fmla="*/ 568475 h 682172"/>
-              <a:gd name="connsiteX5" fmla="*/ 1018417 w 1132114"/>
-              <a:gd name="connsiteY5" fmla="*/ 682172 h 682172"/>
-              <a:gd name="connsiteX6" fmla="*/ 113697 w 1132114"/>
-              <a:gd name="connsiteY6" fmla="*/ 682172 h 682172"/>
-              <a:gd name="connsiteX7" fmla="*/ 0 w 1132114"/>
-              <a:gd name="connsiteY7" fmla="*/ 568475 h 682172"/>
-              <a:gd name="connsiteX8" fmla="*/ 0 w 1132114"/>
-              <a:gd name="connsiteY8" fmla="*/ 113698 h 682172"/>
-              <a:gd name="connsiteX0" fmla="*/ 0 w 1136876"/>
-              <a:gd name="connsiteY0" fmla="*/ 113698 h 682172"/>
-              <a:gd name="connsiteX1" fmla="*/ 113697 w 1136876"/>
-              <a:gd name="connsiteY1" fmla="*/ 1 h 682172"/>
-              <a:gd name="connsiteX2" fmla="*/ 804104 w 1136876"/>
-              <a:gd name="connsiteY2" fmla="*/ 0 h 682172"/>
-              <a:gd name="connsiteX3" fmla="*/ 1136876 w 1136876"/>
-              <a:gd name="connsiteY3" fmla="*/ 332773 h 682172"/>
-              <a:gd name="connsiteX4" fmla="*/ 1132114 w 1136876"/>
-              <a:gd name="connsiteY4" fmla="*/ 568475 h 682172"/>
-              <a:gd name="connsiteX5" fmla="*/ 1018417 w 1136876"/>
-              <a:gd name="connsiteY5" fmla="*/ 682172 h 682172"/>
-              <a:gd name="connsiteX6" fmla="*/ 113697 w 1136876"/>
-              <a:gd name="connsiteY6" fmla="*/ 682172 h 682172"/>
-              <a:gd name="connsiteX7" fmla="*/ 0 w 1136876"/>
-              <a:gd name="connsiteY7" fmla="*/ 568475 h 682172"/>
-              <a:gd name="connsiteX8" fmla="*/ 0 w 1136876"/>
-              <a:gd name="connsiteY8" fmla="*/ 113698 h 682172"/>
-              <a:gd name="connsiteX0" fmla="*/ 0 w 1136876"/>
-              <a:gd name="connsiteY0" fmla="*/ 113698 h 682172"/>
-              <a:gd name="connsiteX1" fmla="*/ 113697 w 1136876"/>
-              <a:gd name="connsiteY1" fmla="*/ 1 h 682172"/>
-              <a:gd name="connsiteX2" fmla="*/ 804104 w 1136876"/>
-              <a:gd name="connsiteY2" fmla="*/ 0 h 682172"/>
-              <a:gd name="connsiteX3" fmla="*/ 1136876 w 1136876"/>
-              <a:gd name="connsiteY3" fmla="*/ 332773 h 682172"/>
-              <a:gd name="connsiteX4" fmla="*/ 1132114 w 1136876"/>
-              <a:gd name="connsiteY4" fmla="*/ 568475 h 682172"/>
-              <a:gd name="connsiteX5" fmla="*/ 1018417 w 1136876"/>
-              <a:gd name="connsiteY5" fmla="*/ 682172 h 682172"/>
-              <a:gd name="connsiteX6" fmla="*/ 113697 w 1136876"/>
-              <a:gd name="connsiteY6" fmla="*/ 682172 h 682172"/>
-              <a:gd name="connsiteX7" fmla="*/ 0 w 1136876"/>
-              <a:gd name="connsiteY7" fmla="*/ 568475 h 682172"/>
-              <a:gd name="connsiteX8" fmla="*/ 0 w 1136876"/>
-              <a:gd name="connsiteY8" fmla="*/ 113698 h 682172"/>
-              <a:gd name="connsiteX0" fmla="*/ 0 w 1136876"/>
-              <a:gd name="connsiteY0" fmla="*/ 118461 h 686935"/>
-              <a:gd name="connsiteX1" fmla="*/ 113697 w 1136876"/>
-              <a:gd name="connsiteY1" fmla="*/ 4764 h 686935"/>
-              <a:gd name="connsiteX2" fmla="*/ 646941 w 1136876"/>
-              <a:gd name="connsiteY2" fmla="*/ 0 h 686935"/>
-              <a:gd name="connsiteX3" fmla="*/ 1136876 w 1136876"/>
-              <a:gd name="connsiteY3" fmla="*/ 337536 h 686935"/>
-              <a:gd name="connsiteX4" fmla="*/ 1132114 w 1136876"/>
-              <a:gd name="connsiteY4" fmla="*/ 573238 h 686935"/>
-              <a:gd name="connsiteX5" fmla="*/ 1018417 w 1136876"/>
-              <a:gd name="connsiteY5" fmla="*/ 686935 h 686935"/>
-              <a:gd name="connsiteX6" fmla="*/ 113697 w 1136876"/>
-              <a:gd name="connsiteY6" fmla="*/ 686935 h 686935"/>
-              <a:gd name="connsiteX7" fmla="*/ 0 w 1136876"/>
-              <a:gd name="connsiteY7" fmla="*/ 573238 h 686935"/>
-              <a:gd name="connsiteX8" fmla="*/ 0 w 1136876"/>
-              <a:gd name="connsiteY8" fmla="*/ 118461 h 686935"/>
-              <a:gd name="connsiteX0" fmla="*/ 0 w 1136876"/>
-              <a:gd name="connsiteY0" fmla="*/ 118461 h 686935"/>
-              <a:gd name="connsiteX1" fmla="*/ 113697 w 1136876"/>
-              <a:gd name="connsiteY1" fmla="*/ 4764 h 686935"/>
-              <a:gd name="connsiteX2" fmla="*/ 646941 w 1136876"/>
-              <a:gd name="connsiteY2" fmla="*/ 0 h 686935"/>
-              <a:gd name="connsiteX3" fmla="*/ 1136876 w 1136876"/>
-              <a:gd name="connsiteY3" fmla="*/ 337536 h 686935"/>
-              <a:gd name="connsiteX4" fmla="*/ 1132114 w 1136876"/>
-              <a:gd name="connsiteY4" fmla="*/ 573238 h 686935"/>
-              <a:gd name="connsiteX5" fmla="*/ 1018417 w 1136876"/>
-              <a:gd name="connsiteY5" fmla="*/ 686935 h 686935"/>
-              <a:gd name="connsiteX6" fmla="*/ 113697 w 1136876"/>
-              <a:gd name="connsiteY6" fmla="*/ 686935 h 686935"/>
-              <a:gd name="connsiteX7" fmla="*/ 0 w 1136876"/>
-              <a:gd name="connsiteY7" fmla="*/ 573238 h 686935"/>
-              <a:gd name="connsiteX8" fmla="*/ 0 w 1136876"/>
-              <a:gd name="connsiteY8" fmla="*/ 118461 h 686935"/>
-              <a:gd name="connsiteX0" fmla="*/ 0 w 1136876"/>
-              <a:gd name="connsiteY0" fmla="*/ 118461 h 686935"/>
-              <a:gd name="connsiteX1" fmla="*/ 113697 w 1136876"/>
-              <a:gd name="connsiteY1" fmla="*/ 4764 h 686935"/>
-              <a:gd name="connsiteX2" fmla="*/ 646941 w 1136876"/>
-              <a:gd name="connsiteY2" fmla="*/ 0 h 686935"/>
-              <a:gd name="connsiteX3" fmla="*/ 1136876 w 1136876"/>
-              <a:gd name="connsiteY3" fmla="*/ 337536 h 686935"/>
-              <a:gd name="connsiteX4" fmla="*/ 1132114 w 1136876"/>
-              <a:gd name="connsiteY4" fmla="*/ 573238 h 686935"/>
-              <a:gd name="connsiteX5" fmla="*/ 1018417 w 1136876"/>
-              <a:gd name="connsiteY5" fmla="*/ 686935 h 686935"/>
-              <a:gd name="connsiteX6" fmla="*/ 113697 w 1136876"/>
-              <a:gd name="connsiteY6" fmla="*/ 686935 h 686935"/>
-              <a:gd name="connsiteX7" fmla="*/ 0 w 1136876"/>
-              <a:gd name="connsiteY7" fmla="*/ 573238 h 686935"/>
-              <a:gd name="connsiteX8" fmla="*/ 0 w 1136876"/>
-              <a:gd name="connsiteY8" fmla="*/ 118461 h 686935"/>
-              <a:gd name="connsiteX0" fmla="*/ 0 w 1136876"/>
-              <a:gd name="connsiteY0" fmla="*/ 118461 h 686935"/>
-              <a:gd name="connsiteX1" fmla="*/ 113697 w 1136876"/>
-              <a:gd name="connsiteY1" fmla="*/ 4764 h 686935"/>
-              <a:gd name="connsiteX2" fmla="*/ 646941 w 1136876"/>
-              <a:gd name="connsiteY2" fmla="*/ 0 h 686935"/>
-              <a:gd name="connsiteX3" fmla="*/ 1136876 w 1136876"/>
-              <a:gd name="connsiteY3" fmla="*/ 337536 h 686935"/>
-              <a:gd name="connsiteX4" fmla="*/ 1132114 w 1136876"/>
-              <a:gd name="connsiteY4" fmla="*/ 573238 h 686935"/>
-              <a:gd name="connsiteX5" fmla="*/ 1018417 w 1136876"/>
-              <a:gd name="connsiteY5" fmla="*/ 686935 h 686935"/>
-              <a:gd name="connsiteX6" fmla="*/ 113697 w 1136876"/>
-              <a:gd name="connsiteY6" fmla="*/ 686935 h 686935"/>
-              <a:gd name="connsiteX7" fmla="*/ 0 w 1136876"/>
-              <a:gd name="connsiteY7" fmla="*/ 573238 h 686935"/>
-              <a:gd name="connsiteX8" fmla="*/ 0 w 1136876"/>
-              <a:gd name="connsiteY8" fmla="*/ 118461 h 686935"/>
-              <a:gd name="connsiteX0" fmla="*/ 0 w 1136876"/>
-              <a:gd name="connsiteY0" fmla="*/ 118465 h 686939"/>
-              <a:gd name="connsiteX1" fmla="*/ 113697 w 1136876"/>
-              <a:gd name="connsiteY1" fmla="*/ 4768 h 686939"/>
-              <a:gd name="connsiteX2" fmla="*/ 646941 w 1136876"/>
-              <a:gd name="connsiteY2" fmla="*/ 4 h 686939"/>
-              <a:gd name="connsiteX3" fmla="*/ 1136876 w 1136876"/>
-              <a:gd name="connsiteY3" fmla="*/ 337540 h 686939"/>
-              <a:gd name="connsiteX4" fmla="*/ 1132114 w 1136876"/>
-              <a:gd name="connsiteY4" fmla="*/ 573242 h 686939"/>
-              <a:gd name="connsiteX5" fmla="*/ 1018417 w 1136876"/>
-              <a:gd name="connsiteY5" fmla="*/ 686939 h 686939"/>
-              <a:gd name="connsiteX6" fmla="*/ 113697 w 1136876"/>
-              <a:gd name="connsiteY6" fmla="*/ 686939 h 686939"/>
-              <a:gd name="connsiteX7" fmla="*/ 0 w 1136876"/>
-              <a:gd name="connsiteY7" fmla="*/ 573242 h 686939"/>
-              <a:gd name="connsiteX8" fmla="*/ 0 w 1136876"/>
-              <a:gd name="connsiteY8" fmla="*/ 118465 h 686939"/>
-              <a:gd name="connsiteX0" fmla="*/ 0 w 1136876"/>
-              <a:gd name="connsiteY0" fmla="*/ 118466 h 686940"/>
-              <a:gd name="connsiteX1" fmla="*/ 113697 w 1136876"/>
-              <a:gd name="connsiteY1" fmla="*/ 4769 h 686940"/>
-              <a:gd name="connsiteX2" fmla="*/ 646941 w 1136876"/>
-              <a:gd name="connsiteY2" fmla="*/ 5 h 686940"/>
-              <a:gd name="connsiteX3" fmla="*/ 1136876 w 1136876"/>
-              <a:gd name="connsiteY3" fmla="*/ 337541 h 686940"/>
-              <a:gd name="connsiteX4" fmla="*/ 1132114 w 1136876"/>
-              <a:gd name="connsiteY4" fmla="*/ 573243 h 686940"/>
-              <a:gd name="connsiteX5" fmla="*/ 1018417 w 1136876"/>
-              <a:gd name="connsiteY5" fmla="*/ 686940 h 686940"/>
-              <a:gd name="connsiteX6" fmla="*/ 113697 w 1136876"/>
-              <a:gd name="connsiteY6" fmla="*/ 686940 h 686940"/>
-              <a:gd name="connsiteX7" fmla="*/ 0 w 1136876"/>
-              <a:gd name="connsiteY7" fmla="*/ 573243 h 686940"/>
-              <a:gd name="connsiteX8" fmla="*/ 0 w 1136876"/>
-              <a:gd name="connsiteY8" fmla="*/ 118466 h 686940"/>
-              <a:gd name="connsiteX0" fmla="*/ 0 w 1136876"/>
-              <a:gd name="connsiteY0" fmla="*/ 118466 h 686940"/>
-              <a:gd name="connsiteX1" fmla="*/ 113697 w 1136876"/>
-              <a:gd name="connsiteY1" fmla="*/ 4769 h 686940"/>
-              <a:gd name="connsiteX2" fmla="*/ 646941 w 1136876"/>
-              <a:gd name="connsiteY2" fmla="*/ 5 h 686940"/>
-              <a:gd name="connsiteX3" fmla="*/ 1136876 w 1136876"/>
-              <a:gd name="connsiteY3" fmla="*/ 337541 h 686940"/>
-              <a:gd name="connsiteX4" fmla="*/ 1132114 w 1136876"/>
-              <a:gd name="connsiteY4" fmla="*/ 573243 h 686940"/>
-              <a:gd name="connsiteX5" fmla="*/ 1018417 w 1136876"/>
-              <a:gd name="connsiteY5" fmla="*/ 686940 h 686940"/>
-              <a:gd name="connsiteX6" fmla="*/ 113697 w 1136876"/>
-              <a:gd name="connsiteY6" fmla="*/ 686940 h 686940"/>
-              <a:gd name="connsiteX7" fmla="*/ 0 w 1136876"/>
-              <a:gd name="connsiteY7" fmla="*/ 573244 h 686940"/>
-              <a:gd name="connsiteX8" fmla="*/ 0 w 1136876"/>
-              <a:gd name="connsiteY8" fmla="*/ 118466 h 686940"/>
-              <a:gd name="connsiteX0" fmla="*/ 1797 w 1138673"/>
-              <a:gd name="connsiteY0" fmla="*/ 118466 h 691666"/>
-              <a:gd name="connsiteX1" fmla="*/ 115494 w 1138673"/>
-              <a:gd name="connsiteY1" fmla="*/ 4769 h 691666"/>
-              <a:gd name="connsiteX2" fmla="*/ 648738 w 1138673"/>
-              <a:gd name="connsiteY2" fmla="*/ 5 h 691666"/>
-              <a:gd name="connsiteX3" fmla="*/ 1138673 w 1138673"/>
-              <a:gd name="connsiteY3" fmla="*/ 337541 h 691666"/>
-              <a:gd name="connsiteX4" fmla="*/ 1133911 w 1138673"/>
-              <a:gd name="connsiteY4" fmla="*/ 573243 h 691666"/>
-              <a:gd name="connsiteX5" fmla="*/ 1020214 w 1138673"/>
-              <a:gd name="connsiteY5" fmla="*/ 686940 h 691666"/>
-              <a:gd name="connsiteX6" fmla="*/ 115494 w 1138673"/>
-              <a:gd name="connsiteY6" fmla="*/ 686940 h 691666"/>
-              <a:gd name="connsiteX7" fmla="*/ 1797 w 1138673"/>
-              <a:gd name="connsiteY7" fmla="*/ 573244 h 691666"/>
-              <a:gd name="connsiteX8" fmla="*/ 1797 w 1138673"/>
-              <a:gd name="connsiteY8" fmla="*/ 118466 h 691666"/>
-              <a:gd name="connsiteX0" fmla="*/ 1797 w 1138673"/>
-              <a:gd name="connsiteY0" fmla="*/ 118462 h 691662"/>
-              <a:gd name="connsiteX1" fmla="*/ 115494 w 1138673"/>
-              <a:gd name="connsiteY1" fmla="*/ 4765 h 691662"/>
-              <a:gd name="connsiteX2" fmla="*/ 648738 w 1138673"/>
-              <a:gd name="connsiteY2" fmla="*/ 1 h 691662"/>
-              <a:gd name="connsiteX3" fmla="*/ 1138673 w 1138673"/>
-              <a:gd name="connsiteY3" fmla="*/ 337537 h 691662"/>
-              <a:gd name="connsiteX4" fmla="*/ 1133911 w 1138673"/>
-              <a:gd name="connsiteY4" fmla="*/ 573239 h 691662"/>
-              <a:gd name="connsiteX5" fmla="*/ 1020214 w 1138673"/>
-              <a:gd name="connsiteY5" fmla="*/ 686936 h 691662"/>
-              <a:gd name="connsiteX6" fmla="*/ 115494 w 1138673"/>
-              <a:gd name="connsiteY6" fmla="*/ 686936 h 691662"/>
-              <a:gd name="connsiteX7" fmla="*/ 1797 w 1138673"/>
-              <a:gd name="connsiteY7" fmla="*/ 573240 h 691662"/>
-              <a:gd name="connsiteX8" fmla="*/ 1797 w 1138673"/>
-              <a:gd name="connsiteY8" fmla="*/ 118462 h 691662"/>
-              <a:gd name="connsiteX0" fmla="*/ 1797 w 1138673"/>
-              <a:gd name="connsiteY0" fmla="*/ 118461 h 691661"/>
-              <a:gd name="connsiteX1" fmla="*/ 115494 w 1138673"/>
-              <a:gd name="connsiteY1" fmla="*/ 4764 h 691661"/>
-              <a:gd name="connsiteX2" fmla="*/ 648738 w 1138673"/>
-              <a:gd name="connsiteY2" fmla="*/ 0 h 691661"/>
-              <a:gd name="connsiteX3" fmla="*/ 1138673 w 1138673"/>
-              <a:gd name="connsiteY3" fmla="*/ 337536 h 691661"/>
-              <a:gd name="connsiteX4" fmla="*/ 1133911 w 1138673"/>
-              <a:gd name="connsiteY4" fmla="*/ 573238 h 691661"/>
-              <a:gd name="connsiteX5" fmla="*/ 1020214 w 1138673"/>
-              <a:gd name="connsiteY5" fmla="*/ 686935 h 691661"/>
-              <a:gd name="connsiteX6" fmla="*/ 115494 w 1138673"/>
-              <a:gd name="connsiteY6" fmla="*/ 686935 h 691661"/>
-              <a:gd name="connsiteX7" fmla="*/ 1797 w 1138673"/>
-              <a:gd name="connsiteY7" fmla="*/ 573239 h 691661"/>
-              <a:gd name="connsiteX8" fmla="*/ 1797 w 1138673"/>
-              <a:gd name="connsiteY8" fmla="*/ 118461 h 691661"/>
-              <a:gd name="connsiteX0" fmla="*/ 1797 w 1138673"/>
-              <a:gd name="connsiteY0" fmla="*/ 118461 h 691661"/>
-              <a:gd name="connsiteX1" fmla="*/ 115494 w 1138673"/>
-              <a:gd name="connsiteY1" fmla="*/ 4764 h 691661"/>
-              <a:gd name="connsiteX2" fmla="*/ 648738 w 1138673"/>
-              <a:gd name="connsiteY2" fmla="*/ 0 h 691661"/>
-              <a:gd name="connsiteX3" fmla="*/ 1138673 w 1138673"/>
-              <a:gd name="connsiteY3" fmla="*/ 337536 h 691661"/>
-              <a:gd name="connsiteX4" fmla="*/ 1133911 w 1138673"/>
-              <a:gd name="connsiteY4" fmla="*/ 573238 h 691661"/>
-              <a:gd name="connsiteX5" fmla="*/ 1020214 w 1138673"/>
-              <a:gd name="connsiteY5" fmla="*/ 686935 h 691661"/>
-              <a:gd name="connsiteX6" fmla="*/ 115494 w 1138673"/>
-              <a:gd name="connsiteY6" fmla="*/ 686935 h 691661"/>
-              <a:gd name="connsiteX7" fmla="*/ 1797 w 1138673"/>
-              <a:gd name="connsiteY7" fmla="*/ 573239 h 691661"/>
-              <a:gd name="connsiteX8" fmla="*/ 1797 w 1138673"/>
-              <a:gd name="connsiteY8" fmla="*/ 118461 h 691661"/>
-              <a:gd name="connsiteX0" fmla="*/ 1797 w 1138673"/>
-              <a:gd name="connsiteY0" fmla="*/ 118461 h 691661"/>
-              <a:gd name="connsiteX1" fmla="*/ 115494 w 1138673"/>
-              <a:gd name="connsiteY1" fmla="*/ 4764 h 691661"/>
-              <a:gd name="connsiteX2" fmla="*/ 648738 w 1138673"/>
-              <a:gd name="connsiteY2" fmla="*/ 0 h 691661"/>
-              <a:gd name="connsiteX3" fmla="*/ 1138673 w 1138673"/>
-              <a:gd name="connsiteY3" fmla="*/ 337536 h 691661"/>
-              <a:gd name="connsiteX4" fmla="*/ 1133911 w 1138673"/>
-              <a:gd name="connsiteY4" fmla="*/ 573238 h 691661"/>
-              <a:gd name="connsiteX5" fmla="*/ 1020214 w 1138673"/>
-              <a:gd name="connsiteY5" fmla="*/ 686935 h 691661"/>
-              <a:gd name="connsiteX6" fmla="*/ 115494 w 1138673"/>
-              <a:gd name="connsiteY6" fmla="*/ 686935 h 691661"/>
-              <a:gd name="connsiteX7" fmla="*/ 1797 w 1138673"/>
-              <a:gd name="connsiteY7" fmla="*/ 573239 h 691661"/>
-              <a:gd name="connsiteX8" fmla="*/ 1797 w 1138673"/>
-              <a:gd name="connsiteY8" fmla="*/ 118461 h 691661"/>
-              <a:gd name="connsiteX0" fmla="*/ 1797 w 1138673"/>
-              <a:gd name="connsiteY0" fmla="*/ 118461 h 691661"/>
-              <a:gd name="connsiteX1" fmla="*/ 115494 w 1138673"/>
-              <a:gd name="connsiteY1" fmla="*/ 4764 h 691661"/>
-              <a:gd name="connsiteX2" fmla="*/ 648738 w 1138673"/>
-              <a:gd name="connsiteY2" fmla="*/ 0 h 691661"/>
-              <a:gd name="connsiteX3" fmla="*/ 1138673 w 1138673"/>
-              <a:gd name="connsiteY3" fmla="*/ 337536 h 691661"/>
-              <a:gd name="connsiteX4" fmla="*/ 1133911 w 1138673"/>
-              <a:gd name="connsiteY4" fmla="*/ 573238 h 691661"/>
-              <a:gd name="connsiteX5" fmla="*/ 1020214 w 1138673"/>
-              <a:gd name="connsiteY5" fmla="*/ 686935 h 691661"/>
-              <a:gd name="connsiteX6" fmla="*/ 115494 w 1138673"/>
-              <a:gd name="connsiteY6" fmla="*/ 686935 h 691661"/>
-              <a:gd name="connsiteX7" fmla="*/ 1797 w 1138673"/>
-              <a:gd name="connsiteY7" fmla="*/ 573239 h 691661"/>
-              <a:gd name="connsiteX8" fmla="*/ 1797 w 1138673"/>
-              <a:gd name="connsiteY8" fmla="*/ 118461 h 691661"/>
-              <a:gd name="connsiteX0" fmla="*/ 1797 w 1138673"/>
-              <a:gd name="connsiteY0" fmla="*/ 118461 h 691661"/>
-              <a:gd name="connsiteX1" fmla="*/ 115494 w 1138673"/>
-              <a:gd name="connsiteY1" fmla="*/ 4764 h 691661"/>
-              <a:gd name="connsiteX2" fmla="*/ 648738 w 1138673"/>
-              <a:gd name="connsiteY2" fmla="*/ 0 h 691661"/>
-              <a:gd name="connsiteX3" fmla="*/ 1138673 w 1138673"/>
-              <a:gd name="connsiteY3" fmla="*/ 337536 h 691661"/>
-              <a:gd name="connsiteX4" fmla="*/ 1133911 w 1138673"/>
-              <a:gd name="connsiteY4" fmla="*/ 573238 h 691661"/>
-              <a:gd name="connsiteX5" fmla="*/ 1020214 w 1138673"/>
-              <a:gd name="connsiteY5" fmla="*/ 686935 h 691661"/>
-              <a:gd name="connsiteX6" fmla="*/ 115494 w 1138673"/>
-              <a:gd name="connsiteY6" fmla="*/ 686935 h 691661"/>
-              <a:gd name="connsiteX7" fmla="*/ 1797 w 1138673"/>
-              <a:gd name="connsiteY7" fmla="*/ 573239 h 691661"/>
-              <a:gd name="connsiteX8" fmla="*/ 1797 w 1138673"/>
-              <a:gd name="connsiteY8" fmla="*/ 118461 h 691661"/>
-              <a:gd name="connsiteX0" fmla="*/ 1797 w 1138673"/>
-              <a:gd name="connsiteY0" fmla="*/ 118461 h 691661"/>
-              <a:gd name="connsiteX1" fmla="*/ 115494 w 1138673"/>
-              <a:gd name="connsiteY1" fmla="*/ 4764 h 691661"/>
-              <a:gd name="connsiteX2" fmla="*/ 648738 w 1138673"/>
-              <a:gd name="connsiteY2" fmla="*/ 0 h 691661"/>
-              <a:gd name="connsiteX3" fmla="*/ 1138673 w 1138673"/>
-              <a:gd name="connsiteY3" fmla="*/ 337536 h 691661"/>
-              <a:gd name="connsiteX4" fmla="*/ 1133911 w 1138673"/>
-              <a:gd name="connsiteY4" fmla="*/ 573238 h 691661"/>
-              <a:gd name="connsiteX5" fmla="*/ 1020214 w 1138673"/>
-              <a:gd name="connsiteY5" fmla="*/ 686935 h 691661"/>
-              <a:gd name="connsiteX6" fmla="*/ 115494 w 1138673"/>
-              <a:gd name="connsiteY6" fmla="*/ 686935 h 691661"/>
-              <a:gd name="connsiteX7" fmla="*/ 1797 w 1138673"/>
-              <a:gd name="connsiteY7" fmla="*/ 573239 h 691661"/>
-              <a:gd name="connsiteX8" fmla="*/ 1797 w 1138673"/>
-              <a:gd name="connsiteY8" fmla="*/ 118461 h 691661"/>
-              <a:gd name="connsiteX0" fmla="*/ 1797 w 1138673"/>
-              <a:gd name="connsiteY0" fmla="*/ 118461 h 691661"/>
-              <a:gd name="connsiteX1" fmla="*/ 115494 w 1138673"/>
-              <a:gd name="connsiteY1" fmla="*/ 4764 h 691661"/>
-              <a:gd name="connsiteX2" fmla="*/ 826875 w 1138673"/>
-              <a:gd name="connsiteY2" fmla="*/ 0 h 691661"/>
-              <a:gd name="connsiteX3" fmla="*/ 1138673 w 1138673"/>
-              <a:gd name="connsiteY3" fmla="*/ 337536 h 691661"/>
-              <a:gd name="connsiteX4" fmla="*/ 1133911 w 1138673"/>
-              <a:gd name="connsiteY4" fmla="*/ 573238 h 691661"/>
-              <a:gd name="connsiteX5" fmla="*/ 1020214 w 1138673"/>
-              <a:gd name="connsiteY5" fmla="*/ 686935 h 691661"/>
-              <a:gd name="connsiteX6" fmla="*/ 115494 w 1138673"/>
-              <a:gd name="connsiteY6" fmla="*/ 686935 h 691661"/>
-              <a:gd name="connsiteX7" fmla="*/ 1797 w 1138673"/>
-              <a:gd name="connsiteY7" fmla="*/ 573239 h 691661"/>
-              <a:gd name="connsiteX8" fmla="*/ 1797 w 1138673"/>
-              <a:gd name="connsiteY8" fmla="*/ 118461 h 691661"/>
-              <a:gd name="connsiteX0" fmla="*/ 1797 w 1138673"/>
-              <a:gd name="connsiteY0" fmla="*/ 118461 h 691661"/>
-              <a:gd name="connsiteX1" fmla="*/ 115494 w 1138673"/>
-              <a:gd name="connsiteY1" fmla="*/ 4764 h 691661"/>
-              <a:gd name="connsiteX2" fmla="*/ 826875 w 1138673"/>
-              <a:gd name="connsiteY2" fmla="*/ 0 h 691661"/>
-              <a:gd name="connsiteX3" fmla="*/ 1138673 w 1138673"/>
-              <a:gd name="connsiteY3" fmla="*/ 337536 h 691661"/>
-              <a:gd name="connsiteX4" fmla="*/ 1133911 w 1138673"/>
-              <a:gd name="connsiteY4" fmla="*/ 573238 h 691661"/>
-              <a:gd name="connsiteX5" fmla="*/ 1020214 w 1138673"/>
-              <a:gd name="connsiteY5" fmla="*/ 686935 h 691661"/>
-              <a:gd name="connsiteX6" fmla="*/ 115494 w 1138673"/>
-              <a:gd name="connsiteY6" fmla="*/ 686935 h 691661"/>
-              <a:gd name="connsiteX7" fmla="*/ 1797 w 1138673"/>
-              <a:gd name="connsiteY7" fmla="*/ 573239 h 691661"/>
-              <a:gd name="connsiteX8" fmla="*/ 1797 w 1138673"/>
-              <a:gd name="connsiteY8" fmla="*/ 118461 h 691661"/>
-              <a:gd name="connsiteX0" fmla="*/ 1797 w 1138673"/>
-              <a:gd name="connsiteY0" fmla="*/ 118461 h 691661"/>
-              <a:gd name="connsiteX1" fmla="*/ 115494 w 1138673"/>
-              <a:gd name="connsiteY1" fmla="*/ 4764 h 691661"/>
-              <a:gd name="connsiteX2" fmla="*/ 826875 w 1138673"/>
-              <a:gd name="connsiteY2" fmla="*/ 0 h 691661"/>
-              <a:gd name="connsiteX3" fmla="*/ 1138673 w 1138673"/>
-              <a:gd name="connsiteY3" fmla="*/ 337536 h 691661"/>
-              <a:gd name="connsiteX4" fmla="*/ 1133911 w 1138673"/>
-              <a:gd name="connsiteY4" fmla="*/ 573238 h 691661"/>
-              <a:gd name="connsiteX5" fmla="*/ 1020214 w 1138673"/>
-              <a:gd name="connsiteY5" fmla="*/ 686935 h 691661"/>
-              <a:gd name="connsiteX6" fmla="*/ 115494 w 1138673"/>
-              <a:gd name="connsiteY6" fmla="*/ 686935 h 691661"/>
-              <a:gd name="connsiteX7" fmla="*/ 1797 w 1138673"/>
-              <a:gd name="connsiteY7" fmla="*/ 573239 h 691661"/>
-              <a:gd name="connsiteX8" fmla="*/ 1797 w 1138673"/>
-              <a:gd name="connsiteY8" fmla="*/ 118461 h 691661"/>
-              <a:gd name="connsiteX0" fmla="*/ 1797 w 1138673"/>
-              <a:gd name="connsiteY0" fmla="*/ 118461 h 691661"/>
-              <a:gd name="connsiteX1" fmla="*/ 115494 w 1138673"/>
-              <a:gd name="connsiteY1" fmla="*/ 4764 h 691661"/>
-              <a:gd name="connsiteX2" fmla="*/ 826875 w 1138673"/>
-              <a:gd name="connsiteY2" fmla="*/ 0 h 691661"/>
-              <a:gd name="connsiteX3" fmla="*/ 1138673 w 1138673"/>
-              <a:gd name="connsiteY3" fmla="*/ 337536 h 691661"/>
-              <a:gd name="connsiteX4" fmla="*/ 1133911 w 1138673"/>
-              <a:gd name="connsiteY4" fmla="*/ 573238 h 691661"/>
-              <a:gd name="connsiteX5" fmla="*/ 1020214 w 1138673"/>
-              <a:gd name="connsiteY5" fmla="*/ 686935 h 691661"/>
-              <a:gd name="connsiteX6" fmla="*/ 115494 w 1138673"/>
-              <a:gd name="connsiteY6" fmla="*/ 686935 h 691661"/>
-              <a:gd name="connsiteX7" fmla="*/ 1797 w 1138673"/>
-              <a:gd name="connsiteY7" fmla="*/ 573239 h 691661"/>
-              <a:gd name="connsiteX8" fmla="*/ 1797 w 1138673"/>
-              <a:gd name="connsiteY8" fmla="*/ 118461 h 691661"/>
-            </a:gdLst>
-            <a:ahLst/>
-            <a:cxnLst>
-              <a:cxn ang="0">
-                <a:pos x="connsiteX0" y="connsiteY0"/>
-              </a:cxn>
-              <a:cxn ang="0">
-                <a:pos x="connsiteX1" y="connsiteY1"/>
-              </a:cxn>
-              <a:cxn ang="0">
-                <a:pos x="connsiteX2" y="connsiteY2"/>
-              </a:cxn>
-              <a:cxn ang="0">
-                <a:pos x="connsiteX3" y="connsiteY3"/>
-              </a:cxn>
-              <a:cxn ang="0">
-                <a:pos x="connsiteX4" y="connsiteY4"/>
-              </a:cxn>
-              <a:cxn ang="0">
-                <a:pos x="connsiteX5" y="connsiteY5"/>
-              </a:cxn>
-              <a:cxn ang="0">
-                <a:pos x="connsiteX6" y="connsiteY6"/>
-              </a:cxn>
-              <a:cxn ang="0">
-                <a:pos x="connsiteX7" y="connsiteY7"/>
-              </a:cxn>
-              <a:cxn ang="0">
-                <a:pos x="connsiteX8" y="connsiteY8"/>
-              </a:cxn>
-            </a:cxnLst>
-            <a:rect l="l" t="t" r="r" b="b"/>
-            <a:pathLst>
-              <a:path w="1138673" h="691661">
-                <a:moveTo>
-                  <a:pt x="1797" y="118461"/>
-                </a:moveTo>
-                <a:cubicBezTo>
-                  <a:pt x="1797" y="55668"/>
-                  <a:pt x="52701" y="4764"/>
-                  <a:pt x="115494" y="4764"/>
-                </a:cubicBezTo>
-                <a:lnTo>
-                  <a:pt x="826875" y="0"/>
-                </a:lnTo>
-                <a:cubicBezTo>
-                  <a:pt x="1006399" y="10834"/>
-                  <a:pt x="892773" y="279869"/>
-                  <a:pt x="1138673" y="337536"/>
-                </a:cubicBezTo>
-                <a:cubicBezTo>
-                  <a:pt x="1137086" y="416103"/>
-                  <a:pt x="1135498" y="494671"/>
-                  <a:pt x="1133911" y="573238"/>
-                </a:cubicBezTo>
-                <a:cubicBezTo>
-                  <a:pt x="1133911" y="684602"/>
-                  <a:pt x="1123340" y="686935"/>
-                  <a:pt x="1020214" y="686935"/>
-                </a:cubicBezTo>
-                <a:lnTo>
-                  <a:pt x="115494" y="686935"/>
-                </a:lnTo>
-                <a:cubicBezTo>
-                  <a:pt x="52701" y="686935"/>
-                  <a:pt x="-11647" y="727102"/>
-                  <a:pt x="1797" y="573239"/>
-                </a:cubicBezTo>
-                <a:lnTo>
-                  <a:pt x="1797" y="118461"/>
-                </a:lnTo>
-                <a:close/>
-              </a:path>
-            </a:pathLst>
-          </a:custGeom>
-          <a:solidFill>
-            <a:schemeClr val="accent6">
-              <a:lumMod val="75000"/>
-              <a:alpha val="32000"/>
-            </a:schemeClr>
-          </a:solidFill>
-          <a:ln>
-            <a:noFill/>
-          </a:ln>
+          </a:prstGeom>
         </p:spPr>
         <p:style>
           <a:lnRef idx="2">
@@ -20541,28 +19145,40 @@
           <a:bodyPr rtlCol="0" anchor="ctr"/>
           <a:lstStyle/>
           <a:p>
-            <a:pPr algn="ctr"/>
-            <a:endParaRPr lang="en-US"/>
-          </a:p>
-        </p:txBody>
-      </p:sp>
-      <p:sp>
-        <p:nvSpPr>
-          <p:cNvPr id="36" name="Flowchart: Collate 35"/>
+            <a:r>
+              <a:rPr lang="en-US" sz="2400" smtClean="0"/>
+              <a:t>Ngôn ngữ</a:t>
+            </a:r>
+          </a:p>
+          <a:p>
+            <a:r>
+              <a:rPr lang="en-US" sz="2400" smtClean="0"/>
+              <a:t>Nhắc nhở</a:t>
+            </a:r>
+          </a:p>
+          <a:p>
+            <a:r>
+              <a:rPr lang="en-US" sz="2400" smtClean="0"/>
+              <a:t>Giao diện</a:t>
+            </a:r>
+            <a:endParaRPr lang="en-US" sz="2400"/>
+          </a:p>
+        </p:txBody>
+      </p:sp>
+      <p:sp>
+        <p:nvSpPr>
+          <p:cNvPr id="27" name="Rounded Rectangle 26"/>
           <p:cNvSpPr/>
           <p:nvPr/>
         </p:nvSpPr>
         <p:spPr>
           <a:xfrm>
-            <a:off x="6791695" y="5975901"/>
-            <a:ext cx="314317" cy="283741"/>
-          </a:xfrm>
-          <a:prstGeom prst="flowChartCollate">
+            <a:off x="6015788" y="3872806"/>
+            <a:ext cx="3801979" cy="1260668"/>
+          </a:xfrm>
+          <a:prstGeom prst="roundRect">
             <a:avLst/>
           </a:prstGeom>
-          <a:solidFill>
-            <a:schemeClr val="bg1"/>
-          </a:solidFill>
         </p:spPr>
         <p:style>
           <a:lnRef idx="2">
@@ -20584,33 +19200,44 @@
           <a:bodyPr rtlCol="0" anchor="ctr"/>
           <a:lstStyle/>
           <a:p>
-            <a:pPr algn="ctr"/>
-            <a:endParaRPr lang="en-US">
-              <a:solidFill>
-                <a:schemeClr val="tx1"/>
-              </a:solidFill>
-            </a:endParaRPr>
-          </a:p>
-        </p:txBody>
-      </p:sp>
-      <p:sp>
-        <p:nvSpPr>
-          <p:cNvPr id="37" name="Action Button: Information 36">
-            <a:hlinkClick r:id="" action="ppaction://noaction" highlightClick="1"/>
-          </p:cNvPr>
+            <a:r>
+              <a:rPr lang="en-US" sz="2400" smtClean="0"/>
+              <a:t>Phiên bản</a:t>
+            </a:r>
+          </a:p>
+          <a:p>
+            <a:r>
+              <a:rPr lang="en-US" sz="2400" smtClean="0"/>
+              <a:t>Chính sách</a:t>
+            </a:r>
+          </a:p>
+          <a:p>
+            <a:r>
+              <a:rPr lang="en-US" sz="2400" smtClean="0"/>
+              <a:t>Đánh giá của bạn</a:t>
+            </a:r>
+            <a:endParaRPr lang="en-US" sz="2400"/>
+          </a:p>
+        </p:txBody>
+      </p:sp>
+      <p:sp>
+        <p:nvSpPr>
+          <p:cNvPr id="29" name="Rounded Rectangle 28"/>
           <p:cNvSpPr/>
           <p:nvPr/>
         </p:nvSpPr>
         <p:spPr>
           <a:xfrm>
-            <a:off x="7323915" y="5975900"/>
-            <a:ext cx="329609" cy="283741"/>
-          </a:xfrm>
-          <a:prstGeom prst="actionButtonInformation">
+            <a:off x="640964" y="2831098"/>
+            <a:ext cx="2709185" cy="403854"/>
+          </a:xfrm>
+          <a:prstGeom prst="roundRect">
             <a:avLst/>
           </a:prstGeom>
           <a:solidFill>
-            <a:schemeClr val="bg1"/>
+            <a:schemeClr val="accent1">
+              <a:alpha val="38000"/>
+            </a:schemeClr>
           </a:solidFill>
         </p:spPr>
         <p:style>
@@ -20633,33 +19260,28 @@
           <a:bodyPr rtlCol="0" anchor="ctr"/>
           <a:lstStyle/>
           <a:p>
-            <a:pPr algn="ctr"/>
+            <a:r>
+              <a:rPr lang="en-US" smtClean="0"/>
+              <a:t>Contact us</a:t>
+            </a:r>
             <a:endParaRPr lang="en-US"/>
           </a:p>
         </p:txBody>
       </p:sp>
       <p:sp>
         <p:nvSpPr>
-          <p:cNvPr id="38" name="Chevron 37"/>
+          <p:cNvPr id="32" name="Rounded Rectangle 31"/>
           <p:cNvSpPr/>
           <p:nvPr/>
         </p:nvSpPr>
         <p:spPr>
-          <a:xfrm rot="5400000">
-            <a:off x="5241544" y="576027"/>
-            <a:ext cx="147739" cy="295094"/>
-          </a:xfrm>
-          <a:prstGeom prst="chevron">
-            <a:avLst>
-              <a:gd name="adj" fmla="val 72295"/>
-            </a:avLst>
+          <a:xfrm>
+            <a:off x="6015788" y="5327946"/>
+            <a:ext cx="3801979" cy="1260668"/>
+          </a:xfrm>
+          <a:prstGeom prst="roundRect">
+            <a:avLst/>
           </a:prstGeom>
-          <a:solidFill>
-            <a:schemeClr val="accent4"/>
-          </a:solidFill>
-          <a:ln>
-            <a:noFill/>
-          </a:ln>
         </p:spPr>
         <p:style>
           <a:lnRef idx="2">
@@ -20681,36 +19303,48 @@
           <a:bodyPr rtlCol="0" anchor="ctr"/>
           <a:lstStyle/>
           <a:p>
-            <a:pPr algn="ctr"/>
-            <a:endParaRPr lang="en-US">
-              <a:solidFill>
-                <a:schemeClr val="tx1"/>
-              </a:solidFill>
-            </a:endParaRPr>
-          </a:p>
-        </p:txBody>
-      </p:sp>
-      <p:sp>
-        <p:nvSpPr>
-          <p:cNvPr id="39" name="Rectangle 38"/>
+            <a:r>
+              <a:rPr lang="en-US" sz="2000" smtClean="0"/>
+              <a:t>Nếu bạn có bất kỳ câu hỏi nào, vui lòng liên hệ đội ngũ phát triển</a:t>
+            </a:r>
+          </a:p>
+          <a:p>
+            <a:r>
+              <a:rPr lang="en-US" sz="2000" smtClean="0"/>
+              <a:t>Tinh.hd</a:t>
+            </a:r>
+          </a:p>
+          <a:p>
+            <a:r>
+              <a:rPr lang="en-US" sz="2000" smtClean="0"/>
+              <a:t>Dat.nv</a:t>
+            </a:r>
+            <a:endParaRPr lang="en-US" sz="2000"/>
+          </a:p>
+        </p:txBody>
+      </p:sp>
+      <p:sp>
+        <p:nvSpPr>
+          <p:cNvPr id="33" name="Chevron 32"/>
           <p:cNvSpPr/>
           <p:nvPr/>
         </p:nvSpPr>
         <p:spPr>
           <a:xfrm>
-            <a:off x="5091715" y="890826"/>
-            <a:ext cx="2711303" cy="4940855"/>
-          </a:xfrm>
-          <a:prstGeom prst="rect">
-            <a:avLst/>
+            <a:off x="3144901" y="1301106"/>
+            <a:ext cx="162004" cy="223752"/>
+          </a:xfrm>
+          <a:prstGeom prst="chevron">
+            <a:avLst>
+              <a:gd name="adj" fmla="val 72295"/>
+            </a:avLst>
           </a:prstGeom>
           <a:solidFill>
-            <a:schemeClr val="accent1">
-              <a:lumMod val="40000"/>
-              <a:lumOff val="60000"/>
-              <a:alpha val="59000"/>
-            </a:schemeClr>
+            <a:schemeClr val="accent3"/>
           </a:solidFill>
+          <a:ln>
+            <a:noFill/>
+          </a:ln>
         </p:spPr>
         <p:style>
           <a:lnRef idx="2">
@@ -20733,43 +19367,9 @@
           <a:lstStyle/>
           <a:p>
             <a:pPr algn="ctr"/>
-            <a:endParaRPr lang="en-US"/>
-          </a:p>
-        </p:txBody>
-      </p:sp>
-      <p:sp>
-        <p:nvSpPr>
-          <p:cNvPr id="42" name="TextBox 41"/>
-          <p:cNvSpPr txBox="1"/>
-          <p:nvPr/>
-        </p:nvSpPr>
-        <p:spPr>
-          <a:xfrm>
-            <a:off x="5546904" y="521494"/>
-            <a:ext cx="1626782" cy="369332"/>
-          </a:xfrm>
-          <a:prstGeom prst="rect">
-            <a:avLst/>
-          </a:prstGeom>
-          <a:noFill/>
-        </p:spPr>
-        <p:txBody>
-          <a:bodyPr wrap="square" rtlCol="0">
-            <a:spAutoFit/>
-          </a:bodyPr>
-          <a:lstStyle/>
-          <a:p>
-            <a:r>
-              <a:rPr lang="en-US" smtClean="0">
-                <a:solidFill>
-                  <a:schemeClr val="accent4"/>
-                </a:solidFill>
-              </a:rPr>
-              <a:t>Information</a:t>
-            </a:r>
             <a:endParaRPr lang="en-US">
               <a:solidFill>
-                <a:schemeClr val="accent4"/>
+                <a:schemeClr val="tx1"/>
               </a:solidFill>
             </a:endParaRPr>
           </a:p>
@@ -20777,20 +19377,22 @@
       </p:sp>
       <p:sp>
         <p:nvSpPr>
-          <p:cNvPr id="17" name="Oval 16"/>
+          <p:cNvPr id="35" name="Chevron 34"/>
           <p:cNvSpPr/>
           <p:nvPr/>
         </p:nvSpPr>
         <p:spPr>
           <a:xfrm>
-            <a:off x="6223007" y="5659293"/>
-            <a:ext cx="462525" cy="441971"/>
-          </a:xfrm>
-          <a:prstGeom prst="ellipse">
-            <a:avLst/>
+            <a:off x="3159247" y="1789191"/>
+            <a:ext cx="162004" cy="223752"/>
+          </a:xfrm>
+          <a:prstGeom prst="chevron">
+            <a:avLst>
+              <a:gd name="adj" fmla="val 72295"/>
+            </a:avLst>
           </a:prstGeom>
           <a:solidFill>
-            <a:schemeClr val="accent1"/>
+            <a:schemeClr val="accent3"/>
           </a:solidFill>
           <a:ln>
             <a:noFill/>
@@ -20817,26 +19419,32 @@
           <a:lstStyle/>
           <a:p>
             <a:pPr algn="ctr"/>
-            <a:endParaRPr lang="en-US"/>
-          </a:p>
-        </p:txBody>
-      </p:sp>
-      <p:sp>
-        <p:nvSpPr>
-          <p:cNvPr id="18" name="Oval 17"/>
+            <a:endParaRPr lang="en-US">
+              <a:solidFill>
+                <a:schemeClr val="tx1"/>
+              </a:solidFill>
+            </a:endParaRPr>
+          </a:p>
+        </p:txBody>
+      </p:sp>
+      <p:sp>
+        <p:nvSpPr>
+          <p:cNvPr id="40" name="Chevron 39"/>
           <p:cNvSpPr/>
           <p:nvPr/>
         </p:nvSpPr>
         <p:spPr>
           <a:xfrm>
-            <a:off x="6252593" y="5683521"/>
-            <a:ext cx="407194" cy="389099"/>
-          </a:xfrm>
-          <a:prstGeom prst="ellipse">
-            <a:avLst/>
+            <a:off x="3127163" y="2403938"/>
+            <a:ext cx="162004" cy="223752"/>
+          </a:xfrm>
+          <a:prstGeom prst="chevron">
+            <a:avLst>
+              <a:gd name="adj" fmla="val 72295"/>
+            </a:avLst>
           </a:prstGeom>
           <a:solidFill>
-            <a:schemeClr val="accent4"/>
+            <a:schemeClr val="accent3"/>
           </a:solidFill>
           <a:ln>
             <a:noFill/>
@@ -20863,84 +19471,70 @@
           <a:lstStyle/>
           <a:p>
             <a:pPr algn="ctr"/>
-            <a:endParaRPr lang="en-US"/>
-          </a:p>
-        </p:txBody>
-      </p:sp>
-      <p:cxnSp>
-        <p:nvCxnSpPr>
-          <p:cNvPr id="26" name="Straight Connector 25"/>
-          <p:cNvCxnSpPr/>
+            <a:endParaRPr lang="en-US">
+              <a:solidFill>
+                <a:schemeClr val="tx1"/>
+              </a:solidFill>
+            </a:endParaRPr>
+          </a:p>
+        </p:txBody>
+      </p:sp>
+      <p:sp>
+        <p:nvSpPr>
+          <p:cNvPr id="41" name="Chevron 40"/>
+          <p:cNvSpPr/>
           <p:nvPr/>
-        </p:nvCxnSpPr>
+        </p:nvSpPr>
         <p:spPr>
           <a:xfrm>
-            <a:off x="6448469" y="5836015"/>
-            <a:ext cx="0" cy="95250"/>
-          </a:xfrm>
-          <a:prstGeom prst="line">
-            <a:avLst/>
+            <a:off x="3127163" y="2929590"/>
+            <a:ext cx="162004" cy="223752"/>
+          </a:xfrm>
+          <a:prstGeom prst="chevron">
+            <a:avLst>
+              <a:gd name="adj" fmla="val 72295"/>
+            </a:avLst>
           </a:prstGeom>
-          <a:ln w="12700">
-            <a:solidFill>
-              <a:schemeClr val="accent1"/>
-            </a:solidFill>
+          <a:solidFill>
+            <a:schemeClr val="accent3"/>
+          </a:solidFill>
+          <a:ln>
+            <a:noFill/>
           </a:ln>
         </p:spPr>
         <p:style>
-          <a:lnRef idx="1">
-            <a:schemeClr val="accent1"/>
+          <a:lnRef idx="2">
+            <a:schemeClr val="accent1">
+              <a:shade val="50000"/>
+            </a:schemeClr>
           </a:lnRef>
-          <a:fillRef idx="0">
+          <a:fillRef idx="1">
             <a:schemeClr val="accent1"/>
           </a:fillRef>
           <a:effectRef idx="0">
             <a:schemeClr val="accent1"/>
           </a:effectRef>
           <a:fontRef idx="minor">
-            <a:schemeClr val="tx1"/>
+            <a:schemeClr val="lt1"/>
           </a:fontRef>
         </p:style>
-      </p:cxnSp>
-      <p:cxnSp>
-        <p:nvCxnSpPr>
-          <p:cNvPr id="28" name="Straight Connector 27"/>
-          <p:cNvCxnSpPr/>
-          <p:nvPr/>
-        </p:nvCxnSpPr>
-        <p:spPr>
-          <a:xfrm>
-            <a:off x="6394593" y="5881505"/>
-            <a:ext cx="107979" cy="0"/>
-          </a:xfrm>
-          <a:prstGeom prst="line">
-            <a:avLst/>
-          </a:prstGeom>
-          <a:ln w="12700">
-            <a:solidFill>
-              <a:schemeClr val="accent1"/>
-            </a:solidFill>
-          </a:ln>
-        </p:spPr>
-        <p:style>
-          <a:lnRef idx="1">
-            <a:schemeClr val="accent1"/>
-          </a:lnRef>
-          <a:fillRef idx="0">
-            <a:schemeClr val="accent1"/>
-          </a:fillRef>
-          <a:effectRef idx="0">
-            <a:schemeClr val="accent1"/>
-          </a:effectRef>
-          <a:fontRef idx="minor">
-            <a:schemeClr val="tx1"/>
-          </a:fontRef>
-        </p:style>
-      </p:cxnSp>
+        <p:txBody>
+          <a:bodyPr rtlCol="0" anchor="ctr"/>
+          <a:lstStyle/>
+          <a:p>
+            <a:pPr algn="ctr"/>
+            <a:endParaRPr lang="en-US">
+              <a:solidFill>
+                <a:schemeClr val="tx1"/>
+              </a:solidFill>
+            </a:endParaRPr>
+          </a:p>
+        </p:txBody>
+      </p:sp>
     </p:spTree>
     <p:extLst>
       <p:ext uri="{BB962C8B-B14F-4D97-AF65-F5344CB8AC3E}">
-        <p14:creationId xmlns:p14="http://schemas.microsoft.com/office/powerpoint/2010/main" val="271566843"/>
+        <p14:creationId xmlns:p14="http://schemas.microsoft.com/office/powerpoint/2010/main" val="3804437772"/>
       </p:ext>
     </p:extLst>
   </p:cSld>

</xml_diff>

<commit_message>
EDIT tone (Slide 7)
</commit_message>
<xml_diff>
--- a/Doccuments/UI/IOCome_UI.pptx
+++ b/Doccuments/UI/IOCome_UI.pptx
@@ -11,6 +11,7 @@
     <p:sldId id="262" r:id="rId5"/>
     <p:sldId id="258" r:id="rId6"/>
     <p:sldId id="259" r:id="rId7"/>
+    <p:sldId id="264" r:id="rId8"/>
   </p:sldIdLst>
   <p:sldSz cx="12192000" cy="6858000"/>
   <p:notesSz cx="6858000" cy="9144000"/>
@@ -259,7 +260,7 @@
           <a:p>
             <a:fld id="{C825973C-53B5-47E1-A734-4594CD7192E7}" type="datetimeFigureOut">
               <a:rPr lang="en-US" smtClean="0"/>
-              <a:t>11/1/2021</a:t>
+              <a:t>11/4/2021</a:t>
             </a:fld>
             <a:endParaRPr lang="en-US"/>
           </a:p>
@@ -429,7 +430,7 @@
           <a:p>
             <a:fld id="{C825973C-53B5-47E1-A734-4594CD7192E7}" type="datetimeFigureOut">
               <a:rPr lang="en-US" smtClean="0"/>
-              <a:t>11/1/2021</a:t>
+              <a:t>11/4/2021</a:t>
             </a:fld>
             <a:endParaRPr lang="en-US"/>
           </a:p>
@@ -609,7 +610,7 @@
           <a:p>
             <a:fld id="{C825973C-53B5-47E1-A734-4594CD7192E7}" type="datetimeFigureOut">
               <a:rPr lang="en-US" smtClean="0"/>
-              <a:t>11/1/2021</a:t>
+              <a:t>11/4/2021</a:t>
             </a:fld>
             <a:endParaRPr lang="en-US"/>
           </a:p>
@@ -779,7 +780,7 @@
           <a:p>
             <a:fld id="{C825973C-53B5-47E1-A734-4594CD7192E7}" type="datetimeFigureOut">
               <a:rPr lang="en-US" smtClean="0"/>
-              <a:t>11/1/2021</a:t>
+              <a:t>11/4/2021</a:t>
             </a:fld>
             <a:endParaRPr lang="en-US"/>
           </a:p>
@@ -1025,7 +1026,7 @@
           <a:p>
             <a:fld id="{C825973C-53B5-47E1-A734-4594CD7192E7}" type="datetimeFigureOut">
               <a:rPr lang="en-US" smtClean="0"/>
-              <a:t>11/1/2021</a:t>
+              <a:t>11/4/2021</a:t>
             </a:fld>
             <a:endParaRPr lang="en-US"/>
           </a:p>
@@ -1257,7 +1258,7 @@
           <a:p>
             <a:fld id="{C825973C-53B5-47E1-A734-4594CD7192E7}" type="datetimeFigureOut">
               <a:rPr lang="en-US" smtClean="0"/>
-              <a:t>11/1/2021</a:t>
+              <a:t>11/4/2021</a:t>
             </a:fld>
             <a:endParaRPr lang="en-US"/>
           </a:p>
@@ -1624,7 +1625,7 @@
           <a:p>
             <a:fld id="{C825973C-53B5-47E1-A734-4594CD7192E7}" type="datetimeFigureOut">
               <a:rPr lang="en-US" smtClean="0"/>
-              <a:t>11/1/2021</a:t>
+              <a:t>11/4/2021</a:t>
             </a:fld>
             <a:endParaRPr lang="en-US"/>
           </a:p>
@@ -1742,7 +1743,7 @@
           <a:p>
             <a:fld id="{C825973C-53B5-47E1-A734-4594CD7192E7}" type="datetimeFigureOut">
               <a:rPr lang="en-US" smtClean="0"/>
-              <a:t>11/1/2021</a:t>
+              <a:t>11/4/2021</a:t>
             </a:fld>
             <a:endParaRPr lang="en-US"/>
           </a:p>
@@ -1837,7 +1838,7 @@
           <a:p>
             <a:fld id="{C825973C-53B5-47E1-A734-4594CD7192E7}" type="datetimeFigureOut">
               <a:rPr lang="en-US" smtClean="0"/>
-              <a:t>11/1/2021</a:t>
+              <a:t>11/4/2021</a:t>
             </a:fld>
             <a:endParaRPr lang="en-US"/>
           </a:p>
@@ -2114,7 +2115,7 @@
           <a:p>
             <a:fld id="{C825973C-53B5-47E1-A734-4594CD7192E7}" type="datetimeFigureOut">
               <a:rPr lang="en-US" smtClean="0"/>
-              <a:t>11/1/2021</a:t>
+              <a:t>11/4/2021</a:t>
             </a:fld>
             <a:endParaRPr lang="en-US"/>
           </a:p>
@@ -2367,7 +2368,7 @@
           <a:p>
             <a:fld id="{C825973C-53B5-47E1-A734-4594CD7192E7}" type="datetimeFigureOut">
               <a:rPr lang="en-US" smtClean="0"/>
-              <a:t>11/1/2021</a:t>
+              <a:t>11/4/2021</a:t>
             </a:fld>
             <a:endParaRPr lang="en-US"/>
           </a:p>
@@ -2580,7 +2581,7 @@
           <a:p>
             <a:fld id="{C825973C-53B5-47E1-A734-4594CD7192E7}" type="datetimeFigureOut">
               <a:rPr lang="en-US" smtClean="0"/>
-              <a:t>11/1/2021</a:t>
+              <a:t>11/4/2021</a:t>
             </a:fld>
             <a:endParaRPr lang="en-US"/>
           </a:p>
@@ -18945,7 +18946,6 @@
               <a:rPr lang="en-US"/>
               <a:t>Thông tin cá nhân</a:t>
             </a:r>
-            <a:endParaRPr lang="en-US"/>
           </a:p>
         </p:txBody>
       </p:sp>
@@ -18993,7 +18993,6 @@
               <a:rPr lang="en-US"/>
               <a:t>Cài đặt chung</a:t>
             </a:r>
-            <a:endParaRPr lang="en-US"/>
           </a:p>
         </p:txBody>
       </p:sp>
@@ -19535,6 +19534,2245 @@
     <p:extLst>
       <p:ext uri="{BB962C8B-B14F-4D97-AF65-F5344CB8AC3E}">
         <p14:creationId xmlns:p14="http://schemas.microsoft.com/office/powerpoint/2010/main" val="3804437772"/>
+      </p:ext>
+    </p:extLst>
+  </p:cSld>
+  <p:clrMapOvr>
+    <a:masterClrMapping/>
+  </p:clrMapOvr>
+</p:sld>
+</file>
+
+<file path=ppt/slides/slide7.xml><?xml version="1.0" encoding="utf-8"?>
+<p:sld xmlns:a="http://schemas.openxmlformats.org/drawingml/2006/main" xmlns:r="http://schemas.openxmlformats.org/officeDocument/2006/relationships" xmlns:p="http://schemas.openxmlformats.org/presentationml/2006/main">
+  <p:cSld>
+    <p:spTree>
+      <p:nvGrpSpPr>
+        <p:cNvPr id="1" name=""/>
+        <p:cNvGrpSpPr/>
+        <p:nvPr/>
+      </p:nvGrpSpPr>
+      <p:grpSpPr>
+        <a:xfrm>
+          <a:off x="0" y="0"/>
+          <a:ext cx="0" cy="0"/>
+          <a:chOff x="0" y="0"/>
+          <a:chExt cx="0" cy="0"/>
+        </a:xfrm>
+      </p:grpSpPr>
+      <p:sp>
+        <p:nvSpPr>
+          <p:cNvPr id="4" name="Rectangle 3"/>
+          <p:cNvSpPr/>
+          <p:nvPr/>
+        </p:nvSpPr>
+        <p:spPr>
+          <a:xfrm>
+            <a:off x="5007430" y="435430"/>
+            <a:ext cx="2888342" cy="5921828"/>
+          </a:xfrm>
+          <a:prstGeom prst="rect">
+            <a:avLst/>
+          </a:prstGeom>
+          <a:solidFill>
+            <a:schemeClr val="bg1"/>
+          </a:solidFill>
+          <a:ln>
+            <a:solidFill>
+              <a:schemeClr val="accent1"/>
+            </a:solidFill>
+          </a:ln>
+        </p:spPr>
+        <p:style>
+          <a:lnRef idx="1">
+            <a:schemeClr val="accent6"/>
+          </a:lnRef>
+          <a:fillRef idx="2">
+            <a:schemeClr val="accent6"/>
+          </a:fillRef>
+          <a:effectRef idx="1">
+            <a:schemeClr val="accent6"/>
+          </a:effectRef>
+          <a:fontRef idx="minor">
+            <a:schemeClr val="dk1"/>
+          </a:fontRef>
+        </p:style>
+        <p:txBody>
+          <a:bodyPr rtlCol="0" anchor="ctr"/>
+          <a:lstStyle/>
+          <a:p>
+            <a:pPr algn="ctr"/>
+            <a:endParaRPr lang="en-US"/>
+          </a:p>
+        </p:txBody>
+      </p:sp>
+      <p:cxnSp>
+        <p:nvCxnSpPr>
+          <p:cNvPr id="7" name="Straight Arrow Connector 6"/>
+          <p:cNvCxnSpPr/>
+          <p:nvPr/>
+        </p:nvCxnSpPr>
+        <p:spPr>
+          <a:xfrm>
+            <a:off x="8621486" y="435430"/>
+            <a:ext cx="29029" cy="5921828"/>
+          </a:xfrm>
+          <a:prstGeom prst="straightConnector1">
+            <a:avLst/>
+          </a:prstGeom>
+          <a:ln>
+            <a:headEnd type="triangle"/>
+            <a:tailEnd type="triangle"/>
+          </a:ln>
+        </p:spPr>
+        <p:style>
+          <a:lnRef idx="1">
+            <a:schemeClr val="accent1"/>
+          </a:lnRef>
+          <a:fillRef idx="0">
+            <a:schemeClr val="accent1"/>
+          </a:fillRef>
+          <a:effectRef idx="0">
+            <a:schemeClr val="accent1"/>
+          </a:effectRef>
+          <a:fontRef idx="minor">
+            <a:schemeClr val="tx1"/>
+          </a:fontRef>
+        </p:style>
+      </p:cxnSp>
+      <p:sp>
+        <p:nvSpPr>
+          <p:cNvPr id="10" name="Rectangle 9"/>
+          <p:cNvSpPr/>
+          <p:nvPr/>
+        </p:nvSpPr>
+        <p:spPr>
+          <a:xfrm>
+            <a:off x="5007430" y="5878286"/>
+            <a:ext cx="2888342" cy="478972"/>
+          </a:xfrm>
+          <a:prstGeom prst="rect">
+            <a:avLst/>
+          </a:prstGeom>
+          <a:solidFill>
+            <a:schemeClr val="accent1">
+              <a:lumMod val="20000"/>
+              <a:lumOff val="80000"/>
+            </a:schemeClr>
+          </a:solidFill>
+          <a:ln>
+            <a:solidFill>
+              <a:schemeClr val="accent1"/>
+            </a:solidFill>
+          </a:ln>
+        </p:spPr>
+        <p:style>
+          <a:lnRef idx="2">
+            <a:schemeClr val="accent1">
+              <a:shade val="50000"/>
+            </a:schemeClr>
+          </a:lnRef>
+          <a:fillRef idx="1">
+            <a:schemeClr val="accent1"/>
+          </a:fillRef>
+          <a:effectRef idx="0">
+            <a:schemeClr val="accent1"/>
+          </a:effectRef>
+          <a:fontRef idx="minor">
+            <a:schemeClr val="lt1"/>
+          </a:fontRef>
+        </p:style>
+        <p:txBody>
+          <a:bodyPr rtlCol="0" anchor="ctr"/>
+          <a:lstStyle/>
+          <a:p>
+            <a:pPr algn="ctr"/>
+            <a:endParaRPr lang="en-US"/>
+          </a:p>
+        </p:txBody>
+      </p:sp>
+      <p:sp>
+        <p:nvSpPr>
+          <p:cNvPr id="13" name="Rounded Rectangle 12"/>
+          <p:cNvSpPr/>
+          <p:nvPr/>
+        </p:nvSpPr>
+        <p:spPr>
+          <a:xfrm>
+            <a:off x="5009818" y="5882518"/>
+            <a:ext cx="1442201" cy="482267"/>
+          </a:xfrm>
+          <a:custGeom>
+            <a:avLst/>
+            <a:gdLst>
+              <a:gd name="connsiteX0" fmla="*/ 0 w 1132114"/>
+              <a:gd name="connsiteY0" fmla="*/ 113697 h 682171"/>
+              <a:gd name="connsiteX1" fmla="*/ 113697 w 1132114"/>
+              <a:gd name="connsiteY1" fmla="*/ 0 h 682171"/>
+              <a:gd name="connsiteX2" fmla="*/ 1018417 w 1132114"/>
+              <a:gd name="connsiteY2" fmla="*/ 0 h 682171"/>
+              <a:gd name="connsiteX3" fmla="*/ 1132114 w 1132114"/>
+              <a:gd name="connsiteY3" fmla="*/ 113697 h 682171"/>
+              <a:gd name="connsiteX4" fmla="*/ 1132114 w 1132114"/>
+              <a:gd name="connsiteY4" fmla="*/ 568474 h 682171"/>
+              <a:gd name="connsiteX5" fmla="*/ 1018417 w 1132114"/>
+              <a:gd name="connsiteY5" fmla="*/ 682171 h 682171"/>
+              <a:gd name="connsiteX6" fmla="*/ 113697 w 1132114"/>
+              <a:gd name="connsiteY6" fmla="*/ 682171 h 682171"/>
+              <a:gd name="connsiteX7" fmla="*/ 0 w 1132114"/>
+              <a:gd name="connsiteY7" fmla="*/ 568474 h 682171"/>
+              <a:gd name="connsiteX8" fmla="*/ 0 w 1132114"/>
+              <a:gd name="connsiteY8" fmla="*/ 113697 h 682171"/>
+              <a:gd name="connsiteX0" fmla="*/ 0 w 1132114"/>
+              <a:gd name="connsiteY0" fmla="*/ 113697 h 682171"/>
+              <a:gd name="connsiteX1" fmla="*/ 113697 w 1132114"/>
+              <a:gd name="connsiteY1" fmla="*/ 0 h 682171"/>
+              <a:gd name="connsiteX2" fmla="*/ 923167 w 1132114"/>
+              <a:gd name="connsiteY2" fmla="*/ 4762 h 682171"/>
+              <a:gd name="connsiteX3" fmla="*/ 1132114 w 1132114"/>
+              <a:gd name="connsiteY3" fmla="*/ 113697 h 682171"/>
+              <a:gd name="connsiteX4" fmla="*/ 1132114 w 1132114"/>
+              <a:gd name="connsiteY4" fmla="*/ 568474 h 682171"/>
+              <a:gd name="connsiteX5" fmla="*/ 1018417 w 1132114"/>
+              <a:gd name="connsiteY5" fmla="*/ 682171 h 682171"/>
+              <a:gd name="connsiteX6" fmla="*/ 113697 w 1132114"/>
+              <a:gd name="connsiteY6" fmla="*/ 682171 h 682171"/>
+              <a:gd name="connsiteX7" fmla="*/ 0 w 1132114"/>
+              <a:gd name="connsiteY7" fmla="*/ 568474 h 682171"/>
+              <a:gd name="connsiteX8" fmla="*/ 0 w 1132114"/>
+              <a:gd name="connsiteY8" fmla="*/ 113697 h 682171"/>
+              <a:gd name="connsiteX0" fmla="*/ 0 w 1132114"/>
+              <a:gd name="connsiteY0" fmla="*/ 113697 h 682171"/>
+              <a:gd name="connsiteX1" fmla="*/ 113697 w 1132114"/>
+              <a:gd name="connsiteY1" fmla="*/ 0 h 682171"/>
+              <a:gd name="connsiteX2" fmla="*/ 923167 w 1132114"/>
+              <a:gd name="connsiteY2" fmla="*/ 4762 h 682171"/>
+              <a:gd name="connsiteX3" fmla="*/ 1132114 w 1132114"/>
+              <a:gd name="connsiteY3" fmla="*/ 227997 h 682171"/>
+              <a:gd name="connsiteX4" fmla="*/ 1132114 w 1132114"/>
+              <a:gd name="connsiteY4" fmla="*/ 568474 h 682171"/>
+              <a:gd name="connsiteX5" fmla="*/ 1018417 w 1132114"/>
+              <a:gd name="connsiteY5" fmla="*/ 682171 h 682171"/>
+              <a:gd name="connsiteX6" fmla="*/ 113697 w 1132114"/>
+              <a:gd name="connsiteY6" fmla="*/ 682171 h 682171"/>
+              <a:gd name="connsiteX7" fmla="*/ 0 w 1132114"/>
+              <a:gd name="connsiteY7" fmla="*/ 568474 h 682171"/>
+              <a:gd name="connsiteX8" fmla="*/ 0 w 1132114"/>
+              <a:gd name="connsiteY8" fmla="*/ 113697 h 682171"/>
+              <a:gd name="connsiteX0" fmla="*/ 0 w 1132114"/>
+              <a:gd name="connsiteY0" fmla="*/ 113697 h 682171"/>
+              <a:gd name="connsiteX1" fmla="*/ 113697 w 1132114"/>
+              <a:gd name="connsiteY1" fmla="*/ 0 h 682171"/>
+              <a:gd name="connsiteX2" fmla="*/ 923167 w 1132114"/>
+              <a:gd name="connsiteY2" fmla="*/ 4762 h 682171"/>
+              <a:gd name="connsiteX3" fmla="*/ 1132114 w 1132114"/>
+              <a:gd name="connsiteY3" fmla="*/ 227997 h 682171"/>
+              <a:gd name="connsiteX4" fmla="*/ 1132114 w 1132114"/>
+              <a:gd name="connsiteY4" fmla="*/ 568474 h 682171"/>
+              <a:gd name="connsiteX5" fmla="*/ 1018417 w 1132114"/>
+              <a:gd name="connsiteY5" fmla="*/ 682171 h 682171"/>
+              <a:gd name="connsiteX6" fmla="*/ 113697 w 1132114"/>
+              <a:gd name="connsiteY6" fmla="*/ 682171 h 682171"/>
+              <a:gd name="connsiteX7" fmla="*/ 0 w 1132114"/>
+              <a:gd name="connsiteY7" fmla="*/ 568474 h 682171"/>
+              <a:gd name="connsiteX8" fmla="*/ 0 w 1132114"/>
+              <a:gd name="connsiteY8" fmla="*/ 113697 h 682171"/>
+              <a:gd name="connsiteX0" fmla="*/ 0 w 1132114"/>
+              <a:gd name="connsiteY0" fmla="*/ 113697 h 682171"/>
+              <a:gd name="connsiteX1" fmla="*/ 113697 w 1132114"/>
+              <a:gd name="connsiteY1" fmla="*/ 0 h 682171"/>
+              <a:gd name="connsiteX2" fmla="*/ 923167 w 1132114"/>
+              <a:gd name="connsiteY2" fmla="*/ 4762 h 682171"/>
+              <a:gd name="connsiteX3" fmla="*/ 1132114 w 1132114"/>
+              <a:gd name="connsiteY3" fmla="*/ 227997 h 682171"/>
+              <a:gd name="connsiteX4" fmla="*/ 1132114 w 1132114"/>
+              <a:gd name="connsiteY4" fmla="*/ 568474 h 682171"/>
+              <a:gd name="connsiteX5" fmla="*/ 1018417 w 1132114"/>
+              <a:gd name="connsiteY5" fmla="*/ 682171 h 682171"/>
+              <a:gd name="connsiteX6" fmla="*/ 113697 w 1132114"/>
+              <a:gd name="connsiteY6" fmla="*/ 682171 h 682171"/>
+              <a:gd name="connsiteX7" fmla="*/ 0 w 1132114"/>
+              <a:gd name="connsiteY7" fmla="*/ 568474 h 682171"/>
+              <a:gd name="connsiteX8" fmla="*/ 0 w 1132114"/>
+              <a:gd name="connsiteY8" fmla="*/ 113697 h 682171"/>
+              <a:gd name="connsiteX0" fmla="*/ 0 w 1132114"/>
+              <a:gd name="connsiteY0" fmla="*/ 113697 h 682171"/>
+              <a:gd name="connsiteX1" fmla="*/ 113697 w 1132114"/>
+              <a:gd name="connsiteY1" fmla="*/ 0 h 682171"/>
+              <a:gd name="connsiteX2" fmla="*/ 923167 w 1132114"/>
+              <a:gd name="connsiteY2" fmla="*/ 4762 h 682171"/>
+              <a:gd name="connsiteX3" fmla="*/ 1132114 w 1132114"/>
+              <a:gd name="connsiteY3" fmla="*/ 227997 h 682171"/>
+              <a:gd name="connsiteX4" fmla="*/ 1132114 w 1132114"/>
+              <a:gd name="connsiteY4" fmla="*/ 568474 h 682171"/>
+              <a:gd name="connsiteX5" fmla="*/ 1018417 w 1132114"/>
+              <a:gd name="connsiteY5" fmla="*/ 682171 h 682171"/>
+              <a:gd name="connsiteX6" fmla="*/ 113697 w 1132114"/>
+              <a:gd name="connsiteY6" fmla="*/ 682171 h 682171"/>
+              <a:gd name="connsiteX7" fmla="*/ 0 w 1132114"/>
+              <a:gd name="connsiteY7" fmla="*/ 568474 h 682171"/>
+              <a:gd name="connsiteX8" fmla="*/ 0 w 1132114"/>
+              <a:gd name="connsiteY8" fmla="*/ 113697 h 682171"/>
+              <a:gd name="connsiteX0" fmla="*/ 0 w 1132114"/>
+              <a:gd name="connsiteY0" fmla="*/ 113697 h 682171"/>
+              <a:gd name="connsiteX1" fmla="*/ 113697 w 1132114"/>
+              <a:gd name="connsiteY1" fmla="*/ 0 h 682171"/>
+              <a:gd name="connsiteX2" fmla="*/ 923167 w 1132114"/>
+              <a:gd name="connsiteY2" fmla="*/ 4762 h 682171"/>
+              <a:gd name="connsiteX3" fmla="*/ 1132114 w 1132114"/>
+              <a:gd name="connsiteY3" fmla="*/ 227997 h 682171"/>
+              <a:gd name="connsiteX4" fmla="*/ 1132114 w 1132114"/>
+              <a:gd name="connsiteY4" fmla="*/ 568474 h 682171"/>
+              <a:gd name="connsiteX5" fmla="*/ 1018417 w 1132114"/>
+              <a:gd name="connsiteY5" fmla="*/ 682171 h 682171"/>
+              <a:gd name="connsiteX6" fmla="*/ 113697 w 1132114"/>
+              <a:gd name="connsiteY6" fmla="*/ 682171 h 682171"/>
+              <a:gd name="connsiteX7" fmla="*/ 0 w 1132114"/>
+              <a:gd name="connsiteY7" fmla="*/ 568474 h 682171"/>
+              <a:gd name="connsiteX8" fmla="*/ 0 w 1132114"/>
+              <a:gd name="connsiteY8" fmla="*/ 113697 h 682171"/>
+              <a:gd name="connsiteX0" fmla="*/ 0 w 1132114"/>
+              <a:gd name="connsiteY0" fmla="*/ 113697 h 682171"/>
+              <a:gd name="connsiteX1" fmla="*/ 113697 w 1132114"/>
+              <a:gd name="connsiteY1" fmla="*/ 0 h 682171"/>
+              <a:gd name="connsiteX2" fmla="*/ 923167 w 1132114"/>
+              <a:gd name="connsiteY2" fmla="*/ 4762 h 682171"/>
+              <a:gd name="connsiteX3" fmla="*/ 1132114 w 1132114"/>
+              <a:gd name="connsiteY3" fmla="*/ 227997 h 682171"/>
+              <a:gd name="connsiteX4" fmla="*/ 1132114 w 1132114"/>
+              <a:gd name="connsiteY4" fmla="*/ 568474 h 682171"/>
+              <a:gd name="connsiteX5" fmla="*/ 1018417 w 1132114"/>
+              <a:gd name="connsiteY5" fmla="*/ 682171 h 682171"/>
+              <a:gd name="connsiteX6" fmla="*/ 113697 w 1132114"/>
+              <a:gd name="connsiteY6" fmla="*/ 682171 h 682171"/>
+              <a:gd name="connsiteX7" fmla="*/ 0 w 1132114"/>
+              <a:gd name="connsiteY7" fmla="*/ 568474 h 682171"/>
+              <a:gd name="connsiteX8" fmla="*/ 0 w 1132114"/>
+              <a:gd name="connsiteY8" fmla="*/ 113697 h 682171"/>
+              <a:gd name="connsiteX0" fmla="*/ 0 w 1132114"/>
+              <a:gd name="connsiteY0" fmla="*/ 113697 h 682171"/>
+              <a:gd name="connsiteX1" fmla="*/ 113697 w 1132114"/>
+              <a:gd name="connsiteY1" fmla="*/ 0 h 682171"/>
+              <a:gd name="connsiteX2" fmla="*/ 923167 w 1132114"/>
+              <a:gd name="connsiteY2" fmla="*/ 4762 h 682171"/>
+              <a:gd name="connsiteX3" fmla="*/ 1132114 w 1132114"/>
+              <a:gd name="connsiteY3" fmla="*/ 227997 h 682171"/>
+              <a:gd name="connsiteX4" fmla="*/ 1132114 w 1132114"/>
+              <a:gd name="connsiteY4" fmla="*/ 568474 h 682171"/>
+              <a:gd name="connsiteX5" fmla="*/ 1018417 w 1132114"/>
+              <a:gd name="connsiteY5" fmla="*/ 682171 h 682171"/>
+              <a:gd name="connsiteX6" fmla="*/ 113697 w 1132114"/>
+              <a:gd name="connsiteY6" fmla="*/ 682171 h 682171"/>
+              <a:gd name="connsiteX7" fmla="*/ 0 w 1132114"/>
+              <a:gd name="connsiteY7" fmla="*/ 568474 h 682171"/>
+              <a:gd name="connsiteX8" fmla="*/ 0 w 1132114"/>
+              <a:gd name="connsiteY8" fmla="*/ 113697 h 682171"/>
+              <a:gd name="connsiteX0" fmla="*/ 0 w 1132114"/>
+              <a:gd name="connsiteY0" fmla="*/ 113697 h 682171"/>
+              <a:gd name="connsiteX1" fmla="*/ 113697 w 1132114"/>
+              <a:gd name="connsiteY1" fmla="*/ 0 h 682171"/>
+              <a:gd name="connsiteX2" fmla="*/ 923167 w 1132114"/>
+              <a:gd name="connsiteY2" fmla="*/ 4762 h 682171"/>
+              <a:gd name="connsiteX3" fmla="*/ 1132114 w 1132114"/>
+              <a:gd name="connsiteY3" fmla="*/ 227997 h 682171"/>
+              <a:gd name="connsiteX4" fmla="*/ 1132114 w 1132114"/>
+              <a:gd name="connsiteY4" fmla="*/ 568474 h 682171"/>
+              <a:gd name="connsiteX5" fmla="*/ 1018417 w 1132114"/>
+              <a:gd name="connsiteY5" fmla="*/ 682171 h 682171"/>
+              <a:gd name="connsiteX6" fmla="*/ 113697 w 1132114"/>
+              <a:gd name="connsiteY6" fmla="*/ 682171 h 682171"/>
+              <a:gd name="connsiteX7" fmla="*/ 0 w 1132114"/>
+              <a:gd name="connsiteY7" fmla="*/ 568474 h 682171"/>
+              <a:gd name="connsiteX8" fmla="*/ 0 w 1132114"/>
+              <a:gd name="connsiteY8" fmla="*/ 113697 h 682171"/>
+              <a:gd name="connsiteX0" fmla="*/ 0 w 1132114"/>
+              <a:gd name="connsiteY0" fmla="*/ 113698 h 682172"/>
+              <a:gd name="connsiteX1" fmla="*/ 113697 w 1132114"/>
+              <a:gd name="connsiteY1" fmla="*/ 1 h 682172"/>
+              <a:gd name="connsiteX2" fmla="*/ 804104 w 1132114"/>
+              <a:gd name="connsiteY2" fmla="*/ 0 h 682172"/>
+              <a:gd name="connsiteX3" fmla="*/ 1132114 w 1132114"/>
+              <a:gd name="connsiteY3" fmla="*/ 227998 h 682172"/>
+              <a:gd name="connsiteX4" fmla="*/ 1132114 w 1132114"/>
+              <a:gd name="connsiteY4" fmla="*/ 568475 h 682172"/>
+              <a:gd name="connsiteX5" fmla="*/ 1018417 w 1132114"/>
+              <a:gd name="connsiteY5" fmla="*/ 682172 h 682172"/>
+              <a:gd name="connsiteX6" fmla="*/ 113697 w 1132114"/>
+              <a:gd name="connsiteY6" fmla="*/ 682172 h 682172"/>
+              <a:gd name="connsiteX7" fmla="*/ 0 w 1132114"/>
+              <a:gd name="connsiteY7" fmla="*/ 568475 h 682172"/>
+              <a:gd name="connsiteX8" fmla="*/ 0 w 1132114"/>
+              <a:gd name="connsiteY8" fmla="*/ 113698 h 682172"/>
+              <a:gd name="connsiteX0" fmla="*/ 0 w 1136876"/>
+              <a:gd name="connsiteY0" fmla="*/ 113698 h 682172"/>
+              <a:gd name="connsiteX1" fmla="*/ 113697 w 1136876"/>
+              <a:gd name="connsiteY1" fmla="*/ 1 h 682172"/>
+              <a:gd name="connsiteX2" fmla="*/ 804104 w 1136876"/>
+              <a:gd name="connsiteY2" fmla="*/ 0 h 682172"/>
+              <a:gd name="connsiteX3" fmla="*/ 1136876 w 1136876"/>
+              <a:gd name="connsiteY3" fmla="*/ 332773 h 682172"/>
+              <a:gd name="connsiteX4" fmla="*/ 1132114 w 1136876"/>
+              <a:gd name="connsiteY4" fmla="*/ 568475 h 682172"/>
+              <a:gd name="connsiteX5" fmla="*/ 1018417 w 1136876"/>
+              <a:gd name="connsiteY5" fmla="*/ 682172 h 682172"/>
+              <a:gd name="connsiteX6" fmla="*/ 113697 w 1136876"/>
+              <a:gd name="connsiteY6" fmla="*/ 682172 h 682172"/>
+              <a:gd name="connsiteX7" fmla="*/ 0 w 1136876"/>
+              <a:gd name="connsiteY7" fmla="*/ 568475 h 682172"/>
+              <a:gd name="connsiteX8" fmla="*/ 0 w 1136876"/>
+              <a:gd name="connsiteY8" fmla="*/ 113698 h 682172"/>
+              <a:gd name="connsiteX0" fmla="*/ 0 w 1136876"/>
+              <a:gd name="connsiteY0" fmla="*/ 113698 h 682172"/>
+              <a:gd name="connsiteX1" fmla="*/ 113697 w 1136876"/>
+              <a:gd name="connsiteY1" fmla="*/ 1 h 682172"/>
+              <a:gd name="connsiteX2" fmla="*/ 804104 w 1136876"/>
+              <a:gd name="connsiteY2" fmla="*/ 0 h 682172"/>
+              <a:gd name="connsiteX3" fmla="*/ 1136876 w 1136876"/>
+              <a:gd name="connsiteY3" fmla="*/ 332773 h 682172"/>
+              <a:gd name="connsiteX4" fmla="*/ 1132114 w 1136876"/>
+              <a:gd name="connsiteY4" fmla="*/ 568475 h 682172"/>
+              <a:gd name="connsiteX5" fmla="*/ 1018417 w 1136876"/>
+              <a:gd name="connsiteY5" fmla="*/ 682172 h 682172"/>
+              <a:gd name="connsiteX6" fmla="*/ 113697 w 1136876"/>
+              <a:gd name="connsiteY6" fmla="*/ 682172 h 682172"/>
+              <a:gd name="connsiteX7" fmla="*/ 0 w 1136876"/>
+              <a:gd name="connsiteY7" fmla="*/ 568475 h 682172"/>
+              <a:gd name="connsiteX8" fmla="*/ 0 w 1136876"/>
+              <a:gd name="connsiteY8" fmla="*/ 113698 h 682172"/>
+              <a:gd name="connsiteX0" fmla="*/ 0 w 1136876"/>
+              <a:gd name="connsiteY0" fmla="*/ 118461 h 686935"/>
+              <a:gd name="connsiteX1" fmla="*/ 113697 w 1136876"/>
+              <a:gd name="connsiteY1" fmla="*/ 4764 h 686935"/>
+              <a:gd name="connsiteX2" fmla="*/ 646941 w 1136876"/>
+              <a:gd name="connsiteY2" fmla="*/ 0 h 686935"/>
+              <a:gd name="connsiteX3" fmla="*/ 1136876 w 1136876"/>
+              <a:gd name="connsiteY3" fmla="*/ 337536 h 686935"/>
+              <a:gd name="connsiteX4" fmla="*/ 1132114 w 1136876"/>
+              <a:gd name="connsiteY4" fmla="*/ 573238 h 686935"/>
+              <a:gd name="connsiteX5" fmla="*/ 1018417 w 1136876"/>
+              <a:gd name="connsiteY5" fmla="*/ 686935 h 686935"/>
+              <a:gd name="connsiteX6" fmla="*/ 113697 w 1136876"/>
+              <a:gd name="connsiteY6" fmla="*/ 686935 h 686935"/>
+              <a:gd name="connsiteX7" fmla="*/ 0 w 1136876"/>
+              <a:gd name="connsiteY7" fmla="*/ 573238 h 686935"/>
+              <a:gd name="connsiteX8" fmla="*/ 0 w 1136876"/>
+              <a:gd name="connsiteY8" fmla="*/ 118461 h 686935"/>
+              <a:gd name="connsiteX0" fmla="*/ 0 w 1136876"/>
+              <a:gd name="connsiteY0" fmla="*/ 118461 h 686935"/>
+              <a:gd name="connsiteX1" fmla="*/ 113697 w 1136876"/>
+              <a:gd name="connsiteY1" fmla="*/ 4764 h 686935"/>
+              <a:gd name="connsiteX2" fmla="*/ 646941 w 1136876"/>
+              <a:gd name="connsiteY2" fmla="*/ 0 h 686935"/>
+              <a:gd name="connsiteX3" fmla="*/ 1136876 w 1136876"/>
+              <a:gd name="connsiteY3" fmla="*/ 337536 h 686935"/>
+              <a:gd name="connsiteX4" fmla="*/ 1132114 w 1136876"/>
+              <a:gd name="connsiteY4" fmla="*/ 573238 h 686935"/>
+              <a:gd name="connsiteX5" fmla="*/ 1018417 w 1136876"/>
+              <a:gd name="connsiteY5" fmla="*/ 686935 h 686935"/>
+              <a:gd name="connsiteX6" fmla="*/ 113697 w 1136876"/>
+              <a:gd name="connsiteY6" fmla="*/ 686935 h 686935"/>
+              <a:gd name="connsiteX7" fmla="*/ 0 w 1136876"/>
+              <a:gd name="connsiteY7" fmla="*/ 573238 h 686935"/>
+              <a:gd name="connsiteX8" fmla="*/ 0 w 1136876"/>
+              <a:gd name="connsiteY8" fmla="*/ 118461 h 686935"/>
+              <a:gd name="connsiteX0" fmla="*/ 0 w 1136876"/>
+              <a:gd name="connsiteY0" fmla="*/ 118461 h 686935"/>
+              <a:gd name="connsiteX1" fmla="*/ 113697 w 1136876"/>
+              <a:gd name="connsiteY1" fmla="*/ 4764 h 686935"/>
+              <a:gd name="connsiteX2" fmla="*/ 646941 w 1136876"/>
+              <a:gd name="connsiteY2" fmla="*/ 0 h 686935"/>
+              <a:gd name="connsiteX3" fmla="*/ 1136876 w 1136876"/>
+              <a:gd name="connsiteY3" fmla="*/ 337536 h 686935"/>
+              <a:gd name="connsiteX4" fmla="*/ 1132114 w 1136876"/>
+              <a:gd name="connsiteY4" fmla="*/ 573238 h 686935"/>
+              <a:gd name="connsiteX5" fmla="*/ 1018417 w 1136876"/>
+              <a:gd name="connsiteY5" fmla="*/ 686935 h 686935"/>
+              <a:gd name="connsiteX6" fmla="*/ 113697 w 1136876"/>
+              <a:gd name="connsiteY6" fmla="*/ 686935 h 686935"/>
+              <a:gd name="connsiteX7" fmla="*/ 0 w 1136876"/>
+              <a:gd name="connsiteY7" fmla="*/ 573238 h 686935"/>
+              <a:gd name="connsiteX8" fmla="*/ 0 w 1136876"/>
+              <a:gd name="connsiteY8" fmla="*/ 118461 h 686935"/>
+              <a:gd name="connsiteX0" fmla="*/ 0 w 1136876"/>
+              <a:gd name="connsiteY0" fmla="*/ 118461 h 686935"/>
+              <a:gd name="connsiteX1" fmla="*/ 113697 w 1136876"/>
+              <a:gd name="connsiteY1" fmla="*/ 4764 h 686935"/>
+              <a:gd name="connsiteX2" fmla="*/ 646941 w 1136876"/>
+              <a:gd name="connsiteY2" fmla="*/ 0 h 686935"/>
+              <a:gd name="connsiteX3" fmla="*/ 1136876 w 1136876"/>
+              <a:gd name="connsiteY3" fmla="*/ 337536 h 686935"/>
+              <a:gd name="connsiteX4" fmla="*/ 1132114 w 1136876"/>
+              <a:gd name="connsiteY4" fmla="*/ 573238 h 686935"/>
+              <a:gd name="connsiteX5" fmla="*/ 1018417 w 1136876"/>
+              <a:gd name="connsiteY5" fmla="*/ 686935 h 686935"/>
+              <a:gd name="connsiteX6" fmla="*/ 113697 w 1136876"/>
+              <a:gd name="connsiteY6" fmla="*/ 686935 h 686935"/>
+              <a:gd name="connsiteX7" fmla="*/ 0 w 1136876"/>
+              <a:gd name="connsiteY7" fmla="*/ 573238 h 686935"/>
+              <a:gd name="connsiteX8" fmla="*/ 0 w 1136876"/>
+              <a:gd name="connsiteY8" fmla="*/ 118461 h 686935"/>
+              <a:gd name="connsiteX0" fmla="*/ 0 w 1136876"/>
+              <a:gd name="connsiteY0" fmla="*/ 118465 h 686939"/>
+              <a:gd name="connsiteX1" fmla="*/ 113697 w 1136876"/>
+              <a:gd name="connsiteY1" fmla="*/ 4768 h 686939"/>
+              <a:gd name="connsiteX2" fmla="*/ 646941 w 1136876"/>
+              <a:gd name="connsiteY2" fmla="*/ 4 h 686939"/>
+              <a:gd name="connsiteX3" fmla="*/ 1136876 w 1136876"/>
+              <a:gd name="connsiteY3" fmla="*/ 337540 h 686939"/>
+              <a:gd name="connsiteX4" fmla="*/ 1132114 w 1136876"/>
+              <a:gd name="connsiteY4" fmla="*/ 573242 h 686939"/>
+              <a:gd name="connsiteX5" fmla="*/ 1018417 w 1136876"/>
+              <a:gd name="connsiteY5" fmla="*/ 686939 h 686939"/>
+              <a:gd name="connsiteX6" fmla="*/ 113697 w 1136876"/>
+              <a:gd name="connsiteY6" fmla="*/ 686939 h 686939"/>
+              <a:gd name="connsiteX7" fmla="*/ 0 w 1136876"/>
+              <a:gd name="connsiteY7" fmla="*/ 573242 h 686939"/>
+              <a:gd name="connsiteX8" fmla="*/ 0 w 1136876"/>
+              <a:gd name="connsiteY8" fmla="*/ 118465 h 686939"/>
+              <a:gd name="connsiteX0" fmla="*/ 0 w 1136876"/>
+              <a:gd name="connsiteY0" fmla="*/ 118466 h 686940"/>
+              <a:gd name="connsiteX1" fmla="*/ 113697 w 1136876"/>
+              <a:gd name="connsiteY1" fmla="*/ 4769 h 686940"/>
+              <a:gd name="connsiteX2" fmla="*/ 646941 w 1136876"/>
+              <a:gd name="connsiteY2" fmla="*/ 5 h 686940"/>
+              <a:gd name="connsiteX3" fmla="*/ 1136876 w 1136876"/>
+              <a:gd name="connsiteY3" fmla="*/ 337541 h 686940"/>
+              <a:gd name="connsiteX4" fmla="*/ 1132114 w 1136876"/>
+              <a:gd name="connsiteY4" fmla="*/ 573243 h 686940"/>
+              <a:gd name="connsiteX5" fmla="*/ 1018417 w 1136876"/>
+              <a:gd name="connsiteY5" fmla="*/ 686940 h 686940"/>
+              <a:gd name="connsiteX6" fmla="*/ 113697 w 1136876"/>
+              <a:gd name="connsiteY6" fmla="*/ 686940 h 686940"/>
+              <a:gd name="connsiteX7" fmla="*/ 0 w 1136876"/>
+              <a:gd name="connsiteY7" fmla="*/ 573243 h 686940"/>
+              <a:gd name="connsiteX8" fmla="*/ 0 w 1136876"/>
+              <a:gd name="connsiteY8" fmla="*/ 118466 h 686940"/>
+              <a:gd name="connsiteX0" fmla="*/ 0 w 1136876"/>
+              <a:gd name="connsiteY0" fmla="*/ 118466 h 686940"/>
+              <a:gd name="connsiteX1" fmla="*/ 113697 w 1136876"/>
+              <a:gd name="connsiteY1" fmla="*/ 4769 h 686940"/>
+              <a:gd name="connsiteX2" fmla="*/ 646941 w 1136876"/>
+              <a:gd name="connsiteY2" fmla="*/ 5 h 686940"/>
+              <a:gd name="connsiteX3" fmla="*/ 1136876 w 1136876"/>
+              <a:gd name="connsiteY3" fmla="*/ 337541 h 686940"/>
+              <a:gd name="connsiteX4" fmla="*/ 1132114 w 1136876"/>
+              <a:gd name="connsiteY4" fmla="*/ 573243 h 686940"/>
+              <a:gd name="connsiteX5" fmla="*/ 1018417 w 1136876"/>
+              <a:gd name="connsiteY5" fmla="*/ 686940 h 686940"/>
+              <a:gd name="connsiteX6" fmla="*/ 113697 w 1136876"/>
+              <a:gd name="connsiteY6" fmla="*/ 686940 h 686940"/>
+              <a:gd name="connsiteX7" fmla="*/ 0 w 1136876"/>
+              <a:gd name="connsiteY7" fmla="*/ 573244 h 686940"/>
+              <a:gd name="connsiteX8" fmla="*/ 0 w 1136876"/>
+              <a:gd name="connsiteY8" fmla="*/ 118466 h 686940"/>
+              <a:gd name="connsiteX0" fmla="*/ 1797 w 1138673"/>
+              <a:gd name="connsiteY0" fmla="*/ 118466 h 691666"/>
+              <a:gd name="connsiteX1" fmla="*/ 115494 w 1138673"/>
+              <a:gd name="connsiteY1" fmla="*/ 4769 h 691666"/>
+              <a:gd name="connsiteX2" fmla="*/ 648738 w 1138673"/>
+              <a:gd name="connsiteY2" fmla="*/ 5 h 691666"/>
+              <a:gd name="connsiteX3" fmla="*/ 1138673 w 1138673"/>
+              <a:gd name="connsiteY3" fmla="*/ 337541 h 691666"/>
+              <a:gd name="connsiteX4" fmla="*/ 1133911 w 1138673"/>
+              <a:gd name="connsiteY4" fmla="*/ 573243 h 691666"/>
+              <a:gd name="connsiteX5" fmla="*/ 1020214 w 1138673"/>
+              <a:gd name="connsiteY5" fmla="*/ 686940 h 691666"/>
+              <a:gd name="connsiteX6" fmla="*/ 115494 w 1138673"/>
+              <a:gd name="connsiteY6" fmla="*/ 686940 h 691666"/>
+              <a:gd name="connsiteX7" fmla="*/ 1797 w 1138673"/>
+              <a:gd name="connsiteY7" fmla="*/ 573244 h 691666"/>
+              <a:gd name="connsiteX8" fmla="*/ 1797 w 1138673"/>
+              <a:gd name="connsiteY8" fmla="*/ 118466 h 691666"/>
+              <a:gd name="connsiteX0" fmla="*/ 1797 w 1138673"/>
+              <a:gd name="connsiteY0" fmla="*/ 118462 h 691662"/>
+              <a:gd name="connsiteX1" fmla="*/ 115494 w 1138673"/>
+              <a:gd name="connsiteY1" fmla="*/ 4765 h 691662"/>
+              <a:gd name="connsiteX2" fmla="*/ 648738 w 1138673"/>
+              <a:gd name="connsiteY2" fmla="*/ 1 h 691662"/>
+              <a:gd name="connsiteX3" fmla="*/ 1138673 w 1138673"/>
+              <a:gd name="connsiteY3" fmla="*/ 337537 h 691662"/>
+              <a:gd name="connsiteX4" fmla="*/ 1133911 w 1138673"/>
+              <a:gd name="connsiteY4" fmla="*/ 573239 h 691662"/>
+              <a:gd name="connsiteX5" fmla="*/ 1020214 w 1138673"/>
+              <a:gd name="connsiteY5" fmla="*/ 686936 h 691662"/>
+              <a:gd name="connsiteX6" fmla="*/ 115494 w 1138673"/>
+              <a:gd name="connsiteY6" fmla="*/ 686936 h 691662"/>
+              <a:gd name="connsiteX7" fmla="*/ 1797 w 1138673"/>
+              <a:gd name="connsiteY7" fmla="*/ 573240 h 691662"/>
+              <a:gd name="connsiteX8" fmla="*/ 1797 w 1138673"/>
+              <a:gd name="connsiteY8" fmla="*/ 118462 h 691662"/>
+              <a:gd name="connsiteX0" fmla="*/ 1797 w 1138673"/>
+              <a:gd name="connsiteY0" fmla="*/ 118461 h 691661"/>
+              <a:gd name="connsiteX1" fmla="*/ 115494 w 1138673"/>
+              <a:gd name="connsiteY1" fmla="*/ 4764 h 691661"/>
+              <a:gd name="connsiteX2" fmla="*/ 648738 w 1138673"/>
+              <a:gd name="connsiteY2" fmla="*/ 0 h 691661"/>
+              <a:gd name="connsiteX3" fmla="*/ 1138673 w 1138673"/>
+              <a:gd name="connsiteY3" fmla="*/ 337536 h 691661"/>
+              <a:gd name="connsiteX4" fmla="*/ 1133911 w 1138673"/>
+              <a:gd name="connsiteY4" fmla="*/ 573238 h 691661"/>
+              <a:gd name="connsiteX5" fmla="*/ 1020214 w 1138673"/>
+              <a:gd name="connsiteY5" fmla="*/ 686935 h 691661"/>
+              <a:gd name="connsiteX6" fmla="*/ 115494 w 1138673"/>
+              <a:gd name="connsiteY6" fmla="*/ 686935 h 691661"/>
+              <a:gd name="connsiteX7" fmla="*/ 1797 w 1138673"/>
+              <a:gd name="connsiteY7" fmla="*/ 573239 h 691661"/>
+              <a:gd name="connsiteX8" fmla="*/ 1797 w 1138673"/>
+              <a:gd name="connsiteY8" fmla="*/ 118461 h 691661"/>
+              <a:gd name="connsiteX0" fmla="*/ 1797 w 1138673"/>
+              <a:gd name="connsiteY0" fmla="*/ 118461 h 691661"/>
+              <a:gd name="connsiteX1" fmla="*/ 115494 w 1138673"/>
+              <a:gd name="connsiteY1" fmla="*/ 4764 h 691661"/>
+              <a:gd name="connsiteX2" fmla="*/ 648738 w 1138673"/>
+              <a:gd name="connsiteY2" fmla="*/ 0 h 691661"/>
+              <a:gd name="connsiteX3" fmla="*/ 1138673 w 1138673"/>
+              <a:gd name="connsiteY3" fmla="*/ 337536 h 691661"/>
+              <a:gd name="connsiteX4" fmla="*/ 1133911 w 1138673"/>
+              <a:gd name="connsiteY4" fmla="*/ 573238 h 691661"/>
+              <a:gd name="connsiteX5" fmla="*/ 1020214 w 1138673"/>
+              <a:gd name="connsiteY5" fmla="*/ 686935 h 691661"/>
+              <a:gd name="connsiteX6" fmla="*/ 115494 w 1138673"/>
+              <a:gd name="connsiteY6" fmla="*/ 686935 h 691661"/>
+              <a:gd name="connsiteX7" fmla="*/ 1797 w 1138673"/>
+              <a:gd name="connsiteY7" fmla="*/ 573239 h 691661"/>
+              <a:gd name="connsiteX8" fmla="*/ 1797 w 1138673"/>
+              <a:gd name="connsiteY8" fmla="*/ 118461 h 691661"/>
+              <a:gd name="connsiteX0" fmla="*/ 1797 w 1138673"/>
+              <a:gd name="connsiteY0" fmla="*/ 118461 h 691661"/>
+              <a:gd name="connsiteX1" fmla="*/ 115494 w 1138673"/>
+              <a:gd name="connsiteY1" fmla="*/ 4764 h 691661"/>
+              <a:gd name="connsiteX2" fmla="*/ 648738 w 1138673"/>
+              <a:gd name="connsiteY2" fmla="*/ 0 h 691661"/>
+              <a:gd name="connsiteX3" fmla="*/ 1138673 w 1138673"/>
+              <a:gd name="connsiteY3" fmla="*/ 337536 h 691661"/>
+              <a:gd name="connsiteX4" fmla="*/ 1133911 w 1138673"/>
+              <a:gd name="connsiteY4" fmla="*/ 573238 h 691661"/>
+              <a:gd name="connsiteX5" fmla="*/ 1020214 w 1138673"/>
+              <a:gd name="connsiteY5" fmla="*/ 686935 h 691661"/>
+              <a:gd name="connsiteX6" fmla="*/ 115494 w 1138673"/>
+              <a:gd name="connsiteY6" fmla="*/ 686935 h 691661"/>
+              <a:gd name="connsiteX7" fmla="*/ 1797 w 1138673"/>
+              <a:gd name="connsiteY7" fmla="*/ 573239 h 691661"/>
+              <a:gd name="connsiteX8" fmla="*/ 1797 w 1138673"/>
+              <a:gd name="connsiteY8" fmla="*/ 118461 h 691661"/>
+              <a:gd name="connsiteX0" fmla="*/ 1797 w 1138673"/>
+              <a:gd name="connsiteY0" fmla="*/ 118461 h 691661"/>
+              <a:gd name="connsiteX1" fmla="*/ 115494 w 1138673"/>
+              <a:gd name="connsiteY1" fmla="*/ 4764 h 691661"/>
+              <a:gd name="connsiteX2" fmla="*/ 648738 w 1138673"/>
+              <a:gd name="connsiteY2" fmla="*/ 0 h 691661"/>
+              <a:gd name="connsiteX3" fmla="*/ 1138673 w 1138673"/>
+              <a:gd name="connsiteY3" fmla="*/ 337536 h 691661"/>
+              <a:gd name="connsiteX4" fmla="*/ 1133911 w 1138673"/>
+              <a:gd name="connsiteY4" fmla="*/ 573238 h 691661"/>
+              <a:gd name="connsiteX5" fmla="*/ 1020214 w 1138673"/>
+              <a:gd name="connsiteY5" fmla="*/ 686935 h 691661"/>
+              <a:gd name="connsiteX6" fmla="*/ 115494 w 1138673"/>
+              <a:gd name="connsiteY6" fmla="*/ 686935 h 691661"/>
+              <a:gd name="connsiteX7" fmla="*/ 1797 w 1138673"/>
+              <a:gd name="connsiteY7" fmla="*/ 573239 h 691661"/>
+              <a:gd name="connsiteX8" fmla="*/ 1797 w 1138673"/>
+              <a:gd name="connsiteY8" fmla="*/ 118461 h 691661"/>
+              <a:gd name="connsiteX0" fmla="*/ 1797 w 1138673"/>
+              <a:gd name="connsiteY0" fmla="*/ 118461 h 691661"/>
+              <a:gd name="connsiteX1" fmla="*/ 115494 w 1138673"/>
+              <a:gd name="connsiteY1" fmla="*/ 4764 h 691661"/>
+              <a:gd name="connsiteX2" fmla="*/ 648738 w 1138673"/>
+              <a:gd name="connsiteY2" fmla="*/ 0 h 691661"/>
+              <a:gd name="connsiteX3" fmla="*/ 1138673 w 1138673"/>
+              <a:gd name="connsiteY3" fmla="*/ 337536 h 691661"/>
+              <a:gd name="connsiteX4" fmla="*/ 1133911 w 1138673"/>
+              <a:gd name="connsiteY4" fmla="*/ 573238 h 691661"/>
+              <a:gd name="connsiteX5" fmla="*/ 1020214 w 1138673"/>
+              <a:gd name="connsiteY5" fmla="*/ 686935 h 691661"/>
+              <a:gd name="connsiteX6" fmla="*/ 115494 w 1138673"/>
+              <a:gd name="connsiteY6" fmla="*/ 686935 h 691661"/>
+              <a:gd name="connsiteX7" fmla="*/ 1797 w 1138673"/>
+              <a:gd name="connsiteY7" fmla="*/ 573239 h 691661"/>
+              <a:gd name="connsiteX8" fmla="*/ 1797 w 1138673"/>
+              <a:gd name="connsiteY8" fmla="*/ 118461 h 691661"/>
+              <a:gd name="connsiteX0" fmla="*/ 1797 w 1138673"/>
+              <a:gd name="connsiteY0" fmla="*/ 118461 h 691661"/>
+              <a:gd name="connsiteX1" fmla="*/ 115494 w 1138673"/>
+              <a:gd name="connsiteY1" fmla="*/ 4764 h 691661"/>
+              <a:gd name="connsiteX2" fmla="*/ 648738 w 1138673"/>
+              <a:gd name="connsiteY2" fmla="*/ 0 h 691661"/>
+              <a:gd name="connsiteX3" fmla="*/ 1138673 w 1138673"/>
+              <a:gd name="connsiteY3" fmla="*/ 337536 h 691661"/>
+              <a:gd name="connsiteX4" fmla="*/ 1133911 w 1138673"/>
+              <a:gd name="connsiteY4" fmla="*/ 573238 h 691661"/>
+              <a:gd name="connsiteX5" fmla="*/ 1020214 w 1138673"/>
+              <a:gd name="connsiteY5" fmla="*/ 686935 h 691661"/>
+              <a:gd name="connsiteX6" fmla="*/ 115494 w 1138673"/>
+              <a:gd name="connsiteY6" fmla="*/ 686935 h 691661"/>
+              <a:gd name="connsiteX7" fmla="*/ 1797 w 1138673"/>
+              <a:gd name="connsiteY7" fmla="*/ 573239 h 691661"/>
+              <a:gd name="connsiteX8" fmla="*/ 1797 w 1138673"/>
+              <a:gd name="connsiteY8" fmla="*/ 118461 h 691661"/>
+              <a:gd name="connsiteX0" fmla="*/ 1797 w 1138673"/>
+              <a:gd name="connsiteY0" fmla="*/ 118461 h 691661"/>
+              <a:gd name="connsiteX1" fmla="*/ 115494 w 1138673"/>
+              <a:gd name="connsiteY1" fmla="*/ 4764 h 691661"/>
+              <a:gd name="connsiteX2" fmla="*/ 826875 w 1138673"/>
+              <a:gd name="connsiteY2" fmla="*/ 0 h 691661"/>
+              <a:gd name="connsiteX3" fmla="*/ 1138673 w 1138673"/>
+              <a:gd name="connsiteY3" fmla="*/ 337536 h 691661"/>
+              <a:gd name="connsiteX4" fmla="*/ 1133911 w 1138673"/>
+              <a:gd name="connsiteY4" fmla="*/ 573238 h 691661"/>
+              <a:gd name="connsiteX5" fmla="*/ 1020214 w 1138673"/>
+              <a:gd name="connsiteY5" fmla="*/ 686935 h 691661"/>
+              <a:gd name="connsiteX6" fmla="*/ 115494 w 1138673"/>
+              <a:gd name="connsiteY6" fmla="*/ 686935 h 691661"/>
+              <a:gd name="connsiteX7" fmla="*/ 1797 w 1138673"/>
+              <a:gd name="connsiteY7" fmla="*/ 573239 h 691661"/>
+              <a:gd name="connsiteX8" fmla="*/ 1797 w 1138673"/>
+              <a:gd name="connsiteY8" fmla="*/ 118461 h 691661"/>
+              <a:gd name="connsiteX0" fmla="*/ 1797 w 1138673"/>
+              <a:gd name="connsiteY0" fmla="*/ 118461 h 691661"/>
+              <a:gd name="connsiteX1" fmla="*/ 115494 w 1138673"/>
+              <a:gd name="connsiteY1" fmla="*/ 4764 h 691661"/>
+              <a:gd name="connsiteX2" fmla="*/ 826875 w 1138673"/>
+              <a:gd name="connsiteY2" fmla="*/ 0 h 691661"/>
+              <a:gd name="connsiteX3" fmla="*/ 1138673 w 1138673"/>
+              <a:gd name="connsiteY3" fmla="*/ 337536 h 691661"/>
+              <a:gd name="connsiteX4" fmla="*/ 1133911 w 1138673"/>
+              <a:gd name="connsiteY4" fmla="*/ 573238 h 691661"/>
+              <a:gd name="connsiteX5" fmla="*/ 1020214 w 1138673"/>
+              <a:gd name="connsiteY5" fmla="*/ 686935 h 691661"/>
+              <a:gd name="connsiteX6" fmla="*/ 115494 w 1138673"/>
+              <a:gd name="connsiteY6" fmla="*/ 686935 h 691661"/>
+              <a:gd name="connsiteX7" fmla="*/ 1797 w 1138673"/>
+              <a:gd name="connsiteY7" fmla="*/ 573239 h 691661"/>
+              <a:gd name="connsiteX8" fmla="*/ 1797 w 1138673"/>
+              <a:gd name="connsiteY8" fmla="*/ 118461 h 691661"/>
+              <a:gd name="connsiteX0" fmla="*/ 1797 w 1138673"/>
+              <a:gd name="connsiteY0" fmla="*/ 118461 h 691661"/>
+              <a:gd name="connsiteX1" fmla="*/ 115494 w 1138673"/>
+              <a:gd name="connsiteY1" fmla="*/ 4764 h 691661"/>
+              <a:gd name="connsiteX2" fmla="*/ 826875 w 1138673"/>
+              <a:gd name="connsiteY2" fmla="*/ 0 h 691661"/>
+              <a:gd name="connsiteX3" fmla="*/ 1138673 w 1138673"/>
+              <a:gd name="connsiteY3" fmla="*/ 337536 h 691661"/>
+              <a:gd name="connsiteX4" fmla="*/ 1133911 w 1138673"/>
+              <a:gd name="connsiteY4" fmla="*/ 573238 h 691661"/>
+              <a:gd name="connsiteX5" fmla="*/ 1020214 w 1138673"/>
+              <a:gd name="connsiteY5" fmla="*/ 686935 h 691661"/>
+              <a:gd name="connsiteX6" fmla="*/ 115494 w 1138673"/>
+              <a:gd name="connsiteY6" fmla="*/ 686935 h 691661"/>
+              <a:gd name="connsiteX7" fmla="*/ 1797 w 1138673"/>
+              <a:gd name="connsiteY7" fmla="*/ 573239 h 691661"/>
+              <a:gd name="connsiteX8" fmla="*/ 1797 w 1138673"/>
+              <a:gd name="connsiteY8" fmla="*/ 118461 h 691661"/>
+              <a:gd name="connsiteX0" fmla="*/ 1797 w 1138673"/>
+              <a:gd name="connsiteY0" fmla="*/ 118461 h 691661"/>
+              <a:gd name="connsiteX1" fmla="*/ 115494 w 1138673"/>
+              <a:gd name="connsiteY1" fmla="*/ 4764 h 691661"/>
+              <a:gd name="connsiteX2" fmla="*/ 826875 w 1138673"/>
+              <a:gd name="connsiteY2" fmla="*/ 0 h 691661"/>
+              <a:gd name="connsiteX3" fmla="*/ 1138673 w 1138673"/>
+              <a:gd name="connsiteY3" fmla="*/ 337536 h 691661"/>
+              <a:gd name="connsiteX4" fmla="*/ 1133911 w 1138673"/>
+              <a:gd name="connsiteY4" fmla="*/ 573238 h 691661"/>
+              <a:gd name="connsiteX5" fmla="*/ 1020214 w 1138673"/>
+              <a:gd name="connsiteY5" fmla="*/ 686935 h 691661"/>
+              <a:gd name="connsiteX6" fmla="*/ 115494 w 1138673"/>
+              <a:gd name="connsiteY6" fmla="*/ 686935 h 691661"/>
+              <a:gd name="connsiteX7" fmla="*/ 1797 w 1138673"/>
+              <a:gd name="connsiteY7" fmla="*/ 573239 h 691661"/>
+              <a:gd name="connsiteX8" fmla="*/ 1797 w 1138673"/>
+              <a:gd name="connsiteY8" fmla="*/ 118461 h 691661"/>
+            </a:gdLst>
+            <a:ahLst/>
+            <a:cxnLst>
+              <a:cxn ang="0">
+                <a:pos x="connsiteX0" y="connsiteY0"/>
+              </a:cxn>
+              <a:cxn ang="0">
+                <a:pos x="connsiteX1" y="connsiteY1"/>
+              </a:cxn>
+              <a:cxn ang="0">
+                <a:pos x="connsiteX2" y="connsiteY2"/>
+              </a:cxn>
+              <a:cxn ang="0">
+                <a:pos x="connsiteX3" y="connsiteY3"/>
+              </a:cxn>
+              <a:cxn ang="0">
+                <a:pos x="connsiteX4" y="connsiteY4"/>
+              </a:cxn>
+              <a:cxn ang="0">
+                <a:pos x="connsiteX5" y="connsiteY5"/>
+              </a:cxn>
+              <a:cxn ang="0">
+                <a:pos x="connsiteX6" y="connsiteY6"/>
+              </a:cxn>
+              <a:cxn ang="0">
+                <a:pos x="connsiteX7" y="connsiteY7"/>
+              </a:cxn>
+              <a:cxn ang="0">
+                <a:pos x="connsiteX8" y="connsiteY8"/>
+              </a:cxn>
+            </a:cxnLst>
+            <a:rect l="l" t="t" r="r" b="b"/>
+            <a:pathLst>
+              <a:path w="1138673" h="691661">
+                <a:moveTo>
+                  <a:pt x="1797" y="118461"/>
+                </a:moveTo>
+                <a:cubicBezTo>
+                  <a:pt x="1797" y="55668"/>
+                  <a:pt x="52701" y="4764"/>
+                  <a:pt x="115494" y="4764"/>
+                </a:cubicBezTo>
+                <a:lnTo>
+                  <a:pt x="826875" y="0"/>
+                </a:lnTo>
+                <a:cubicBezTo>
+                  <a:pt x="1006399" y="10834"/>
+                  <a:pt x="892773" y="279869"/>
+                  <a:pt x="1138673" y="337536"/>
+                </a:cubicBezTo>
+                <a:cubicBezTo>
+                  <a:pt x="1137086" y="416103"/>
+                  <a:pt x="1135498" y="494671"/>
+                  <a:pt x="1133911" y="573238"/>
+                </a:cubicBezTo>
+                <a:cubicBezTo>
+                  <a:pt x="1133911" y="684602"/>
+                  <a:pt x="1123340" y="686935"/>
+                  <a:pt x="1020214" y="686935"/>
+                </a:cubicBezTo>
+                <a:lnTo>
+                  <a:pt x="115494" y="686935"/>
+                </a:lnTo>
+                <a:cubicBezTo>
+                  <a:pt x="52701" y="686935"/>
+                  <a:pt x="-11647" y="727102"/>
+                  <a:pt x="1797" y="573239"/>
+                </a:cubicBezTo>
+                <a:lnTo>
+                  <a:pt x="1797" y="118461"/>
+                </a:lnTo>
+                <a:close/>
+              </a:path>
+            </a:pathLst>
+          </a:custGeom>
+          <a:solidFill>
+            <a:schemeClr val="accent1">
+              <a:lumMod val="60000"/>
+              <a:lumOff val="40000"/>
+              <a:alpha val="32000"/>
+            </a:schemeClr>
+          </a:solidFill>
+          <a:ln>
+            <a:noFill/>
+          </a:ln>
+        </p:spPr>
+        <p:style>
+          <a:lnRef idx="2">
+            <a:schemeClr val="accent1">
+              <a:shade val="50000"/>
+            </a:schemeClr>
+          </a:lnRef>
+          <a:fillRef idx="1">
+            <a:schemeClr val="accent1"/>
+          </a:fillRef>
+          <a:effectRef idx="0">
+            <a:schemeClr val="accent1"/>
+          </a:effectRef>
+          <a:fontRef idx="minor">
+            <a:schemeClr val="lt1"/>
+          </a:fontRef>
+        </p:style>
+        <p:txBody>
+          <a:bodyPr rtlCol="0" anchor="ctr"/>
+          <a:lstStyle/>
+          <a:p>
+            <a:pPr algn="ctr"/>
+            <a:endParaRPr lang="en-US"/>
+          </a:p>
+        </p:txBody>
+      </p:sp>
+      <p:sp>
+        <p:nvSpPr>
+          <p:cNvPr id="30" name="Action Button: Home 29">
+            <a:hlinkClick r:id="" action="ppaction://hlinkshowjump?jump=firstslide" highlightClick="1"/>
+          </p:cNvPr>
+          <p:cNvSpPr/>
+          <p:nvPr/>
+        </p:nvSpPr>
+        <p:spPr>
+          <a:xfrm>
+            <a:off x="5167868" y="5978138"/>
+            <a:ext cx="295094" cy="281504"/>
+          </a:xfrm>
+          <a:prstGeom prst="actionButtonHome">
+            <a:avLst/>
+          </a:prstGeom>
+          <a:solidFill>
+            <a:schemeClr val="accent1">
+              <a:lumMod val="75000"/>
+            </a:schemeClr>
+          </a:solidFill>
+        </p:spPr>
+        <p:style>
+          <a:lnRef idx="2">
+            <a:schemeClr val="accent1">
+              <a:shade val="50000"/>
+            </a:schemeClr>
+          </a:lnRef>
+          <a:fillRef idx="1">
+            <a:schemeClr val="accent1"/>
+          </a:fillRef>
+          <a:effectRef idx="0">
+            <a:schemeClr val="accent1"/>
+          </a:effectRef>
+          <a:fontRef idx="minor">
+            <a:schemeClr val="lt1"/>
+          </a:fontRef>
+        </p:style>
+        <p:txBody>
+          <a:bodyPr rtlCol="0" anchor="ctr"/>
+          <a:lstStyle/>
+          <a:p>
+            <a:pPr algn="ctr"/>
+            <a:endParaRPr lang="en-US"/>
+          </a:p>
+        </p:txBody>
+      </p:sp>
+      <p:sp>
+        <p:nvSpPr>
+          <p:cNvPr id="31" name="Flowchart: Or 30"/>
+          <p:cNvSpPr/>
+          <p:nvPr/>
+        </p:nvSpPr>
+        <p:spPr>
+          <a:xfrm>
+            <a:off x="5754686" y="5975901"/>
+            <a:ext cx="300024" cy="283741"/>
+          </a:xfrm>
+          <a:prstGeom prst="flowChartOr">
+            <a:avLst/>
+          </a:prstGeom>
+          <a:noFill/>
+          <a:ln>
+            <a:solidFill>
+              <a:srgbClr val="0070C0"/>
+            </a:solidFill>
+          </a:ln>
+        </p:spPr>
+        <p:style>
+          <a:lnRef idx="2">
+            <a:schemeClr val="accent1">
+              <a:shade val="50000"/>
+            </a:schemeClr>
+          </a:lnRef>
+          <a:fillRef idx="1">
+            <a:schemeClr val="accent1"/>
+          </a:fillRef>
+          <a:effectRef idx="0">
+            <a:schemeClr val="accent1"/>
+          </a:effectRef>
+          <a:fontRef idx="minor">
+            <a:schemeClr val="lt1"/>
+          </a:fontRef>
+        </p:style>
+        <p:txBody>
+          <a:bodyPr rtlCol="0" anchor="ctr"/>
+          <a:lstStyle/>
+          <a:p>
+            <a:pPr algn="ctr"/>
+            <a:endParaRPr lang="en-US"/>
+          </a:p>
+        </p:txBody>
+      </p:sp>
+      <p:sp>
+        <p:nvSpPr>
+          <p:cNvPr id="34" name="Rounded Rectangle 12"/>
+          <p:cNvSpPr/>
+          <p:nvPr/>
+        </p:nvSpPr>
+        <p:spPr>
+          <a:xfrm flipH="1">
+            <a:off x="6468411" y="5885160"/>
+            <a:ext cx="1452638" cy="482267"/>
+          </a:xfrm>
+          <a:custGeom>
+            <a:avLst/>
+            <a:gdLst>
+              <a:gd name="connsiteX0" fmla="*/ 0 w 1132114"/>
+              <a:gd name="connsiteY0" fmla="*/ 113697 h 682171"/>
+              <a:gd name="connsiteX1" fmla="*/ 113697 w 1132114"/>
+              <a:gd name="connsiteY1" fmla="*/ 0 h 682171"/>
+              <a:gd name="connsiteX2" fmla="*/ 1018417 w 1132114"/>
+              <a:gd name="connsiteY2" fmla="*/ 0 h 682171"/>
+              <a:gd name="connsiteX3" fmla="*/ 1132114 w 1132114"/>
+              <a:gd name="connsiteY3" fmla="*/ 113697 h 682171"/>
+              <a:gd name="connsiteX4" fmla="*/ 1132114 w 1132114"/>
+              <a:gd name="connsiteY4" fmla="*/ 568474 h 682171"/>
+              <a:gd name="connsiteX5" fmla="*/ 1018417 w 1132114"/>
+              <a:gd name="connsiteY5" fmla="*/ 682171 h 682171"/>
+              <a:gd name="connsiteX6" fmla="*/ 113697 w 1132114"/>
+              <a:gd name="connsiteY6" fmla="*/ 682171 h 682171"/>
+              <a:gd name="connsiteX7" fmla="*/ 0 w 1132114"/>
+              <a:gd name="connsiteY7" fmla="*/ 568474 h 682171"/>
+              <a:gd name="connsiteX8" fmla="*/ 0 w 1132114"/>
+              <a:gd name="connsiteY8" fmla="*/ 113697 h 682171"/>
+              <a:gd name="connsiteX0" fmla="*/ 0 w 1132114"/>
+              <a:gd name="connsiteY0" fmla="*/ 113697 h 682171"/>
+              <a:gd name="connsiteX1" fmla="*/ 113697 w 1132114"/>
+              <a:gd name="connsiteY1" fmla="*/ 0 h 682171"/>
+              <a:gd name="connsiteX2" fmla="*/ 923167 w 1132114"/>
+              <a:gd name="connsiteY2" fmla="*/ 4762 h 682171"/>
+              <a:gd name="connsiteX3" fmla="*/ 1132114 w 1132114"/>
+              <a:gd name="connsiteY3" fmla="*/ 113697 h 682171"/>
+              <a:gd name="connsiteX4" fmla="*/ 1132114 w 1132114"/>
+              <a:gd name="connsiteY4" fmla="*/ 568474 h 682171"/>
+              <a:gd name="connsiteX5" fmla="*/ 1018417 w 1132114"/>
+              <a:gd name="connsiteY5" fmla="*/ 682171 h 682171"/>
+              <a:gd name="connsiteX6" fmla="*/ 113697 w 1132114"/>
+              <a:gd name="connsiteY6" fmla="*/ 682171 h 682171"/>
+              <a:gd name="connsiteX7" fmla="*/ 0 w 1132114"/>
+              <a:gd name="connsiteY7" fmla="*/ 568474 h 682171"/>
+              <a:gd name="connsiteX8" fmla="*/ 0 w 1132114"/>
+              <a:gd name="connsiteY8" fmla="*/ 113697 h 682171"/>
+              <a:gd name="connsiteX0" fmla="*/ 0 w 1132114"/>
+              <a:gd name="connsiteY0" fmla="*/ 113697 h 682171"/>
+              <a:gd name="connsiteX1" fmla="*/ 113697 w 1132114"/>
+              <a:gd name="connsiteY1" fmla="*/ 0 h 682171"/>
+              <a:gd name="connsiteX2" fmla="*/ 923167 w 1132114"/>
+              <a:gd name="connsiteY2" fmla="*/ 4762 h 682171"/>
+              <a:gd name="connsiteX3" fmla="*/ 1132114 w 1132114"/>
+              <a:gd name="connsiteY3" fmla="*/ 227997 h 682171"/>
+              <a:gd name="connsiteX4" fmla="*/ 1132114 w 1132114"/>
+              <a:gd name="connsiteY4" fmla="*/ 568474 h 682171"/>
+              <a:gd name="connsiteX5" fmla="*/ 1018417 w 1132114"/>
+              <a:gd name="connsiteY5" fmla="*/ 682171 h 682171"/>
+              <a:gd name="connsiteX6" fmla="*/ 113697 w 1132114"/>
+              <a:gd name="connsiteY6" fmla="*/ 682171 h 682171"/>
+              <a:gd name="connsiteX7" fmla="*/ 0 w 1132114"/>
+              <a:gd name="connsiteY7" fmla="*/ 568474 h 682171"/>
+              <a:gd name="connsiteX8" fmla="*/ 0 w 1132114"/>
+              <a:gd name="connsiteY8" fmla="*/ 113697 h 682171"/>
+              <a:gd name="connsiteX0" fmla="*/ 0 w 1132114"/>
+              <a:gd name="connsiteY0" fmla="*/ 113697 h 682171"/>
+              <a:gd name="connsiteX1" fmla="*/ 113697 w 1132114"/>
+              <a:gd name="connsiteY1" fmla="*/ 0 h 682171"/>
+              <a:gd name="connsiteX2" fmla="*/ 923167 w 1132114"/>
+              <a:gd name="connsiteY2" fmla="*/ 4762 h 682171"/>
+              <a:gd name="connsiteX3" fmla="*/ 1132114 w 1132114"/>
+              <a:gd name="connsiteY3" fmla="*/ 227997 h 682171"/>
+              <a:gd name="connsiteX4" fmla="*/ 1132114 w 1132114"/>
+              <a:gd name="connsiteY4" fmla="*/ 568474 h 682171"/>
+              <a:gd name="connsiteX5" fmla="*/ 1018417 w 1132114"/>
+              <a:gd name="connsiteY5" fmla="*/ 682171 h 682171"/>
+              <a:gd name="connsiteX6" fmla="*/ 113697 w 1132114"/>
+              <a:gd name="connsiteY6" fmla="*/ 682171 h 682171"/>
+              <a:gd name="connsiteX7" fmla="*/ 0 w 1132114"/>
+              <a:gd name="connsiteY7" fmla="*/ 568474 h 682171"/>
+              <a:gd name="connsiteX8" fmla="*/ 0 w 1132114"/>
+              <a:gd name="connsiteY8" fmla="*/ 113697 h 682171"/>
+              <a:gd name="connsiteX0" fmla="*/ 0 w 1132114"/>
+              <a:gd name="connsiteY0" fmla="*/ 113697 h 682171"/>
+              <a:gd name="connsiteX1" fmla="*/ 113697 w 1132114"/>
+              <a:gd name="connsiteY1" fmla="*/ 0 h 682171"/>
+              <a:gd name="connsiteX2" fmla="*/ 923167 w 1132114"/>
+              <a:gd name="connsiteY2" fmla="*/ 4762 h 682171"/>
+              <a:gd name="connsiteX3" fmla="*/ 1132114 w 1132114"/>
+              <a:gd name="connsiteY3" fmla="*/ 227997 h 682171"/>
+              <a:gd name="connsiteX4" fmla="*/ 1132114 w 1132114"/>
+              <a:gd name="connsiteY4" fmla="*/ 568474 h 682171"/>
+              <a:gd name="connsiteX5" fmla="*/ 1018417 w 1132114"/>
+              <a:gd name="connsiteY5" fmla="*/ 682171 h 682171"/>
+              <a:gd name="connsiteX6" fmla="*/ 113697 w 1132114"/>
+              <a:gd name="connsiteY6" fmla="*/ 682171 h 682171"/>
+              <a:gd name="connsiteX7" fmla="*/ 0 w 1132114"/>
+              <a:gd name="connsiteY7" fmla="*/ 568474 h 682171"/>
+              <a:gd name="connsiteX8" fmla="*/ 0 w 1132114"/>
+              <a:gd name="connsiteY8" fmla="*/ 113697 h 682171"/>
+              <a:gd name="connsiteX0" fmla="*/ 0 w 1132114"/>
+              <a:gd name="connsiteY0" fmla="*/ 113697 h 682171"/>
+              <a:gd name="connsiteX1" fmla="*/ 113697 w 1132114"/>
+              <a:gd name="connsiteY1" fmla="*/ 0 h 682171"/>
+              <a:gd name="connsiteX2" fmla="*/ 923167 w 1132114"/>
+              <a:gd name="connsiteY2" fmla="*/ 4762 h 682171"/>
+              <a:gd name="connsiteX3" fmla="*/ 1132114 w 1132114"/>
+              <a:gd name="connsiteY3" fmla="*/ 227997 h 682171"/>
+              <a:gd name="connsiteX4" fmla="*/ 1132114 w 1132114"/>
+              <a:gd name="connsiteY4" fmla="*/ 568474 h 682171"/>
+              <a:gd name="connsiteX5" fmla="*/ 1018417 w 1132114"/>
+              <a:gd name="connsiteY5" fmla="*/ 682171 h 682171"/>
+              <a:gd name="connsiteX6" fmla="*/ 113697 w 1132114"/>
+              <a:gd name="connsiteY6" fmla="*/ 682171 h 682171"/>
+              <a:gd name="connsiteX7" fmla="*/ 0 w 1132114"/>
+              <a:gd name="connsiteY7" fmla="*/ 568474 h 682171"/>
+              <a:gd name="connsiteX8" fmla="*/ 0 w 1132114"/>
+              <a:gd name="connsiteY8" fmla="*/ 113697 h 682171"/>
+              <a:gd name="connsiteX0" fmla="*/ 0 w 1132114"/>
+              <a:gd name="connsiteY0" fmla="*/ 113697 h 682171"/>
+              <a:gd name="connsiteX1" fmla="*/ 113697 w 1132114"/>
+              <a:gd name="connsiteY1" fmla="*/ 0 h 682171"/>
+              <a:gd name="connsiteX2" fmla="*/ 923167 w 1132114"/>
+              <a:gd name="connsiteY2" fmla="*/ 4762 h 682171"/>
+              <a:gd name="connsiteX3" fmla="*/ 1132114 w 1132114"/>
+              <a:gd name="connsiteY3" fmla="*/ 227997 h 682171"/>
+              <a:gd name="connsiteX4" fmla="*/ 1132114 w 1132114"/>
+              <a:gd name="connsiteY4" fmla="*/ 568474 h 682171"/>
+              <a:gd name="connsiteX5" fmla="*/ 1018417 w 1132114"/>
+              <a:gd name="connsiteY5" fmla="*/ 682171 h 682171"/>
+              <a:gd name="connsiteX6" fmla="*/ 113697 w 1132114"/>
+              <a:gd name="connsiteY6" fmla="*/ 682171 h 682171"/>
+              <a:gd name="connsiteX7" fmla="*/ 0 w 1132114"/>
+              <a:gd name="connsiteY7" fmla="*/ 568474 h 682171"/>
+              <a:gd name="connsiteX8" fmla="*/ 0 w 1132114"/>
+              <a:gd name="connsiteY8" fmla="*/ 113697 h 682171"/>
+              <a:gd name="connsiteX0" fmla="*/ 0 w 1132114"/>
+              <a:gd name="connsiteY0" fmla="*/ 113697 h 682171"/>
+              <a:gd name="connsiteX1" fmla="*/ 113697 w 1132114"/>
+              <a:gd name="connsiteY1" fmla="*/ 0 h 682171"/>
+              <a:gd name="connsiteX2" fmla="*/ 923167 w 1132114"/>
+              <a:gd name="connsiteY2" fmla="*/ 4762 h 682171"/>
+              <a:gd name="connsiteX3" fmla="*/ 1132114 w 1132114"/>
+              <a:gd name="connsiteY3" fmla="*/ 227997 h 682171"/>
+              <a:gd name="connsiteX4" fmla="*/ 1132114 w 1132114"/>
+              <a:gd name="connsiteY4" fmla="*/ 568474 h 682171"/>
+              <a:gd name="connsiteX5" fmla="*/ 1018417 w 1132114"/>
+              <a:gd name="connsiteY5" fmla="*/ 682171 h 682171"/>
+              <a:gd name="connsiteX6" fmla="*/ 113697 w 1132114"/>
+              <a:gd name="connsiteY6" fmla="*/ 682171 h 682171"/>
+              <a:gd name="connsiteX7" fmla="*/ 0 w 1132114"/>
+              <a:gd name="connsiteY7" fmla="*/ 568474 h 682171"/>
+              <a:gd name="connsiteX8" fmla="*/ 0 w 1132114"/>
+              <a:gd name="connsiteY8" fmla="*/ 113697 h 682171"/>
+              <a:gd name="connsiteX0" fmla="*/ 0 w 1132114"/>
+              <a:gd name="connsiteY0" fmla="*/ 113697 h 682171"/>
+              <a:gd name="connsiteX1" fmla="*/ 113697 w 1132114"/>
+              <a:gd name="connsiteY1" fmla="*/ 0 h 682171"/>
+              <a:gd name="connsiteX2" fmla="*/ 923167 w 1132114"/>
+              <a:gd name="connsiteY2" fmla="*/ 4762 h 682171"/>
+              <a:gd name="connsiteX3" fmla="*/ 1132114 w 1132114"/>
+              <a:gd name="connsiteY3" fmla="*/ 227997 h 682171"/>
+              <a:gd name="connsiteX4" fmla="*/ 1132114 w 1132114"/>
+              <a:gd name="connsiteY4" fmla="*/ 568474 h 682171"/>
+              <a:gd name="connsiteX5" fmla="*/ 1018417 w 1132114"/>
+              <a:gd name="connsiteY5" fmla="*/ 682171 h 682171"/>
+              <a:gd name="connsiteX6" fmla="*/ 113697 w 1132114"/>
+              <a:gd name="connsiteY6" fmla="*/ 682171 h 682171"/>
+              <a:gd name="connsiteX7" fmla="*/ 0 w 1132114"/>
+              <a:gd name="connsiteY7" fmla="*/ 568474 h 682171"/>
+              <a:gd name="connsiteX8" fmla="*/ 0 w 1132114"/>
+              <a:gd name="connsiteY8" fmla="*/ 113697 h 682171"/>
+              <a:gd name="connsiteX0" fmla="*/ 0 w 1132114"/>
+              <a:gd name="connsiteY0" fmla="*/ 113697 h 682171"/>
+              <a:gd name="connsiteX1" fmla="*/ 113697 w 1132114"/>
+              <a:gd name="connsiteY1" fmla="*/ 0 h 682171"/>
+              <a:gd name="connsiteX2" fmla="*/ 923167 w 1132114"/>
+              <a:gd name="connsiteY2" fmla="*/ 4762 h 682171"/>
+              <a:gd name="connsiteX3" fmla="*/ 1132114 w 1132114"/>
+              <a:gd name="connsiteY3" fmla="*/ 227997 h 682171"/>
+              <a:gd name="connsiteX4" fmla="*/ 1132114 w 1132114"/>
+              <a:gd name="connsiteY4" fmla="*/ 568474 h 682171"/>
+              <a:gd name="connsiteX5" fmla="*/ 1018417 w 1132114"/>
+              <a:gd name="connsiteY5" fmla="*/ 682171 h 682171"/>
+              <a:gd name="connsiteX6" fmla="*/ 113697 w 1132114"/>
+              <a:gd name="connsiteY6" fmla="*/ 682171 h 682171"/>
+              <a:gd name="connsiteX7" fmla="*/ 0 w 1132114"/>
+              <a:gd name="connsiteY7" fmla="*/ 568474 h 682171"/>
+              <a:gd name="connsiteX8" fmla="*/ 0 w 1132114"/>
+              <a:gd name="connsiteY8" fmla="*/ 113697 h 682171"/>
+              <a:gd name="connsiteX0" fmla="*/ 0 w 1132114"/>
+              <a:gd name="connsiteY0" fmla="*/ 113698 h 682172"/>
+              <a:gd name="connsiteX1" fmla="*/ 113697 w 1132114"/>
+              <a:gd name="connsiteY1" fmla="*/ 1 h 682172"/>
+              <a:gd name="connsiteX2" fmla="*/ 804104 w 1132114"/>
+              <a:gd name="connsiteY2" fmla="*/ 0 h 682172"/>
+              <a:gd name="connsiteX3" fmla="*/ 1132114 w 1132114"/>
+              <a:gd name="connsiteY3" fmla="*/ 227998 h 682172"/>
+              <a:gd name="connsiteX4" fmla="*/ 1132114 w 1132114"/>
+              <a:gd name="connsiteY4" fmla="*/ 568475 h 682172"/>
+              <a:gd name="connsiteX5" fmla="*/ 1018417 w 1132114"/>
+              <a:gd name="connsiteY5" fmla="*/ 682172 h 682172"/>
+              <a:gd name="connsiteX6" fmla="*/ 113697 w 1132114"/>
+              <a:gd name="connsiteY6" fmla="*/ 682172 h 682172"/>
+              <a:gd name="connsiteX7" fmla="*/ 0 w 1132114"/>
+              <a:gd name="connsiteY7" fmla="*/ 568475 h 682172"/>
+              <a:gd name="connsiteX8" fmla="*/ 0 w 1132114"/>
+              <a:gd name="connsiteY8" fmla="*/ 113698 h 682172"/>
+              <a:gd name="connsiteX0" fmla="*/ 0 w 1136876"/>
+              <a:gd name="connsiteY0" fmla="*/ 113698 h 682172"/>
+              <a:gd name="connsiteX1" fmla="*/ 113697 w 1136876"/>
+              <a:gd name="connsiteY1" fmla="*/ 1 h 682172"/>
+              <a:gd name="connsiteX2" fmla="*/ 804104 w 1136876"/>
+              <a:gd name="connsiteY2" fmla="*/ 0 h 682172"/>
+              <a:gd name="connsiteX3" fmla="*/ 1136876 w 1136876"/>
+              <a:gd name="connsiteY3" fmla="*/ 332773 h 682172"/>
+              <a:gd name="connsiteX4" fmla="*/ 1132114 w 1136876"/>
+              <a:gd name="connsiteY4" fmla="*/ 568475 h 682172"/>
+              <a:gd name="connsiteX5" fmla="*/ 1018417 w 1136876"/>
+              <a:gd name="connsiteY5" fmla="*/ 682172 h 682172"/>
+              <a:gd name="connsiteX6" fmla="*/ 113697 w 1136876"/>
+              <a:gd name="connsiteY6" fmla="*/ 682172 h 682172"/>
+              <a:gd name="connsiteX7" fmla="*/ 0 w 1136876"/>
+              <a:gd name="connsiteY7" fmla="*/ 568475 h 682172"/>
+              <a:gd name="connsiteX8" fmla="*/ 0 w 1136876"/>
+              <a:gd name="connsiteY8" fmla="*/ 113698 h 682172"/>
+              <a:gd name="connsiteX0" fmla="*/ 0 w 1136876"/>
+              <a:gd name="connsiteY0" fmla="*/ 113698 h 682172"/>
+              <a:gd name="connsiteX1" fmla="*/ 113697 w 1136876"/>
+              <a:gd name="connsiteY1" fmla="*/ 1 h 682172"/>
+              <a:gd name="connsiteX2" fmla="*/ 804104 w 1136876"/>
+              <a:gd name="connsiteY2" fmla="*/ 0 h 682172"/>
+              <a:gd name="connsiteX3" fmla="*/ 1136876 w 1136876"/>
+              <a:gd name="connsiteY3" fmla="*/ 332773 h 682172"/>
+              <a:gd name="connsiteX4" fmla="*/ 1132114 w 1136876"/>
+              <a:gd name="connsiteY4" fmla="*/ 568475 h 682172"/>
+              <a:gd name="connsiteX5" fmla="*/ 1018417 w 1136876"/>
+              <a:gd name="connsiteY5" fmla="*/ 682172 h 682172"/>
+              <a:gd name="connsiteX6" fmla="*/ 113697 w 1136876"/>
+              <a:gd name="connsiteY6" fmla="*/ 682172 h 682172"/>
+              <a:gd name="connsiteX7" fmla="*/ 0 w 1136876"/>
+              <a:gd name="connsiteY7" fmla="*/ 568475 h 682172"/>
+              <a:gd name="connsiteX8" fmla="*/ 0 w 1136876"/>
+              <a:gd name="connsiteY8" fmla="*/ 113698 h 682172"/>
+              <a:gd name="connsiteX0" fmla="*/ 0 w 1136876"/>
+              <a:gd name="connsiteY0" fmla="*/ 118461 h 686935"/>
+              <a:gd name="connsiteX1" fmla="*/ 113697 w 1136876"/>
+              <a:gd name="connsiteY1" fmla="*/ 4764 h 686935"/>
+              <a:gd name="connsiteX2" fmla="*/ 646941 w 1136876"/>
+              <a:gd name="connsiteY2" fmla="*/ 0 h 686935"/>
+              <a:gd name="connsiteX3" fmla="*/ 1136876 w 1136876"/>
+              <a:gd name="connsiteY3" fmla="*/ 337536 h 686935"/>
+              <a:gd name="connsiteX4" fmla="*/ 1132114 w 1136876"/>
+              <a:gd name="connsiteY4" fmla="*/ 573238 h 686935"/>
+              <a:gd name="connsiteX5" fmla="*/ 1018417 w 1136876"/>
+              <a:gd name="connsiteY5" fmla="*/ 686935 h 686935"/>
+              <a:gd name="connsiteX6" fmla="*/ 113697 w 1136876"/>
+              <a:gd name="connsiteY6" fmla="*/ 686935 h 686935"/>
+              <a:gd name="connsiteX7" fmla="*/ 0 w 1136876"/>
+              <a:gd name="connsiteY7" fmla="*/ 573238 h 686935"/>
+              <a:gd name="connsiteX8" fmla="*/ 0 w 1136876"/>
+              <a:gd name="connsiteY8" fmla="*/ 118461 h 686935"/>
+              <a:gd name="connsiteX0" fmla="*/ 0 w 1136876"/>
+              <a:gd name="connsiteY0" fmla="*/ 118461 h 686935"/>
+              <a:gd name="connsiteX1" fmla="*/ 113697 w 1136876"/>
+              <a:gd name="connsiteY1" fmla="*/ 4764 h 686935"/>
+              <a:gd name="connsiteX2" fmla="*/ 646941 w 1136876"/>
+              <a:gd name="connsiteY2" fmla="*/ 0 h 686935"/>
+              <a:gd name="connsiteX3" fmla="*/ 1136876 w 1136876"/>
+              <a:gd name="connsiteY3" fmla="*/ 337536 h 686935"/>
+              <a:gd name="connsiteX4" fmla="*/ 1132114 w 1136876"/>
+              <a:gd name="connsiteY4" fmla="*/ 573238 h 686935"/>
+              <a:gd name="connsiteX5" fmla="*/ 1018417 w 1136876"/>
+              <a:gd name="connsiteY5" fmla="*/ 686935 h 686935"/>
+              <a:gd name="connsiteX6" fmla="*/ 113697 w 1136876"/>
+              <a:gd name="connsiteY6" fmla="*/ 686935 h 686935"/>
+              <a:gd name="connsiteX7" fmla="*/ 0 w 1136876"/>
+              <a:gd name="connsiteY7" fmla="*/ 573238 h 686935"/>
+              <a:gd name="connsiteX8" fmla="*/ 0 w 1136876"/>
+              <a:gd name="connsiteY8" fmla="*/ 118461 h 686935"/>
+              <a:gd name="connsiteX0" fmla="*/ 0 w 1136876"/>
+              <a:gd name="connsiteY0" fmla="*/ 118461 h 686935"/>
+              <a:gd name="connsiteX1" fmla="*/ 113697 w 1136876"/>
+              <a:gd name="connsiteY1" fmla="*/ 4764 h 686935"/>
+              <a:gd name="connsiteX2" fmla="*/ 646941 w 1136876"/>
+              <a:gd name="connsiteY2" fmla="*/ 0 h 686935"/>
+              <a:gd name="connsiteX3" fmla="*/ 1136876 w 1136876"/>
+              <a:gd name="connsiteY3" fmla="*/ 337536 h 686935"/>
+              <a:gd name="connsiteX4" fmla="*/ 1132114 w 1136876"/>
+              <a:gd name="connsiteY4" fmla="*/ 573238 h 686935"/>
+              <a:gd name="connsiteX5" fmla="*/ 1018417 w 1136876"/>
+              <a:gd name="connsiteY5" fmla="*/ 686935 h 686935"/>
+              <a:gd name="connsiteX6" fmla="*/ 113697 w 1136876"/>
+              <a:gd name="connsiteY6" fmla="*/ 686935 h 686935"/>
+              <a:gd name="connsiteX7" fmla="*/ 0 w 1136876"/>
+              <a:gd name="connsiteY7" fmla="*/ 573238 h 686935"/>
+              <a:gd name="connsiteX8" fmla="*/ 0 w 1136876"/>
+              <a:gd name="connsiteY8" fmla="*/ 118461 h 686935"/>
+              <a:gd name="connsiteX0" fmla="*/ 0 w 1136876"/>
+              <a:gd name="connsiteY0" fmla="*/ 118461 h 686935"/>
+              <a:gd name="connsiteX1" fmla="*/ 113697 w 1136876"/>
+              <a:gd name="connsiteY1" fmla="*/ 4764 h 686935"/>
+              <a:gd name="connsiteX2" fmla="*/ 646941 w 1136876"/>
+              <a:gd name="connsiteY2" fmla="*/ 0 h 686935"/>
+              <a:gd name="connsiteX3" fmla="*/ 1136876 w 1136876"/>
+              <a:gd name="connsiteY3" fmla="*/ 337536 h 686935"/>
+              <a:gd name="connsiteX4" fmla="*/ 1132114 w 1136876"/>
+              <a:gd name="connsiteY4" fmla="*/ 573238 h 686935"/>
+              <a:gd name="connsiteX5" fmla="*/ 1018417 w 1136876"/>
+              <a:gd name="connsiteY5" fmla="*/ 686935 h 686935"/>
+              <a:gd name="connsiteX6" fmla="*/ 113697 w 1136876"/>
+              <a:gd name="connsiteY6" fmla="*/ 686935 h 686935"/>
+              <a:gd name="connsiteX7" fmla="*/ 0 w 1136876"/>
+              <a:gd name="connsiteY7" fmla="*/ 573238 h 686935"/>
+              <a:gd name="connsiteX8" fmla="*/ 0 w 1136876"/>
+              <a:gd name="connsiteY8" fmla="*/ 118461 h 686935"/>
+              <a:gd name="connsiteX0" fmla="*/ 0 w 1136876"/>
+              <a:gd name="connsiteY0" fmla="*/ 118465 h 686939"/>
+              <a:gd name="connsiteX1" fmla="*/ 113697 w 1136876"/>
+              <a:gd name="connsiteY1" fmla="*/ 4768 h 686939"/>
+              <a:gd name="connsiteX2" fmla="*/ 646941 w 1136876"/>
+              <a:gd name="connsiteY2" fmla="*/ 4 h 686939"/>
+              <a:gd name="connsiteX3" fmla="*/ 1136876 w 1136876"/>
+              <a:gd name="connsiteY3" fmla="*/ 337540 h 686939"/>
+              <a:gd name="connsiteX4" fmla="*/ 1132114 w 1136876"/>
+              <a:gd name="connsiteY4" fmla="*/ 573242 h 686939"/>
+              <a:gd name="connsiteX5" fmla="*/ 1018417 w 1136876"/>
+              <a:gd name="connsiteY5" fmla="*/ 686939 h 686939"/>
+              <a:gd name="connsiteX6" fmla="*/ 113697 w 1136876"/>
+              <a:gd name="connsiteY6" fmla="*/ 686939 h 686939"/>
+              <a:gd name="connsiteX7" fmla="*/ 0 w 1136876"/>
+              <a:gd name="connsiteY7" fmla="*/ 573242 h 686939"/>
+              <a:gd name="connsiteX8" fmla="*/ 0 w 1136876"/>
+              <a:gd name="connsiteY8" fmla="*/ 118465 h 686939"/>
+              <a:gd name="connsiteX0" fmla="*/ 0 w 1136876"/>
+              <a:gd name="connsiteY0" fmla="*/ 118466 h 686940"/>
+              <a:gd name="connsiteX1" fmla="*/ 113697 w 1136876"/>
+              <a:gd name="connsiteY1" fmla="*/ 4769 h 686940"/>
+              <a:gd name="connsiteX2" fmla="*/ 646941 w 1136876"/>
+              <a:gd name="connsiteY2" fmla="*/ 5 h 686940"/>
+              <a:gd name="connsiteX3" fmla="*/ 1136876 w 1136876"/>
+              <a:gd name="connsiteY3" fmla="*/ 337541 h 686940"/>
+              <a:gd name="connsiteX4" fmla="*/ 1132114 w 1136876"/>
+              <a:gd name="connsiteY4" fmla="*/ 573243 h 686940"/>
+              <a:gd name="connsiteX5" fmla="*/ 1018417 w 1136876"/>
+              <a:gd name="connsiteY5" fmla="*/ 686940 h 686940"/>
+              <a:gd name="connsiteX6" fmla="*/ 113697 w 1136876"/>
+              <a:gd name="connsiteY6" fmla="*/ 686940 h 686940"/>
+              <a:gd name="connsiteX7" fmla="*/ 0 w 1136876"/>
+              <a:gd name="connsiteY7" fmla="*/ 573243 h 686940"/>
+              <a:gd name="connsiteX8" fmla="*/ 0 w 1136876"/>
+              <a:gd name="connsiteY8" fmla="*/ 118466 h 686940"/>
+              <a:gd name="connsiteX0" fmla="*/ 0 w 1136876"/>
+              <a:gd name="connsiteY0" fmla="*/ 118466 h 686940"/>
+              <a:gd name="connsiteX1" fmla="*/ 113697 w 1136876"/>
+              <a:gd name="connsiteY1" fmla="*/ 4769 h 686940"/>
+              <a:gd name="connsiteX2" fmla="*/ 646941 w 1136876"/>
+              <a:gd name="connsiteY2" fmla="*/ 5 h 686940"/>
+              <a:gd name="connsiteX3" fmla="*/ 1136876 w 1136876"/>
+              <a:gd name="connsiteY3" fmla="*/ 337541 h 686940"/>
+              <a:gd name="connsiteX4" fmla="*/ 1132114 w 1136876"/>
+              <a:gd name="connsiteY4" fmla="*/ 573243 h 686940"/>
+              <a:gd name="connsiteX5" fmla="*/ 1018417 w 1136876"/>
+              <a:gd name="connsiteY5" fmla="*/ 686940 h 686940"/>
+              <a:gd name="connsiteX6" fmla="*/ 113697 w 1136876"/>
+              <a:gd name="connsiteY6" fmla="*/ 686940 h 686940"/>
+              <a:gd name="connsiteX7" fmla="*/ 0 w 1136876"/>
+              <a:gd name="connsiteY7" fmla="*/ 573244 h 686940"/>
+              <a:gd name="connsiteX8" fmla="*/ 0 w 1136876"/>
+              <a:gd name="connsiteY8" fmla="*/ 118466 h 686940"/>
+              <a:gd name="connsiteX0" fmla="*/ 1797 w 1138673"/>
+              <a:gd name="connsiteY0" fmla="*/ 118466 h 691666"/>
+              <a:gd name="connsiteX1" fmla="*/ 115494 w 1138673"/>
+              <a:gd name="connsiteY1" fmla="*/ 4769 h 691666"/>
+              <a:gd name="connsiteX2" fmla="*/ 648738 w 1138673"/>
+              <a:gd name="connsiteY2" fmla="*/ 5 h 691666"/>
+              <a:gd name="connsiteX3" fmla="*/ 1138673 w 1138673"/>
+              <a:gd name="connsiteY3" fmla="*/ 337541 h 691666"/>
+              <a:gd name="connsiteX4" fmla="*/ 1133911 w 1138673"/>
+              <a:gd name="connsiteY4" fmla="*/ 573243 h 691666"/>
+              <a:gd name="connsiteX5" fmla="*/ 1020214 w 1138673"/>
+              <a:gd name="connsiteY5" fmla="*/ 686940 h 691666"/>
+              <a:gd name="connsiteX6" fmla="*/ 115494 w 1138673"/>
+              <a:gd name="connsiteY6" fmla="*/ 686940 h 691666"/>
+              <a:gd name="connsiteX7" fmla="*/ 1797 w 1138673"/>
+              <a:gd name="connsiteY7" fmla="*/ 573244 h 691666"/>
+              <a:gd name="connsiteX8" fmla="*/ 1797 w 1138673"/>
+              <a:gd name="connsiteY8" fmla="*/ 118466 h 691666"/>
+              <a:gd name="connsiteX0" fmla="*/ 1797 w 1138673"/>
+              <a:gd name="connsiteY0" fmla="*/ 118462 h 691662"/>
+              <a:gd name="connsiteX1" fmla="*/ 115494 w 1138673"/>
+              <a:gd name="connsiteY1" fmla="*/ 4765 h 691662"/>
+              <a:gd name="connsiteX2" fmla="*/ 648738 w 1138673"/>
+              <a:gd name="connsiteY2" fmla="*/ 1 h 691662"/>
+              <a:gd name="connsiteX3" fmla="*/ 1138673 w 1138673"/>
+              <a:gd name="connsiteY3" fmla="*/ 337537 h 691662"/>
+              <a:gd name="connsiteX4" fmla="*/ 1133911 w 1138673"/>
+              <a:gd name="connsiteY4" fmla="*/ 573239 h 691662"/>
+              <a:gd name="connsiteX5" fmla="*/ 1020214 w 1138673"/>
+              <a:gd name="connsiteY5" fmla="*/ 686936 h 691662"/>
+              <a:gd name="connsiteX6" fmla="*/ 115494 w 1138673"/>
+              <a:gd name="connsiteY6" fmla="*/ 686936 h 691662"/>
+              <a:gd name="connsiteX7" fmla="*/ 1797 w 1138673"/>
+              <a:gd name="connsiteY7" fmla="*/ 573240 h 691662"/>
+              <a:gd name="connsiteX8" fmla="*/ 1797 w 1138673"/>
+              <a:gd name="connsiteY8" fmla="*/ 118462 h 691662"/>
+              <a:gd name="connsiteX0" fmla="*/ 1797 w 1138673"/>
+              <a:gd name="connsiteY0" fmla="*/ 118461 h 691661"/>
+              <a:gd name="connsiteX1" fmla="*/ 115494 w 1138673"/>
+              <a:gd name="connsiteY1" fmla="*/ 4764 h 691661"/>
+              <a:gd name="connsiteX2" fmla="*/ 648738 w 1138673"/>
+              <a:gd name="connsiteY2" fmla="*/ 0 h 691661"/>
+              <a:gd name="connsiteX3" fmla="*/ 1138673 w 1138673"/>
+              <a:gd name="connsiteY3" fmla="*/ 337536 h 691661"/>
+              <a:gd name="connsiteX4" fmla="*/ 1133911 w 1138673"/>
+              <a:gd name="connsiteY4" fmla="*/ 573238 h 691661"/>
+              <a:gd name="connsiteX5" fmla="*/ 1020214 w 1138673"/>
+              <a:gd name="connsiteY5" fmla="*/ 686935 h 691661"/>
+              <a:gd name="connsiteX6" fmla="*/ 115494 w 1138673"/>
+              <a:gd name="connsiteY6" fmla="*/ 686935 h 691661"/>
+              <a:gd name="connsiteX7" fmla="*/ 1797 w 1138673"/>
+              <a:gd name="connsiteY7" fmla="*/ 573239 h 691661"/>
+              <a:gd name="connsiteX8" fmla="*/ 1797 w 1138673"/>
+              <a:gd name="connsiteY8" fmla="*/ 118461 h 691661"/>
+              <a:gd name="connsiteX0" fmla="*/ 1797 w 1138673"/>
+              <a:gd name="connsiteY0" fmla="*/ 118461 h 691661"/>
+              <a:gd name="connsiteX1" fmla="*/ 115494 w 1138673"/>
+              <a:gd name="connsiteY1" fmla="*/ 4764 h 691661"/>
+              <a:gd name="connsiteX2" fmla="*/ 648738 w 1138673"/>
+              <a:gd name="connsiteY2" fmla="*/ 0 h 691661"/>
+              <a:gd name="connsiteX3" fmla="*/ 1138673 w 1138673"/>
+              <a:gd name="connsiteY3" fmla="*/ 337536 h 691661"/>
+              <a:gd name="connsiteX4" fmla="*/ 1133911 w 1138673"/>
+              <a:gd name="connsiteY4" fmla="*/ 573238 h 691661"/>
+              <a:gd name="connsiteX5" fmla="*/ 1020214 w 1138673"/>
+              <a:gd name="connsiteY5" fmla="*/ 686935 h 691661"/>
+              <a:gd name="connsiteX6" fmla="*/ 115494 w 1138673"/>
+              <a:gd name="connsiteY6" fmla="*/ 686935 h 691661"/>
+              <a:gd name="connsiteX7" fmla="*/ 1797 w 1138673"/>
+              <a:gd name="connsiteY7" fmla="*/ 573239 h 691661"/>
+              <a:gd name="connsiteX8" fmla="*/ 1797 w 1138673"/>
+              <a:gd name="connsiteY8" fmla="*/ 118461 h 691661"/>
+              <a:gd name="connsiteX0" fmla="*/ 1797 w 1138673"/>
+              <a:gd name="connsiteY0" fmla="*/ 118461 h 691661"/>
+              <a:gd name="connsiteX1" fmla="*/ 115494 w 1138673"/>
+              <a:gd name="connsiteY1" fmla="*/ 4764 h 691661"/>
+              <a:gd name="connsiteX2" fmla="*/ 648738 w 1138673"/>
+              <a:gd name="connsiteY2" fmla="*/ 0 h 691661"/>
+              <a:gd name="connsiteX3" fmla="*/ 1138673 w 1138673"/>
+              <a:gd name="connsiteY3" fmla="*/ 337536 h 691661"/>
+              <a:gd name="connsiteX4" fmla="*/ 1133911 w 1138673"/>
+              <a:gd name="connsiteY4" fmla="*/ 573238 h 691661"/>
+              <a:gd name="connsiteX5" fmla="*/ 1020214 w 1138673"/>
+              <a:gd name="connsiteY5" fmla="*/ 686935 h 691661"/>
+              <a:gd name="connsiteX6" fmla="*/ 115494 w 1138673"/>
+              <a:gd name="connsiteY6" fmla="*/ 686935 h 691661"/>
+              <a:gd name="connsiteX7" fmla="*/ 1797 w 1138673"/>
+              <a:gd name="connsiteY7" fmla="*/ 573239 h 691661"/>
+              <a:gd name="connsiteX8" fmla="*/ 1797 w 1138673"/>
+              <a:gd name="connsiteY8" fmla="*/ 118461 h 691661"/>
+              <a:gd name="connsiteX0" fmla="*/ 1797 w 1138673"/>
+              <a:gd name="connsiteY0" fmla="*/ 118461 h 691661"/>
+              <a:gd name="connsiteX1" fmla="*/ 115494 w 1138673"/>
+              <a:gd name="connsiteY1" fmla="*/ 4764 h 691661"/>
+              <a:gd name="connsiteX2" fmla="*/ 648738 w 1138673"/>
+              <a:gd name="connsiteY2" fmla="*/ 0 h 691661"/>
+              <a:gd name="connsiteX3" fmla="*/ 1138673 w 1138673"/>
+              <a:gd name="connsiteY3" fmla="*/ 337536 h 691661"/>
+              <a:gd name="connsiteX4" fmla="*/ 1133911 w 1138673"/>
+              <a:gd name="connsiteY4" fmla="*/ 573238 h 691661"/>
+              <a:gd name="connsiteX5" fmla="*/ 1020214 w 1138673"/>
+              <a:gd name="connsiteY5" fmla="*/ 686935 h 691661"/>
+              <a:gd name="connsiteX6" fmla="*/ 115494 w 1138673"/>
+              <a:gd name="connsiteY6" fmla="*/ 686935 h 691661"/>
+              <a:gd name="connsiteX7" fmla="*/ 1797 w 1138673"/>
+              <a:gd name="connsiteY7" fmla="*/ 573239 h 691661"/>
+              <a:gd name="connsiteX8" fmla="*/ 1797 w 1138673"/>
+              <a:gd name="connsiteY8" fmla="*/ 118461 h 691661"/>
+              <a:gd name="connsiteX0" fmla="*/ 1797 w 1138673"/>
+              <a:gd name="connsiteY0" fmla="*/ 118461 h 691661"/>
+              <a:gd name="connsiteX1" fmla="*/ 115494 w 1138673"/>
+              <a:gd name="connsiteY1" fmla="*/ 4764 h 691661"/>
+              <a:gd name="connsiteX2" fmla="*/ 648738 w 1138673"/>
+              <a:gd name="connsiteY2" fmla="*/ 0 h 691661"/>
+              <a:gd name="connsiteX3" fmla="*/ 1138673 w 1138673"/>
+              <a:gd name="connsiteY3" fmla="*/ 337536 h 691661"/>
+              <a:gd name="connsiteX4" fmla="*/ 1133911 w 1138673"/>
+              <a:gd name="connsiteY4" fmla="*/ 573238 h 691661"/>
+              <a:gd name="connsiteX5" fmla="*/ 1020214 w 1138673"/>
+              <a:gd name="connsiteY5" fmla="*/ 686935 h 691661"/>
+              <a:gd name="connsiteX6" fmla="*/ 115494 w 1138673"/>
+              <a:gd name="connsiteY6" fmla="*/ 686935 h 691661"/>
+              <a:gd name="connsiteX7" fmla="*/ 1797 w 1138673"/>
+              <a:gd name="connsiteY7" fmla="*/ 573239 h 691661"/>
+              <a:gd name="connsiteX8" fmla="*/ 1797 w 1138673"/>
+              <a:gd name="connsiteY8" fmla="*/ 118461 h 691661"/>
+              <a:gd name="connsiteX0" fmla="*/ 1797 w 1138673"/>
+              <a:gd name="connsiteY0" fmla="*/ 118461 h 691661"/>
+              <a:gd name="connsiteX1" fmla="*/ 115494 w 1138673"/>
+              <a:gd name="connsiteY1" fmla="*/ 4764 h 691661"/>
+              <a:gd name="connsiteX2" fmla="*/ 648738 w 1138673"/>
+              <a:gd name="connsiteY2" fmla="*/ 0 h 691661"/>
+              <a:gd name="connsiteX3" fmla="*/ 1138673 w 1138673"/>
+              <a:gd name="connsiteY3" fmla="*/ 337536 h 691661"/>
+              <a:gd name="connsiteX4" fmla="*/ 1133911 w 1138673"/>
+              <a:gd name="connsiteY4" fmla="*/ 573238 h 691661"/>
+              <a:gd name="connsiteX5" fmla="*/ 1020214 w 1138673"/>
+              <a:gd name="connsiteY5" fmla="*/ 686935 h 691661"/>
+              <a:gd name="connsiteX6" fmla="*/ 115494 w 1138673"/>
+              <a:gd name="connsiteY6" fmla="*/ 686935 h 691661"/>
+              <a:gd name="connsiteX7" fmla="*/ 1797 w 1138673"/>
+              <a:gd name="connsiteY7" fmla="*/ 573239 h 691661"/>
+              <a:gd name="connsiteX8" fmla="*/ 1797 w 1138673"/>
+              <a:gd name="connsiteY8" fmla="*/ 118461 h 691661"/>
+              <a:gd name="connsiteX0" fmla="*/ 1797 w 1138673"/>
+              <a:gd name="connsiteY0" fmla="*/ 118461 h 691661"/>
+              <a:gd name="connsiteX1" fmla="*/ 115494 w 1138673"/>
+              <a:gd name="connsiteY1" fmla="*/ 4764 h 691661"/>
+              <a:gd name="connsiteX2" fmla="*/ 826875 w 1138673"/>
+              <a:gd name="connsiteY2" fmla="*/ 0 h 691661"/>
+              <a:gd name="connsiteX3" fmla="*/ 1138673 w 1138673"/>
+              <a:gd name="connsiteY3" fmla="*/ 337536 h 691661"/>
+              <a:gd name="connsiteX4" fmla="*/ 1133911 w 1138673"/>
+              <a:gd name="connsiteY4" fmla="*/ 573238 h 691661"/>
+              <a:gd name="connsiteX5" fmla="*/ 1020214 w 1138673"/>
+              <a:gd name="connsiteY5" fmla="*/ 686935 h 691661"/>
+              <a:gd name="connsiteX6" fmla="*/ 115494 w 1138673"/>
+              <a:gd name="connsiteY6" fmla="*/ 686935 h 691661"/>
+              <a:gd name="connsiteX7" fmla="*/ 1797 w 1138673"/>
+              <a:gd name="connsiteY7" fmla="*/ 573239 h 691661"/>
+              <a:gd name="connsiteX8" fmla="*/ 1797 w 1138673"/>
+              <a:gd name="connsiteY8" fmla="*/ 118461 h 691661"/>
+              <a:gd name="connsiteX0" fmla="*/ 1797 w 1138673"/>
+              <a:gd name="connsiteY0" fmla="*/ 118461 h 691661"/>
+              <a:gd name="connsiteX1" fmla="*/ 115494 w 1138673"/>
+              <a:gd name="connsiteY1" fmla="*/ 4764 h 691661"/>
+              <a:gd name="connsiteX2" fmla="*/ 826875 w 1138673"/>
+              <a:gd name="connsiteY2" fmla="*/ 0 h 691661"/>
+              <a:gd name="connsiteX3" fmla="*/ 1138673 w 1138673"/>
+              <a:gd name="connsiteY3" fmla="*/ 337536 h 691661"/>
+              <a:gd name="connsiteX4" fmla="*/ 1133911 w 1138673"/>
+              <a:gd name="connsiteY4" fmla="*/ 573238 h 691661"/>
+              <a:gd name="connsiteX5" fmla="*/ 1020214 w 1138673"/>
+              <a:gd name="connsiteY5" fmla="*/ 686935 h 691661"/>
+              <a:gd name="connsiteX6" fmla="*/ 115494 w 1138673"/>
+              <a:gd name="connsiteY6" fmla="*/ 686935 h 691661"/>
+              <a:gd name="connsiteX7" fmla="*/ 1797 w 1138673"/>
+              <a:gd name="connsiteY7" fmla="*/ 573239 h 691661"/>
+              <a:gd name="connsiteX8" fmla="*/ 1797 w 1138673"/>
+              <a:gd name="connsiteY8" fmla="*/ 118461 h 691661"/>
+              <a:gd name="connsiteX0" fmla="*/ 1797 w 1138673"/>
+              <a:gd name="connsiteY0" fmla="*/ 118461 h 691661"/>
+              <a:gd name="connsiteX1" fmla="*/ 115494 w 1138673"/>
+              <a:gd name="connsiteY1" fmla="*/ 4764 h 691661"/>
+              <a:gd name="connsiteX2" fmla="*/ 826875 w 1138673"/>
+              <a:gd name="connsiteY2" fmla="*/ 0 h 691661"/>
+              <a:gd name="connsiteX3" fmla="*/ 1138673 w 1138673"/>
+              <a:gd name="connsiteY3" fmla="*/ 337536 h 691661"/>
+              <a:gd name="connsiteX4" fmla="*/ 1133911 w 1138673"/>
+              <a:gd name="connsiteY4" fmla="*/ 573238 h 691661"/>
+              <a:gd name="connsiteX5" fmla="*/ 1020214 w 1138673"/>
+              <a:gd name="connsiteY5" fmla="*/ 686935 h 691661"/>
+              <a:gd name="connsiteX6" fmla="*/ 115494 w 1138673"/>
+              <a:gd name="connsiteY6" fmla="*/ 686935 h 691661"/>
+              <a:gd name="connsiteX7" fmla="*/ 1797 w 1138673"/>
+              <a:gd name="connsiteY7" fmla="*/ 573239 h 691661"/>
+              <a:gd name="connsiteX8" fmla="*/ 1797 w 1138673"/>
+              <a:gd name="connsiteY8" fmla="*/ 118461 h 691661"/>
+              <a:gd name="connsiteX0" fmla="*/ 1797 w 1138673"/>
+              <a:gd name="connsiteY0" fmla="*/ 118461 h 691661"/>
+              <a:gd name="connsiteX1" fmla="*/ 115494 w 1138673"/>
+              <a:gd name="connsiteY1" fmla="*/ 4764 h 691661"/>
+              <a:gd name="connsiteX2" fmla="*/ 826875 w 1138673"/>
+              <a:gd name="connsiteY2" fmla="*/ 0 h 691661"/>
+              <a:gd name="connsiteX3" fmla="*/ 1138673 w 1138673"/>
+              <a:gd name="connsiteY3" fmla="*/ 337536 h 691661"/>
+              <a:gd name="connsiteX4" fmla="*/ 1133911 w 1138673"/>
+              <a:gd name="connsiteY4" fmla="*/ 573238 h 691661"/>
+              <a:gd name="connsiteX5" fmla="*/ 1020214 w 1138673"/>
+              <a:gd name="connsiteY5" fmla="*/ 686935 h 691661"/>
+              <a:gd name="connsiteX6" fmla="*/ 115494 w 1138673"/>
+              <a:gd name="connsiteY6" fmla="*/ 686935 h 691661"/>
+              <a:gd name="connsiteX7" fmla="*/ 1797 w 1138673"/>
+              <a:gd name="connsiteY7" fmla="*/ 573239 h 691661"/>
+              <a:gd name="connsiteX8" fmla="*/ 1797 w 1138673"/>
+              <a:gd name="connsiteY8" fmla="*/ 118461 h 691661"/>
+            </a:gdLst>
+            <a:ahLst/>
+            <a:cxnLst>
+              <a:cxn ang="0">
+                <a:pos x="connsiteX0" y="connsiteY0"/>
+              </a:cxn>
+              <a:cxn ang="0">
+                <a:pos x="connsiteX1" y="connsiteY1"/>
+              </a:cxn>
+              <a:cxn ang="0">
+                <a:pos x="connsiteX2" y="connsiteY2"/>
+              </a:cxn>
+              <a:cxn ang="0">
+                <a:pos x="connsiteX3" y="connsiteY3"/>
+              </a:cxn>
+              <a:cxn ang="0">
+                <a:pos x="connsiteX4" y="connsiteY4"/>
+              </a:cxn>
+              <a:cxn ang="0">
+                <a:pos x="connsiteX5" y="connsiteY5"/>
+              </a:cxn>
+              <a:cxn ang="0">
+                <a:pos x="connsiteX6" y="connsiteY6"/>
+              </a:cxn>
+              <a:cxn ang="0">
+                <a:pos x="connsiteX7" y="connsiteY7"/>
+              </a:cxn>
+              <a:cxn ang="0">
+                <a:pos x="connsiteX8" y="connsiteY8"/>
+              </a:cxn>
+            </a:cxnLst>
+            <a:rect l="l" t="t" r="r" b="b"/>
+            <a:pathLst>
+              <a:path w="1138673" h="691661">
+                <a:moveTo>
+                  <a:pt x="1797" y="118461"/>
+                </a:moveTo>
+                <a:cubicBezTo>
+                  <a:pt x="1797" y="55668"/>
+                  <a:pt x="52701" y="4764"/>
+                  <a:pt x="115494" y="4764"/>
+                </a:cubicBezTo>
+                <a:lnTo>
+                  <a:pt x="826875" y="0"/>
+                </a:lnTo>
+                <a:cubicBezTo>
+                  <a:pt x="1006399" y="10834"/>
+                  <a:pt x="892773" y="279869"/>
+                  <a:pt x="1138673" y="337536"/>
+                </a:cubicBezTo>
+                <a:cubicBezTo>
+                  <a:pt x="1137086" y="416103"/>
+                  <a:pt x="1135498" y="494671"/>
+                  <a:pt x="1133911" y="573238"/>
+                </a:cubicBezTo>
+                <a:cubicBezTo>
+                  <a:pt x="1133911" y="684602"/>
+                  <a:pt x="1123340" y="686935"/>
+                  <a:pt x="1020214" y="686935"/>
+                </a:cubicBezTo>
+                <a:lnTo>
+                  <a:pt x="115494" y="686935"/>
+                </a:lnTo>
+                <a:cubicBezTo>
+                  <a:pt x="52701" y="686935"/>
+                  <a:pt x="-11647" y="727102"/>
+                  <a:pt x="1797" y="573239"/>
+                </a:cubicBezTo>
+                <a:lnTo>
+                  <a:pt x="1797" y="118461"/>
+                </a:lnTo>
+                <a:close/>
+              </a:path>
+            </a:pathLst>
+          </a:custGeom>
+          <a:solidFill>
+            <a:schemeClr val="accent1">
+              <a:lumMod val="60000"/>
+              <a:lumOff val="40000"/>
+              <a:alpha val="32000"/>
+            </a:schemeClr>
+          </a:solidFill>
+          <a:ln>
+            <a:noFill/>
+          </a:ln>
+        </p:spPr>
+        <p:style>
+          <a:lnRef idx="2">
+            <a:schemeClr val="accent1">
+              <a:shade val="50000"/>
+            </a:schemeClr>
+          </a:lnRef>
+          <a:fillRef idx="1">
+            <a:schemeClr val="accent1"/>
+          </a:fillRef>
+          <a:effectRef idx="0">
+            <a:schemeClr val="accent1"/>
+          </a:effectRef>
+          <a:fontRef idx="minor">
+            <a:schemeClr val="lt1"/>
+          </a:fontRef>
+        </p:style>
+        <p:txBody>
+          <a:bodyPr rtlCol="0" anchor="ctr"/>
+          <a:lstStyle/>
+          <a:p>
+            <a:pPr algn="ctr"/>
+            <a:endParaRPr lang="en-US"/>
+          </a:p>
+        </p:txBody>
+      </p:sp>
+      <p:sp>
+        <p:nvSpPr>
+          <p:cNvPr id="36" name="Flowchart: Collate 35"/>
+          <p:cNvSpPr/>
+          <p:nvPr/>
+        </p:nvSpPr>
+        <p:spPr>
+          <a:xfrm>
+            <a:off x="6838139" y="5975900"/>
+            <a:ext cx="314317" cy="283741"/>
+          </a:xfrm>
+          <a:prstGeom prst="flowChartCollate">
+            <a:avLst/>
+          </a:prstGeom>
+          <a:noFill/>
+        </p:spPr>
+        <p:style>
+          <a:lnRef idx="2">
+            <a:schemeClr val="accent1">
+              <a:shade val="50000"/>
+            </a:schemeClr>
+          </a:lnRef>
+          <a:fillRef idx="1">
+            <a:schemeClr val="accent1"/>
+          </a:fillRef>
+          <a:effectRef idx="0">
+            <a:schemeClr val="accent1"/>
+          </a:effectRef>
+          <a:fontRef idx="minor">
+            <a:schemeClr val="lt1"/>
+          </a:fontRef>
+        </p:style>
+        <p:txBody>
+          <a:bodyPr rtlCol="0" anchor="ctr"/>
+          <a:lstStyle/>
+          <a:p>
+            <a:pPr algn="ctr"/>
+            <a:endParaRPr lang="en-US">
+              <a:solidFill>
+                <a:schemeClr val="tx1"/>
+              </a:solidFill>
+            </a:endParaRPr>
+          </a:p>
+        </p:txBody>
+      </p:sp>
+      <p:sp>
+        <p:nvSpPr>
+          <p:cNvPr id="37" name="Action Button: Information 36">
+            <a:hlinkClick r:id="" action="ppaction://noaction" highlightClick="1"/>
+          </p:cNvPr>
+          <p:cNvSpPr/>
+          <p:nvPr/>
+        </p:nvSpPr>
+        <p:spPr>
+          <a:xfrm>
+            <a:off x="7323915" y="5975900"/>
+            <a:ext cx="329609" cy="283741"/>
+          </a:xfrm>
+          <a:prstGeom prst="actionButtonInformation">
+            <a:avLst/>
+          </a:prstGeom>
+          <a:noFill/>
+        </p:spPr>
+        <p:style>
+          <a:lnRef idx="2">
+            <a:schemeClr val="accent1">
+              <a:shade val="50000"/>
+            </a:schemeClr>
+          </a:lnRef>
+          <a:fillRef idx="1">
+            <a:schemeClr val="accent1"/>
+          </a:fillRef>
+          <a:effectRef idx="0">
+            <a:schemeClr val="accent1"/>
+          </a:effectRef>
+          <a:fontRef idx="minor">
+            <a:schemeClr val="lt1"/>
+          </a:fontRef>
+        </p:style>
+        <p:txBody>
+          <a:bodyPr rtlCol="0" anchor="ctr"/>
+          <a:lstStyle/>
+          <a:p>
+            <a:pPr algn="ctr"/>
+            <a:endParaRPr lang="en-US"/>
+          </a:p>
+        </p:txBody>
+      </p:sp>
+      <p:sp>
+        <p:nvSpPr>
+          <p:cNvPr id="42" name="TextBox 41"/>
+          <p:cNvSpPr txBox="1"/>
+          <p:nvPr/>
+        </p:nvSpPr>
+        <p:spPr>
+          <a:xfrm>
+            <a:off x="5546904" y="521494"/>
+            <a:ext cx="1626782" cy="369332"/>
+          </a:xfrm>
+          <a:prstGeom prst="rect">
+            <a:avLst/>
+          </a:prstGeom>
+          <a:noFill/>
+        </p:spPr>
+        <p:txBody>
+          <a:bodyPr wrap="square" rtlCol="0">
+            <a:spAutoFit/>
+          </a:bodyPr>
+          <a:lstStyle/>
+          <a:p>
+            <a:r>
+              <a:rPr lang="en-US" smtClean="0">
+                <a:solidFill>
+                  <a:schemeClr val="accent1"/>
+                </a:solidFill>
+              </a:rPr>
+              <a:t>Information</a:t>
+            </a:r>
+            <a:endParaRPr lang="en-US">
+              <a:solidFill>
+                <a:schemeClr val="accent1"/>
+              </a:solidFill>
+            </a:endParaRPr>
+          </a:p>
+        </p:txBody>
+      </p:sp>
+      <p:sp>
+        <p:nvSpPr>
+          <p:cNvPr id="17" name="Oval 16"/>
+          <p:cNvSpPr/>
+          <p:nvPr/>
+        </p:nvSpPr>
+        <p:spPr>
+          <a:xfrm>
+            <a:off x="6223007" y="5659293"/>
+            <a:ext cx="462525" cy="441971"/>
+          </a:xfrm>
+          <a:prstGeom prst="ellipse">
+            <a:avLst/>
+          </a:prstGeom>
+          <a:solidFill>
+            <a:schemeClr val="accent1">
+              <a:lumMod val="75000"/>
+            </a:schemeClr>
+          </a:solidFill>
+          <a:ln>
+            <a:noFill/>
+          </a:ln>
+        </p:spPr>
+        <p:style>
+          <a:lnRef idx="2">
+            <a:schemeClr val="accent1">
+              <a:shade val="50000"/>
+            </a:schemeClr>
+          </a:lnRef>
+          <a:fillRef idx="1">
+            <a:schemeClr val="accent1"/>
+          </a:fillRef>
+          <a:effectRef idx="0">
+            <a:schemeClr val="accent1"/>
+          </a:effectRef>
+          <a:fontRef idx="minor">
+            <a:schemeClr val="lt1"/>
+          </a:fontRef>
+        </p:style>
+        <p:txBody>
+          <a:bodyPr rtlCol="0" anchor="ctr"/>
+          <a:lstStyle/>
+          <a:p>
+            <a:pPr algn="ctr"/>
+            <a:endParaRPr lang="en-US"/>
+          </a:p>
+        </p:txBody>
+      </p:sp>
+      <p:sp>
+        <p:nvSpPr>
+          <p:cNvPr id="18" name="Oval 17"/>
+          <p:cNvSpPr/>
+          <p:nvPr/>
+        </p:nvSpPr>
+        <p:spPr>
+          <a:xfrm>
+            <a:off x="6252593" y="5683521"/>
+            <a:ext cx="407194" cy="389099"/>
+          </a:xfrm>
+          <a:prstGeom prst="ellipse">
+            <a:avLst/>
+          </a:prstGeom>
+          <a:solidFill>
+            <a:schemeClr val="accent1">
+              <a:lumMod val="60000"/>
+              <a:lumOff val="40000"/>
+            </a:schemeClr>
+          </a:solidFill>
+          <a:ln>
+            <a:noFill/>
+          </a:ln>
+        </p:spPr>
+        <p:style>
+          <a:lnRef idx="2">
+            <a:schemeClr val="accent1">
+              <a:shade val="50000"/>
+            </a:schemeClr>
+          </a:lnRef>
+          <a:fillRef idx="1">
+            <a:schemeClr val="accent1"/>
+          </a:fillRef>
+          <a:effectRef idx="0">
+            <a:schemeClr val="accent1"/>
+          </a:effectRef>
+          <a:fontRef idx="minor">
+            <a:schemeClr val="lt1"/>
+          </a:fontRef>
+        </p:style>
+        <p:txBody>
+          <a:bodyPr rtlCol="0" anchor="ctr"/>
+          <a:lstStyle/>
+          <a:p>
+            <a:pPr algn="ctr"/>
+            <a:endParaRPr lang="en-US"/>
+          </a:p>
+        </p:txBody>
+      </p:sp>
+      <p:cxnSp>
+        <p:nvCxnSpPr>
+          <p:cNvPr id="26" name="Straight Connector 25"/>
+          <p:cNvCxnSpPr/>
+          <p:nvPr/>
+        </p:nvCxnSpPr>
+        <p:spPr>
+          <a:xfrm>
+            <a:off x="6448469" y="5836015"/>
+            <a:ext cx="0" cy="95250"/>
+          </a:xfrm>
+          <a:prstGeom prst="line">
+            <a:avLst/>
+          </a:prstGeom>
+          <a:ln w="12700">
+            <a:solidFill>
+              <a:schemeClr val="accent1"/>
+            </a:solidFill>
+          </a:ln>
+        </p:spPr>
+        <p:style>
+          <a:lnRef idx="1">
+            <a:schemeClr val="accent1"/>
+          </a:lnRef>
+          <a:fillRef idx="0">
+            <a:schemeClr val="accent1"/>
+          </a:fillRef>
+          <a:effectRef idx="0">
+            <a:schemeClr val="accent1"/>
+          </a:effectRef>
+          <a:fontRef idx="minor">
+            <a:schemeClr val="tx1"/>
+          </a:fontRef>
+        </p:style>
+      </p:cxnSp>
+      <p:cxnSp>
+        <p:nvCxnSpPr>
+          <p:cNvPr id="28" name="Straight Connector 27"/>
+          <p:cNvCxnSpPr/>
+          <p:nvPr/>
+        </p:nvCxnSpPr>
+        <p:spPr>
+          <a:xfrm>
+            <a:off x="6394593" y="5881505"/>
+            <a:ext cx="107979" cy="0"/>
+          </a:xfrm>
+          <a:prstGeom prst="line">
+            <a:avLst/>
+          </a:prstGeom>
+          <a:ln w="12700">
+            <a:solidFill>
+              <a:schemeClr val="accent1"/>
+            </a:solidFill>
+          </a:ln>
+        </p:spPr>
+        <p:style>
+          <a:lnRef idx="1">
+            <a:schemeClr val="accent1"/>
+          </a:lnRef>
+          <a:fillRef idx="0">
+            <a:schemeClr val="accent1"/>
+          </a:fillRef>
+          <a:effectRef idx="0">
+            <a:schemeClr val="accent1"/>
+          </a:effectRef>
+          <a:fontRef idx="minor">
+            <a:schemeClr val="tx1"/>
+          </a:fontRef>
+        </p:style>
+      </p:cxnSp>
+      <p:sp>
+        <p:nvSpPr>
+          <p:cNvPr id="11" name="Rectangle 10"/>
+          <p:cNvSpPr/>
+          <p:nvPr/>
+        </p:nvSpPr>
+        <p:spPr>
+          <a:xfrm>
+            <a:off x="5155840" y="2293620"/>
+            <a:ext cx="2585484" cy="304800"/>
+          </a:xfrm>
+          <a:prstGeom prst="rect">
+            <a:avLst/>
+          </a:prstGeom>
+          <a:solidFill>
+            <a:schemeClr val="accent1">
+              <a:lumMod val="60000"/>
+              <a:lumOff val="40000"/>
+            </a:schemeClr>
+          </a:solidFill>
+        </p:spPr>
+        <p:style>
+          <a:lnRef idx="2">
+            <a:schemeClr val="accent1">
+              <a:shade val="50000"/>
+            </a:schemeClr>
+          </a:lnRef>
+          <a:fillRef idx="1">
+            <a:schemeClr val="accent1"/>
+          </a:fillRef>
+          <a:effectRef idx="0">
+            <a:schemeClr val="accent1"/>
+          </a:effectRef>
+          <a:fontRef idx="minor">
+            <a:schemeClr val="lt1"/>
+          </a:fontRef>
+        </p:style>
+        <p:txBody>
+          <a:bodyPr rtlCol="0" anchor="ctr"/>
+          <a:lstStyle/>
+          <a:p>
+            <a:r>
+              <a:rPr lang="en-US" dirty="0" smtClean="0"/>
+              <a:t>Item 1</a:t>
+            </a:r>
+            <a:endParaRPr lang="en-US" dirty="0"/>
+          </a:p>
+        </p:txBody>
+      </p:sp>
+      <p:sp>
+        <p:nvSpPr>
+          <p:cNvPr id="27" name="Rectangle 26"/>
+          <p:cNvSpPr/>
+          <p:nvPr/>
+        </p:nvSpPr>
+        <p:spPr>
+          <a:xfrm>
+            <a:off x="5155842" y="2690693"/>
+            <a:ext cx="2585484" cy="304800"/>
+          </a:xfrm>
+          <a:prstGeom prst="rect">
+            <a:avLst/>
+          </a:prstGeom>
+          <a:solidFill>
+            <a:schemeClr val="accent1">
+              <a:lumMod val="60000"/>
+              <a:lumOff val="40000"/>
+            </a:schemeClr>
+          </a:solidFill>
+        </p:spPr>
+        <p:style>
+          <a:lnRef idx="2">
+            <a:schemeClr val="accent1">
+              <a:shade val="50000"/>
+            </a:schemeClr>
+          </a:lnRef>
+          <a:fillRef idx="1">
+            <a:schemeClr val="accent1"/>
+          </a:fillRef>
+          <a:effectRef idx="0">
+            <a:schemeClr val="accent1"/>
+          </a:effectRef>
+          <a:fontRef idx="minor">
+            <a:schemeClr val="lt1"/>
+          </a:fontRef>
+        </p:style>
+        <p:txBody>
+          <a:bodyPr rtlCol="0" anchor="ctr"/>
+          <a:lstStyle/>
+          <a:p>
+            <a:r>
+              <a:rPr lang="en-US" dirty="0" smtClean="0"/>
+              <a:t>Item 2</a:t>
+            </a:r>
+            <a:endParaRPr lang="en-US" dirty="0"/>
+          </a:p>
+        </p:txBody>
+      </p:sp>
+      <p:sp>
+        <p:nvSpPr>
+          <p:cNvPr id="12" name="Rectangle 11"/>
+          <p:cNvSpPr/>
+          <p:nvPr/>
+        </p:nvSpPr>
+        <p:spPr>
+          <a:xfrm>
+            <a:off x="5128260" y="2244090"/>
+            <a:ext cx="2644140" cy="3360420"/>
+          </a:xfrm>
+          <a:prstGeom prst="rect">
+            <a:avLst/>
+          </a:prstGeom>
+          <a:noFill/>
+        </p:spPr>
+        <p:style>
+          <a:lnRef idx="2">
+            <a:schemeClr val="accent1">
+              <a:shade val="50000"/>
+            </a:schemeClr>
+          </a:lnRef>
+          <a:fillRef idx="1">
+            <a:schemeClr val="accent1"/>
+          </a:fillRef>
+          <a:effectRef idx="0">
+            <a:schemeClr val="accent1"/>
+          </a:effectRef>
+          <a:fontRef idx="minor">
+            <a:schemeClr val="lt1"/>
+          </a:fontRef>
+        </p:style>
+        <p:txBody>
+          <a:bodyPr rtlCol="0" anchor="ctr"/>
+          <a:lstStyle/>
+          <a:p>
+            <a:pPr algn="ctr"/>
+            <a:endParaRPr lang="en-US"/>
+          </a:p>
+        </p:txBody>
+      </p:sp>
+      <p:sp>
+        <p:nvSpPr>
+          <p:cNvPr id="2" name="Rounded Rectangle 1"/>
+          <p:cNvSpPr/>
+          <p:nvPr/>
+        </p:nvSpPr>
+        <p:spPr>
+          <a:xfrm>
+            <a:off x="389964" y="286851"/>
+            <a:ext cx="1936377" cy="725706"/>
+          </a:xfrm>
+          <a:prstGeom prst="roundRect">
+            <a:avLst/>
+          </a:prstGeom>
+        </p:spPr>
+        <p:style>
+          <a:lnRef idx="0">
+            <a:schemeClr val="accent2"/>
+          </a:lnRef>
+          <a:fillRef idx="3">
+            <a:schemeClr val="accent2"/>
+          </a:fillRef>
+          <a:effectRef idx="3">
+            <a:schemeClr val="accent2"/>
+          </a:effectRef>
+          <a:fontRef idx="minor">
+            <a:schemeClr val="lt1"/>
+          </a:fontRef>
+        </p:style>
+        <p:txBody>
+          <a:bodyPr rtlCol="0" anchor="ctr"/>
+          <a:lstStyle/>
+          <a:p>
+            <a:pPr algn="ctr"/>
+            <a:r>
+              <a:rPr lang="en-US" sz="3200" b="1" smtClean="0">
+                <a:ln>
+                  <a:solidFill>
+                    <a:schemeClr val="accent1">
+                      <a:lumMod val="75000"/>
+                    </a:schemeClr>
+                  </a:solidFill>
+                </a:ln>
+              </a:rPr>
+              <a:t>COLOR</a:t>
+            </a:r>
+            <a:endParaRPr lang="en-US" sz="3200" b="1">
+              <a:ln>
+                <a:solidFill>
+                  <a:schemeClr val="accent1">
+                    <a:lumMod val="75000"/>
+                  </a:schemeClr>
+                </a:solidFill>
+              </a:ln>
+            </a:endParaRPr>
+          </a:p>
+        </p:txBody>
+      </p:sp>
+      <p:cxnSp>
+        <p:nvCxnSpPr>
+          <p:cNvPr id="15" name="Straight Connector 14"/>
+          <p:cNvCxnSpPr/>
+          <p:nvPr/>
+        </p:nvCxnSpPr>
+        <p:spPr>
+          <a:xfrm>
+            <a:off x="5230230" y="658802"/>
+            <a:ext cx="187155" cy="0"/>
+          </a:xfrm>
+          <a:prstGeom prst="line">
+            <a:avLst/>
+          </a:prstGeom>
+          <a:ln w="12700"/>
+        </p:spPr>
+        <p:style>
+          <a:lnRef idx="1">
+            <a:schemeClr val="accent1"/>
+          </a:lnRef>
+          <a:fillRef idx="0">
+            <a:schemeClr val="accent1"/>
+          </a:fillRef>
+          <a:effectRef idx="0">
+            <a:schemeClr val="accent1"/>
+          </a:effectRef>
+          <a:fontRef idx="minor">
+            <a:schemeClr val="tx1"/>
+          </a:fontRef>
+        </p:style>
+      </p:cxnSp>
+      <p:cxnSp>
+        <p:nvCxnSpPr>
+          <p:cNvPr id="32" name="Straight Connector 31"/>
+          <p:cNvCxnSpPr/>
+          <p:nvPr/>
+        </p:nvCxnSpPr>
+        <p:spPr>
+          <a:xfrm>
+            <a:off x="5230229" y="712554"/>
+            <a:ext cx="187155" cy="0"/>
+          </a:xfrm>
+          <a:prstGeom prst="line">
+            <a:avLst/>
+          </a:prstGeom>
+          <a:ln w="12700"/>
+        </p:spPr>
+        <p:style>
+          <a:lnRef idx="1">
+            <a:schemeClr val="accent1"/>
+          </a:lnRef>
+          <a:fillRef idx="0">
+            <a:schemeClr val="accent1"/>
+          </a:fillRef>
+          <a:effectRef idx="0">
+            <a:schemeClr val="accent1"/>
+          </a:effectRef>
+          <a:fontRef idx="minor">
+            <a:schemeClr val="tx1"/>
+          </a:fontRef>
+        </p:style>
+      </p:cxnSp>
+      <p:cxnSp>
+        <p:nvCxnSpPr>
+          <p:cNvPr id="33" name="Straight Connector 32"/>
+          <p:cNvCxnSpPr/>
+          <p:nvPr/>
+        </p:nvCxnSpPr>
+        <p:spPr>
+          <a:xfrm>
+            <a:off x="5230229" y="769010"/>
+            <a:ext cx="187155" cy="0"/>
+          </a:xfrm>
+          <a:prstGeom prst="line">
+            <a:avLst/>
+          </a:prstGeom>
+          <a:ln w="12700"/>
+        </p:spPr>
+        <p:style>
+          <a:lnRef idx="1">
+            <a:schemeClr val="accent1"/>
+          </a:lnRef>
+          <a:fillRef idx="0">
+            <a:schemeClr val="accent1"/>
+          </a:fillRef>
+          <a:effectRef idx="0">
+            <a:schemeClr val="accent1"/>
+          </a:effectRef>
+          <a:fontRef idx="minor">
+            <a:schemeClr val="tx1"/>
+          </a:fontRef>
+        </p:style>
+      </p:cxnSp>
+    </p:spTree>
+    <p:extLst>
+      <p:ext uri="{BB962C8B-B14F-4D97-AF65-F5344CB8AC3E}">
+        <p14:creationId xmlns:p14="http://schemas.microsoft.com/office/powerpoint/2010/main" val="767753815"/>
       </p:ext>
     </p:extLst>
   </p:cSld>

</xml_diff>